<commit_message>
Update the readme with additional design detail.
</commit_message>
<xml_diff>
--- a/AVXSearch/AVX-Framework.pptx
+++ b/AVXSearch/AVX-Framework.pptx
@@ -10253,13 +10253,13 @@
           <p:nvPr>
             <p:extLst>
               <p:ext uri="{D42A27DB-BD31-4B8C-83A1-F6EECF244321}">
-                <p14:modId xmlns:p14="http://schemas.microsoft.com/office/powerpoint/2010/main" val="1732696242"/>
+                <p14:modId xmlns:p14="http://schemas.microsoft.com/office/powerpoint/2010/main" val="4114340607"/>
               </p:ext>
             </p:extLst>
           </p:nvPr>
         </p:nvGraphicFramePr>
         <p:xfrm>
-          <a:off x="7251285" y="1519318"/>
+          <a:off x="6990982" y="3337080"/>
           <a:ext cx="4245741" cy="2966720"/>
         </p:xfrm>
         <a:graphic>
@@ -10727,97 +10727,6 @@
           </a:graphicData>
         </a:graphic>
       </p:graphicFrame>
-      <p:sp>
-        <p:nvSpPr>
-          <p:cNvPr id="510" name="TextBox 509">
-            <a:extLst>
-              <a:ext uri="{FF2B5EF4-FFF2-40B4-BE49-F238E27FC236}">
-                <a16:creationId xmlns:a16="http://schemas.microsoft.com/office/drawing/2014/main" id="{424D8B57-3C58-D028-B956-AD0D97D0808B}"/>
-              </a:ext>
-            </a:extLst>
-          </p:cNvPr>
-          <p:cNvSpPr txBox="1"/>
-          <p:nvPr/>
-        </p:nvSpPr>
-        <p:spPr>
-          <a:xfrm>
-            <a:off x="7251285" y="5067313"/>
-            <a:ext cx="4245741" cy="1231106"/>
-          </a:xfrm>
-          <a:prstGeom prst="rect">
-            <a:avLst/>
-          </a:prstGeom>
-          <a:noFill/>
-          <a:ln w="25400">
-            <a:solidFill>
-              <a:schemeClr val="accent1"/>
-            </a:solidFill>
-          </a:ln>
-        </p:spPr>
-        <p:txBody>
-          <a:bodyPr wrap="square" rtlCol="0">
-            <a:spAutoFit/>
-          </a:bodyPr>
-          <a:lstStyle/>
-          <a:p>
-            <a:r>
-              <a:rPr lang="en-US" i="1" dirty="0"/>
-              <a:t>TO DO:</a:t>
-            </a:r>
-          </a:p>
-          <a:p>
-            <a:pPr algn="just"/>
-            <a:r>
-              <a:rPr lang="en-US" sz="1400" dirty="0"/>
-              <a:t>Define </a:t>
-            </a:r>
-            <a:r>
-              <a:rPr lang="en-US" sz="1400" dirty="0" err="1"/>
-              <a:t>IAVResult</a:t>
-            </a:r>
-            <a:r>
-              <a:rPr lang="en-US" sz="1400" dirty="0"/>
-              <a:t> interface, appearing to the consumer of AV-Engine as a POCO; it will use a facade pattern to expose a </a:t>
-            </a:r>
-            <a:r>
-              <a:rPr lang="en-US" sz="1400" dirty="0" err="1"/>
-              <a:t>FlatSharp</a:t>
-            </a:r>
-            <a:r>
-              <a:rPr lang="en-US" sz="1400" dirty="0"/>
-              <a:t> [</a:t>
-            </a:r>
-            <a:r>
-              <a:rPr lang="en-US" sz="1400" dirty="0" err="1"/>
-              <a:t>avx_search</a:t>
-            </a:r>
-            <a:r>
-              <a:rPr lang="en-US" sz="1400" dirty="0"/>
-              <a:t>] </a:t>
-            </a:r>
-            <a:r>
-              <a:rPr lang="en-US" sz="1400" dirty="0" err="1"/>
-              <a:t>XResult</a:t>
-            </a:r>
-            <a:r>
-              <a:rPr lang="en-US" sz="1400" dirty="0"/>
-              <a:t> object (w/o adding direct </a:t>
-            </a:r>
-            <a:r>
-              <a:rPr lang="en-US" sz="1400" dirty="0" err="1"/>
-              <a:t>FlatSharp</a:t>
-            </a:r>
-            <a:r>
-              <a:rPr lang="en-US" sz="1400"/>
-              <a:t> API </a:t>
-            </a:r>
-            <a:r>
-              <a:rPr lang="en-US" sz="1400" dirty="0"/>
-              <a:t>dependencies to caller).</a:t>
-            </a:r>
-          </a:p>
-        </p:txBody>
-      </p:sp>
     </p:spTree>
     <p:extLst>
       <p:ext uri="{BB962C8B-B14F-4D97-AF65-F5344CB8AC3E}">

</xml_diff>

<commit_message>
More info about: inputs, outputs, repos, and relative folder locations
</commit_message>
<xml_diff>
--- a/AVXSearch/AVX-Framework.pptx
+++ b/AVXSearch/AVX-Framework.pptx
@@ -3454,17 +3454,17 @@
             <a:pPr algn="ctr"/>
             <a:r>
               <a:rPr lang="en-US" dirty="0"/>
-              <a:t>AVX-Framework dependencies – 3A23</a:t>
+              <a:t>AVX-Framework dependencies – 3A24</a:t>
             </a:r>
           </a:p>
         </p:txBody>
       </p:sp>
       <p:grpSp>
         <p:nvGrpSpPr>
-          <p:cNvPr id="506" name="Group 505">
+          <p:cNvPr id="477" name="Group 476">
             <a:extLst>
               <a:ext uri="{FF2B5EF4-FFF2-40B4-BE49-F238E27FC236}">
-                <a16:creationId xmlns:a16="http://schemas.microsoft.com/office/drawing/2014/main" id="{B93D2B62-CD61-5ECA-76D2-4C11875BDB60}"/>
+                <a16:creationId xmlns:a16="http://schemas.microsoft.com/office/drawing/2014/main" id="{0F560C92-6C19-30D4-3B20-CC3BEFD337A2}"/>
               </a:ext>
             </a:extLst>
           </p:cNvPr>
@@ -3475,7 +3475,7 @@
           <a:xfrm>
             <a:off x="791180" y="1066595"/>
             <a:ext cx="5799694" cy="5231824"/>
-            <a:chOff x="3074511" y="1195674"/>
+            <a:chOff x="791180" y="1066595"/>
             <a:chExt cx="5799694" cy="5231824"/>
           </a:xfrm>
         </p:grpSpPr>
@@ -3493,7 +3493,7 @@
           </p:nvSpPr>
           <p:spPr>
             <a:xfrm>
-              <a:off x="3074511" y="1195674"/>
+              <a:off x="791180" y="1066595"/>
               <a:ext cx="5783786" cy="5231824"/>
             </a:xfrm>
             <a:prstGeom prst="rect">
@@ -3554,7 +3554,7 @@
           </p:nvGrpSpPr>
           <p:grpSpPr>
             <a:xfrm>
-              <a:off x="3656591" y="5644815"/>
+              <a:off x="5076258" y="5515794"/>
               <a:ext cx="1015341" cy="760388"/>
               <a:chOff x="3791378" y="3615014"/>
               <a:chExt cx="1498417" cy="1119069"/>
@@ -4089,7 +4089,7 @@
           </p:nvGrpSpPr>
           <p:grpSpPr>
             <a:xfrm>
-              <a:off x="7292897" y="5644815"/>
+              <a:off x="1305434" y="5515019"/>
               <a:ext cx="987891" cy="760389"/>
               <a:chOff x="3793406" y="3615014"/>
               <a:chExt cx="1457907" cy="1119069"/>
@@ -4620,7 +4620,7 @@
           </p:nvCxnSpPr>
           <p:spPr>
             <a:xfrm>
-              <a:off x="4151562" y="5518128"/>
+              <a:off x="5571229" y="5389107"/>
               <a:ext cx="1296" cy="177538"/>
             </a:xfrm>
             <a:prstGeom prst="straightConnector1">
@@ -4668,7 +4668,7 @@
           </p:nvCxnSpPr>
           <p:spPr>
             <a:xfrm>
-              <a:off x="7783574" y="5518128"/>
+              <a:off x="1796111" y="5388332"/>
               <a:ext cx="4216" cy="177538"/>
             </a:xfrm>
             <a:prstGeom prst="straightConnector1">
@@ -4717,7 +4717,7 @@
           </p:nvCxnSpPr>
           <p:spPr>
             <a:xfrm rot="5400000">
-              <a:off x="4864837" y="2875590"/>
+              <a:off x="2581506" y="2746511"/>
               <a:ext cx="444382" cy="944"/>
             </a:xfrm>
             <a:prstGeom prst="bentConnector3">
@@ -4765,7 +4765,7 @@
           </p:nvSpPr>
           <p:spPr>
             <a:xfrm>
-              <a:off x="3373263" y="4547646"/>
+              <a:off x="4792930" y="4418625"/>
               <a:ext cx="1575459" cy="979714"/>
             </a:xfrm>
             <a:prstGeom prst="rect">
@@ -4891,7 +4891,7 @@
           </p:nvSpPr>
           <p:spPr>
             <a:xfrm>
-              <a:off x="5186094" y="4547646"/>
+              <a:off x="2902763" y="4418567"/>
               <a:ext cx="1575459" cy="979714"/>
             </a:xfrm>
             <a:prstGeom prst="rect">
@@ -5050,7 +5050,7 @@
           </p:nvSpPr>
           <p:spPr>
             <a:xfrm>
-              <a:off x="4299770" y="1674157"/>
+              <a:off x="2016439" y="1545078"/>
               <a:ext cx="1575459" cy="979714"/>
             </a:xfrm>
             <a:prstGeom prst="rect">
@@ -5336,7 +5336,7 @@
           </p:nvSpPr>
           <p:spPr>
             <a:xfrm>
-              <a:off x="6143763" y="1672709"/>
+              <a:off x="3860432" y="1543630"/>
               <a:ext cx="1575459" cy="987836"/>
             </a:xfrm>
             <a:prstGeom prst="rect">
@@ -5622,7 +5622,7 @@
           </p:nvSpPr>
           <p:spPr>
             <a:xfrm>
-              <a:off x="4298826" y="3098253"/>
+              <a:off x="2015495" y="2969174"/>
               <a:ext cx="1575459" cy="979714"/>
             </a:xfrm>
             <a:prstGeom prst="rect">
@@ -5857,7 +5857,7 @@
           </p:nvCxnSpPr>
           <p:spPr>
             <a:xfrm>
-              <a:off x="5875229" y="2164014"/>
+              <a:off x="3591898" y="2034935"/>
               <a:ext cx="268534" cy="2613"/>
             </a:xfrm>
             <a:prstGeom prst="straightConnector1">
@@ -5899,15 +5899,15 @@
             </p:cNvPr>
             <p:cNvCxnSpPr>
               <a:cxnSpLocks/>
-              <a:stCxn id="10" idx="2"/>
-              <a:endCxn id="6" idx="0"/>
+              <a:stCxn id="7" idx="3"/>
+              <a:endCxn id="6" idx="1"/>
             </p:cNvCxnSpPr>
             <p:nvPr/>
           </p:nvCxnSpPr>
           <p:spPr>
-            <a:xfrm rot="5400000">
-              <a:off x="4388936" y="3850025"/>
-              <a:ext cx="469679" cy="925563"/>
+            <a:xfrm>
+              <a:off x="4478222" y="4908424"/>
+              <a:ext cx="314708" cy="58"/>
             </a:xfrm>
             <a:prstGeom prst="bentConnector3">
               <a:avLst>
@@ -5957,7 +5957,7 @@
           </p:nvCxnSpPr>
           <p:spPr>
             <a:xfrm rot="16200000" flipH="1">
-              <a:off x="5295351" y="3869172"/>
+              <a:off x="3012020" y="3740093"/>
               <a:ext cx="469679" cy="887268"/>
             </a:xfrm>
             <a:prstGeom prst="bentConnector3">
@@ -6004,7 +6004,7 @@
           </p:nvSpPr>
           <p:spPr>
             <a:xfrm>
-              <a:off x="6998925" y="4547646"/>
+              <a:off x="1011462" y="4417850"/>
               <a:ext cx="1575459" cy="979714"/>
             </a:xfrm>
             <a:prstGeom prst="rect">
@@ -6126,9 +6126,9 @@
             <p:nvPr/>
           </p:nvCxnSpPr>
           <p:spPr>
-            <a:xfrm rot="16200000" flipH="1">
-              <a:off x="6201766" y="2962756"/>
-              <a:ext cx="469679" cy="2700099"/>
+            <a:xfrm rot="5400000">
+              <a:off x="2066728" y="3681353"/>
+              <a:ext cx="468962" cy="1004033"/>
             </a:xfrm>
             <a:prstGeom prst="bentConnector3">
               <a:avLst>
@@ -6174,14 +6174,14 @@
           </p:nvSpPr>
           <p:spPr>
             <a:xfrm>
-              <a:off x="6143763" y="3092104"/>
+              <a:off x="3860432" y="2963025"/>
               <a:ext cx="1575459" cy="979714"/>
             </a:xfrm>
             <a:prstGeom prst="rect">
               <a:avLst/>
             </a:prstGeom>
             <a:solidFill>
-              <a:srgbClr val="4472C4"/>
+              <a:srgbClr val="7030A0"/>
             </a:solidFill>
           </p:spPr>
           <p:style>
@@ -6204,39 +6204,10 @@
             <a:bodyPr rtlCol="0" anchor="ctr"/>
             <a:lstStyle/>
             <a:p>
-              <a:pPr marL="0" marR="0" lvl="0" indent="0" algn="ctr" defTabSz="914400" rtl="0" eaLnBrk="1" fontAlgn="auto" latinLnBrk="0" hangingPunct="1">
-                <a:lnSpc>
-                  <a:spcPct val="100000"/>
-                </a:lnSpc>
-                <a:spcBef>
-                  <a:spcPts val="0"/>
-                </a:spcBef>
-                <a:spcAft>
-                  <a:spcPts val="0"/>
-                </a:spcAft>
-                <a:buClrTx/>
-                <a:buSzTx/>
-                <a:buFontTx/>
-                <a:buNone/>
-                <a:tabLst/>
-                <a:defRPr/>
-              </a:pPr>
+              <a:pPr algn="ctr"/>
               <a:r>
-                <a:rPr kumimoji="0" lang="en-US" sz="800" b="0" i="0" u="none" strike="noStrike" kern="1200" cap="none" spc="0" normalizeH="0" baseline="0" noProof="0" dirty="0">
-                  <a:ln>
-                    <a:noFill/>
-                  </a:ln>
-                  <a:solidFill>
-                    <a:prstClr val="white"/>
-                  </a:solidFill>
-                  <a:effectLst/>
-                  <a:uLnTx/>
-                  <a:uFillTx/>
-                  <a:latin typeface="Calibri" panose="020F0502020204030204"/>
-                  <a:ea typeface="+mn-ea"/>
-                  <a:cs typeface="+mn-cs"/>
-                </a:rPr>
-                <a:t>http://github.com/AV-Text</a:t>
+                <a:rPr lang="en-US" sz="800" dirty="0"/>
+                <a:t>http://github.com/kwonus </a:t>
               </a:r>
             </a:p>
             <a:p>
@@ -6396,7 +6367,7 @@
           </p:nvCxnSpPr>
           <p:spPr>
             <a:xfrm flipV="1">
-              <a:off x="5874285" y="3581961"/>
+              <a:off x="3590954" y="3452882"/>
               <a:ext cx="269478" cy="6149"/>
             </a:xfrm>
             <a:prstGeom prst="straightConnector1">
@@ -6441,7 +6412,7 @@
           </p:nvGrpSpPr>
           <p:grpSpPr>
             <a:xfrm>
-              <a:off x="7735129" y="2562516"/>
+              <a:off x="5451798" y="2433437"/>
               <a:ext cx="1139076" cy="853175"/>
               <a:chOff x="10738631" y="2574015"/>
               <a:chExt cx="1139076" cy="853175"/>
@@ -7002,7 +6973,7 @@
           </p:nvCxnSpPr>
           <p:spPr>
             <a:xfrm rot="5400000" flipH="1" flipV="1">
-              <a:off x="7456717" y="2409614"/>
+              <a:off x="5173386" y="2280535"/>
               <a:ext cx="157267" cy="1207714"/>
             </a:xfrm>
             <a:prstGeom prst="bentConnector2">
@@ -7049,7 +7020,7 @@
           </p:nvCxnSpPr>
           <p:spPr>
             <a:xfrm rot="16200000" flipH="1">
-              <a:off x="7463279" y="2144689"/>
+              <a:off x="5179948" y="2015610"/>
               <a:ext cx="144142" cy="1207712"/>
             </a:xfrm>
             <a:prstGeom prst="bentConnector2">
@@ -7094,7 +7065,7 @@
           </p:nvGrpSpPr>
           <p:grpSpPr>
             <a:xfrm>
-              <a:off x="5421264" y="5644815"/>
+              <a:off x="3137933" y="5515736"/>
               <a:ext cx="1015341" cy="760389"/>
               <a:chOff x="3752896" y="3615014"/>
               <a:chExt cx="1498417" cy="1119069"/>
@@ -7651,7 +7622,7 @@
           </p:nvCxnSpPr>
           <p:spPr>
             <a:xfrm>
-              <a:off x="5943606" y="5518557"/>
+              <a:off x="3660275" y="5389478"/>
               <a:ext cx="4216" cy="177538"/>
             </a:xfrm>
             <a:prstGeom prst="straightConnector1">
@@ -7696,7 +7667,7 @@
           </p:nvGrpSpPr>
           <p:grpSpPr>
             <a:xfrm>
-              <a:off x="3206434" y="1447844"/>
+              <a:off x="923103" y="1318765"/>
               <a:ext cx="987891" cy="760389"/>
               <a:chOff x="3793406" y="3615014"/>
               <a:chExt cx="1457907" cy="1119069"/>
@@ -8231,7 +8202,7 @@
           </p:nvGrpSpPr>
           <p:grpSpPr>
             <a:xfrm>
-              <a:off x="3178984" y="3322340"/>
+              <a:off x="895653" y="3193261"/>
               <a:ext cx="1015341" cy="760389"/>
               <a:chOff x="3752896" y="3615014"/>
               <a:chExt cx="1498417" cy="1119069"/>
@@ -8786,7 +8757,7 @@
           </p:nvGrpSpPr>
           <p:grpSpPr>
             <a:xfrm>
-              <a:off x="3178984" y="2232681"/>
+              <a:off x="895653" y="2103602"/>
               <a:ext cx="1015341" cy="760389"/>
               <a:chOff x="3752896" y="3615014"/>
               <a:chExt cx="1498417" cy="1119069"/>
@@ -9323,7 +9294,7 @@
           </p:nvCxnSpPr>
           <p:spPr>
             <a:xfrm flipH="1">
-              <a:off x="3857801" y="1789200"/>
+              <a:off x="1574470" y="1660121"/>
               <a:ext cx="441025" cy="0"/>
             </a:xfrm>
             <a:prstGeom prst="straightConnector1">
@@ -9370,7 +9341,7 @@
           </p:nvCxnSpPr>
           <p:spPr>
             <a:xfrm flipH="1">
-              <a:off x="3857801" y="2495021"/>
+              <a:off x="1574470" y="2365942"/>
               <a:ext cx="408906" cy="0"/>
             </a:xfrm>
             <a:prstGeom prst="straightConnector1">
@@ -9419,7 +9390,7 @@
           </p:nvCxnSpPr>
           <p:spPr>
             <a:xfrm flipH="1" flipV="1">
-              <a:off x="3858240" y="3588031"/>
+              <a:off x="1574909" y="3458952"/>
               <a:ext cx="440586" cy="79"/>
             </a:xfrm>
             <a:prstGeom prst="straightConnector1">
@@ -9464,7 +9435,7 @@
           </p:nvGrpSpPr>
           <p:grpSpPr>
             <a:xfrm>
-              <a:off x="5935298" y="4330668"/>
+              <a:off x="3651967" y="4201589"/>
               <a:ext cx="741133" cy="260141"/>
               <a:chOff x="7686586" y="4456943"/>
               <a:chExt cx="741133" cy="260141"/>
@@ -9577,7 +9548,7 @@
           </p:nvGrpSpPr>
           <p:grpSpPr>
             <a:xfrm>
-              <a:off x="5271380" y="4330668"/>
+              <a:off x="2988049" y="4201589"/>
               <a:ext cx="741133" cy="260141"/>
               <a:chOff x="7686586" y="4456943"/>
               <a:chExt cx="741133" cy="260141"/>
@@ -9613,7 +9584,7 @@
               <a:p>
                 <a:pPr algn="ctr"/>
                 <a:r>
-                  <a:rPr lang="en-US" sz="800" dirty="0" err="1">
+                  <a:rPr lang="en-US" sz="800" dirty="0">
                     <a:solidFill>
                       <a:schemeClr val="tx1">
                         <a:lumMod val="50000"/>
@@ -9621,16 +9592,8 @@
                       </a:schemeClr>
                     </a:solidFill>
                   </a:rPr>
-                  <a:t>json</a:t>
+                  <a:t>string</a:t>
                 </a:r>
-                <a:endParaRPr lang="en-US" sz="800" dirty="0">
-                  <a:solidFill>
-                    <a:schemeClr val="tx1">
-                      <a:lumMod val="50000"/>
-                      <a:lumOff val="50000"/>
-                    </a:schemeClr>
-                  </a:solidFill>
-                </a:endParaRPr>
               </a:p>
             </p:txBody>
           </p:sp>
@@ -9689,8 +9652,8 @@
             <p:nvPr/>
           </p:nvGrpSpPr>
           <p:grpSpPr>
-            <a:xfrm>
-              <a:off x="4120458" y="4330668"/>
+            <a:xfrm rot="16200000">
+              <a:off x="4300247" y="4944681"/>
               <a:ext cx="741133" cy="260141"/>
               <a:chOff x="7686586" y="4456943"/>
               <a:chExt cx="741133" cy="260141"/>
@@ -9802,8 +9765,8 @@
             <p:nvPr/>
           </p:nvGrpSpPr>
           <p:grpSpPr>
-            <a:xfrm>
-              <a:off x="3456540" y="4330668"/>
+            <a:xfrm rot="16200000">
+              <a:off x="4300248" y="4555284"/>
               <a:ext cx="741133" cy="260141"/>
               <a:chOff x="7686586" y="4456943"/>
               <a:chExt cx="741133" cy="260141"/>
@@ -9908,7 +9871,7 @@
           </p:nvGrpSpPr>
           <p:grpSpPr>
             <a:xfrm>
-              <a:off x="7769363" y="4330668"/>
+              <a:off x="1781900" y="4200872"/>
               <a:ext cx="741133" cy="260141"/>
               <a:chOff x="7686586" y="4456943"/>
               <a:chExt cx="741133" cy="260141"/>
@@ -10013,7 +9976,7 @@
           </p:nvGrpSpPr>
           <p:grpSpPr>
             <a:xfrm>
-              <a:off x="7105445" y="4330668"/>
+              <a:off x="1117982" y="4200872"/>
               <a:ext cx="741133" cy="260141"/>
               <a:chOff x="7686586" y="4456943"/>
               <a:chExt cx="741133" cy="260141"/>
@@ -10120,7 +10083,7 @@
           </p:nvCxnSpPr>
           <p:spPr>
             <a:xfrm>
-              <a:off x="5432259" y="2934604"/>
+              <a:off x="3148928" y="2805525"/>
               <a:ext cx="0" cy="138792"/>
             </a:xfrm>
             <a:prstGeom prst="straightConnector1">
@@ -10159,7 +10122,7 @@
           </p:nvSpPr>
           <p:spPr>
             <a:xfrm>
-              <a:off x="5086556" y="2741442"/>
+              <a:off x="2803225" y="2612363"/>
               <a:ext cx="741133" cy="215444"/>
             </a:xfrm>
             <a:prstGeom prst="rect">
@@ -10212,7 +10175,7 @@
           </p:nvCxnSpPr>
           <p:spPr>
             <a:xfrm flipV="1">
-              <a:off x="5432259" y="2661471"/>
+              <a:off x="3148928" y="2532392"/>
               <a:ext cx="0" cy="138890"/>
             </a:xfrm>
             <a:prstGeom prst="straightConnector1">
@@ -10253,7 +10216,7 @@
           <p:nvPr>
             <p:extLst>
               <p:ext uri="{D42A27DB-BD31-4B8C-83A1-F6EECF244321}">
-                <p14:modId xmlns:p14="http://schemas.microsoft.com/office/powerpoint/2010/main" val="4114340607"/>
+                <p14:modId xmlns:p14="http://schemas.microsoft.com/office/powerpoint/2010/main" val="2885092314"/>
               </p:ext>
             </p:extLst>
           </p:nvPr>
@@ -10638,13 +10601,8 @@
                     <a:p>
                       <a:r>
                         <a:rPr lang="en-US" sz="1100" dirty="0"/>
-                        <a:t>null-terminated </a:t>
+                        <a:t>null-terminated string</a:t>
                       </a:r>
-                      <a:r>
-                        <a:rPr lang="en-US" sz="1100" dirty="0" err="1"/>
-                        <a:t>json</a:t>
-                      </a:r>
-                      <a:endParaRPr lang="en-US" sz="1100" dirty="0"/>
                     </a:p>
                   </a:txBody>
                   <a:tcPr anchor="ctr"/>
@@ -10759,10 +10717,10 @@
       </p:grpSpPr>
       <p:grpSp>
         <p:nvGrpSpPr>
-          <p:cNvPr id="36" name="Group 35">
+          <p:cNvPr id="227" name="Group 226">
             <a:extLst>
               <a:ext uri="{FF2B5EF4-FFF2-40B4-BE49-F238E27FC236}">
-                <a16:creationId xmlns:a16="http://schemas.microsoft.com/office/drawing/2014/main" id="{9BAD7F74-4B43-8FA9-02E0-950C93A2CF6E}"/>
+                <a16:creationId xmlns:a16="http://schemas.microsoft.com/office/drawing/2014/main" id="{00ADCB59-D113-1780-4EF7-867F3D14D91C}"/>
               </a:ext>
             </a:extLst>
           </p:cNvPr>
@@ -11037,7 +10995,7 @@
           </p:nvSpPr>
           <p:spPr>
             <a:xfrm>
-              <a:off x="5121969" y="4681865"/>
+              <a:off x="8812171" y="4684058"/>
               <a:ext cx="1575459" cy="979714"/>
             </a:xfrm>
             <a:prstGeom prst="rect">
@@ -12185,7 +12143,7 @@
           </p:nvSpPr>
           <p:spPr>
             <a:xfrm>
-              <a:off x="6222265" y="5306670"/>
+              <a:off x="9912467" y="5302685"/>
               <a:ext cx="475163" cy="369332"/>
             </a:xfrm>
             <a:prstGeom prst="rect">
@@ -12276,15 +12234,15 @@
             </p:cNvPr>
             <p:cNvCxnSpPr>
               <a:cxnSpLocks/>
-              <a:stCxn id="135" idx="2"/>
-              <a:endCxn id="130" idx="0"/>
+              <a:stCxn id="131" idx="3"/>
+              <a:endCxn id="130" idx="1"/>
             </p:cNvCxnSpPr>
             <p:nvPr/>
           </p:nvCxnSpPr>
           <p:spPr>
-            <a:xfrm rot="5400000">
-              <a:off x="6137642" y="3984244"/>
-              <a:ext cx="469679" cy="925563"/>
+            <a:xfrm>
+              <a:off x="8510259" y="5171722"/>
+              <a:ext cx="301912" cy="2193"/>
             </a:xfrm>
             <a:prstGeom prst="bentConnector3">
               <a:avLst>
@@ -12381,7 +12339,7 @@
           </p:nvSpPr>
           <p:spPr>
             <a:xfrm>
-              <a:off x="8747631" y="4681865"/>
+              <a:off x="5055199" y="4675813"/>
               <a:ext cx="1575459" cy="979714"/>
             </a:xfrm>
             <a:prstGeom prst="rect">
@@ -12506,9 +12464,9 @@
             <p:nvPr/>
           </p:nvCxnSpPr>
           <p:spPr>
-            <a:xfrm rot="16200000" flipH="1">
-              <a:off x="7950472" y="3096975"/>
-              <a:ext cx="469679" cy="2700099"/>
+            <a:xfrm rot="5400000">
+              <a:off x="6107283" y="3947833"/>
+              <a:ext cx="463627" cy="992333"/>
             </a:xfrm>
             <a:prstGeom prst="bentConnector3">
               <a:avLst>
@@ -12554,7 +12512,7 @@
           </p:nvSpPr>
           <p:spPr>
             <a:xfrm>
-              <a:off x="9891881" y="5306670"/>
+              <a:off x="6199449" y="5300618"/>
               <a:ext cx="475163" cy="369332"/>
             </a:xfrm>
             <a:prstGeom prst="rect">
@@ -12606,7 +12564,7 @@
               <a:avLst/>
             </a:prstGeom>
             <a:solidFill>
-              <a:srgbClr val="4472C4"/>
+              <a:srgbClr val="7030A0"/>
             </a:solidFill>
           </p:spPr>
           <p:style>
@@ -12629,39 +12587,10 @@
             <a:bodyPr rtlCol="0" anchor="ctr"/>
             <a:lstStyle/>
             <a:p>
-              <a:pPr marL="0" marR="0" lvl="0" indent="0" algn="ctr" defTabSz="914400" rtl="0" eaLnBrk="1" fontAlgn="auto" latinLnBrk="0" hangingPunct="1">
-                <a:lnSpc>
-                  <a:spcPct val="100000"/>
-                </a:lnSpc>
-                <a:spcBef>
-                  <a:spcPts val="0"/>
-                </a:spcBef>
-                <a:spcAft>
-                  <a:spcPts val="0"/>
-                </a:spcAft>
-                <a:buClrTx/>
-                <a:buSzTx/>
-                <a:buFontTx/>
-                <a:buNone/>
-                <a:tabLst/>
-                <a:defRPr/>
-              </a:pPr>
+              <a:pPr algn="ctr"/>
               <a:r>
-                <a:rPr kumimoji="0" lang="en-US" sz="800" b="0" i="0" u="none" strike="noStrike" kern="1200" cap="none" spc="0" normalizeH="0" baseline="0" noProof="0" dirty="0">
-                  <a:ln>
-                    <a:noFill/>
-                  </a:ln>
-                  <a:solidFill>
-                    <a:prstClr val="white"/>
-                  </a:solidFill>
-                  <a:effectLst/>
-                  <a:uLnTx/>
-                  <a:uFillTx/>
-                  <a:latin typeface="Calibri" panose="020F0502020204030204"/>
-                  <a:ea typeface="+mn-ea"/>
-                  <a:cs typeface="+mn-cs"/>
-                </a:rPr>
-                <a:t>http://github.com/AV-Text</a:t>
+                <a:rPr lang="en-US" sz="800" dirty="0"/>
+                <a:t>http://github.com/kwonus </a:t>
               </a:r>
             </a:p>
             <a:p>
@@ -13669,7 +13598,7 @@
           </p:nvSpPr>
           <p:spPr>
             <a:xfrm>
-              <a:off x="9059893" y="2481285"/>
+              <a:off x="9036288" y="2481285"/>
               <a:ext cx="475163" cy="369332"/>
             </a:xfrm>
             <a:prstGeom prst="rect">
@@ -13973,224 +13902,6 @@
         </p:grpSp>
         <p:grpSp>
           <p:nvGrpSpPr>
-            <p:cNvPr id="18" name="Group 17">
-              <a:extLst>
-                <a:ext uri="{FF2B5EF4-FFF2-40B4-BE49-F238E27FC236}">
-                  <a16:creationId xmlns:a16="http://schemas.microsoft.com/office/drawing/2014/main" id="{7D9EED3B-D31C-E323-0756-546847D282C4}"/>
-                </a:ext>
-              </a:extLst>
-            </p:cNvPr>
-            <p:cNvGrpSpPr/>
-            <p:nvPr/>
-          </p:nvGrpSpPr>
-          <p:grpSpPr>
-            <a:xfrm>
-              <a:off x="5871746" y="4475974"/>
-              <a:ext cx="741133" cy="260141"/>
-              <a:chOff x="7686586" y="4456943"/>
-              <a:chExt cx="741133" cy="260141"/>
-            </a:xfrm>
-          </p:grpSpPr>
-          <p:sp>
-            <p:nvSpPr>
-              <p:cNvPr id="19" name="TextBox 18">
-                <a:extLst>
-                  <a:ext uri="{FF2B5EF4-FFF2-40B4-BE49-F238E27FC236}">
-                    <a16:creationId xmlns:a16="http://schemas.microsoft.com/office/drawing/2014/main" id="{79B2F546-EACF-3259-852B-EB5B001A0E09}"/>
-                  </a:ext>
-                </a:extLst>
-              </p:cNvPr>
-              <p:cNvSpPr txBox="1"/>
-              <p:nvPr/>
-            </p:nvSpPr>
-            <p:spPr>
-              <a:xfrm>
-                <a:off x="7686586" y="4501640"/>
-                <a:ext cx="741133" cy="215444"/>
-              </a:xfrm>
-              <a:prstGeom prst="rect">
-                <a:avLst/>
-              </a:prstGeom>
-              <a:noFill/>
-            </p:spPr>
-            <p:txBody>
-              <a:bodyPr wrap="square" rtlCol="0">
-                <a:spAutoFit/>
-              </a:bodyPr>
-              <a:lstStyle/>
-              <a:p>
-                <a:pPr algn="ctr"/>
-                <a:r>
-                  <a:rPr lang="en-US" sz="800" dirty="0" err="1">
-                    <a:solidFill>
-                      <a:schemeClr val="tx1">
-                        <a:lumMod val="50000"/>
-                        <a:lumOff val="50000"/>
-                      </a:schemeClr>
-                    </a:solidFill>
-                  </a:rPr>
-                  <a:t>json</a:t>
-                </a:r>
-                <a:endParaRPr lang="en-US" sz="800" dirty="0">
-                  <a:solidFill>
-                    <a:schemeClr val="tx1">
-                      <a:lumMod val="50000"/>
-                      <a:lumOff val="50000"/>
-                    </a:schemeClr>
-                  </a:solidFill>
-                </a:endParaRPr>
-              </a:p>
-            </p:txBody>
-          </p:sp>
-          <p:cxnSp>
-            <p:nvCxnSpPr>
-              <p:cNvPr id="20" name="Connector: Elbow 5">
-                <a:extLst>
-                  <a:ext uri="{FF2B5EF4-FFF2-40B4-BE49-F238E27FC236}">
-                    <a16:creationId xmlns:a16="http://schemas.microsoft.com/office/drawing/2014/main" id="{14F4DBBA-7E8C-236A-7289-9E3A4BBD2DAB}"/>
-                  </a:ext>
-                </a:extLst>
-              </p:cNvPr>
-              <p:cNvCxnSpPr>
-                <a:cxnSpLocks/>
-              </p:cNvCxnSpPr>
-              <p:nvPr/>
-            </p:nvCxnSpPr>
-            <p:spPr>
-              <a:xfrm flipV="1">
-                <a:off x="8032289" y="4456943"/>
-                <a:ext cx="0" cy="109794"/>
-              </a:xfrm>
-              <a:prstGeom prst="straightConnector1">
-                <a:avLst/>
-              </a:prstGeom>
-              <a:ln>
-                <a:tailEnd type="triangle"/>
-              </a:ln>
-            </p:spPr>
-            <p:style>
-              <a:lnRef idx="1">
-                <a:schemeClr val="accent1"/>
-              </a:lnRef>
-              <a:fillRef idx="0">
-                <a:schemeClr val="accent1"/>
-              </a:fillRef>
-              <a:effectRef idx="0">
-                <a:schemeClr val="accent1"/>
-              </a:effectRef>
-              <a:fontRef idx="minor">
-                <a:schemeClr val="tx1"/>
-              </a:fontRef>
-            </p:style>
-          </p:cxnSp>
-        </p:grpSp>
-        <p:grpSp>
-          <p:nvGrpSpPr>
-            <p:cNvPr id="21" name="Group 20">
-              <a:extLst>
-                <a:ext uri="{FF2B5EF4-FFF2-40B4-BE49-F238E27FC236}">
-                  <a16:creationId xmlns:a16="http://schemas.microsoft.com/office/drawing/2014/main" id="{C85C3A1A-7E85-9FFD-29E9-BFCE6FCDA518}"/>
-                </a:ext>
-              </a:extLst>
-            </p:cNvPr>
-            <p:cNvGrpSpPr/>
-            <p:nvPr/>
-          </p:nvGrpSpPr>
-          <p:grpSpPr>
-            <a:xfrm>
-              <a:off x="5207828" y="4475974"/>
-              <a:ext cx="741133" cy="260141"/>
-              <a:chOff x="7686586" y="4456943"/>
-              <a:chExt cx="741133" cy="260141"/>
-            </a:xfrm>
-          </p:grpSpPr>
-          <p:sp>
-            <p:nvSpPr>
-              <p:cNvPr id="22" name="TextBox 21">
-                <a:extLst>
-                  <a:ext uri="{FF2B5EF4-FFF2-40B4-BE49-F238E27FC236}">
-                    <a16:creationId xmlns:a16="http://schemas.microsoft.com/office/drawing/2014/main" id="{BCA58D21-9F07-41A9-47B3-A82C1D87EC03}"/>
-                  </a:ext>
-                </a:extLst>
-              </p:cNvPr>
-              <p:cNvSpPr txBox="1"/>
-              <p:nvPr/>
-            </p:nvSpPr>
-            <p:spPr>
-              <a:xfrm>
-                <a:off x="7686586" y="4501640"/>
-                <a:ext cx="741133" cy="215444"/>
-              </a:xfrm>
-              <a:prstGeom prst="rect">
-                <a:avLst/>
-              </a:prstGeom>
-              <a:noFill/>
-            </p:spPr>
-            <p:txBody>
-              <a:bodyPr wrap="square" rtlCol="0">
-                <a:spAutoFit/>
-              </a:bodyPr>
-              <a:lstStyle/>
-              <a:p>
-                <a:pPr algn="ctr"/>
-                <a:r>
-                  <a:rPr lang="en-US" sz="800" dirty="0">
-                    <a:solidFill>
-                      <a:schemeClr val="tx1">
-                        <a:lumMod val="50000"/>
-                        <a:lumOff val="50000"/>
-                      </a:schemeClr>
-                    </a:solidFill>
-                  </a:rPr>
-                  <a:t>string</a:t>
-                </a:r>
-              </a:p>
-            </p:txBody>
-          </p:sp>
-          <p:cxnSp>
-            <p:nvCxnSpPr>
-              <p:cNvPr id="23" name="Connector: Elbow 5">
-                <a:extLst>
-                  <a:ext uri="{FF2B5EF4-FFF2-40B4-BE49-F238E27FC236}">
-                    <a16:creationId xmlns:a16="http://schemas.microsoft.com/office/drawing/2014/main" id="{6BF7CEAF-298E-DD67-AEE9-C2DC89728F77}"/>
-                  </a:ext>
-                </a:extLst>
-              </p:cNvPr>
-              <p:cNvCxnSpPr>
-                <a:cxnSpLocks/>
-              </p:cNvCxnSpPr>
-              <p:nvPr/>
-            </p:nvCxnSpPr>
-            <p:spPr>
-              <a:xfrm>
-                <a:off x="8032289" y="4456943"/>
-                <a:ext cx="0" cy="109794"/>
-              </a:xfrm>
-              <a:prstGeom prst="straightConnector1">
-                <a:avLst/>
-              </a:prstGeom>
-              <a:ln>
-                <a:tailEnd type="triangle"/>
-              </a:ln>
-            </p:spPr>
-            <p:style>
-              <a:lnRef idx="1">
-                <a:schemeClr val="accent1"/>
-              </a:lnRef>
-              <a:fillRef idx="0">
-                <a:schemeClr val="accent1"/>
-              </a:fillRef>
-              <a:effectRef idx="0">
-                <a:schemeClr val="accent1"/>
-              </a:effectRef>
-              <a:fontRef idx="minor">
-                <a:schemeClr val="tx1"/>
-              </a:fontRef>
-            </p:style>
-          </p:cxnSp>
-        </p:grpSp>
-        <p:grpSp>
-          <p:nvGrpSpPr>
             <p:cNvPr id="24" name="Group 23">
               <a:extLst>
                 <a:ext uri="{FF2B5EF4-FFF2-40B4-BE49-F238E27FC236}">
@@ -14203,7 +13914,7 @@
           </p:nvGrpSpPr>
           <p:grpSpPr>
             <a:xfrm>
-              <a:off x="9520651" y="4475974"/>
+              <a:off x="5828219" y="4469922"/>
               <a:ext cx="741133" cy="260141"/>
               <a:chOff x="7686586" y="4456943"/>
               <a:chExt cx="741133" cy="260141"/>
@@ -14308,7 +14019,7 @@
           </p:nvGrpSpPr>
           <p:grpSpPr>
             <a:xfrm>
-              <a:off x="8856733" y="4475974"/>
+              <a:off x="5164301" y="4469922"/>
               <a:ext cx="741133" cy="260141"/>
               <a:chOff x="7686586" y="4456943"/>
               <a:chExt cx="741133" cy="260141"/>
@@ -14399,6 +14110,269 @@
             </p:style>
           </p:cxnSp>
         </p:grpSp>
+        <p:grpSp>
+          <p:nvGrpSpPr>
+            <p:cNvPr id="218" name="Group 217">
+              <a:extLst>
+                <a:ext uri="{FF2B5EF4-FFF2-40B4-BE49-F238E27FC236}">
+                  <a16:creationId xmlns:a16="http://schemas.microsoft.com/office/drawing/2014/main" id="{DCE60BDE-1878-E9E5-F48E-DD18E36C867D}"/>
+                </a:ext>
+              </a:extLst>
+            </p:cNvPr>
+            <p:cNvGrpSpPr/>
+            <p:nvPr/>
+          </p:nvGrpSpPr>
+          <p:grpSpPr>
+            <a:xfrm rot="16200000">
+              <a:off x="8339452" y="5231873"/>
+              <a:ext cx="741133" cy="260141"/>
+              <a:chOff x="7686586" y="4456943"/>
+              <a:chExt cx="741133" cy="260141"/>
+            </a:xfrm>
+          </p:grpSpPr>
+          <p:sp>
+            <p:nvSpPr>
+              <p:cNvPr id="219" name="TextBox 218">
+                <a:extLst>
+                  <a:ext uri="{FF2B5EF4-FFF2-40B4-BE49-F238E27FC236}">
+                    <a16:creationId xmlns:a16="http://schemas.microsoft.com/office/drawing/2014/main" id="{598EAFE0-DF8E-BB15-A99B-8A7EB98AC554}"/>
+                  </a:ext>
+                </a:extLst>
+              </p:cNvPr>
+              <p:cNvSpPr txBox="1"/>
+              <p:nvPr/>
+            </p:nvSpPr>
+            <p:spPr>
+              <a:xfrm>
+                <a:off x="7686586" y="4501640"/>
+                <a:ext cx="741133" cy="215444"/>
+              </a:xfrm>
+              <a:prstGeom prst="rect">
+                <a:avLst/>
+              </a:prstGeom>
+              <a:noFill/>
+            </p:spPr>
+            <p:txBody>
+              <a:bodyPr wrap="square" rtlCol="0">
+                <a:spAutoFit/>
+              </a:bodyPr>
+              <a:lstStyle/>
+              <a:p>
+                <a:pPr algn="ctr"/>
+                <a:r>
+                  <a:rPr lang="en-US" sz="800" dirty="0" err="1">
+                    <a:solidFill>
+                      <a:schemeClr val="tx1">
+                        <a:lumMod val="50000"/>
+                        <a:lumOff val="50000"/>
+                      </a:schemeClr>
+                    </a:solidFill>
+                  </a:rPr>
+                  <a:t>json</a:t>
+                </a:r>
+                <a:endParaRPr lang="en-US" sz="800" dirty="0">
+                  <a:solidFill>
+                    <a:schemeClr val="tx1">
+                      <a:lumMod val="50000"/>
+                      <a:lumOff val="50000"/>
+                    </a:schemeClr>
+                  </a:solidFill>
+                </a:endParaRPr>
+              </a:p>
+            </p:txBody>
+          </p:sp>
+          <p:cxnSp>
+            <p:nvCxnSpPr>
+              <p:cNvPr id="220" name="Connector: Elbow 5">
+                <a:extLst>
+                  <a:ext uri="{FF2B5EF4-FFF2-40B4-BE49-F238E27FC236}">
+                    <a16:creationId xmlns:a16="http://schemas.microsoft.com/office/drawing/2014/main" id="{116EC6B9-0C29-7653-C05F-F302478A2F12}"/>
+                  </a:ext>
+                </a:extLst>
+              </p:cNvPr>
+              <p:cNvCxnSpPr>
+                <a:cxnSpLocks/>
+              </p:cNvCxnSpPr>
+              <p:nvPr/>
+            </p:nvCxnSpPr>
+            <p:spPr>
+              <a:xfrm flipV="1">
+                <a:off x="8032289" y="4456943"/>
+                <a:ext cx="0" cy="109794"/>
+              </a:xfrm>
+              <a:prstGeom prst="straightConnector1">
+                <a:avLst/>
+              </a:prstGeom>
+              <a:ln>
+                <a:tailEnd type="triangle"/>
+              </a:ln>
+            </p:spPr>
+            <p:style>
+              <a:lnRef idx="1">
+                <a:schemeClr val="accent1"/>
+              </a:lnRef>
+              <a:fillRef idx="0">
+                <a:schemeClr val="accent1"/>
+              </a:fillRef>
+              <a:effectRef idx="0">
+                <a:schemeClr val="accent1"/>
+              </a:effectRef>
+              <a:fontRef idx="minor">
+                <a:schemeClr val="tx1"/>
+              </a:fontRef>
+            </p:style>
+          </p:cxnSp>
+        </p:grpSp>
+        <p:grpSp>
+          <p:nvGrpSpPr>
+            <p:cNvPr id="221" name="Group 220">
+              <a:extLst>
+                <a:ext uri="{FF2B5EF4-FFF2-40B4-BE49-F238E27FC236}">
+                  <a16:creationId xmlns:a16="http://schemas.microsoft.com/office/drawing/2014/main" id="{7C799F3D-498B-61C6-3479-C0547610D57D}"/>
+                </a:ext>
+              </a:extLst>
+            </p:cNvPr>
+            <p:cNvGrpSpPr/>
+            <p:nvPr/>
+          </p:nvGrpSpPr>
+          <p:grpSpPr>
+            <a:xfrm rot="16200000">
+              <a:off x="8339454" y="4842476"/>
+              <a:ext cx="741133" cy="260142"/>
+              <a:chOff x="7686586" y="4456943"/>
+              <a:chExt cx="741133" cy="260142"/>
+            </a:xfrm>
+          </p:grpSpPr>
+          <p:sp>
+            <p:nvSpPr>
+              <p:cNvPr id="222" name="TextBox 221">
+                <a:extLst>
+                  <a:ext uri="{FF2B5EF4-FFF2-40B4-BE49-F238E27FC236}">
+                    <a16:creationId xmlns:a16="http://schemas.microsoft.com/office/drawing/2014/main" id="{E2876694-0093-4218-D01F-0BC7D2DDDE9B}"/>
+                  </a:ext>
+                </a:extLst>
+              </p:cNvPr>
+              <p:cNvSpPr txBox="1"/>
+              <p:nvPr/>
+            </p:nvSpPr>
+            <p:spPr>
+              <a:xfrm>
+                <a:off x="7686586" y="4501641"/>
+                <a:ext cx="741133" cy="215444"/>
+              </a:xfrm>
+              <a:prstGeom prst="rect">
+                <a:avLst/>
+              </a:prstGeom>
+              <a:noFill/>
+            </p:spPr>
+            <p:txBody>
+              <a:bodyPr wrap="square" rtlCol="0">
+                <a:spAutoFit/>
+              </a:bodyPr>
+              <a:lstStyle/>
+              <a:p>
+                <a:pPr algn="ctr"/>
+                <a:r>
+                  <a:rPr lang="en-US" sz="800" dirty="0">
+                    <a:solidFill>
+                      <a:schemeClr val="tx1">
+                        <a:lumMod val="50000"/>
+                        <a:lumOff val="50000"/>
+                      </a:schemeClr>
+                    </a:solidFill>
+                  </a:rPr>
+                  <a:t>string</a:t>
+                </a:r>
+              </a:p>
+            </p:txBody>
+          </p:sp>
+          <p:cxnSp>
+            <p:nvCxnSpPr>
+              <p:cNvPr id="223" name="Connector: Elbow 5">
+                <a:extLst>
+                  <a:ext uri="{FF2B5EF4-FFF2-40B4-BE49-F238E27FC236}">
+                    <a16:creationId xmlns:a16="http://schemas.microsoft.com/office/drawing/2014/main" id="{FFBA43E2-7981-E693-0C51-2B9BE98D2F26}"/>
+                  </a:ext>
+                </a:extLst>
+              </p:cNvPr>
+              <p:cNvCxnSpPr>
+                <a:cxnSpLocks/>
+              </p:cNvCxnSpPr>
+              <p:nvPr/>
+            </p:nvCxnSpPr>
+            <p:spPr>
+              <a:xfrm>
+                <a:off x="8032289" y="4456943"/>
+                <a:ext cx="0" cy="109794"/>
+              </a:xfrm>
+              <a:prstGeom prst="straightConnector1">
+                <a:avLst/>
+              </a:prstGeom>
+              <a:ln>
+                <a:tailEnd type="triangle"/>
+              </a:ln>
+            </p:spPr>
+            <p:style>
+              <a:lnRef idx="1">
+                <a:schemeClr val="accent1"/>
+              </a:lnRef>
+              <a:fillRef idx="0">
+                <a:schemeClr val="accent1"/>
+              </a:fillRef>
+              <a:effectRef idx="0">
+                <a:schemeClr val="accent1"/>
+              </a:effectRef>
+              <a:fontRef idx="minor">
+                <a:schemeClr val="tx1"/>
+              </a:fontRef>
+            </p:style>
+          </p:cxnSp>
+        </p:grpSp>
+        <p:sp>
+          <p:nvSpPr>
+            <p:cNvPr id="226" name="TextBox 225">
+              <a:extLst>
+                <a:ext uri="{FF2B5EF4-FFF2-40B4-BE49-F238E27FC236}">
+                  <a16:creationId xmlns:a16="http://schemas.microsoft.com/office/drawing/2014/main" id="{0351657F-1248-18F4-53A9-1D70F3EE23F7}"/>
+                </a:ext>
+              </a:extLst>
+            </p:cNvPr>
+            <p:cNvSpPr txBox="1"/>
+            <p:nvPr/>
+          </p:nvSpPr>
+          <p:spPr>
+            <a:xfrm>
+              <a:off x="9036288" y="3904317"/>
+              <a:ext cx="475163" cy="369332"/>
+            </a:xfrm>
+            <a:prstGeom prst="rect">
+              <a:avLst/>
+            </a:prstGeom>
+            <a:noFill/>
+          </p:spPr>
+          <p:txBody>
+            <a:bodyPr wrap="square" rtlCol="0">
+              <a:spAutoFit/>
+            </a:bodyPr>
+            <a:lstStyle/>
+            <a:p>
+              <a:r>
+                <a:rPr lang="en-US" dirty="0">
+                  <a:solidFill>
+                    <a:schemeClr val="accent6"/>
+                  </a:solidFill>
+                  <a:sym typeface="Wingdings" panose="05000000000000000000" pitchFamily="2" charset="2"/>
+                </a:rPr>
+                <a:t></a:t>
+              </a:r>
+              <a:endParaRPr lang="en-US" dirty="0">
+                <a:solidFill>
+                  <a:schemeClr val="accent6"/>
+                </a:solidFill>
+              </a:endParaRPr>
+            </a:p>
+          </p:txBody>
+        </p:sp>
       </p:grpSp>
       <p:sp>
         <p:nvSpPr>
@@ -14429,7 +14403,7 @@
             <a:pPr algn="ctr"/>
             <a:r>
               <a:rPr lang="en-US" dirty="0"/>
-              <a:t>AVX Roadmap – 3A23 – CY2023</a:t>
+              <a:t>AVX Roadmap – 3A24 – CY2023</a:t>
             </a:r>
           </a:p>
         </p:txBody>
@@ -15107,10 +15081,10 @@
       </p:grpSpPr>
       <p:grpSp>
         <p:nvGrpSpPr>
-          <p:cNvPr id="34" name="Group 33">
+          <p:cNvPr id="148" name="Group 147">
             <a:extLst>
               <a:ext uri="{FF2B5EF4-FFF2-40B4-BE49-F238E27FC236}">
-                <a16:creationId xmlns:a16="http://schemas.microsoft.com/office/drawing/2014/main" id="{4EE9EBCB-8337-AA49-1E68-C3330538F5BC}"/>
+                <a16:creationId xmlns:a16="http://schemas.microsoft.com/office/drawing/2014/main" id="{ED7144E1-B406-0504-F693-7327DA97DA7F}"/>
               </a:ext>
             </a:extLst>
           </p:cNvPr>
@@ -15119,18 +15093,18 @@
         </p:nvGrpSpPr>
         <p:grpSpPr>
           <a:xfrm>
-            <a:off x="6078014" y="1223102"/>
-            <a:ext cx="5799693" cy="4625248"/>
-            <a:chOff x="6078014" y="1223102"/>
-            <a:chExt cx="5799693" cy="4625248"/>
+            <a:off x="6085073" y="1264874"/>
+            <a:ext cx="5824288" cy="4625248"/>
+            <a:chOff x="6085073" y="1246340"/>
+            <a:chExt cx="5824288" cy="4625248"/>
           </a:xfrm>
         </p:grpSpPr>
         <p:sp>
           <p:nvSpPr>
-            <p:cNvPr id="128" name="Rectangle 127">
+            <p:cNvPr id="38" name="Rectangle 37">
               <a:extLst>
                 <a:ext uri="{FF2B5EF4-FFF2-40B4-BE49-F238E27FC236}">
-                  <a16:creationId xmlns:a16="http://schemas.microsoft.com/office/drawing/2014/main" id="{3583ABD7-B9DD-C847-3BE3-D2D35675CF0F}"/>
+                  <a16:creationId xmlns:a16="http://schemas.microsoft.com/office/drawing/2014/main" id="{9E747F21-7EF5-924D-49D3-9ABEB423ECC3}"/>
                 </a:ext>
               </a:extLst>
             </p:cNvPr>
@@ -15139,7 +15113,7 @@
           </p:nvSpPr>
           <p:spPr>
             <a:xfrm>
-              <a:off x="6078014" y="1223102"/>
+              <a:off x="6085073" y="1246340"/>
               <a:ext cx="5783786" cy="4625248"/>
             </a:xfrm>
             <a:prstGeom prst="rect">
@@ -15188,10 +15162,10 @@
         </p:sp>
         <p:cxnSp>
           <p:nvCxnSpPr>
-            <p:cNvPr id="25" name="Connector: Elbow 5">
+            <p:cNvPr id="41" name="Connector: Elbow 5">
               <a:extLst>
                 <a:ext uri="{FF2B5EF4-FFF2-40B4-BE49-F238E27FC236}">
-                  <a16:creationId xmlns:a16="http://schemas.microsoft.com/office/drawing/2014/main" id="{00440394-EE83-08A6-1975-33F7C860BCE6}"/>
+                  <a16:creationId xmlns:a16="http://schemas.microsoft.com/office/drawing/2014/main" id="{2E704963-C14D-01A3-DE83-B00E1B2F3E35}"/>
                 </a:ext>
               </a:extLst>
             </p:cNvPr>
@@ -15202,7 +15176,7 @@
           </p:nvCxnSpPr>
           <p:spPr>
             <a:xfrm>
-              <a:off x="8490592" y="2966358"/>
+              <a:off x="8497651" y="2989596"/>
               <a:ext cx="0" cy="138792"/>
             </a:xfrm>
             <a:prstGeom prst="straightConnector1">
@@ -15229,10 +15203,10 @@
         </p:cxnSp>
         <p:sp>
           <p:nvSpPr>
-            <p:cNvPr id="27" name="TextBox 26">
+            <p:cNvPr id="42" name="TextBox 41">
               <a:extLst>
                 <a:ext uri="{FF2B5EF4-FFF2-40B4-BE49-F238E27FC236}">
-                  <a16:creationId xmlns:a16="http://schemas.microsoft.com/office/drawing/2014/main" id="{E7BE9129-F068-F6C6-D590-72EAD63B777C}"/>
+                  <a16:creationId xmlns:a16="http://schemas.microsoft.com/office/drawing/2014/main" id="{6086AB70-7DD7-8FD1-EC25-1FC26F65FA8D}"/>
                 </a:ext>
               </a:extLst>
             </p:cNvPr>
@@ -15241,7 +15215,7 @@
           </p:nvSpPr>
           <p:spPr>
             <a:xfrm>
-              <a:off x="8144889" y="2773196"/>
+              <a:off x="8151948" y="2796434"/>
               <a:ext cx="741133" cy="215444"/>
             </a:xfrm>
             <a:prstGeom prst="rect">
@@ -15280,10 +15254,10 @@
         </p:sp>
         <p:cxnSp>
           <p:nvCxnSpPr>
-            <p:cNvPr id="28" name="Connector: Elbow 5">
+            <p:cNvPr id="43" name="Connector: Elbow 5">
               <a:extLst>
                 <a:ext uri="{FF2B5EF4-FFF2-40B4-BE49-F238E27FC236}">
-                  <a16:creationId xmlns:a16="http://schemas.microsoft.com/office/drawing/2014/main" id="{2A9028BC-C04B-4197-37D4-2E8C60C0BB22}"/>
+                  <a16:creationId xmlns:a16="http://schemas.microsoft.com/office/drawing/2014/main" id="{D555A80E-9BEA-567A-65DF-566F98C3C23A}"/>
                 </a:ext>
               </a:extLst>
             </p:cNvPr>
@@ -15294,7 +15268,7 @@
           </p:nvCxnSpPr>
           <p:spPr>
             <a:xfrm flipV="1">
-              <a:off x="8490592" y="2693225"/>
+              <a:off x="8497651" y="2716463"/>
               <a:ext cx="0" cy="138890"/>
             </a:xfrm>
             <a:prstGeom prst="straightConnector1">
@@ -15321,23 +15295,23 @@
         </p:cxnSp>
         <p:cxnSp>
           <p:nvCxnSpPr>
-            <p:cNvPr id="129" name="Straight Arrow Connector 89">
+            <p:cNvPr id="44" name="Straight Arrow Connector 89">
               <a:extLst>
                 <a:ext uri="{FF2B5EF4-FFF2-40B4-BE49-F238E27FC236}">
-                  <a16:creationId xmlns:a16="http://schemas.microsoft.com/office/drawing/2014/main" id="{F7174356-4CF6-40AF-8000-963DD9C68825}"/>
+                  <a16:creationId xmlns:a16="http://schemas.microsoft.com/office/drawing/2014/main" id="{A6EBF524-5B5B-4723-FA74-B782CCFDB760}"/>
                 </a:ext>
               </a:extLst>
             </p:cNvPr>
             <p:cNvCxnSpPr>
               <a:cxnSpLocks/>
-              <a:stCxn id="132" idx="2"/>
-              <a:endCxn id="135" idx="0"/>
+              <a:stCxn id="49" idx="2"/>
+              <a:endCxn id="51" idx="0"/>
             </p:cNvCxnSpPr>
             <p:nvPr/>
           </p:nvCxnSpPr>
           <p:spPr>
             <a:xfrm rot="5400000">
-              <a:off x="7868340" y="2903018"/>
+              <a:off x="7875399" y="2926256"/>
               <a:ext cx="444382" cy="944"/>
             </a:xfrm>
             <a:prstGeom prst="bentConnector3">
@@ -15373,10 +15347,10 @@
         </p:cxnSp>
         <p:sp>
           <p:nvSpPr>
-            <p:cNvPr id="130" name="Rectangle 129">
+            <p:cNvPr id="47" name="Rectangle 46">
               <a:extLst>
                 <a:ext uri="{FF2B5EF4-FFF2-40B4-BE49-F238E27FC236}">
-                  <a16:creationId xmlns:a16="http://schemas.microsoft.com/office/drawing/2014/main" id="{CD9580F4-9270-669D-A21B-905D0E52B50A}"/>
+                  <a16:creationId xmlns:a16="http://schemas.microsoft.com/office/drawing/2014/main" id="{97D5DC1E-7280-D117-BB71-FA3E790E8DB4}"/>
                 </a:ext>
               </a:extLst>
             </p:cNvPr>
@@ -15385,7 +15359,7 @@
           </p:nvSpPr>
           <p:spPr>
             <a:xfrm>
-              <a:off x="6376766" y="4575074"/>
+              <a:off x="10074027" y="4600505"/>
               <a:ext cx="1575459" cy="979714"/>
             </a:xfrm>
             <a:prstGeom prst="rect">
@@ -15471,9 +15445,6 @@
             </a:p>
             <a:p>
               <a:pPr algn="ctr">
-                <a:spcAft>
-                  <a:spcPts val="200"/>
-                </a:spcAft>
                 <a:defRPr/>
               </a:pPr>
               <a:r>
@@ -15505,10 +15476,10 @@
         </p:sp>
         <p:sp>
           <p:nvSpPr>
-            <p:cNvPr id="131" name="Rectangle 130">
+            <p:cNvPr id="48" name="Rectangle 47">
               <a:extLst>
                 <a:ext uri="{FF2B5EF4-FFF2-40B4-BE49-F238E27FC236}">
-                  <a16:creationId xmlns:a16="http://schemas.microsoft.com/office/drawing/2014/main" id="{A3BB26C9-7667-5705-4EEB-A8A01DFC1F61}"/>
+                  <a16:creationId xmlns:a16="http://schemas.microsoft.com/office/drawing/2014/main" id="{E0A8BB29-8405-F8D5-68E0-638BC20CAB1C}"/>
                 </a:ext>
               </a:extLst>
             </p:cNvPr>
@@ -15517,7 +15488,7 @@
           </p:nvSpPr>
           <p:spPr>
             <a:xfrm>
-              <a:off x="8189597" y="4575074"/>
+              <a:off x="8196656" y="4598312"/>
               <a:ext cx="1575459" cy="979714"/>
             </a:xfrm>
             <a:prstGeom prst="rect">
@@ -15667,10 +15638,10 @@
         </p:sp>
         <p:sp>
           <p:nvSpPr>
-            <p:cNvPr id="132" name="Rectangle 131">
+            <p:cNvPr id="49" name="Rectangle 48">
               <a:extLst>
                 <a:ext uri="{FF2B5EF4-FFF2-40B4-BE49-F238E27FC236}">
-                  <a16:creationId xmlns:a16="http://schemas.microsoft.com/office/drawing/2014/main" id="{3DC23A3F-F2BC-2465-6E2F-B6579804B5A7}"/>
+                  <a16:creationId xmlns:a16="http://schemas.microsoft.com/office/drawing/2014/main" id="{82F82915-F8CF-C3B3-F60E-01684B99E119}"/>
                 </a:ext>
               </a:extLst>
             </p:cNvPr>
@@ -15679,7 +15650,7 @@
           </p:nvSpPr>
           <p:spPr>
             <a:xfrm>
-              <a:off x="7303273" y="1701585"/>
+              <a:off x="7310332" y="1724823"/>
               <a:ext cx="1575459" cy="979714"/>
             </a:xfrm>
             <a:prstGeom prst="rect">
@@ -15956,10 +15927,10 @@
         </p:sp>
         <p:sp>
           <p:nvSpPr>
-            <p:cNvPr id="133" name="Rectangle 132">
+            <p:cNvPr id="50" name="Rectangle 49">
               <a:extLst>
                 <a:ext uri="{FF2B5EF4-FFF2-40B4-BE49-F238E27FC236}">
-                  <a16:creationId xmlns:a16="http://schemas.microsoft.com/office/drawing/2014/main" id="{0D9DD274-6113-F6EB-0AC5-AF7985B27C1F}"/>
+                  <a16:creationId xmlns:a16="http://schemas.microsoft.com/office/drawing/2014/main" id="{0129C0FD-675E-BB6C-178A-BFED38E5E35E}"/>
                 </a:ext>
               </a:extLst>
             </p:cNvPr>
@@ -15968,7 +15939,7 @@
           </p:nvSpPr>
           <p:spPr>
             <a:xfrm>
-              <a:off x="9147266" y="1700137"/>
+              <a:off x="9154325" y="1723375"/>
               <a:ext cx="1575459" cy="987836"/>
             </a:xfrm>
             <a:prstGeom prst="rect">
@@ -16245,10 +16216,10 @@
         </p:sp>
         <p:sp>
           <p:nvSpPr>
-            <p:cNvPr id="135" name="Rectangle 134">
+            <p:cNvPr id="51" name="Rectangle 50">
               <a:extLst>
                 <a:ext uri="{FF2B5EF4-FFF2-40B4-BE49-F238E27FC236}">
-                  <a16:creationId xmlns:a16="http://schemas.microsoft.com/office/drawing/2014/main" id="{3E277456-0B43-2C03-3133-47DE1B13B986}"/>
+                  <a16:creationId xmlns:a16="http://schemas.microsoft.com/office/drawing/2014/main" id="{43300B99-3587-3FD3-A30C-096EFFFCE07C}"/>
                 </a:ext>
               </a:extLst>
             </p:cNvPr>
@@ -16257,7 +16228,7 @@
           </p:nvSpPr>
           <p:spPr>
             <a:xfrm>
-              <a:off x="7302329" y="3125681"/>
+              <a:off x="7309388" y="3148919"/>
               <a:ext cx="1575459" cy="979714"/>
             </a:xfrm>
             <a:prstGeom prst="rect">
@@ -16341,7 +16312,7 @@
                 <a:defRPr/>
               </a:pPr>
               <a:r>
-                <a:rPr kumimoji="0" lang="en-US" sz="800" b="0" u="none" strike="noStrike" kern="1200" cap="none" spc="0" normalizeH="0" baseline="0" noProof="0" dirty="0">
+                <a:rPr kumimoji="0" lang="en-US" sz="800" b="0" i="1" u="none" strike="noStrike" kern="1200" cap="none" spc="0" normalizeH="0" baseline="0" noProof="0" dirty="0">
                   <a:ln>
                     <a:noFill/>
                   </a:ln>
@@ -16477,25 +16448,115 @@
             </a:p>
           </p:txBody>
         </p:sp>
+        <p:sp>
+          <p:nvSpPr>
+            <p:cNvPr id="52" name="TextBox 51">
+              <a:extLst>
+                <a:ext uri="{FF2B5EF4-FFF2-40B4-BE49-F238E27FC236}">
+                  <a16:creationId xmlns:a16="http://schemas.microsoft.com/office/drawing/2014/main" id="{11A2D8D7-23A8-F81D-B799-EC8F74836598}"/>
+                </a:ext>
+              </a:extLst>
+            </p:cNvPr>
+            <p:cNvSpPr txBox="1"/>
+            <p:nvPr/>
+          </p:nvSpPr>
+          <p:spPr>
+            <a:xfrm>
+              <a:off x="9334906" y="5223117"/>
+              <a:ext cx="475163" cy="369332"/>
+            </a:xfrm>
+            <a:prstGeom prst="rect">
+              <a:avLst/>
+            </a:prstGeom>
+            <a:noFill/>
+          </p:spPr>
+          <p:txBody>
+            <a:bodyPr wrap="square" rtlCol="0">
+              <a:spAutoFit/>
+            </a:bodyPr>
+            <a:lstStyle/>
+            <a:p>
+              <a:r>
+                <a:rPr lang="en-US" dirty="0">
+                  <a:solidFill>
+                    <a:schemeClr val="accent6"/>
+                  </a:solidFill>
+                  <a:sym typeface="Wingdings" panose="05000000000000000000" pitchFamily="2" charset="2"/>
+                </a:rPr>
+                <a:t></a:t>
+              </a:r>
+              <a:endParaRPr lang="en-US" dirty="0">
+                <a:solidFill>
+                  <a:schemeClr val="accent6"/>
+                </a:solidFill>
+              </a:endParaRPr>
+            </a:p>
+          </p:txBody>
+        </p:sp>
+        <p:sp>
+          <p:nvSpPr>
+            <p:cNvPr id="53" name="TextBox 52">
+              <a:extLst>
+                <a:ext uri="{FF2B5EF4-FFF2-40B4-BE49-F238E27FC236}">
+                  <a16:creationId xmlns:a16="http://schemas.microsoft.com/office/drawing/2014/main" id="{66689AF5-F167-D360-5C22-087B26F1FE38}"/>
+                </a:ext>
+              </a:extLst>
+            </p:cNvPr>
+            <p:cNvSpPr txBox="1"/>
+            <p:nvPr/>
+          </p:nvSpPr>
+          <p:spPr>
+            <a:xfrm>
+              <a:off x="11174323" y="5219132"/>
+              <a:ext cx="475163" cy="369332"/>
+            </a:xfrm>
+            <a:prstGeom prst="rect">
+              <a:avLst/>
+            </a:prstGeom>
+            <a:noFill/>
+          </p:spPr>
+          <p:txBody>
+            <a:bodyPr wrap="square" rtlCol="0">
+              <a:spAutoFit/>
+            </a:bodyPr>
+            <a:lstStyle/>
+            <a:p>
+              <a:r>
+                <a:rPr lang="en-US" dirty="0">
+                  <a:solidFill>
+                    <a:schemeClr val="accent6"/>
+                  </a:solidFill>
+                  <a:sym typeface="Wingdings" panose="05000000000000000000" pitchFamily="2" charset="2"/>
+                </a:rPr>
+                <a:t></a:t>
+              </a:r>
+              <a:endParaRPr lang="en-US" dirty="0">
+                <a:solidFill>
+                  <a:schemeClr val="accent6"/>
+                </a:solidFill>
+              </a:endParaRPr>
+            </a:p>
+          </p:txBody>
+        </p:sp>
         <p:cxnSp>
           <p:nvCxnSpPr>
-            <p:cNvPr id="138" name="Straight Arrow Connector 137">
+            <p:cNvPr id="54" name="Straight Arrow Connector 53">
               <a:extLst>
                 <a:ext uri="{FF2B5EF4-FFF2-40B4-BE49-F238E27FC236}">
-                  <a16:creationId xmlns:a16="http://schemas.microsoft.com/office/drawing/2014/main" id="{BFF92177-BF13-0A2F-17BD-06FEA3361A4F}"/>
+                  <a16:creationId xmlns:a16="http://schemas.microsoft.com/office/drawing/2014/main" id="{C7942ADD-A5ED-FBFD-FE50-B331D019B71B}"/>
                 </a:ext>
               </a:extLst>
             </p:cNvPr>
             <p:cNvCxnSpPr>
               <a:cxnSpLocks/>
-              <a:stCxn id="132" idx="3"/>
-              <a:endCxn id="133" idx="1"/>
+              <a:stCxn id="49" idx="3"/>
+              <a:endCxn id="50" idx="1"/>
             </p:cNvCxnSpPr>
             <p:nvPr/>
           </p:nvCxnSpPr>
           <p:spPr>
             <a:xfrm>
-              <a:off x="8878732" y="2191442"/>
+              <a:off x="8885791" y="2214680"/>
               <a:ext cx="268534" cy="2613"/>
             </a:xfrm>
             <a:prstGeom prst="straightConnector1">
@@ -16528,24 +16589,24 @@
         </p:cxnSp>
         <p:cxnSp>
           <p:nvCxnSpPr>
-            <p:cNvPr id="139" name="Straight Arrow Connector 105">
+            <p:cNvPr id="55" name="Straight Arrow Connector 105">
               <a:extLst>
                 <a:ext uri="{FF2B5EF4-FFF2-40B4-BE49-F238E27FC236}">
-                  <a16:creationId xmlns:a16="http://schemas.microsoft.com/office/drawing/2014/main" id="{67000F2F-3C8F-931A-BD96-C56F65E276BD}"/>
+                  <a16:creationId xmlns:a16="http://schemas.microsoft.com/office/drawing/2014/main" id="{44303DE3-1394-A469-85F5-EF3D462235E9}"/>
                 </a:ext>
               </a:extLst>
             </p:cNvPr>
             <p:cNvCxnSpPr>
               <a:cxnSpLocks/>
-              <a:stCxn id="135" idx="2"/>
-              <a:endCxn id="130" idx="0"/>
+              <a:stCxn id="48" idx="3"/>
+              <a:endCxn id="47" idx="1"/>
             </p:cNvCxnSpPr>
             <p:nvPr/>
           </p:nvCxnSpPr>
           <p:spPr>
-            <a:xfrm rot="5400000">
-              <a:off x="7392439" y="3877453"/>
-              <a:ext cx="469679" cy="925563"/>
+            <a:xfrm>
+              <a:off x="9772115" y="5088169"/>
+              <a:ext cx="301912" cy="2193"/>
             </a:xfrm>
             <a:prstGeom prst="bentConnector3">
               <a:avLst>
@@ -16579,23 +16640,23 @@
         </p:cxnSp>
         <p:cxnSp>
           <p:nvCxnSpPr>
-            <p:cNvPr id="140" name="Straight Arrow Connector 105">
+            <p:cNvPr id="56" name="Straight Arrow Connector 105">
               <a:extLst>
                 <a:ext uri="{FF2B5EF4-FFF2-40B4-BE49-F238E27FC236}">
-                  <a16:creationId xmlns:a16="http://schemas.microsoft.com/office/drawing/2014/main" id="{0C021CBE-2701-63CD-0AE1-160FA01F2EF1}"/>
+                  <a16:creationId xmlns:a16="http://schemas.microsoft.com/office/drawing/2014/main" id="{2F1DC55F-20BF-1250-9AE0-E66138A18669}"/>
                 </a:ext>
               </a:extLst>
             </p:cNvPr>
             <p:cNvCxnSpPr>
               <a:cxnSpLocks/>
-              <a:stCxn id="135" idx="2"/>
-              <a:endCxn id="131" idx="0"/>
+              <a:stCxn id="51" idx="2"/>
+              <a:endCxn id="48" idx="0"/>
             </p:cNvCxnSpPr>
             <p:nvPr/>
           </p:nvCxnSpPr>
           <p:spPr>
             <a:xfrm rot="16200000" flipH="1">
-              <a:off x="8298854" y="3896600"/>
+              <a:off x="8305913" y="3919838"/>
               <a:ext cx="469679" cy="887268"/>
             </a:xfrm>
             <a:prstGeom prst="bentConnector3">
@@ -16630,10 +16691,10 @@
         </p:cxnSp>
         <p:sp>
           <p:nvSpPr>
-            <p:cNvPr id="145" name="Rectangle 144">
+            <p:cNvPr id="57" name="Rectangle 56">
               <a:extLst>
                 <a:ext uri="{FF2B5EF4-FFF2-40B4-BE49-F238E27FC236}">
-                  <a16:creationId xmlns:a16="http://schemas.microsoft.com/office/drawing/2014/main" id="{CB8129C1-3781-C200-F29F-C3AA50D6F795}"/>
+                  <a16:creationId xmlns:a16="http://schemas.microsoft.com/office/drawing/2014/main" id="{B810A902-F3F2-6469-C65C-93C47A4B5FC0}"/>
                 </a:ext>
               </a:extLst>
             </p:cNvPr>
@@ -16642,7 +16703,7 @@
           </p:nvSpPr>
           <p:spPr>
             <a:xfrm>
-              <a:off x="10002428" y="4575074"/>
+              <a:off x="6317055" y="4592260"/>
               <a:ext cx="1575459" cy="979714"/>
             </a:xfrm>
             <a:prstGeom prst="rect">
@@ -16752,24 +16813,24 @@
         </p:sp>
         <p:cxnSp>
           <p:nvCxnSpPr>
-            <p:cNvPr id="146" name="Straight Arrow Connector 105">
+            <p:cNvPr id="58" name="Straight Arrow Connector 105">
               <a:extLst>
                 <a:ext uri="{FF2B5EF4-FFF2-40B4-BE49-F238E27FC236}">
-                  <a16:creationId xmlns:a16="http://schemas.microsoft.com/office/drawing/2014/main" id="{63C76340-31D5-8188-6ED3-C1804D8B70B6}"/>
+                  <a16:creationId xmlns:a16="http://schemas.microsoft.com/office/drawing/2014/main" id="{540D79FF-CF14-713E-A774-366CBF06FDD5}"/>
                 </a:ext>
               </a:extLst>
             </p:cNvPr>
             <p:cNvCxnSpPr>
               <a:cxnSpLocks/>
-              <a:stCxn id="135" idx="2"/>
-              <a:endCxn id="145" idx="0"/>
+              <a:stCxn id="51" idx="2"/>
+              <a:endCxn id="57" idx="0"/>
             </p:cNvCxnSpPr>
             <p:nvPr/>
           </p:nvCxnSpPr>
           <p:spPr>
-            <a:xfrm rot="16200000" flipH="1">
-              <a:off x="9205269" y="2990184"/>
-              <a:ext cx="469679" cy="2700099"/>
+            <a:xfrm rot="5400000">
+              <a:off x="7369139" y="3864280"/>
+              <a:ext cx="463627" cy="992333"/>
             </a:xfrm>
             <a:prstGeom prst="bentConnector3">
               <a:avLst>
@@ -16803,10 +16864,55 @@
         </p:cxnSp>
         <p:sp>
           <p:nvSpPr>
-            <p:cNvPr id="59" name="Rectangle 58">
+            <p:cNvPr id="61" name="TextBox 60">
               <a:extLst>
                 <a:ext uri="{FF2B5EF4-FFF2-40B4-BE49-F238E27FC236}">
-                  <a16:creationId xmlns:a16="http://schemas.microsoft.com/office/drawing/2014/main" id="{9BC9225F-A4D8-564B-36EC-A579F9FD0916}"/>
+                  <a16:creationId xmlns:a16="http://schemas.microsoft.com/office/drawing/2014/main" id="{E8EB486E-B0ED-CF2C-626F-78E1CF44CE36}"/>
+                </a:ext>
+              </a:extLst>
+            </p:cNvPr>
+            <p:cNvSpPr txBox="1"/>
+            <p:nvPr/>
+          </p:nvSpPr>
+          <p:spPr>
+            <a:xfrm>
+              <a:off x="7461305" y="5217065"/>
+              <a:ext cx="475163" cy="369332"/>
+            </a:xfrm>
+            <a:prstGeom prst="rect">
+              <a:avLst/>
+            </a:prstGeom>
+            <a:noFill/>
+          </p:spPr>
+          <p:txBody>
+            <a:bodyPr wrap="square" rtlCol="0">
+              <a:spAutoFit/>
+            </a:bodyPr>
+            <a:lstStyle/>
+            <a:p>
+              <a:r>
+                <a:rPr lang="en-US" dirty="0">
+                  <a:solidFill>
+                    <a:schemeClr val="accent6"/>
+                  </a:solidFill>
+                  <a:sym typeface="Wingdings" panose="05000000000000000000" pitchFamily="2" charset="2"/>
+                </a:rPr>
+                <a:t></a:t>
+              </a:r>
+              <a:endParaRPr lang="en-US" dirty="0">
+                <a:solidFill>
+                  <a:schemeClr val="accent6"/>
+                </a:solidFill>
+              </a:endParaRPr>
+            </a:p>
+          </p:txBody>
+        </p:sp>
+        <p:sp>
+          <p:nvSpPr>
+            <p:cNvPr id="62" name="Rectangle 61">
+              <a:extLst>
+                <a:ext uri="{FF2B5EF4-FFF2-40B4-BE49-F238E27FC236}">
+                  <a16:creationId xmlns:a16="http://schemas.microsoft.com/office/drawing/2014/main" id="{FEF7C65B-EDDF-CBDE-E3DC-90CF5350650E}"/>
                 </a:ext>
               </a:extLst>
             </p:cNvPr>
@@ -16815,14 +16921,14 @@
           </p:nvSpPr>
           <p:spPr>
             <a:xfrm>
-              <a:off x="9147265" y="3123625"/>
+              <a:off x="9154324" y="3146863"/>
               <a:ext cx="1575459" cy="979714"/>
             </a:xfrm>
             <a:prstGeom prst="rect">
               <a:avLst/>
             </a:prstGeom>
             <a:solidFill>
-              <a:srgbClr val="4472C4"/>
+              <a:srgbClr val="7030A0"/>
             </a:solidFill>
           </p:spPr>
           <p:style>
@@ -16845,39 +16951,10 @@
             <a:bodyPr rtlCol="0" anchor="ctr"/>
             <a:lstStyle/>
             <a:p>
-              <a:pPr marL="0" marR="0" lvl="0" indent="0" algn="ctr" defTabSz="914400" rtl="0" eaLnBrk="1" fontAlgn="auto" latinLnBrk="0" hangingPunct="1">
-                <a:lnSpc>
-                  <a:spcPct val="100000"/>
-                </a:lnSpc>
-                <a:spcBef>
-                  <a:spcPts val="0"/>
-                </a:spcBef>
-                <a:spcAft>
-                  <a:spcPts val="0"/>
-                </a:spcAft>
-                <a:buClrTx/>
-                <a:buSzTx/>
-                <a:buFontTx/>
-                <a:buNone/>
-                <a:tabLst/>
-                <a:defRPr/>
-              </a:pPr>
+              <a:pPr algn="ctr"/>
               <a:r>
-                <a:rPr kumimoji="0" lang="en-US" sz="800" b="0" i="0" u="none" strike="noStrike" kern="1200" cap="none" spc="0" normalizeH="0" baseline="0" noProof="0" dirty="0">
-                  <a:ln>
-                    <a:noFill/>
-                  </a:ln>
-                  <a:solidFill>
-                    <a:prstClr val="white"/>
-                  </a:solidFill>
-                  <a:effectLst/>
-                  <a:uLnTx/>
-                  <a:uFillTx/>
-                  <a:latin typeface="Calibri" panose="020F0502020204030204"/>
-                  <a:ea typeface="+mn-ea"/>
-                  <a:cs typeface="+mn-cs"/>
-                </a:rPr>
-                <a:t>http://github.com/AV-Text</a:t>
+                <a:rPr lang="en-US" sz="800" dirty="0"/>
+                <a:t>http://github.com/kwonus </a:t>
               </a:r>
             </a:p>
             <a:p>
@@ -17024,23 +17101,23 @@
         </p:sp>
         <p:cxnSp>
           <p:nvCxnSpPr>
-            <p:cNvPr id="60" name="Straight Arrow Connector 59">
+            <p:cNvPr id="63" name="Straight Arrow Connector 62">
               <a:extLst>
                 <a:ext uri="{FF2B5EF4-FFF2-40B4-BE49-F238E27FC236}">
-                  <a16:creationId xmlns:a16="http://schemas.microsoft.com/office/drawing/2014/main" id="{668AE8F0-5C04-62FC-D9D2-86A9626FC9BC}"/>
+                  <a16:creationId xmlns:a16="http://schemas.microsoft.com/office/drawing/2014/main" id="{31846313-BA95-1485-EE02-1DFA91B63043}"/>
                 </a:ext>
               </a:extLst>
             </p:cNvPr>
             <p:cNvCxnSpPr>
               <a:cxnSpLocks/>
-              <a:stCxn id="135" idx="3"/>
-              <a:endCxn id="59" idx="1"/>
+              <a:stCxn id="51" idx="3"/>
+              <a:endCxn id="62" idx="1"/>
             </p:cNvCxnSpPr>
             <p:nvPr/>
           </p:nvCxnSpPr>
           <p:spPr>
             <a:xfrm flipV="1">
-              <a:off x="8877788" y="3613482"/>
+              <a:off x="8884847" y="3636720"/>
               <a:ext cx="269477" cy="2056"/>
             </a:xfrm>
             <a:prstGeom prst="straightConnector1">
@@ -17073,10 +17150,10 @@
         </p:cxnSp>
         <p:grpSp>
           <p:nvGrpSpPr>
-            <p:cNvPr id="83" name="Group 82">
+            <p:cNvPr id="78" name="Group 77">
               <a:extLst>
                 <a:ext uri="{FF2B5EF4-FFF2-40B4-BE49-F238E27FC236}">
-                  <a16:creationId xmlns:a16="http://schemas.microsoft.com/office/drawing/2014/main" id="{C430E538-5A2A-B9CE-4F56-ED2B7ABE6E46}"/>
+                  <a16:creationId xmlns:a16="http://schemas.microsoft.com/office/drawing/2014/main" id="{DD22401B-5D67-A58D-0103-CC17278B113B}"/>
                 </a:ext>
               </a:extLst>
             </p:cNvPr>
@@ -17085,7 +17162,7 @@
           </p:nvGrpSpPr>
           <p:grpSpPr>
             <a:xfrm>
-              <a:off x="10738631" y="2574015"/>
+              <a:off x="10745690" y="2597253"/>
               <a:ext cx="1139076" cy="853175"/>
               <a:chOff x="10738631" y="2574015"/>
               <a:chExt cx="1139076" cy="853175"/>
@@ -17093,10 +17170,10 @@
           </p:grpSpPr>
           <p:grpSp>
             <p:nvGrpSpPr>
-              <p:cNvPr id="64" name="Group 63">
+              <p:cNvPr id="116" name="Group 115">
                 <a:extLst>
                   <a:ext uri="{FF2B5EF4-FFF2-40B4-BE49-F238E27FC236}">
-                    <a16:creationId xmlns:a16="http://schemas.microsoft.com/office/drawing/2014/main" id="{83F7A83A-AC7A-3253-24C6-C0D88846CCA6}"/>
+                    <a16:creationId xmlns:a16="http://schemas.microsoft.com/office/drawing/2014/main" id="{FBF85B66-A62D-6180-157C-1C40352C5AB9}"/>
                   </a:ext>
                 </a:extLst>
               </p:cNvPr>
@@ -17113,10 +17190,10 @@
             </p:grpSpPr>
             <p:grpSp>
               <p:nvGrpSpPr>
-                <p:cNvPr id="66" name="Group 65">
+                <p:cNvPr id="121" name="Group 120">
                   <a:extLst>
                     <a:ext uri="{FF2B5EF4-FFF2-40B4-BE49-F238E27FC236}">
-                      <a16:creationId xmlns:a16="http://schemas.microsoft.com/office/drawing/2014/main" id="{61806880-886D-F997-DBF2-D4B800AF89AF}"/>
+                      <a16:creationId xmlns:a16="http://schemas.microsoft.com/office/drawing/2014/main" id="{1AB5FCE8-5C66-6D80-1EE0-B6404A4FB038}"/>
                     </a:ext>
                   </a:extLst>
                 </p:cNvPr>
@@ -17133,10 +17210,10 @@
               </p:grpSpPr>
               <p:sp>
                 <p:nvSpPr>
-                  <p:cNvPr id="74" name="Rectangle 73">
+                  <p:cNvPr id="136" name="Rectangle 135">
                     <a:extLst>
                       <a:ext uri="{FF2B5EF4-FFF2-40B4-BE49-F238E27FC236}">
-                        <a16:creationId xmlns:a16="http://schemas.microsoft.com/office/drawing/2014/main" id="{9DC29571-A1B8-4F96-DCAE-5B95C10E990B}"/>
+                        <a16:creationId xmlns:a16="http://schemas.microsoft.com/office/drawing/2014/main" id="{8234341C-0C2A-F36E-2CDD-8608E88E8945}"/>
                       </a:ext>
                     </a:extLst>
                   </p:cNvPr>
@@ -17190,10 +17267,10 @@
               </p:sp>
               <p:sp>
                 <p:nvSpPr>
-                  <p:cNvPr id="75" name="Isosceles Triangle 74">
+                  <p:cNvPr id="137" name="Isosceles Triangle 136">
                     <a:extLst>
                       <a:ext uri="{FF2B5EF4-FFF2-40B4-BE49-F238E27FC236}">
-                        <a16:creationId xmlns:a16="http://schemas.microsoft.com/office/drawing/2014/main" id="{62374E45-5268-DC8D-EF53-CFC26035B19F}"/>
+                        <a16:creationId xmlns:a16="http://schemas.microsoft.com/office/drawing/2014/main" id="{6BA741DD-047C-330A-4548-6FBF03FCF2B9}"/>
                       </a:ext>
                     </a:extLst>
                   </p:cNvPr>
@@ -17246,10 +17323,10 @@
               </p:sp>
               <p:sp>
                 <p:nvSpPr>
-                  <p:cNvPr id="76" name="Isosceles Triangle 75">
+                  <p:cNvPr id="141" name="Isosceles Triangle 140">
                     <a:extLst>
                       <a:ext uri="{FF2B5EF4-FFF2-40B4-BE49-F238E27FC236}">
-                        <a16:creationId xmlns:a16="http://schemas.microsoft.com/office/drawing/2014/main" id="{99D3086F-E906-E8D4-6E63-E118C3D95909}"/>
+                        <a16:creationId xmlns:a16="http://schemas.microsoft.com/office/drawing/2014/main" id="{A9D14DBD-24C5-5505-5041-7B88B36A12A4}"/>
                       </a:ext>
                     </a:extLst>
                   </p:cNvPr>
@@ -17303,10 +17380,10 @@
             </p:grpSp>
             <p:grpSp>
               <p:nvGrpSpPr>
-                <p:cNvPr id="67" name="Group 66">
+                <p:cNvPr id="122" name="Group 121">
                   <a:extLst>
                     <a:ext uri="{FF2B5EF4-FFF2-40B4-BE49-F238E27FC236}">
-                      <a16:creationId xmlns:a16="http://schemas.microsoft.com/office/drawing/2014/main" id="{8F952066-84E9-D971-8198-2CC07D7153B3}"/>
+                      <a16:creationId xmlns:a16="http://schemas.microsoft.com/office/drawing/2014/main" id="{9DC30C60-1C6F-9283-79B8-891871692026}"/>
                     </a:ext>
                   </a:extLst>
                 </p:cNvPr>
@@ -17323,10 +17400,10 @@
               </p:grpSpPr>
               <p:cxnSp>
                 <p:nvCxnSpPr>
-                  <p:cNvPr id="68" name="Straight Connector 67">
+                  <p:cNvPr id="123" name="Straight Connector 122">
                     <a:extLst>
                       <a:ext uri="{FF2B5EF4-FFF2-40B4-BE49-F238E27FC236}">
-                        <a16:creationId xmlns:a16="http://schemas.microsoft.com/office/drawing/2014/main" id="{5874EB70-38D9-4B9A-CC84-980DAC7D42F6}"/>
+                        <a16:creationId xmlns:a16="http://schemas.microsoft.com/office/drawing/2014/main" id="{3022973C-E9C1-3AA6-6185-B659C9876312}"/>
                       </a:ext>
                     </a:extLst>
                   </p:cNvPr>
@@ -17368,10 +17445,10 @@
               </p:cxnSp>
               <p:cxnSp>
                 <p:nvCxnSpPr>
-                  <p:cNvPr id="69" name="Straight Connector 68">
+                  <p:cNvPr id="125" name="Straight Connector 124">
                     <a:extLst>
                       <a:ext uri="{FF2B5EF4-FFF2-40B4-BE49-F238E27FC236}">
-                        <a16:creationId xmlns:a16="http://schemas.microsoft.com/office/drawing/2014/main" id="{AAA81D95-E363-2F8E-82D6-04AEB6C594B2}"/>
+                        <a16:creationId xmlns:a16="http://schemas.microsoft.com/office/drawing/2014/main" id="{415DB7C1-3BEB-76A6-BAF0-F78DCF6BBE16}"/>
                       </a:ext>
                     </a:extLst>
                   </p:cNvPr>
@@ -17413,10 +17490,10 @@
               </p:cxnSp>
               <p:cxnSp>
                 <p:nvCxnSpPr>
-                  <p:cNvPr id="70" name="Straight Connector 69">
+                  <p:cNvPr id="126" name="Straight Connector 125">
                     <a:extLst>
                       <a:ext uri="{FF2B5EF4-FFF2-40B4-BE49-F238E27FC236}">
-                        <a16:creationId xmlns:a16="http://schemas.microsoft.com/office/drawing/2014/main" id="{276C2373-AB8E-7195-2F3B-31F5046C2122}"/>
+                        <a16:creationId xmlns:a16="http://schemas.microsoft.com/office/drawing/2014/main" id="{37975D3B-C5C5-9887-30A3-1A147C8900BD}"/>
                       </a:ext>
                     </a:extLst>
                   </p:cNvPr>
@@ -17458,10 +17535,10 @@
               </p:cxnSp>
               <p:cxnSp>
                 <p:nvCxnSpPr>
-                  <p:cNvPr id="71" name="Straight Connector 70">
+                  <p:cNvPr id="127" name="Straight Connector 126">
                     <a:extLst>
                       <a:ext uri="{FF2B5EF4-FFF2-40B4-BE49-F238E27FC236}">
-                        <a16:creationId xmlns:a16="http://schemas.microsoft.com/office/drawing/2014/main" id="{4FE97CE4-CF65-1648-F6C8-A79E9386DA02}"/>
+                        <a16:creationId xmlns:a16="http://schemas.microsoft.com/office/drawing/2014/main" id="{09BB1F94-DD43-58AC-D17C-C5A5664B5B66}"/>
                       </a:ext>
                     </a:extLst>
                   </p:cNvPr>
@@ -17503,10 +17580,10 @@
               </p:cxnSp>
               <p:cxnSp>
                 <p:nvCxnSpPr>
-                  <p:cNvPr id="72" name="Straight Connector 71">
+                  <p:cNvPr id="134" name="Straight Connector 133">
                     <a:extLst>
                       <a:ext uri="{FF2B5EF4-FFF2-40B4-BE49-F238E27FC236}">
-                        <a16:creationId xmlns:a16="http://schemas.microsoft.com/office/drawing/2014/main" id="{FD39F9BB-0D67-D3B6-60BD-84B589425B73}"/>
+                        <a16:creationId xmlns:a16="http://schemas.microsoft.com/office/drawing/2014/main" id="{2343C3CE-A4EF-3388-D834-3F9B73EFF73C}"/>
                       </a:ext>
                     </a:extLst>
                   </p:cNvPr>
@@ -17550,10 +17627,10 @@
           </p:grpSp>
           <p:sp>
             <p:nvSpPr>
-              <p:cNvPr id="65" name="TextBox 64">
+              <p:cNvPr id="119" name="TextBox 118">
                 <a:extLst>
                   <a:ext uri="{FF2B5EF4-FFF2-40B4-BE49-F238E27FC236}">
-                    <a16:creationId xmlns:a16="http://schemas.microsoft.com/office/drawing/2014/main" id="{89269F81-47C8-BD7F-9451-0D6FD4E46977}"/>
+                    <a16:creationId xmlns:a16="http://schemas.microsoft.com/office/drawing/2014/main" id="{1B07AAD0-462F-0474-A63C-8BE3AF8485BD}"/>
                   </a:ext>
                 </a:extLst>
               </p:cNvPr>
@@ -17631,22 +17708,22 @@
         </p:grpSp>
         <p:cxnSp>
           <p:nvCxnSpPr>
-            <p:cNvPr id="77" name="Straight Arrow Connector 105">
+            <p:cNvPr id="79" name="Straight Arrow Connector 105">
               <a:extLst>
                 <a:ext uri="{FF2B5EF4-FFF2-40B4-BE49-F238E27FC236}">
-                  <a16:creationId xmlns:a16="http://schemas.microsoft.com/office/drawing/2014/main" id="{0B0219F1-666E-E841-AF58-53881E0C73C8}"/>
+                  <a16:creationId xmlns:a16="http://schemas.microsoft.com/office/drawing/2014/main" id="{D24C38D6-44D0-5993-8EB9-0DBDD6522CE0}"/>
                 </a:ext>
               </a:extLst>
             </p:cNvPr>
             <p:cNvCxnSpPr>
               <a:cxnSpLocks/>
-              <a:stCxn id="59" idx="0"/>
+              <a:stCxn id="62" idx="0"/>
             </p:cNvCxnSpPr>
             <p:nvPr/>
           </p:nvCxnSpPr>
           <p:spPr>
             <a:xfrm rot="5400000" flipH="1" flipV="1">
-              <a:off x="10460219" y="2441135"/>
+              <a:off x="10467278" y="2464373"/>
               <a:ext cx="157267" cy="1207714"/>
             </a:xfrm>
             <a:prstGeom prst="bentConnector2">
@@ -17679,22 +17756,22 @@
         </p:cxnSp>
         <p:cxnSp>
           <p:nvCxnSpPr>
-            <p:cNvPr id="80" name="Straight Arrow Connector 105">
+            <p:cNvPr id="81" name="Straight Arrow Connector 105">
               <a:extLst>
                 <a:ext uri="{FF2B5EF4-FFF2-40B4-BE49-F238E27FC236}">
-                  <a16:creationId xmlns:a16="http://schemas.microsoft.com/office/drawing/2014/main" id="{6A1F719D-4139-7E7E-AA54-48BAC5445A2A}"/>
+                  <a16:creationId xmlns:a16="http://schemas.microsoft.com/office/drawing/2014/main" id="{A69CDCAE-5A06-27FE-9679-251BA08A2F6D}"/>
                 </a:ext>
               </a:extLst>
             </p:cNvPr>
             <p:cNvCxnSpPr>
               <a:cxnSpLocks/>
-              <a:stCxn id="133" idx="2"/>
+              <a:stCxn id="50" idx="2"/>
             </p:cNvCxnSpPr>
             <p:nvPr/>
           </p:nvCxnSpPr>
           <p:spPr>
             <a:xfrm rot="16200000" flipH="1">
-              <a:off x="10466781" y="2156188"/>
+              <a:off x="10473840" y="2179426"/>
               <a:ext cx="144142" cy="1207712"/>
             </a:xfrm>
             <a:prstGeom prst="bentConnector2">
@@ -17727,10 +17804,10 @@
         </p:cxnSp>
         <p:grpSp>
           <p:nvGrpSpPr>
-            <p:cNvPr id="103" name="Group 102">
+            <p:cNvPr id="82" name="Group 81">
               <a:extLst>
                 <a:ext uri="{FF2B5EF4-FFF2-40B4-BE49-F238E27FC236}">
-                  <a16:creationId xmlns:a16="http://schemas.microsoft.com/office/drawing/2014/main" id="{91531FA6-8388-42E1-84F5-05786810BCEC}"/>
+                  <a16:creationId xmlns:a16="http://schemas.microsoft.com/office/drawing/2014/main" id="{8EA61AF3-0A6F-947D-426C-A06319B8726E}"/>
                 </a:ext>
               </a:extLst>
             </p:cNvPr>
@@ -17739,18 +17816,18 @@
           </p:nvGrpSpPr>
           <p:grpSpPr>
             <a:xfrm>
-              <a:off x="6157281" y="3493534"/>
+              <a:off x="6164340" y="3525049"/>
               <a:ext cx="924644" cy="215444"/>
-              <a:chOff x="1025766" y="1117418"/>
+              <a:chOff x="1025766" y="1118525"/>
               <a:chExt cx="924644" cy="215444"/>
             </a:xfrm>
           </p:grpSpPr>
           <p:cxnSp>
             <p:nvCxnSpPr>
-              <p:cNvPr id="98" name="Connector: Elbow 5">
+              <p:cNvPr id="113" name="Connector: Elbow 5">
                 <a:extLst>
                   <a:ext uri="{FF2B5EF4-FFF2-40B4-BE49-F238E27FC236}">
-                    <a16:creationId xmlns:a16="http://schemas.microsoft.com/office/drawing/2014/main" id="{C34D2BF2-E3AA-4E01-5DEE-FB6E0CDA6F4D}"/>
+                    <a16:creationId xmlns:a16="http://schemas.microsoft.com/office/drawing/2014/main" id="{7ADDF251-F4FA-B8B1-879D-B4362BEB70E7}"/>
                   </a:ext>
                 </a:extLst>
               </p:cNvPr>
@@ -17788,10 +17865,10 @@
           </p:cxnSp>
           <p:sp>
             <p:nvSpPr>
-              <p:cNvPr id="100" name="TextBox 99">
+              <p:cNvPr id="114" name="TextBox 113">
                 <a:extLst>
                   <a:ext uri="{FF2B5EF4-FFF2-40B4-BE49-F238E27FC236}">
-                    <a16:creationId xmlns:a16="http://schemas.microsoft.com/office/drawing/2014/main" id="{288E889D-D472-852D-F5C6-32690064E47E}"/>
+                    <a16:creationId xmlns:a16="http://schemas.microsoft.com/office/drawing/2014/main" id="{3BCF5F6F-7C85-07CF-5F40-732DF2097690}"/>
                   </a:ext>
                 </a:extLst>
               </p:cNvPr>
@@ -17800,7 +17877,7 @@
             </p:nvSpPr>
             <p:spPr>
               <a:xfrm>
-                <a:off x="1257035" y="1117418"/>
+                <a:off x="1264724" y="1118525"/>
                 <a:ext cx="455258" cy="215444"/>
               </a:xfrm>
               <a:prstGeom prst="rect">
@@ -17831,10 +17908,10 @@
           </p:sp>
           <p:cxnSp>
             <p:nvCxnSpPr>
-              <p:cNvPr id="102" name="Connector: Elbow 5">
+              <p:cNvPr id="115" name="Connector: Elbow 5">
                 <a:extLst>
                   <a:ext uri="{FF2B5EF4-FFF2-40B4-BE49-F238E27FC236}">
-                    <a16:creationId xmlns:a16="http://schemas.microsoft.com/office/drawing/2014/main" id="{399F0704-9475-9BB3-D0A7-703AE724B87B}"/>
+                    <a16:creationId xmlns:a16="http://schemas.microsoft.com/office/drawing/2014/main" id="{299B7E97-F1B7-204C-FD49-38CE150DCD30}"/>
                   </a:ext>
                 </a:extLst>
               </p:cNvPr>
@@ -17871,12 +17948,102 @@
             </p:style>
           </p:cxnSp>
         </p:grpSp>
+        <p:sp>
+          <p:nvSpPr>
+            <p:cNvPr id="84" name="TextBox 83">
+              <a:extLst>
+                <a:ext uri="{FF2B5EF4-FFF2-40B4-BE49-F238E27FC236}">
+                  <a16:creationId xmlns:a16="http://schemas.microsoft.com/office/drawing/2014/main" id="{B1E3F905-9A55-8C66-D131-D8FA83B8C98B}"/>
+                </a:ext>
+              </a:extLst>
+            </p:cNvPr>
+            <p:cNvSpPr txBox="1"/>
+            <p:nvPr/>
+          </p:nvSpPr>
+          <p:spPr>
+            <a:xfrm>
+              <a:off x="10321749" y="2397732"/>
+              <a:ext cx="475163" cy="369332"/>
+            </a:xfrm>
+            <a:prstGeom prst="rect">
+              <a:avLst/>
+            </a:prstGeom>
+            <a:noFill/>
+          </p:spPr>
+          <p:txBody>
+            <a:bodyPr wrap="square" rtlCol="0">
+              <a:spAutoFit/>
+            </a:bodyPr>
+            <a:lstStyle/>
+            <a:p>
+              <a:r>
+                <a:rPr lang="en-US" dirty="0">
+                  <a:solidFill>
+                    <a:schemeClr val="accent6"/>
+                  </a:solidFill>
+                  <a:sym typeface="Wingdings" panose="05000000000000000000" pitchFamily="2" charset="2"/>
+                </a:rPr>
+                <a:t></a:t>
+              </a:r>
+              <a:endParaRPr lang="en-US" dirty="0">
+                <a:solidFill>
+                  <a:schemeClr val="accent6"/>
+                </a:solidFill>
+              </a:endParaRPr>
+            </a:p>
+          </p:txBody>
+        </p:sp>
+        <p:sp>
+          <p:nvSpPr>
+            <p:cNvPr id="85" name="TextBox 84">
+              <a:extLst>
+                <a:ext uri="{FF2B5EF4-FFF2-40B4-BE49-F238E27FC236}">
+                  <a16:creationId xmlns:a16="http://schemas.microsoft.com/office/drawing/2014/main" id="{7F01E24C-9476-D2CC-910C-D88C393A4934}"/>
+                </a:ext>
+              </a:extLst>
+            </p:cNvPr>
+            <p:cNvSpPr txBox="1"/>
+            <p:nvPr/>
+          </p:nvSpPr>
+          <p:spPr>
+            <a:xfrm>
+              <a:off x="11434198" y="2767064"/>
+              <a:ext cx="475163" cy="369332"/>
+            </a:xfrm>
+            <a:prstGeom prst="rect">
+              <a:avLst/>
+            </a:prstGeom>
+            <a:noFill/>
+          </p:spPr>
+          <p:txBody>
+            <a:bodyPr wrap="square" rtlCol="0">
+              <a:spAutoFit/>
+            </a:bodyPr>
+            <a:lstStyle/>
+            <a:p>
+              <a:r>
+                <a:rPr lang="en-US" dirty="0">
+                  <a:solidFill>
+                    <a:schemeClr val="accent6"/>
+                  </a:solidFill>
+                  <a:sym typeface="Wingdings" panose="05000000000000000000" pitchFamily="2" charset="2"/>
+                </a:rPr>
+                <a:t></a:t>
+              </a:r>
+              <a:endParaRPr lang="en-US" dirty="0">
+                <a:solidFill>
+                  <a:schemeClr val="accent6"/>
+                </a:solidFill>
+              </a:endParaRPr>
+            </a:p>
+          </p:txBody>
+        </p:sp>
         <p:grpSp>
           <p:nvGrpSpPr>
-            <p:cNvPr id="3" name="Group 2">
+            <p:cNvPr id="86" name="Group 85">
               <a:extLst>
                 <a:ext uri="{FF2B5EF4-FFF2-40B4-BE49-F238E27FC236}">
-                  <a16:creationId xmlns:a16="http://schemas.microsoft.com/office/drawing/2014/main" id="{FEACCDC9-BEE7-C82E-6CB1-01A43ADC0C24}"/>
+                  <a16:creationId xmlns:a16="http://schemas.microsoft.com/office/drawing/2014/main" id="{3065FDA6-A7A5-E808-DAF3-3F47AB530A04}"/>
                 </a:ext>
               </a:extLst>
             </p:cNvPr>
@@ -17885,7 +18052,7 @@
           </p:nvGrpSpPr>
           <p:grpSpPr>
             <a:xfrm>
-              <a:off x="8966792" y="4365272"/>
+              <a:off x="8948442" y="4392421"/>
               <a:ext cx="741133" cy="260141"/>
               <a:chOff x="7686586" y="4456943"/>
               <a:chExt cx="741133" cy="260141"/>
@@ -17893,10 +18060,10 @@
           </p:grpSpPr>
           <p:sp>
             <p:nvSpPr>
-              <p:cNvPr id="4" name="TextBox 3">
+              <p:cNvPr id="109" name="TextBox 108">
                 <a:extLst>
                   <a:ext uri="{FF2B5EF4-FFF2-40B4-BE49-F238E27FC236}">
-                    <a16:creationId xmlns:a16="http://schemas.microsoft.com/office/drawing/2014/main" id="{E643D6BC-C62B-75AE-7A3E-85082D52FA9E}"/>
+                    <a16:creationId xmlns:a16="http://schemas.microsoft.com/office/drawing/2014/main" id="{5DD5408D-3340-8BBE-F611-63E1B80CAFB7}"/>
                   </a:ext>
                 </a:extLst>
               </p:cNvPr>
@@ -17944,10 +18111,10 @@
           </p:sp>
           <p:cxnSp>
             <p:nvCxnSpPr>
-              <p:cNvPr id="5" name="Connector: Elbow 5">
+              <p:cNvPr id="110" name="Connector: Elbow 5">
                 <a:extLst>
                   <a:ext uri="{FF2B5EF4-FFF2-40B4-BE49-F238E27FC236}">
-                    <a16:creationId xmlns:a16="http://schemas.microsoft.com/office/drawing/2014/main" id="{C4429EFC-F41C-5D87-3D0C-078DCAFE5E05}"/>
+                    <a16:creationId xmlns:a16="http://schemas.microsoft.com/office/drawing/2014/main" id="{0FC03F3D-C128-208A-C957-6F8A7C7539E1}"/>
                   </a:ext>
                 </a:extLst>
               </p:cNvPr>
@@ -17986,10 +18153,10 @@
         </p:grpSp>
         <p:grpSp>
           <p:nvGrpSpPr>
-            <p:cNvPr id="6" name="Group 5">
+            <p:cNvPr id="87" name="Group 86">
               <a:extLst>
                 <a:ext uri="{FF2B5EF4-FFF2-40B4-BE49-F238E27FC236}">
-                  <a16:creationId xmlns:a16="http://schemas.microsoft.com/office/drawing/2014/main" id="{994977A1-7572-593A-5031-3FDF3309ED8F}"/>
+                  <a16:creationId xmlns:a16="http://schemas.microsoft.com/office/drawing/2014/main" id="{EFAD2C50-98AC-7351-44CA-D93D17A9552E}"/>
                 </a:ext>
               </a:extLst>
             </p:cNvPr>
@@ -17998,7 +18165,7 @@
           </p:nvGrpSpPr>
           <p:grpSpPr>
             <a:xfrm>
-              <a:off x="8302874" y="4365272"/>
+              <a:off x="8284524" y="4392421"/>
               <a:ext cx="741133" cy="260141"/>
               <a:chOff x="7686586" y="4456943"/>
               <a:chExt cx="741133" cy="260141"/>
@@ -18006,10 +18173,10 @@
           </p:grpSpPr>
           <p:sp>
             <p:nvSpPr>
-              <p:cNvPr id="7" name="TextBox 6">
+              <p:cNvPr id="107" name="TextBox 106">
                 <a:extLst>
                   <a:ext uri="{FF2B5EF4-FFF2-40B4-BE49-F238E27FC236}">
-                    <a16:creationId xmlns:a16="http://schemas.microsoft.com/office/drawing/2014/main" id="{C5E8BFEC-8ACB-143B-DD1A-F259D7F02EBE}"/>
+                    <a16:creationId xmlns:a16="http://schemas.microsoft.com/office/drawing/2014/main" id="{7E906A09-1C38-4FDF-232F-DBFED7EA5D8A}"/>
                   </a:ext>
                 </a:extLst>
               </p:cNvPr>
@@ -18057,10 +18224,10 @@
           </p:sp>
           <p:cxnSp>
             <p:nvCxnSpPr>
-              <p:cNvPr id="8" name="Connector: Elbow 5">
+              <p:cNvPr id="108" name="Connector: Elbow 5">
                 <a:extLst>
                   <a:ext uri="{FF2B5EF4-FFF2-40B4-BE49-F238E27FC236}">
-                    <a16:creationId xmlns:a16="http://schemas.microsoft.com/office/drawing/2014/main" id="{0B245397-E6E8-59C2-393E-C51CBBBC510B}"/>
+                    <a16:creationId xmlns:a16="http://schemas.microsoft.com/office/drawing/2014/main" id="{FCFB0ADB-267C-85D2-F148-D680A6E358A8}"/>
                   </a:ext>
                 </a:extLst>
               </p:cNvPr>
@@ -18099,10 +18266,10 @@
         </p:grpSp>
         <p:grpSp>
           <p:nvGrpSpPr>
-            <p:cNvPr id="9" name="Group 8">
+            <p:cNvPr id="88" name="Group 87">
               <a:extLst>
                 <a:ext uri="{FF2B5EF4-FFF2-40B4-BE49-F238E27FC236}">
-                  <a16:creationId xmlns:a16="http://schemas.microsoft.com/office/drawing/2014/main" id="{D9D62038-B793-2A69-D268-A230F88AD55A}"/>
+                  <a16:creationId xmlns:a16="http://schemas.microsoft.com/office/drawing/2014/main" id="{A1B9CE32-75E9-606A-0CB4-48073499ECDD}"/>
                 </a:ext>
               </a:extLst>
             </p:cNvPr>
@@ -18111,7 +18278,7 @@
           </p:nvGrpSpPr>
           <p:grpSpPr>
             <a:xfrm>
-              <a:off x="7151952" y="4365272"/>
+              <a:off x="7090075" y="4386369"/>
               <a:ext cx="741133" cy="260141"/>
               <a:chOff x="7686586" y="4456943"/>
               <a:chExt cx="741133" cy="260141"/>
@@ -18119,10 +18286,220 @@
           </p:grpSpPr>
           <p:sp>
             <p:nvSpPr>
-              <p:cNvPr id="15" name="TextBox 14">
+              <p:cNvPr id="99" name="TextBox 98">
                 <a:extLst>
                   <a:ext uri="{FF2B5EF4-FFF2-40B4-BE49-F238E27FC236}">
-                    <a16:creationId xmlns:a16="http://schemas.microsoft.com/office/drawing/2014/main" id="{85829AE8-68AD-C68F-1F0E-9B958D26BAB0}"/>
+                    <a16:creationId xmlns:a16="http://schemas.microsoft.com/office/drawing/2014/main" id="{B96DD22F-7948-43FC-E96C-90107DE85717}"/>
+                  </a:ext>
+                </a:extLst>
+              </p:cNvPr>
+              <p:cNvSpPr txBox="1"/>
+              <p:nvPr/>
+            </p:nvSpPr>
+            <p:spPr>
+              <a:xfrm>
+                <a:off x="7686586" y="4501640"/>
+                <a:ext cx="741133" cy="215444"/>
+              </a:xfrm>
+              <a:prstGeom prst="rect">
+                <a:avLst/>
+              </a:prstGeom>
+              <a:noFill/>
+            </p:spPr>
+            <p:txBody>
+              <a:bodyPr wrap="square" rtlCol="0">
+                <a:spAutoFit/>
+              </a:bodyPr>
+              <a:lstStyle/>
+              <a:p>
+                <a:pPr algn="ctr"/>
+                <a:r>
+                  <a:rPr lang="en-US" sz="800" dirty="0">
+                    <a:solidFill>
+                      <a:schemeClr val="tx1">
+                        <a:lumMod val="50000"/>
+                        <a:lumOff val="50000"/>
+                      </a:schemeClr>
+                    </a:solidFill>
+                  </a:rPr>
+                  <a:t>poco</a:t>
+                </a:r>
+              </a:p>
+            </p:txBody>
+          </p:sp>
+          <p:cxnSp>
+            <p:nvCxnSpPr>
+              <p:cNvPr id="106" name="Connector: Elbow 5">
+                <a:extLst>
+                  <a:ext uri="{FF2B5EF4-FFF2-40B4-BE49-F238E27FC236}">
+                    <a16:creationId xmlns:a16="http://schemas.microsoft.com/office/drawing/2014/main" id="{24D67472-561A-45BB-7ACD-A7FA9C2BE68B}"/>
+                  </a:ext>
+                </a:extLst>
+              </p:cNvPr>
+              <p:cNvCxnSpPr>
+                <a:cxnSpLocks/>
+              </p:cNvCxnSpPr>
+              <p:nvPr/>
+            </p:nvCxnSpPr>
+            <p:spPr>
+              <a:xfrm flipV="1">
+                <a:off x="8032289" y="4456943"/>
+                <a:ext cx="0" cy="109794"/>
+              </a:xfrm>
+              <a:prstGeom prst="straightConnector1">
+                <a:avLst/>
+              </a:prstGeom>
+              <a:ln>
+                <a:tailEnd type="triangle"/>
+              </a:ln>
+            </p:spPr>
+            <p:style>
+              <a:lnRef idx="1">
+                <a:schemeClr val="accent1"/>
+              </a:lnRef>
+              <a:fillRef idx="0">
+                <a:schemeClr val="accent1"/>
+              </a:fillRef>
+              <a:effectRef idx="0">
+                <a:schemeClr val="accent1"/>
+              </a:effectRef>
+              <a:fontRef idx="minor">
+                <a:schemeClr val="tx1"/>
+              </a:fontRef>
+            </p:style>
+          </p:cxnSp>
+        </p:grpSp>
+        <p:grpSp>
+          <p:nvGrpSpPr>
+            <p:cNvPr id="89" name="Group 88">
+              <a:extLst>
+                <a:ext uri="{FF2B5EF4-FFF2-40B4-BE49-F238E27FC236}">
+                  <a16:creationId xmlns:a16="http://schemas.microsoft.com/office/drawing/2014/main" id="{8D579217-2976-BFC9-DC04-A3029CD4FD68}"/>
+                </a:ext>
+              </a:extLst>
+            </p:cNvPr>
+            <p:cNvGrpSpPr/>
+            <p:nvPr/>
+          </p:nvGrpSpPr>
+          <p:grpSpPr>
+            <a:xfrm>
+              <a:off x="6426157" y="4386369"/>
+              <a:ext cx="741133" cy="260141"/>
+              <a:chOff x="7686586" y="4456943"/>
+              <a:chExt cx="741133" cy="260141"/>
+            </a:xfrm>
+          </p:grpSpPr>
+          <p:sp>
+            <p:nvSpPr>
+              <p:cNvPr id="96" name="TextBox 95">
+                <a:extLst>
+                  <a:ext uri="{FF2B5EF4-FFF2-40B4-BE49-F238E27FC236}">
+                    <a16:creationId xmlns:a16="http://schemas.microsoft.com/office/drawing/2014/main" id="{861AF7DE-2957-9F07-0634-6079BD2DDFC7}"/>
+                  </a:ext>
+                </a:extLst>
+              </p:cNvPr>
+              <p:cNvSpPr txBox="1"/>
+              <p:nvPr/>
+            </p:nvSpPr>
+            <p:spPr>
+              <a:xfrm>
+                <a:off x="7686586" y="4501640"/>
+                <a:ext cx="741133" cy="215444"/>
+              </a:xfrm>
+              <a:prstGeom prst="rect">
+                <a:avLst/>
+              </a:prstGeom>
+              <a:noFill/>
+            </p:spPr>
+            <p:txBody>
+              <a:bodyPr wrap="square" rtlCol="0">
+                <a:spAutoFit/>
+              </a:bodyPr>
+              <a:lstStyle/>
+              <a:p>
+                <a:pPr algn="ctr"/>
+                <a:r>
+                  <a:rPr lang="en-US" sz="800" dirty="0">
+                    <a:solidFill>
+                      <a:schemeClr val="tx1">
+                        <a:lumMod val="50000"/>
+                        <a:lumOff val="50000"/>
+                      </a:schemeClr>
+                    </a:solidFill>
+                  </a:rPr>
+                  <a:t>poco</a:t>
+                </a:r>
+              </a:p>
+            </p:txBody>
+          </p:sp>
+          <p:cxnSp>
+            <p:nvCxnSpPr>
+              <p:cNvPr id="97" name="Connector: Elbow 5">
+                <a:extLst>
+                  <a:ext uri="{FF2B5EF4-FFF2-40B4-BE49-F238E27FC236}">
+                    <a16:creationId xmlns:a16="http://schemas.microsoft.com/office/drawing/2014/main" id="{13A59AD8-2FC9-BBB1-C14E-10652666F824}"/>
+                  </a:ext>
+                </a:extLst>
+              </p:cNvPr>
+              <p:cNvCxnSpPr>
+                <a:cxnSpLocks/>
+              </p:cNvCxnSpPr>
+              <p:nvPr/>
+            </p:nvCxnSpPr>
+            <p:spPr>
+              <a:xfrm>
+                <a:off x="8032289" y="4456943"/>
+                <a:ext cx="0" cy="109794"/>
+              </a:xfrm>
+              <a:prstGeom prst="straightConnector1">
+                <a:avLst/>
+              </a:prstGeom>
+              <a:ln>
+                <a:tailEnd type="triangle"/>
+              </a:ln>
+            </p:spPr>
+            <p:style>
+              <a:lnRef idx="1">
+                <a:schemeClr val="accent1"/>
+              </a:lnRef>
+              <a:fillRef idx="0">
+                <a:schemeClr val="accent1"/>
+              </a:fillRef>
+              <a:effectRef idx="0">
+                <a:schemeClr val="accent1"/>
+              </a:effectRef>
+              <a:fontRef idx="minor">
+                <a:schemeClr val="tx1"/>
+              </a:fontRef>
+            </p:style>
+          </p:cxnSp>
+        </p:grpSp>
+        <p:grpSp>
+          <p:nvGrpSpPr>
+            <p:cNvPr id="90" name="Group 89">
+              <a:extLst>
+                <a:ext uri="{FF2B5EF4-FFF2-40B4-BE49-F238E27FC236}">
+                  <a16:creationId xmlns:a16="http://schemas.microsoft.com/office/drawing/2014/main" id="{DF699640-E419-C2B9-0FC5-F6C68F1B8A04}"/>
+                </a:ext>
+              </a:extLst>
+            </p:cNvPr>
+            <p:cNvGrpSpPr/>
+            <p:nvPr/>
+          </p:nvGrpSpPr>
+          <p:grpSpPr>
+            <a:xfrm rot="16200000">
+              <a:off x="9601308" y="5148320"/>
+              <a:ext cx="741133" cy="260141"/>
+              <a:chOff x="7686586" y="4456943"/>
+              <a:chExt cx="741133" cy="260141"/>
+            </a:xfrm>
+          </p:grpSpPr>
+          <p:sp>
+            <p:nvSpPr>
+              <p:cNvPr id="94" name="TextBox 93">
+                <a:extLst>
+                  <a:ext uri="{FF2B5EF4-FFF2-40B4-BE49-F238E27FC236}">
+                    <a16:creationId xmlns:a16="http://schemas.microsoft.com/office/drawing/2014/main" id="{1883908F-2045-9191-67BE-C6E981E256F0}"/>
                   </a:ext>
                 </a:extLst>
               </p:cNvPr>
@@ -18170,10 +18547,10 @@
           </p:sp>
           <p:cxnSp>
             <p:nvCxnSpPr>
-              <p:cNvPr id="21" name="Connector: Elbow 5">
+              <p:cNvPr id="95" name="Connector: Elbow 5">
                 <a:extLst>
                   <a:ext uri="{FF2B5EF4-FFF2-40B4-BE49-F238E27FC236}">
-                    <a16:creationId xmlns:a16="http://schemas.microsoft.com/office/drawing/2014/main" id="{9273713A-D1D7-1A5B-3325-E30EA933F0FB}"/>
+                    <a16:creationId xmlns:a16="http://schemas.microsoft.com/office/drawing/2014/main" id="{890B8365-13D1-84F5-212D-27465AA7F02C}"/>
                   </a:ext>
                 </a:extLst>
               </p:cNvPr>
@@ -18212,10 +18589,10 @@
         </p:grpSp>
         <p:grpSp>
           <p:nvGrpSpPr>
-            <p:cNvPr id="22" name="Group 21">
+            <p:cNvPr id="91" name="Group 90">
               <a:extLst>
                 <a:ext uri="{FF2B5EF4-FFF2-40B4-BE49-F238E27FC236}">
-                  <a16:creationId xmlns:a16="http://schemas.microsoft.com/office/drawing/2014/main" id="{84B86A9A-F438-7E72-222E-ABC7F9D1E2E2}"/>
+                  <a16:creationId xmlns:a16="http://schemas.microsoft.com/office/drawing/2014/main" id="{208EB1EC-AF57-BC2B-1DA7-B9EF023262EB}"/>
                 </a:ext>
               </a:extLst>
             </p:cNvPr>
@@ -18223,19 +18600,19 @@
             <p:nvPr/>
           </p:nvGrpSpPr>
           <p:grpSpPr>
-            <a:xfrm>
-              <a:off x="6488034" y="4365272"/>
-              <a:ext cx="741133" cy="260141"/>
+            <a:xfrm rot="16200000">
+              <a:off x="9601310" y="4758923"/>
+              <a:ext cx="741133" cy="260142"/>
               <a:chOff x="7686586" y="4456943"/>
-              <a:chExt cx="741133" cy="260141"/>
+              <a:chExt cx="741133" cy="260142"/>
             </a:xfrm>
           </p:grpSpPr>
           <p:sp>
             <p:nvSpPr>
-              <p:cNvPr id="23" name="TextBox 22">
+              <p:cNvPr id="92" name="TextBox 91">
                 <a:extLst>
                   <a:ext uri="{FF2B5EF4-FFF2-40B4-BE49-F238E27FC236}">
-                    <a16:creationId xmlns:a16="http://schemas.microsoft.com/office/drawing/2014/main" id="{95D8D3EB-7070-7CD3-73E0-40C7395AD59D}"/>
+                    <a16:creationId xmlns:a16="http://schemas.microsoft.com/office/drawing/2014/main" id="{DD67C3E8-8B57-0419-145E-9F2526F137AA}"/>
                   </a:ext>
                 </a:extLst>
               </p:cNvPr>
@@ -18244,7 +18621,7 @@
             </p:nvSpPr>
             <p:spPr>
               <a:xfrm>
-                <a:off x="7686586" y="4501640"/>
+                <a:off x="7686586" y="4501641"/>
                 <a:ext cx="741133" cy="215444"/>
               </a:xfrm>
               <a:prstGeom prst="rect">
@@ -18275,220 +18652,10 @@
           </p:sp>
           <p:cxnSp>
             <p:nvCxnSpPr>
-              <p:cNvPr id="24" name="Connector: Elbow 5">
+              <p:cNvPr id="93" name="Connector: Elbow 5">
                 <a:extLst>
                   <a:ext uri="{FF2B5EF4-FFF2-40B4-BE49-F238E27FC236}">
-                    <a16:creationId xmlns:a16="http://schemas.microsoft.com/office/drawing/2014/main" id="{F9D520D9-D42A-981F-132E-E80F01E7D949}"/>
-                  </a:ext>
-                </a:extLst>
-              </p:cNvPr>
-              <p:cNvCxnSpPr>
-                <a:cxnSpLocks/>
-              </p:cNvCxnSpPr>
-              <p:nvPr/>
-            </p:nvCxnSpPr>
-            <p:spPr>
-              <a:xfrm>
-                <a:off x="8032289" y="4456943"/>
-                <a:ext cx="0" cy="109794"/>
-              </a:xfrm>
-              <a:prstGeom prst="straightConnector1">
-                <a:avLst/>
-              </a:prstGeom>
-              <a:ln>
-                <a:tailEnd type="triangle"/>
-              </a:ln>
-            </p:spPr>
-            <p:style>
-              <a:lnRef idx="1">
-                <a:schemeClr val="accent1"/>
-              </a:lnRef>
-              <a:fillRef idx="0">
-                <a:schemeClr val="accent1"/>
-              </a:fillRef>
-              <a:effectRef idx="0">
-                <a:schemeClr val="accent1"/>
-              </a:effectRef>
-              <a:fontRef idx="minor">
-                <a:schemeClr val="tx1"/>
-              </a:fontRef>
-            </p:style>
-          </p:cxnSp>
-        </p:grpSp>
-        <p:grpSp>
-          <p:nvGrpSpPr>
-            <p:cNvPr id="26" name="Group 25">
-              <a:extLst>
-                <a:ext uri="{FF2B5EF4-FFF2-40B4-BE49-F238E27FC236}">
-                  <a16:creationId xmlns:a16="http://schemas.microsoft.com/office/drawing/2014/main" id="{45BB4CE7-5C9A-FCB3-DCFA-F2207C7504FE}"/>
-                </a:ext>
-              </a:extLst>
-            </p:cNvPr>
-            <p:cNvGrpSpPr/>
-            <p:nvPr/>
-          </p:nvGrpSpPr>
-          <p:grpSpPr>
-            <a:xfrm>
-              <a:off x="10800857" y="4365272"/>
-              <a:ext cx="741133" cy="260141"/>
-              <a:chOff x="7686586" y="4456943"/>
-              <a:chExt cx="741133" cy="260141"/>
-            </a:xfrm>
-          </p:grpSpPr>
-          <p:sp>
-            <p:nvSpPr>
-              <p:cNvPr id="29" name="TextBox 28">
-                <a:extLst>
-                  <a:ext uri="{FF2B5EF4-FFF2-40B4-BE49-F238E27FC236}">
-                    <a16:creationId xmlns:a16="http://schemas.microsoft.com/office/drawing/2014/main" id="{19904F5B-1C71-80C0-AEF1-C163B2E649EF}"/>
-                  </a:ext>
-                </a:extLst>
-              </p:cNvPr>
-              <p:cNvSpPr txBox="1"/>
-              <p:nvPr/>
-            </p:nvSpPr>
-            <p:spPr>
-              <a:xfrm>
-                <a:off x="7686586" y="4501640"/>
-                <a:ext cx="741133" cy="215444"/>
-              </a:xfrm>
-              <a:prstGeom prst="rect">
-                <a:avLst/>
-              </a:prstGeom>
-              <a:noFill/>
-            </p:spPr>
-            <p:txBody>
-              <a:bodyPr wrap="square" rtlCol="0">
-                <a:spAutoFit/>
-              </a:bodyPr>
-              <a:lstStyle/>
-              <a:p>
-                <a:pPr algn="ctr"/>
-                <a:r>
-                  <a:rPr lang="en-US" sz="800" dirty="0">
-                    <a:solidFill>
-                      <a:schemeClr val="tx1">
-                        <a:lumMod val="50000"/>
-                        <a:lumOff val="50000"/>
-                      </a:schemeClr>
-                    </a:solidFill>
-                  </a:rPr>
-                  <a:t>poco</a:t>
-                </a:r>
-              </a:p>
-            </p:txBody>
-          </p:sp>
-          <p:cxnSp>
-            <p:nvCxnSpPr>
-              <p:cNvPr id="30" name="Connector: Elbow 5">
-                <a:extLst>
-                  <a:ext uri="{FF2B5EF4-FFF2-40B4-BE49-F238E27FC236}">
-                    <a16:creationId xmlns:a16="http://schemas.microsoft.com/office/drawing/2014/main" id="{5741214B-4963-A944-9536-D8ECF71C4F60}"/>
-                  </a:ext>
-                </a:extLst>
-              </p:cNvPr>
-              <p:cNvCxnSpPr>
-                <a:cxnSpLocks/>
-              </p:cNvCxnSpPr>
-              <p:nvPr/>
-            </p:nvCxnSpPr>
-            <p:spPr>
-              <a:xfrm flipV="1">
-                <a:off x="8032289" y="4456943"/>
-                <a:ext cx="0" cy="109794"/>
-              </a:xfrm>
-              <a:prstGeom prst="straightConnector1">
-                <a:avLst/>
-              </a:prstGeom>
-              <a:ln>
-                <a:tailEnd type="triangle"/>
-              </a:ln>
-            </p:spPr>
-            <p:style>
-              <a:lnRef idx="1">
-                <a:schemeClr val="accent1"/>
-              </a:lnRef>
-              <a:fillRef idx="0">
-                <a:schemeClr val="accent1"/>
-              </a:fillRef>
-              <a:effectRef idx="0">
-                <a:schemeClr val="accent1"/>
-              </a:effectRef>
-              <a:fontRef idx="minor">
-                <a:schemeClr val="tx1"/>
-              </a:fontRef>
-            </p:style>
-          </p:cxnSp>
-        </p:grpSp>
-        <p:grpSp>
-          <p:nvGrpSpPr>
-            <p:cNvPr id="31" name="Group 30">
-              <a:extLst>
-                <a:ext uri="{FF2B5EF4-FFF2-40B4-BE49-F238E27FC236}">
-                  <a16:creationId xmlns:a16="http://schemas.microsoft.com/office/drawing/2014/main" id="{82CB3D36-E898-9D15-75E0-C057488A1796}"/>
-                </a:ext>
-              </a:extLst>
-            </p:cNvPr>
-            <p:cNvGrpSpPr/>
-            <p:nvPr/>
-          </p:nvGrpSpPr>
-          <p:grpSpPr>
-            <a:xfrm>
-              <a:off x="10136939" y="4365272"/>
-              <a:ext cx="741133" cy="260141"/>
-              <a:chOff x="7686586" y="4456943"/>
-              <a:chExt cx="741133" cy="260141"/>
-            </a:xfrm>
-          </p:grpSpPr>
-          <p:sp>
-            <p:nvSpPr>
-              <p:cNvPr id="32" name="TextBox 31">
-                <a:extLst>
-                  <a:ext uri="{FF2B5EF4-FFF2-40B4-BE49-F238E27FC236}">
-                    <a16:creationId xmlns:a16="http://schemas.microsoft.com/office/drawing/2014/main" id="{8D69495B-F1BD-0855-FD2C-6D1180D6E164}"/>
-                  </a:ext>
-                </a:extLst>
-              </p:cNvPr>
-              <p:cNvSpPr txBox="1"/>
-              <p:nvPr/>
-            </p:nvSpPr>
-            <p:spPr>
-              <a:xfrm>
-                <a:off x="7686586" y="4501640"/>
-                <a:ext cx="741133" cy="215444"/>
-              </a:xfrm>
-              <a:prstGeom prst="rect">
-                <a:avLst/>
-              </a:prstGeom>
-              <a:noFill/>
-            </p:spPr>
-            <p:txBody>
-              <a:bodyPr wrap="square" rtlCol="0">
-                <a:spAutoFit/>
-              </a:bodyPr>
-              <a:lstStyle/>
-              <a:p>
-                <a:pPr algn="ctr"/>
-                <a:r>
-                  <a:rPr lang="en-US" sz="800" dirty="0">
-                    <a:solidFill>
-                      <a:schemeClr val="tx1">
-                        <a:lumMod val="50000"/>
-                        <a:lumOff val="50000"/>
-                      </a:schemeClr>
-                    </a:solidFill>
-                  </a:rPr>
-                  <a:t>poco</a:t>
-                </a:r>
-              </a:p>
-            </p:txBody>
-          </p:sp>
-          <p:cxnSp>
-            <p:nvCxnSpPr>
-              <p:cNvPr id="33" name="Connector: Elbow 5">
-                <a:extLst>
-                  <a:ext uri="{FF2B5EF4-FFF2-40B4-BE49-F238E27FC236}">
-                    <a16:creationId xmlns:a16="http://schemas.microsoft.com/office/drawing/2014/main" id="{4C135694-D94E-7EB2-7893-E8A48DD85147}"/>
+                    <a16:creationId xmlns:a16="http://schemas.microsoft.com/office/drawing/2014/main" id="{5359DE43-5FF5-4AE6-A47A-2B11BE4C8682}"/>
                   </a:ext>
                 </a:extLst>
               </p:cNvPr>
@@ -18555,17 +18722,17 @@
             <a:pPr algn="ctr"/>
             <a:r>
               <a:rPr lang="en-US" dirty="0"/>
-              <a:t>AVX Roadmap – 3A23 – CY2024</a:t>
+              <a:t>AVX Roadmap – 3A24 – CY2024</a:t>
             </a:r>
           </a:p>
         </p:txBody>
       </p:sp>
       <p:grpSp>
         <p:nvGrpSpPr>
-          <p:cNvPr id="39" name="Group 38">
+          <p:cNvPr id="164" name="Group 163">
             <a:extLst>
               <a:ext uri="{FF2B5EF4-FFF2-40B4-BE49-F238E27FC236}">
-                <a16:creationId xmlns:a16="http://schemas.microsoft.com/office/drawing/2014/main" id="{EA8A93BD-5951-4513-2432-7C998C3EE07A}"/>
+                <a16:creationId xmlns:a16="http://schemas.microsoft.com/office/drawing/2014/main" id="{0E65E644-5F84-D3B9-9601-372C92B90636}"/>
               </a:ext>
             </a:extLst>
           </p:cNvPr>
@@ -18574,282 +18741,261 @@
         </p:nvGrpSpPr>
         <p:grpSpPr>
           <a:xfrm>
-            <a:off x="2669869" y="1883099"/>
-            <a:ext cx="1156688" cy="813823"/>
-            <a:chOff x="8091389" y="3186300"/>
-            <a:chExt cx="1156688" cy="813823"/>
+            <a:off x="3113512" y="1920167"/>
+            <a:ext cx="263702" cy="540628"/>
+            <a:chOff x="1238127" y="3532909"/>
+            <a:chExt cx="389165" cy="795647"/>
           </a:xfrm>
         </p:grpSpPr>
-        <p:grpSp>
-          <p:nvGrpSpPr>
-            <p:cNvPr id="164" name="Group 163">
+        <p:sp>
+          <p:nvSpPr>
+            <p:cNvPr id="165" name="Oval 164">
               <a:extLst>
                 <a:ext uri="{FF2B5EF4-FFF2-40B4-BE49-F238E27FC236}">
-                  <a16:creationId xmlns:a16="http://schemas.microsoft.com/office/drawing/2014/main" id="{0E65E644-5F84-D3B9-9601-372C92B90636}"/>
+                  <a16:creationId xmlns:a16="http://schemas.microsoft.com/office/drawing/2014/main" id="{CE9CD032-B467-08E2-0B42-0FF95DEC3AC5}"/>
                 </a:ext>
               </a:extLst>
             </p:cNvPr>
-            <p:cNvGrpSpPr/>
-            <p:nvPr/>
-          </p:nvGrpSpPr>
-          <p:grpSpPr>
-            <a:xfrm>
-              <a:off x="8535032" y="3186300"/>
-              <a:ext cx="263702" cy="540628"/>
-              <a:chOff x="1238127" y="3532909"/>
-              <a:chExt cx="389165" cy="795647"/>
-            </a:xfrm>
-          </p:grpSpPr>
-          <p:sp>
-            <p:nvSpPr>
-              <p:cNvPr id="165" name="Oval 164">
-                <a:extLst>
-                  <a:ext uri="{FF2B5EF4-FFF2-40B4-BE49-F238E27FC236}">
-                    <a16:creationId xmlns:a16="http://schemas.microsoft.com/office/drawing/2014/main" id="{CE9CD032-B467-08E2-0B42-0FF95DEC3AC5}"/>
-                  </a:ext>
-                </a:extLst>
-              </p:cNvPr>
-              <p:cNvSpPr/>
-              <p:nvPr/>
-            </p:nvSpPr>
-            <p:spPr>
-              <a:xfrm>
-                <a:off x="1359725" y="3532909"/>
-                <a:ext cx="166254" cy="142504"/>
-              </a:xfrm>
-              <a:prstGeom prst="ellipse">
-                <a:avLst/>
-              </a:prstGeom>
-            </p:spPr>
-            <p:style>
-              <a:lnRef idx="2">
-                <a:schemeClr val="accent1">
-                  <a:shade val="50000"/>
-                </a:schemeClr>
-              </a:lnRef>
-              <a:fillRef idx="1">
-                <a:schemeClr val="accent1"/>
-              </a:fillRef>
-              <a:effectRef idx="0">
-                <a:schemeClr val="accent1"/>
-              </a:effectRef>
-              <a:fontRef idx="minor">
-                <a:schemeClr val="lt1"/>
-              </a:fontRef>
-            </p:style>
-            <p:txBody>
-              <a:bodyPr rtlCol="0" anchor="ctr"/>
-              <a:lstStyle/>
-              <a:p>
-                <a:pPr algn="ctr"/>
-                <a:endParaRPr lang="en-US"/>
-              </a:p>
-            </p:txBody>
-          </p:sp>
-          <p:cxnSp>
-            <p:nvCxnSpPr>
-              <p:cNvPr id="166" name="Straight Connector 165">
-                <a:extLst>
-                  <a:ext uri="{FF2B5EF4-FFF2-40B4-BE49-F238E27FC236}">
-                    <a16:creationId xmlns:a16="http://schemas.microsoft.com/office/drawing/2014/main" id="{62AE0D4B-A122-FA01-D6AC-D948BD219794}"/>
-                  </a:ext>
-                </a:extLst>
-              </p:cNvPr>
-              <p:cNvCxnSpPr>
-                <a:stCxn id="165" idx="0"/>
-              </p:cNvCxnSpPr>
-              <p:nvPr/>
-            </p:nvCxnSpPr>
-            <p:spPr>
-              <a:xfrm flipH="1">
-                <a:off x="1436914" y="3532909"/>
-                <a:ext cx="5938" cy="417748"/>
-              </a:xfrm>
-              <a:prstGeom prst="line">
-                <a:avLst/>
-              </a:prstGeom>
-              <a:ln w="31750"/>
-            </p:spPr>
-            <p:style>
-              <a:lnRef idx="1">
-                <a:schemeClr val="accent1"/>
-              </a:lnRef>
-              <a:fillRef idx="0">
-                <a:schemeClr val="accent1"/>
-              </a:fillRef>
-              <a:effectRef idx="0">
-                <a:schemeClr val="accent1"/>
-              </a:effectRef>
-              <a:fontRef idx="minor">
-                <a:schemeClr val="tx1"/>
-              </a:fontRef>
-            </p:style>
-          </p:cxnSp>
-          <p:cxnSp>
-            <p:nvCxnSpPr>
-              <p:cNvPr id="167" name="Straight Connector 166">
-                <a:extLst>
-                  <a:ext uri="{FF2B5EF4-FFF2-40B4-BE49-F238E27FC236}">
-                    <a16:creationId xmlns:a16="http://schemas.microsoft.com/office/drawing/2014/main" id="{AE9824CB-9AE0-7DD3-674F-F8846D61B117}"/>
-                  </a:ext>
-                </a:extLst>
-              </p:cNvPr>
-              <p:cNvCxnSpPr>
-                <a:cxnSpLocks/>
-              </p:cNvCxnSpPr>
-              <p:nvPr/>
-            </p:nvCxnSpPr>
-            <p:spPr>
-              <a:xfrm>
-                <a:off x="1435679" y="3916666"/>
-                <a:ext cx="172864" cy="411890"/>
-              </a:xfrm>
-              <a:prstGeom prst="line">
-                <a:avLst/>
-              </a:prstGeom>
-              <a:ln w="31750"/>
-            </p:spPr>
-            <p:style>
-              <a:lnRef idx="1">
-                <a:schemeClr val="accent1"/>
-              </a:lnRef>
-              <a:fillRef idx="0">
-                <a:schemeClr val="accent1"/>
-              </a:fillRef>
-              <a:effectRef idx="0">
-                <a:schemeClr val="accent1"/>
-              </a:effectRef>
-              <a:fontRef idx="minor">
-                <a:schemeClr val="tx1"/>
-              </a:fontRef>
-            </p:style>
-          </p:cxnSp>
-          <p:cxnSp>
-            <p:nvCxnSpPr>
-              <p:cNvPr id="168" name="Straight Connector 167">
-                <a:extLst>
-                  <a:ext uri="{FF2B5EF4-FFF2-40B4-BE49-F238E27FC236}">
-                    <a16:creationId xmlns:a16="http://schemas.microsoft.com/office/drawing/2014/main" id="{BAE06723-A24E-3570-8FDE-46C5F95394D0}"/>
-                  </a:ext>
-                </a:extLst>
-              </p:cNvPr>
-              <p:cNvCxnSpPr>
-                <a:cxnSpLocks/>
-              </p:cNvCxnSpPr>
-              <p:nvPr/>
-            </p:nvCxnSpPr>
-            <p:spPr>
-              <a:xfrm flipH="1">
-                <a:off x="1261798" y="3916666"/>
-                <a:ext cx="170912" cy="411890"/>
-              </a:xfrm>
-              <a:prstGeom prst="line">
-                <a:avLst/>
-              </a:prstGeom>
-              <a:ln w="31750"/>
-            </p:spPr>
-            <p:style>
-              <a:lnRef idx="1">
-                <a:schemeClr val="accent1"/>
-              </a:lnRef>
-              <a:fillRef idx="0">
-                <a:schemeClr val="accent1"/>
-              </a:fillRef>
-              <a:effectRef idx="0">
-                <a:schemeClr val="accent1"/>
-              </a:effectRef>
-              <a:fontRef idx="minor">
-                <a:schemeClr val="tx1"/>
-              </a:fontRef>
-            </p:style>
-          </p:cxnSp>
-          <p:cxnSp>
-            <p:nvCxnSpPr>
-              <p:cNvPr id="169" name="Straight Connector 168">
-                <a:extLst>
-                  <a:ext uri="{FF2B5EF4-FFF2-40B4-BE49-F238E27FC236}">
-                    <a16:creationId xmlns:a16="http://schemas.microsoft.com/office/drawing/2014/main" id="{3B07D02D-2898-1BBD-00A9-F52DEFBBD527}"/>
-                  </a:ext>
-                </a:extLst>
-              </p:cNvPr>
-              <p:cNvCxnSpPr>
-                <a:cxnSpLocks/>
-              </p:cNvCxnSpPr>
-              <p:nvPr/>
-            </p:nvCxnSpPr>
-            <p:spPr>
-              <a:xfrm flipH="1">
-                <a:off x="1238127" y="3749324"/>
-                <a:ext cx="389165" cy="0"/>
-              </a:xfrm>
-              <a:prstGeom prst="line">
-                <a:avLst/>
-              </a:prstGeom>
-              <a:ln w="31750"/>
-            </p:spPr>
-            <p:style>
-              <a:lnRef idx="1">
-                <a:schemeClr val="accent1"/>
-              </a:lnRef>
-              <a:fillRef idx="0">
-                <a:schemeClr val="accent1"/>
-              </a:fillRef>
-              <a:effectRef idx="0">
-                <a:schemeClr val="accent1"/>
-              </a:effectRef>
-              <a:fontRef idx="minor">
-                <a:schemeClr val="tx1"/>
-              </a:fontRef>
-            </p:style>
-          </p:cxnSp>
-        </p:grpSp>
-        <p:sp>
-          <p:nvSpPr>
-            <p:cNvPr id="249" name="TextBox 248">
-              <a:extLst>
-                <a:ext uri="{FF2B5EF4-FFF2-40B4-BE49-F238E27FC236}">
-                  <a16:creationId xmlns:a16="http://schemas.microsoft.com/office/drawing/2014/main" id="{5877263A-E0D3-3DBD-2AC2-59D46A910CC8}"/>
-                </a:ext>
-              </a:extLst>
-            </p:cNvPr>
-            <p:cNvSpPr txBox="1"/>
+            <p:cNvSpPr/>
             <p:nvPr/>
           </p:nvSpPr>
           <p:spPr>
             <a:xfrm>
-              <a:off x="8091389" y="3723124"/>
-              <a:ext cx="1156688" cy="276999"/>
+              <a:off x="1359725" y="3532909"/>
+              <a:ext cx="166254" cy="142504"/>
             </a:xfrm>
-            <a:prstGeom prst="rect">
+            <a:prstGeom prst="ellipse">
               <a:avLst/>
             </a:prstGeom>
-            <a:noFill/>
           </p:spPr>
+          <p:style>
+            <a:lnRef idx="2">
+              <a:schemeClr val="accent1">
+                <a:shade val="50000"/>
+              </a:schemeClr>
+            </a:lnRef>
+            <a:fillRef idx="1">
+              <a:schemeClr val="accent1"/>
+            </a:fillRef>
+            <a:effectRef idx="0">
+              <a:schemeClr val="accent1"/>
+            </a:effectRef>
+            <a:fontRef idx="minor">
+              <a:schemeClr val="lt1"/>
+            </a:fontRef>
+          </p:style>
           <p:txBody>
-            <a:bodyPr wrap="square" rtlCol="0">
-              <a:spAutoFit/>
-            </a:bodyPr>
+            <a:bodyPr rtlCol="0" anchor="ctr"/>
             <a:lstStyle/>
             <a:p>
               <a:pPr algn="ctr"/>
-              <a:r>
-                <a:rPr lang="en-US" sz="1200" dirty="0">
-                  <a:solidFill>
-                    <a:schemeClr val="accent1"/>
-                  </a:solidFill>
-                </a:rPr>
-                <a:t>Windows User</a:t>
-              </a:r>
+              <a:endParaRPr lang="en-US"/>
             </a:p>
           </p:txBody>
         </p:sp>
+        <p:cxnSp>
+          <p:nvCxnSpPr>
+            <p:cNvPr id="166" name="Straight Connector 165">
+              <a:extLst>
+                <a:ext uri="{FF2B5EF4-FFF2-40B4-BE49-F238E27FC236}">
+                  <a16:creationId xmlns:a16="http://schemas.microsoft.com/office/drawing/2014/main" id="{62AE0D4B-A122-FA01-D6AC-D948BD219794}"/>
+                </a:ext>
+              </a:extLst>
+            </p:cNvPr>
+            <p:cNvCxnSpPr>
+              <a:stCxn id="165" idx="0"/>
+            </p:cNvCxnSpPr>
+            <p:nvPr/>
+          </p:nvCxnSpPr>
+          <p:spPr>
+            <a:xfrm flipH="1">
+              <a:off x="1436914" y="3532909"/>
+              <a:ext cx="5938" cy="417748"/>
+            </a:xfrm>
+            <a:prstGeom prst="line">
+              <a:avLst/>
+            </a:prstGeom>
+            <a:ln w="31750"/>
+          </p:spPr>
+          <p:style>
+            <a:lnRef idx="1">
+              <a:schemeClr val="accent1"/>
+            </a:lnRef>
+            <a:fillRef idx="0">
+              <a:schemeClr val="accent1"/>
+            </a:fillRef>
+            <a:effectRef idx="0">
+              <a:schemeClr val="accent1"/>
+            </a:effectRef>
+            <a:fontRef idx="minor">
+              <a:schemeClr val="tx1"/>
+            </a:fontRef>
+          </p:style>
+        </p:cxnSp>
+        <p:cxnSp>
+          <p:nvCxnSpPr>
+            <p:cNvPr id="167" name="Straight Connector 166">
+              <a:extLst>
+                <a:ext uri="{FF2B5EF4-FFF2-40B4-BE49-F238E27FC236}">
+                  <a16:creationId xmlns:a16="http://schemas.microsoft.com/office/drawing/2014/main" id="{AE9824CB-9AE0-7DD3-674F-F8846D61B117}"/>
+                </a:ext>
+              </a:extLst>
+            </p:cNvPr>
+            <p:cNvCxnSpPr>
+              <a:cxnSpLocks/>
+            </p:cNvCxnSpPr>
+            <p:nvPr/>
+          </p:nvCxnSpPr>
+          <p:spPr>
+            <a:xfrm>
+              <a:off x="1435679" y="3916666"/>
+              <a:ext cx="172864" cy="411890"/>
+            </a:xfrm>
+            <a:prstGeom prst="line">
+              <a:avLst/>
+            </a:prstGeom>
+            <a:ln w="31750"/>
+          </p:spPr>
+          <p:style>
+            <a:lnRef idx="1">
+              <a:schemeClr val="accent1"/>
+            </a:lnRef>
+            <a:fillRef idx="0">
+              <a:schemeClr val="accent1"/>
+            </a:fillRef>
+            <a:effectRef idx="0">
+              <a:schemeClr val="accent1"/>
+            </a:effectRef>
+            <a:fontRef idx="minor">
+              <a:schemeClr val="tx1"/>
+            </a:fontRef>
+          </p:style>
+        </p:cxnSp>
+        <p:cxnSp>
+          <p:nvCxnSpPr>
+            <p:cNvPr id="168" name="Straight Connector 167">
+              <a:extLst>
+                <a:ext uri="{FF2B5EF4-FFF2-40B4-BE49-F238E27FC236}">
+                  <a16:creationId xmlns:a16="http://schemas.microsoft.com/office/drawing/2014/main" id="{BAE06723-A24E-3570-8FDE-46C5F95394D0}"/>
+                </a:ext>
+              </a:extLst>
+            </p:cNvPr>
+            <p:cNvCxnSpPr>
+              <a:cxnSpLocks/>
+            </p:cNvCxnSpPr>
+            <p:nvPr/>
+          </p:nvCxnSpPr>
+          <p:spPr>
+            <a:xfrm flipH="1">
+              <a:off x="1261798" y="3916666"/>
+              <a:ext cx="170912" cy="411890"/>
+            </a:xfrm>
+            <a:prstGeom prst="line">
+              <a:avLst/>
+            </a:prstGeom>
+            <a:ln w="31750"/>
+          </p:spPr>
+          <p:style>
+            <a:lnRef idx="1">
+              <a:schemeClr val="accent1"/>
+            </a:lnRef>
+            <a:fillRef idx="0">
+              <a:schemeClr val="accent1"/>
+            </a:fillRef>
+            <a:effectRef idx="0">
+              <a:schemeClr val="accent1"/>
+            </a:effectRef>
+            <a:fontRef idx="minor">
+              <a:schemeClr val="tx1"/>
+            </a:fontRef>
+          </p:style>
+        </p:cxnSp>
+        <p:cxnSp>
+          <p:nvCxnSpPr>
+            <p:cNvPr id="169" name="Straight Connector 168">
+              <a:extLst>
+                <a:ext uri="{FF2B5EF4-FFF2-40B4-BE49-F238E27FC236}">
+                  <a16:creationId xmlns:a16="http://schemas.microsoft.com/office/drawing/2014/main" id="{3B07D02D-2898-1BBD-00A9-F52DEFBBD527}"/>
+                </a:ext>
+              </a:extLst>
+            </p:cNvPr>
+            <p:cNvCxnSpPr>
+              <a:cxnSpLocks/>
+            </p:cNvCxnSpPr>
+            <p:nvPr/>
+          </p:nvCxnSpPr>
+          <p:spPr>
+            <a:xfrm flipH="1">
+              <a:off x="1238127" y="3749324"/>
+              <a:ext cx="389165" cy="0"/>
+            </a:xfrm>
+            <a:prstGeom prst="line">
+              <a:avLst/>
+            </a:prstGeom>
+            <a:ln w="31750"/>
+          </p:spPr>
+          <p:style>
+            <a:lnRef idx="1">
+              <a:schemeClr val="accent1"/>
+            </a:lnRef>
+            <a:fillRef idx="0">
+              <a:schemeClr val="accent1"/>
+            </a:fillRef>
+            <a:effectRef idx="0">
+              <a:schemeClr val="accent1"/>
+            </a:effectRef>
+            <a:fontRef idx="minor">
+              <a:schemeClr val="tx1"/>
+            </a:fontRef>
+          </p:style>
+        </p:cxnSp>
       </p:grpSp>
+      <p:sp>
+        <p:nvSpPr>
+          <p:cNvPr id="249" name="TextBox 248">
+            <a:extLst>
+              <a:ext uri="{FF2B5EF4-FFF2-40B4-BE49-F238E27FC236}">
+                <a16:creationId xmlns:a16="http://schemas.microsoft.com/office/drawing/2014/main" id="{5877263A-E0D3-3DBD-2AC2-59D46A910CC8}"/>
+              </a:ext>
+            </a:extLst>
+          </p:cNvPr>
+          <p:cNvSpPr txBox="1"/>
+          <p:nvPr/>
+        </p:nvSpPr>
+        <p:spPr>
+          <a:xfrm>
+            <a:off x="2669869" y="2456991"/>
+            <a:ext cx="1156688" cy="276999"/>
+          </a:xfrm>
+          <a:prstGeom prst="rect">
+            <a:avLst/>
+          </a:prstGeom>
+          <a:noFill/>
+        </p:spPr>
+        <p:txBody>
+          <a:bodyPr wrap="square" rtlCol="0">
+            <a:spAutoFit/>
+          </a:bodyPr>
+          <a:lstStyle/>
+          <a:p>
+            <a:pPr algn="ctr"/>
+            <a:r>
+              <a:rPr lang="en-US" sz="1200" dirty="0">
+                <a:solidFill>
+                  <a:schemeClr val="accent1"/>
+                </a:solidFill>
+              </a:rPr>
+              <a:t>Windows User</a:t>
+            </a:r>
+          </a:p>
+        </p:txBody>
+      </p:sp>
       <p:grpSp>
         <p:nvGrpSpPr>
-          <p:cNvPr id="40" name="Group 39">
+          <p:cNvPr id="101" name="Group 100">
             <a:extLst>
               <a:ext uri="{FF2B5EF4-FFF2-40B4-BE49-F238E27FC236}">
-                <a16:creationId xmlns:a16="http://schemas.microsoft.com/office/drawing/2014/main" id="{24BD4378-64AA-C2DF-4AD7-759BCEA03B3A}"/>
+                <a16:creationId xmlns:a16="http://schemas.microsoft.com/office/drawing/2014/main" id="{1E956D25-1613-2B09-F205-078982723028}"/>
               </a:ext>
             </a:extLst>
           </p:cNvPr>
@@ -18858,321 +19004,300 @@
         </p:nvGrpSpPr>
         <p:grpSpPr>
           <a:xfrm>
-            <a:off x="2669869" y="3310564"/>
-            <a:ext cx="1156688" cy="813823"/>
-            <a:chOff x="10125912" y="3186300"/>
-            <a:chExt cx="1156688" cy="813823"/>
+            <a:off x="3084090" y="3347632"/>
+            <a:ext cx="263702" cy="540628"/>
+            <a:chOff x="10617147" y="507672"/>
+            <a:chExt cx="263702" cy="540628"/>
           </a:xfrm>
         </p:grpSpPr>
-        <p:grpSp>
-          <p:nvGrpSpPr>
-            <p:cNvPr id="101" name="Group 100">
+        <p:sp>
+          <p:nvSpPr>
+            <p:cNvPr id="239" name="Oval 238">
               <a:extLst>
                 <a:ext uri="{FF2B5EF4-FFF2-40B4-BE49-F238E27FC236}">
-                  <a16:creationId xmlns:a16="http://schemas.microsoft.com/office/drawing/2014/main" id="{1E956D25-1613-2B09-F205-078982723028}"/>
+                  <a16:creationId xmlns:a16="http://schemas.microsoft.com/office/drawing/2014/main" id="{79DD7D0D-7228-D12C-ADAA-CAF2998469BE}"/>
                 </a:ext>
               </a:extLst>
             </p:cNvPr>
-            <p:cNvGrpSpPr/>
+            <p:cNvSpPr/>
             <p:nvPr/>
-          </p:nvGrpSpPr>
-          <p:grpSpPr>
+          </p:nvSpPr>
+          <p:spPr>
             <a:xfrm>
-              <a:off x="10540133" y="3186300"/>
-              <a:ext cx="263702" cy="540628"/>
-              <a:chOff x="10617147" y="507672"/>
-              <a:chExt cx="263702" cy="540628"/>
+              <a:off x="10699543" y="507672"/>
+              <a:ext cx="112655" cy="96829"/>
             </a:xfrm>
-          </p:grpSpPr>
-          <p:sp>
-            <p:nvSpPr>
-              <p:cNvPr id="239" name="Oval 238">
-                <a:extLst>
-                  <a:ext uri="{FF2B5EF4-FFF2-40B4-BE49-F238E27FC236}">
-                    <a16:creationId xmlns:a16="http://schemas.microsoft.com/office/drawing/2014/main" id="{79DD7D0D-7228-D12C-ADAA-CAF2998469BE}"/>
-                  </a:ext>
-                </a:extLst>
-              </p:cNvPr>
-              <p:cNvSpPr/>
-              <p:nvPr/>
-            </p:nvSpPr>
-            <p:spPr>
-              <a:xfrm>
-                <a:off x="10699543" y="507672"/>
-                <a:ext cx="112655" cy="96829"/>
-              </a:xfrm>
-              <a:prstGeom prst="ellipse">
-                <a:avLst/>
-              </a:prstGeom>
+            <a:prstGeom prst="ellipse">
+              <a:avLst/>
+            </a:prstGeom>
+            <a:solidFill>
+              <a:schemeClr val="tx1">
+                <a:lumMod val="50000"/>
+                <a:lumOff val="50000"/>
+              </a:schemeClr>
+            </a:solidFill>
+            <a:ln>
               <a:solidFill>
                 <a:schemeClr val="tx1">
                   <a:lumMod val="50000"/>
                   <a:lumOff val="50000"/>
                 </a:schemeClr>
               </a:solidFill>
-              <a:ln>
+            </a:ln>
+          </p:spPr>
+          <p:style>
+            <a:lnRef idx="2">
+              <a:schemeClr val="accent1">
+                <a:shade val="50000"/>
+              </a:schemeClr>
+            </a:lnRef>
+            <a:fillRef idx="1">
+              <a:schemeClr val="accent1"/>
+            </a:fillRef>
+            <a:effectRef idx="0">
+              <a:schemeClr val="accent1"/>
+            </a:effectRef>
+            <a:fontRef idx="minor">
+              <a:schemeClr val="lt1"/>
+            </a:fontRef>
+          </p:style>
+          <p:txBody>
+            <a:bodyPr rtlCol="0" anchor="ctr"/>
+            <a:lstStyle/>
+            <a:p>
+              <a:pPr algn="ctr"/>
+              <a:endParaRPr lang="en-US"/>
+            </a:p>
+          </p:txBody>
+        </p:sp>
+        <p:cxnSp>
+          <p:nvCxnSpPr>
+            <p:cNvPr id="240" name="Straight Connector 239">
+              <a:extLst>
+                <a:ext uri="{FF2B5EF4-FFF2-40B4-BE49-F238E27FC236}">
+                  <a16:creationId xmlns:a16="http://schemas.microsoft.com/office/drawing/2014/main" id="{77068CA7-090F-A87F-3F71-F2267059870B}"/>
+                </a:ext>
+              </a:extLst>
+            </p:cNvPr>
+            <p:cNvCxnSpPr>
+              <a:stCxn id="239" idx="0"/>
+            </p:cNvCxnSpPr>
+            <p:nvPr/>
+          </p:nvCxnSpPr>
+          <p:spPr>
+            <a:xfrm flipH="1">
+              <a:off x="10751847" y="507672"/>
+              <a:ext cx="4024" cy="283852"/>
+            </a:xfrm>
+            <a:prstGeom prst="line">
+              <a:avLst/>
+            </a:prstGeom>
+            <a:ln w="31750">
+              <a:solidFill>
+                <a:schemeClr val="tx1">
+                  <a:lumMod val="50000"/>
+                  <a:lumOff val="50000"/>
+                </a:schemeClr>
+              </a:solidFill>
+            </a:ln>
+          </p:spPr>
+          <p:style>
+            <a:lnRef idx="1">
+              <a:schemeClr val="accent1"/>
+            </a:lnRef>
+            <a:fillRef idx="0">
+              <a:schemeClr val="accent1"/>
+            </a:fillRef>
+            <a:effectRef idx="0">
+              <a:schemeClr val="accent1"/>
+            </a:effectRef>
+            <a:fontRef idx="minor">
+              <a:schemeClr val="tx1"/>
+            </a:fontRef>
+          </p:style>
+        </p:cxnSp>
+        <p:cxnSp>
+          <p:nvCxnSpPr>
+            <p:cNvPr id="241" name="Straight Connector 240">
+              <a:extLst>
+                <a:ext uri="{FF2B5EF4-FFF2-40B4-BE49-F238E27FC236}">
+                  <a16:creationId xmlns:a16="http://schemas.microsoft.com/office/drawing/2014/main" id="{4534E9BC-70A8-8E1D-3A65-BAF66F0E3278}"/>
+                </a:ext>
+              </a:extLst>
+            </p:cNvPr>
+            <p:cNvCxnSpPr>
+              <a:cxnSpLocks/>
+            </p:cNvCxnSpPr>
+            <p:nvPr/>
+          </p:nvCxnSpPr>
+          <p:spPr>
+            <a:xfrm>
+              <a:off x="10751010" y="768428"/>
+              <a:ext cx="117134" cy="279872"/>
+            </a:xfrm>
+            <a:prstGeom prst="line">
+              <a:avLst/>
+            </a:prstGeom>
+            <a:ln w="31750">
+              <a:solidFill>
+                <a:schemeClr val="tx1">
+                  <a:lumMod val="50000"/>
+                  <a:lumOff val="50000"/>
+                </a:schemeClr>
+              </a:solidFill>
+            </a:ln>
+          </p:spPr>
+          <p:style>
+            <a:lnRef idx="1">
+              <a:schemeClr val="accent1"/>
+            </a:lnRef>
+            <a:fillRef idx="0">
+              <a:schemeClr val="accent1"/>
+            </a:fillRef>
+            <a:effectRef idx="0">
+              <a:schemeClr val="accent1"/>
+            </a:effectRef>
+            <a:fontRef idx="minor">
+              <a:schemeClr val="tx1"/>
+            </a:fontRef>
+          </p:style>
+        </p:cxnSp>
+        <p:cxnSp>
+          <p:nvCxnSpPr>
+            <p:cNvPr id="242" name="Straight Connector 241">
+              <a:extLst>
+                <a:ext uri="{FF2B5EF4-FFF2-40B4-BE49-F238E27FC236}">
+                  <a16:creationId xmlns:a16="http://schemas.microsoft.com/office/drawing/2014/main" id="{4D654875-FCB5-34A2-391C-703BF3E918FE}"/>
+                </a:ext>
+              </a:extLst>
+            </p:cNvPr>
+            <p:cNvCxnSpPr>
+              <a:cxnSpLocks/>
+            </p:cNvCxnSpPr>
+            <p:nvPr/>
+          </p:nvCxnSpPr>
+          <p:spPr>
+            <a:xfrm flipH="1">
+              <a:off x="10633187" y="768428"/>
+              <a:ext cx="115812" cy="279872"/>
+            </a:xfrm>
+            <a:prstGeom prst="line">
+              <a:avLst/>
+            </a:prstGeom>
+            <a:ln w="31750">
+              <a:solidFill>
+                <a:schemeClr val="tx1">
+                  <a:lumMod val="50000"/>
+                  <a:lumOff val="50000"/>
+                </a:schemeClr>
+              </a:solidFill>
+            </a:ln>
+          </p:spPr>
+          <p:style>
+            <a:lnRef idx="1">
+              <a:schemeClr val="accent1"/>
+            </a:lnRef>
+            <a:fillRef idx="0">
+              <a:schemeClr val="accent1"/>
+            </a:fillRef>
+            <a:effectRef idx="0">
+              <a:schemeClr val="accent1"/>
+            </a:effectRef>
+            <a:fontRef idx="minor">
+              <a:schemeClr val="tx1"/>
+            </a:fontRef>
+          </p:style>
+        </p:cxnSp>
+        <p:cxnSp>
+          <p:nvCxnSpPr>
+            <p:cNvPr id="243" name="Straight Connector 242">
+              <a:extLst>
+                <a:ext uri="{FF2B5EF4-FFF2-40B4-BE49-F238E27FC236}">
+                  <a16:creationId xmlns:a16="http://schemas.microsoft.com/office/drawing/2014/main" id="{DBF44FC1-83EA-E653-790B-88A5A63538D6}"/>
+                </a:ext>
+              </a:extLst>
+            </p:cNvPr>
+            <p:cNvCxnSpPr>
+              <a:cxnSpLocks/>
+            </p:cNvCxnSpPr>
+            <p:nvPr/>
+          </p:nvCxnSpPr>
+          <p:spPr>
+            <a:xfrm flipH="1">
+              <a:off x="10617147" y="654722"/>
+              <a:ext cx="263702" cy="0"/>
+            </a:xfrm>
+            <a:prstGeom prst="line">
+              <a:avLst/>
+            </a:prstGeom>
+            <a:ln w="31750">
+              <a:solidFill>
+                <a:schemeClr val="tx1">
+                  <a:lumMod val="50000"/>
+                  <a:lumOff val="50000"/>
+                </a:schemeClr>
+              </a:solidFill>
+            </a:ln>
+          </p:spPr>
+          <p:style>
+            <a:lnRef idx="1">
+              <a:schemeClr val="accent1"/>
+            </a:lnRef>
+            <a:fillRef idx="0">
+              <a:schemeClr val="accent1"/>
+            </a:fillRef>
+            <a:effectRef idx="0">
+              <a:schemeClr val="accent1"/>
+            </a:effectRef>
+            <a:fontRef idx="minor">
+              <a:schemeClr val="tx1"/>
+            </a:fontRef>
+          </p:style>
+        </p:cxnSp>
+      </p:grpSp>
+      <p:sp>
+        <p:nvSpPr>
+          <p:cNvPr id="250" name="TextBox 249">
+            <a:extLst>
+              <a:ext uri="{FF2B5EF4-FFF2-40B4-BE49-F238E27FC236}">
+                <a16:creationId xmlns:a16="http://schemas.microsoft.com/office/drawing/2014/main" id="{2C4208A7-5618-92D8-E4B0-2604394FA78C}"/>
+              </a:ext>
+            </a:extLst>
+          </p:cNvPr>
+          <p:cNvSpPr txBox="1"/>
+          <p:nvPr/>
+        </p:nvSpPr>
+        <p:spPr>
+          <a:xfrm>
+            <a:off x="2669869" y="3884456"/>
+            <a:ext cx="1156688" cy="276999"/>
+          </a:xfrm>
+          <a:prstGeom prst="rect">
+            <a:avLst/>
+          </a:prstGeom>
+          <a:noFill/>
+        </p:spPr>
+        <p:txBody>
+          <a:bodyPr wrap="square" rtlCol="0">
+            <a:spAutoFit/>
+          </a:bodyPr>
+          <a:lstStyle/>
+          <a:p>
+            <a:pPr algn="ctr"/>
+            <a:r>
+              <a:rPr lang="en-US" sz="1200" dirty="0">
                 <a:solidFill>
                   <a:schemeClr val="tx1">
                     <a:lumMod val="50000"/>
                     <a:lumOff val="50000"/>
                   </a:schemeClr>
                 </a:solidFill>
-              </a:ln>
-            </p:spPr>
-            <p:style>
-              <a:lnRef idx="2">
-                <a:schemeClr val="accent1">
-                  <a:shade val="50000"/>
-                </a:schemeClr>
-              </a:lnRef>
-              <a:fillRef idx="1">
-                <a:schemeClr val="accent1"/>
-              </a:fillRef>
-              <a:effectRef idx="0">
-                <a:schemeClr val="accent1"/>
-              </a:effectRef>
-              <a:fontRef idx="minor">
-                <a:schemeClr val="lt1"/>
-              </a:fontRef>
-            </p:style>
-            <p:txBody>
-              <a:bodyPr rtlCol="0" anchor="ctr"/>
-              <a:lstStyle/>
-              <a:p>
-                <a:pPr algn="ctr"/>
-                <a:endParaRPr lang="en-US"/>
-              </a:p>
-            </p:txBody>
-          </p:sp>
-          <p:cxnSp>
-            <p:nvCxnSpPr>
-              <p:cNvPr id="240" name="Straight Connector 239">
-                <a:extLst>
-                  <a:ext uri="{FF2B5EF4-FFF2-40B4-BE49-F238E27FC236}">
-                    <a16:creationId xmlns:a16="http://schemas.microsoft.com/office/drawing/2014/main" id="{77068CA7-090F-A87F-3F71-F2267059870B}"/>
-                  </a:ext>
-                </a:extLst>
-              </p:cNvPr>
-              <p:cNvCxnSpPr>
-                <a:stCxn id="239" idx="0"/>
-              </p:cNvCxnSpPr>
-              <p:nvPr/>
-            </p:nvCxnSpPr>
-            <p:spPr>
-              <a:xfrm flipH="1">
-                <a:off x="10751847" y="507672"/>
-                <a:ext cx="4024" cy="283852"/>
-              </a:xfrm>
-              <a:prstGeom prst="line">
-                <a:avLst/>
-              </a:prstGeom>
-              <a:ln w="31750">
-                <a:solidFill>
-                  <a:schemeClr val="tx1">
-                    <a:lumMod val="50000"/>
-                    <a:lumOff val="50000"/>
-                  </a:schemeClr>
-                </a:solidFill>
-              </a:ln>
-            </p:spPr>
-            <p:style>
-              <a:lnRef idx="1">
-                <a:schemeClr val="accent1"/>
-              </a:lnRef>
-              <a:fillRef idx="0">
-                <a:schemeClr val="accent1"/>
-              </a:fillRef>
-              <a:effectRef idx="0">
-                <a:schemeClr val="accent1"/>
-              </a:effectRef>
-              <a:fontRef idx="minor">
-                <a:schemeClr val="tx1"/>
-              </a:fontRef>
-            </p:style>
-          </p:cxnSp>
-          <p:cxnSp>
-            <p:nvCxnSpPr>
-              <p:cNvPr id="241" name="Straight Connector 240">
-                <a:extLst>
-                  <a:ext uri="{FF2B5EF4-FFF2-40B4-BE49-F238E27FC236}">
-                    <a16:creationId xmlns:a16="http://schemas.microsoft.com/office/drawing/2014/main" id="{4534E9BC-70A8-8E1D-3A65-BAF66F0E3278}"/>
-                  </a:ext>
-                </a:extLst>
-              </p:cNvPr>
-              <p:cNvCxnSpPr>
-                <a:cxnSpLocks/>
-              </p:cNvCxnSpPr>
-              <p:nvPr/>
-            </p:nvCxnSpPr>
-            <p:spPr>
-              <a:xfrm>
-                <a:off x="10751010" y="768428"/>
-                <a:ext cx="117134" cy="279872"/>
-              </a:xfrm>
-              <a:prstGeom prst="line">
-                <a:avLst/>
-              </a:prstGeom>
-              <a:ln w="31750">
-                <a:solidFill>
-                  <a:schemeClr val="tx1">
-                    <a:lumMod val="50000"/>
-                    <a:lumOff val="50000"/>
-                  </a:schemeClr>
-                </a:solidFill>
-              </a:ln>
-            </p:spPr>
-            <p:style>
-              <a:lnRef idx="1">
-                <a:schemeClr val="accent1"/>
-              </a:lnRef>
-              <a:fillRef idx="0">
-                <a:schemeClr val="accent1"/>
-              </a:fillRef>
-              <a:effectRef idx="0">
-                <a:schemeClr val="accent1"/>
-              </a:effectRef>
-              <a:fontRef idx="minor">
-                <a:schemeClr val="tx1"/>
-              </a:fontRef>
-            </p:style>
-          </p:cxnSp>
-          <p:cxnSp>
-            <p:nvCxnSpPr>
-              <p:cNvPr id="242" name="Straight Connector 241">
-                <a:extLst>
-                  <a:ext uri="{FF2B5EF4-FFF2-40B4-BE49-F238E27FC236}">
-                    <a16:creationId xmlns:a16="http://schemas.microsoft.com/office/drawing/2014/main" id="{4D654875-FCB5-34A2-391C-703BF3E918FE}"/>
-                  </a:ext>
-                </a:extLst>
-              </p:cNvPr>
-              <p:cNvCxnSpPr>
-                <a:cxnSpLocks/>
-              </p:cNvCxnSpPr>
-              <p:nvPr/>
-            </p:nvCxnSpPr>
-            <p:spPr>
-              <a:xfrm flipH="1">
-                <a:off x="10633187" y="768428"/>
-                <a:ext cx="115812" cy="279872"/>
-              </a:xfrm>
-              <a:prstGeom prst="line">
-                <a:avLst/>
-              </a:prstGeom>
-              <a:ln w="31750">
-                <a:solidFill>
-                  <a:schemeClr val="tx1">
-                    <a:lumMod val="50000"/>
-                    <a:lumOff val="50000"/>
-                  </a:schemeClr>
-                </a:solidFill>
-              </a:ln>
-            </p:spPr>
-            <p:style>
-              <a:lnRef idx="1">
-                <a:schemeClr val="accent1"/>
-              </a:lnRef>
-              <a:fillRef idx="0">
-                <a:schemeClr val="accent1"/>
-              </a:fillRef>
-              <a:effectRef idx="0">
-                <a:schemeClr val="accent1"/>
-              </a:effectRef>
-              <a:fontRef idx="minor">
-                <a:schemeClr val="tx1"/>
-              </a:fontRef>
-            </p:style>
-          </p:cxnSp>
-          <p:cxnSp>
-            <p:nvCxnSpPr>
-              <p:cNvPr id="243" name="Straight Connector 242">
-                <a:extLst>
-                  <a:ext uri="{FF2B5EF4-FFF2-40B4-BE49-F238E27FC236}">
-                    <a16:creationId xmlns:a16="http://schemas.microsoft.com/office/drawing/2014/main" id="{DBF44FC1-83EA-E653-790B-88A5A63538D6}"/>
-                  </a:ext>
-                </a:extLst>
-              </p:cNvPr>
-              <p:cNvCxnSpPr>
-                <a:cxnSpLocks/>
-              </p:cNvCxnSpPr>
-              <p:nvPr/>
-            </p:nvCxnSpPr>
-            <p:spPr>
-              <a:xfrm flipH="1">
-                <a:off x="10617147" y="654722"/>
-                <a:ext cx="263702" cy="0"/>
-              </a:xfrm>
-              <a:prstGeom prst="line">
-                <a:avLst/>
-              </a:prstGeom>
-              <a:ln w="31750">
-                <a:solidFill>
-                  <a:schemeClr val="tx1">
-                    <a:lumMod val="50000"/>
-                    <a:lumOff val="50000"/>
-                  </a:schemeClr>
-                </a:solidFill>
-              </a:ln>
-            </p:spPr>
-            <p:style>
-              <a:lnRef idx="1">
-                <a:schemeClr val="accent1"/>
-              </a:lnRef>
-              <a:fillRef idx="0">
-                <a:schemeClr val="accent1"/>
-              </a:fillRef>
-              <a:effectRef idx="0">
-                <a:schemeClr val="accent1"/>
-              </a:effectRef>
-              <a:fontRef idx="minor">
-                <a:schemeClr val="tx1"/>
-              </a:fontRef>
-            </p:style>
-          </p:cxnSp>
-        </p:grpSp>
-        <p:sp>
-          <p:nvSpPr>
-            <p:cNvPr id="250" name="TextBox 249">
-              <a:extLst>
-                <a:ext uri="{FF2B5EF4-FFF2-40B4-BE49-F238E27FC236}">
-                  <a16:creationId xmlns:a16="http://schemas.microsoft.com/office/drawing/2014/main" id="{2C4208A7-5618-92D8-E4B0-2604394FA78C}"/>
-                </a:ext>
-              </a:extLst>
-            </p:cNvPr>
-            <p:cNvSpPr txBox="1"/>
-            <p:nvPr/>
-          </p:nvSpPr>
-          <p:spPr>
-            <a:xfrm>
-              <a:off x="10125912" y="3723124"/>
-              <a:ext cx="1156688" cy="276999"/>
-            </a:xfrm>
-            <a:prstGeom prst="rect">
-              <a:avLst/>
-            </a:prstGeom>
-            <a:noFill/>
-          </p:spPr>
-          <p:txBody>
-            <a:bodyPr wrap="square" rtlCol="0">
-              <a:spAutoFit/>
-            </a:bodyPr>
-            <a:lstStyle/>
-            <a:p>
-              <a:pPr algn="ctr"/>
-              <a:r>
-                <a:rPr lang="en-US" sz="1200" dirty="0">
-                  <a:solidFill>
-                    <a:schemeClr val="tx1">
-                      <a:lumMod val="50000"/>
-                      <a:lumOff val="50000"/>
-                    </a:schemeClr>
-                  </a:solidFill>
-                </a:rPr>
-                <a:t>Any User</a:t>
-              </a:r>
-            </a:p>
-          </p:txBody>
-        </p:sp>
-      </p:grpSp>
+              </a:rPr>
+              <a:t>Any User</a:t>
+            </a:r>
+          </a:p>
+        </p:txBody>
+      </p:sp>
       <p:sp>
         <p:nvSpPr>
           <p:cNvPr id="111" name="Rectangle 110">
@@ -19187,7 +19312,7 @@
         </p:nvSpPr>
         <p:spPr>
           <a:xfrm>
-            <a:off x="3924754" y="1686691"/>
+            <a:off x="3924754" y="1723759"/>
             <a:ext cx="1575459" cy="979714"/>
           </a:xfrm>
           <a:prstGeom prst="rect">
@@ -19268,7 +19393,7 @@
         </p:nvSpPr>
         <p:spPr>
           <a:xfrm>
-            <a:off x="3902318" y="3135933"/>
+            <a:off x="3902318" y="3173001"/>
             <a:ext cx="1575459" cy="979714"/>
           </a:xfrm>
           <a:prstGeom prst="rect">
@@ -19525,7 +19650,7 @@
         </p:nvCxnSpPr>
         <p:spPr>
           <a:xfrm>
-            <a:off x="3479800" y="2176548"/>
+            <a:off x="3479800" y="2213616"/>
             <a:ext cx="444954" cy="0"/>
           </a:xfrm>
           <a:prstGeom prst="straightConnector1">
@@ -19573,7 +19698,7 @@
         </p:nvCxnSpPr>
         <p:spPr>
           <a:xfrm>
-            <a:off x="5500213" y="2176548"/>
+            <a:off x="5500213" y="2213616"/>
             <a:ext cx="1808662" cy="1283118"/>
           </a:xfrm>
           <a:prstGeom prst="bentConnector3">
@@ -19624,7 +19749,7 @@
         </p:nvCxnSpPr>
         <p:spPr>
           <a:xfrm flipH="1">
-            <a:off x="4687044" y="4115647"/>
+            <a:off x="4687044" y="4152715"/>
             <a:ext cx="3004" cy="471301"/>
           </a:xfrm>
           <a:prstGeom prst="straightConnector1">
@@ -19669,7 +19794,7 @@
         </p:nvSpPr>
         <p:spPr>
           <a:xfrm>
-            <a:off x="3899314" y="4586948"/>
+            <a:off x="3899314" y="4624016"/>
             <a:ext cx="1575459" cy="979714"/>
           </a:xfrm>
           <a:prstGeom prst="rect">
@@ -19798,7 +19923,7 @@
         </p:nvSpPr>
         <p:spPr>
           <a:xfrm>
-            <a:off x="937761" y="3133196"/>
+            <a:off x="937761" y="3170264"/>
             <a:ext cx="1575459" cy="979714"/>
           </a:xfrm>
           <a:prstGeom prst="rect">
@@ -19858,7 +19983,7 @@
         </p:nvCxnSpPr>
         <p:spPr>
           <a:xfrm flipH="1">
-            <a:off x="1719981" y="4112910"/>
+            <a:off x="1719981" y="4149978"/>
             <a:ext cx="5510" cy="474038"/>
           </a:xfrm>
           <a:prstGeom prst="straightConnector1">
@@ -19903,7 +20028,7 @@
         </p:nvSpPr>
         <p:spPr>
           <a:xfrm>
-            <a:off x="932251" y="4586948"/>
+            <a:off x="932251" y="4624016"/>
             <a:ext cx="1575459" cy="979714"/>
           </a:xfrm>
           <a:prstGeom prst="rect">
@@ -20007,7 +20132,7 @@
         </p:nvCxnSpPr>
         <p:spPr>
           <a:xfrm>
-            <a:off x="2507710" y="5076805"/>
+            <a:off x="2507710" y="5113873"/>
             <a:ext cx="1391604" cy="0"/>
           </a:xfrm>
           <a:prstGeom prst="straightConnector1">
@@ -20055,7 +20180,7 @@
         </p:nvCxnSpPr>
         <p:spPr>
           <a:xfrm flipH="1">
-            <a:off x="2513220" y="3623053"/>
+            <a:off x="2513220" y="3660121"/>
             <a:ext cx="514595" cy="0"/>
           </a:xfrm>
           <a:prstGeom prst="straightConnector1">
@@ -20103,7 +20228,7 @@
         </p:nvCxnSpPr>
         <p:spPr>
           <a:xfrm flipV="1">
-            <a:off x="5474773" y="3766438"/>
+            <a:off x="5474773" y="3803506"/>
             <a:ext cx="1827555" cy="1310367"/>
           </a:xfrm>
           <a:prstGeom prst="bentConnector3">
@@ -20153,7 +20278,7 @@
         </p:nvCxnSpPr>
         <p:spPr>
           <a:xfrm>
-            <a:off x="3379450" y="3623053"/>
+            <a:off x="3379450" y="3660121"/>
             <a:ext cx="522868" cy="2737"/>
           </a:xfrm>
           <a:prstGeom prst="straightConnector1">
@@ -20184,314 +20309,272 @@
           </a:fontRef>
         </p:style>
       </p:cxnSp>
-      <p:grpSp>
-        <p:nvGrpSpPr>
-          <p:cNvPr id="16" name="Group 15">
+      <p:sp>
+        <p:nvSpPr>
+          <p:cNvPr id="18" name="TextBox 17">
             <a:extLst>
               <a:ext uri="{FF2B5EF4-FFF2-40B4-BE49-F238E27FC236}">
-                <a16:creationId xmlns:a16="http://schemas.microsoft.com/office/drawing/2014/main" id="{5CB2A6DA-2786-D000-0C58-C038ED966FA4}"/>
+                <a16:creationId xmlns:a16="http://schemas.microsoft.com/office/drawing/2014/main" id="{F8122C9A-B109-8BC5-2682-AC41DB1C88BF}"/>
               </a:ext>
             </a:extLst>
           </p:cNvPr>
-          <p:cNvGrpSpPr/>
+          <p:cNvSpPr txBox="1"/>
           <p:nvPr/>
-        </p:nvGrpSpPr>
-        <p:grpSpPr>
+        </p:nvSpPr>
+        <p:spPr>
           <a:xfrm>
-            <a:off x="2737481" y="5053276"/>
-            <a:ext cx="899954" cy="215444"/>
-            <a:chOff x="6543543" y="3674331"/>
-            <a:chExt cx="899954" cy="215444"/>
+            <a:off x="2763630" y="5090344"/>
+            <a:ext cx="847656" cy="215444"/>
           </a:xfrm>
-        </p:grpSpPr>
-        <p:sp>
-          <p:nvSpPr>
-            <p:cNvPr id="18" name="TextBox 17">
-              <a:extLst>
-                <a:ext uri="{FF2B5EF4-FFF2-40B4-BE49-F238E27FC236}">
-                  <a16:creationId xmlns:a16="http://schemas.microsoft.com/office/drawing/2014/main" id="{F8122C9A-B109-8BC5-2682-AC41DB1C88BF}"/>
-                </a:ext>
-              </a:extLst>
-            </p:cNvPr>
-            <p:cNvSpPr txBox="1"/>
-            <p:nvPr/>
-          </p:nvSpPr>
-          <p:spPr>
-            <a:xfrm>
-              <a:off x="6569692" y="3674331"/>
-              <a:ext cx="847656" cy="215444"/>
-            </a:xfrm>
-            <a:prstGeom prst="rect">
-              <a:avLst/>
-            </a:prstGeom>
-            <a:noFill/>
-          </p:spPr>
-          <p:txBody>
-            <a:bodyPr wrap="square" rtlCol="0">
-              <a:spAutoFit/>
-            </a:bodyPr>
-            <a:lstStyle/>
-            <a:p>
-              <a:pPr algn="ctr"/>
-              <a:r>
-                <a:rPr lang="en-US" sz="800" dirty="0" err="1">
-                  <a:solidFill>
-                    <a:schemeClr val="tx1">
-                      <a:lumMod val="50000"/>
-                      <a:lumOff val="50000"/>
-                    </a:schemeClr>
-                  </a:solidFill>
-                </a:rPr>
-                <a:t>json</a:t>
-              </a:r>
-              <a:endParaRPr lang="en-US" sz="800" dirty="0">
+          <a:prstGeom prst="rect">
+            <a:avLst/>
+          </a:prstGeom>
+          <a:noFill/>
+        </p:spPr>
+        <p:txBody>
+          <a:bodyPr wrap="square" rtlCol="0">
+            <a:spAutoFit/>
+          </a:bodyPr>
+          <a:lstStyle/>
+          <a:p>
+            <a:pPr algn="ctr"/>
+            <a:r>
+              <a:rPr lang="en-US" sz="800" dirty="0" err="1">
                 <a:solidFill>
                   <a:schemeClr val="tx1">
                     <a:lumMod val="50000"/>
                     <a:lumOff val="50000"/>
                   </a:schemeClr>
                 </a:solidFill>
-              </a:endParaRPr>
-            </a:p>
-          </p:txBody>
-        </p:sp>
-        <p:cxnSp>
-          <p:nvCxnSpPr>
-            <p:cNvPr id="19" name="Connector: Elbow 5">
-              <a:extLst>
-                <a:ext uri="{FF2B5EF4-FFF2-40B4-BE49-F238E27FC236}">
-                  <a16:creationId xmlns:a16="http://schemas.microsoft.com/office/drawing/2014/main" id="{2FDFFD7B-EEDE-365E-D7AB-2C4E9078DEB5}"/>
-                </a:ext>
-              </a:extLst>
-            </p:cNvPr>
-            <p:cNvCxnSpPr>
-              <a:cxnSpLocks/>
-            </p:cNvCxnSpPr>
-            <p:nvPr/>
-          </p:nvCxnSpPr>
-          <p:spPr>
-            <a:xfrm flipV="1">
-              <a:off x="7164495" y="3784435"/>
-              <a:ext cx="279002" cy="650"/>
-            </a:xfrm>
-            <a:prstGeom prst="straightConnector1">
-              <a:avLst/>
-            </a:prstGeom>
-            <a:ln>
-              <a:tailEnd type="triangle"/>
-            </a:ln>
-          </p:spPr>
-          <p:style>
-            <a:lnRef idx="1">
-              <a:schemeClr val="accent1"/>
-            </a:lnRef>
-            <a:fillRef idx="0">
-              <a:schemeClr val="accent1"/>
-            </a:fillRef>
-            <a:effectRef idx="0">
-              <a:schemeClr val="accent1"/>
-            </a:effectRef>
-            <a:fontRef idx="minor">
-              <a:schemeClr val="tx1"/>
-            </a:fontRef>
-          </p:style>
-        </p:cxnSp>
-        <p:cxnSp>
-          <p:nvCxnSpPr>
-            <p:cNvPr id="20" name="Connector: Elbow 5">
-              <a:extLst>
-                <a:ext uri="{FF2B5EF4-FFF2-40B4-BE49-F238E27FC236}">
-                  <a16:creationId xmlns:a16="http://schemas.microsoft.com/office/drawing/2014/main" id="{95F97D51-380A-8005-F702-824D35C67DDC}"/>
-                </a:ext>
-              </a:extLst>
-            </p:cNvPr>
-            <p:cNvCxnSpPr>
-              <a:cxnSpLocks/>
-            </p:cNvCxnSpPr>
-            <p:nvPr/>
-          </p:nvCxnSpPr>
-          <p:spPr>
-            <a:xfrm flipH="1" flipV="1">
-              <a:off x="6543543" y="3789473"/>
-              <a:ext cx="279002" cy="650"/>
-            </a:xfrm>
-            <a:prstGeom prst="straightConnector1">
-              <a:avLst/>
-            </a:prstGeom>
-            <a:ln>
-              <a:tailEnd type="triangle"/>
-            </a:ln>
-          </p:spPr>
-          <p:style>
-            <a:lnRef idx="1">
-              <a:schemeClr val="accent1"/>
-            </a:lnRef>
-            <a:fillRef idx="0">
-              <a:schemeClr val="accent1"/>
-            </a:fillRef>
-            <a:effectRef idx="0">
-              <a:schemeClr val="accent1"/>
-            </a:effectRef>
-            <a:fontRef idx="minor">
-              <a:schemeClr val="tx1"/>
-            </a:fontRef>
-          </p:style>
-        </p:cxnSp>
-      </p:grpSp>
-      <p:grpSp>
-        <p:nvGrpSpPr>
-          <p:cNvPr id="46" name="Group 45">
+              </a:rPr>
+              <a:t>json</a:t>
+            </a:r>
+            <a:endParaRPr lang="en-US" sz="800" dirty="0">
+              <a:solidFill>
+                <a:schemeClr val="tx1">
+                  <a:lumMod val="50000"/>
+                  <a:lumOff val="50000"/>
+                </a:schemeClr>
+              </a:solidFill>
+            </a:endParaRPr>
+          </a:p>
+        </p:txBody>
+      </p:sp>
+      <p:cxnSp>
+        <p:nvCxnSpPr>
+          <p:cNvPr id="19" name="Connector: Elbow 5">
             <a:extLst>
               <a:ext uri="{FF2B5EF4-FFF2-40B4-BE49-F238E27FC236}">
-                <a16:creationId xmlns:a16="http://schemas.microsoft.com/office/drawing/2014/main" id="{DB05ADE1-C013-64E4-65E5-EF1915BF7F4B}"/>
+                <a16:creationId xmlns:a16="http://schemas.microsoft.com/office/drawing/2014/main" id="{2FDFFD7B-EEDE-365E-D7AB-2C4E9078DEB5}"/>
               </a:ext>
             </a:extLst>
           </p:cNvPr>
-          <p:cNvGrpSpPr/>
+          <p:cNvCxnSpPr>
+            <a:cxnSpLocks/>
+          </p:cNvCxnSpPr>
           <p:nvPr/>
-        </p:nvGrpSpPr>
-        <p:grpSpPr>
+        </p:nvCxnSpPr>
+        <p:spPr>
+          <a:xfrm flipV="1">
+            <a:off x="3358433" y="5200448"/>
+            <a:ext cx="279002" cy="650"/>
+          </a:xfrm>
+          <a:prstGeom prst="straightConnector1">
+            <a:avLst/>
+          </a:prstGeom>
+          <a:ln>
+            <a:tailEnd type="triangle"/>
+          </a:ln>
+        </p:spPr>
+        <p:style>
+          <a:lnRef idx="1">
+            <a:schemeClr val="accent1"/>
+          </a:lnRef>
+          <a:fillRef idx="0">
+            <a:schemeClr val="accent1"/>
+          </a:fillRef>
+          <a:effectRef idx="0">
+            <a:schemeClr val="accent1"/>
+          </a:effectRef>
+          <a:fontRef idx="minor">
+            <a:schemeClr val="tx1"/>
+          </a:fontRef>
+        </p:style>
+      </p:cxnSp>
+      <p:cxnSp>
+        <p:nvCxnSpPr>
+          <p:cNvPr id="20" name="Connector: Elbow 5">
+            <a:extLst>
+              <a:ext uri="{FF2B5EF4-FFF2-40B4-BE49-F238E27FC236}">
+                <a16:creationId xmlns:a16="http://schemas.microsoft.com/office/drawing/2014/main" id="{95F97D51-380A-8005-F702-824D35C67DDC}"/>
+              </a:ext>
+            </a:extLst>
+          </p:cNvPr>
+          <p:cNvCxnSpPr>
+            <a:cxnSpLocks/>
+          </p:cNvCxnSpPr>
+          <p:nvPr/>
+        </p:nvCxnSpPr>
+        <p:spPr>
+          <a:xfrm flipH="1" flipV="1">
+            <a:off x="2737481" y="5205486"/>
+            <a:ext cx="279002" cy="650"/>
+          </a:xfrm>
+          <a:prstGeom prst="straightConnector1">
+            <a:avLst/>
+          </a:prstGeom>
+          <a:ln>
+            <a:tailEnd type="triangle"/>
+          </a:ln>
+        </p:spPr>
+        <p:style>
+          <a:lnRef idx="1">
+            <a:schemeClr val="accent1"/>
+          </a:lnRef>
+          <a:fillRef idx="0">
+            <a:schemeClr val="accent1"/>
+          </a:fillRef>
+          <a:effectRef idx="0">
+            <a:schemeClr val="accent1"/>
+          </a:effectRef>
+          <a:fontRef idx="minor">
+            <a:schemeClr val="tx1"/>
+          </a:fontRef>
+        </p:style>
+      </p:cxnSp>
+      <p:sp>
+        <p:nvSpPr>
+          <p:cNvPr id="35" name="TextBox 34">
+            <a:extLst>
+              <a:ext uri="{FF2B5EF4-FFF2-40B4-BE49-F238E27FC236}">
+                <a16:creationId xmlns:a16="http://schemas.microsoft.com/office/drawing/2014/main" id="{5DC61E03-FF78-DFF9-4187-F15C7A758D43}"/>
+              </a:ext>
+            </a:extLst>
+          </p:cNvPr>
+          <p:cNvSpPr txBox="1"/>
+          <p:nvPr/>
+        </p:nvSpPr>
+        <p:spPr>
           <a:xfrm>
-            <a:off x="4662157" y="4134792"/>
-            <a:ext cx="410637" cy="425986"/>
-            <a:chOff x="4662157" y="4134792"/>
-            <a:chExt cx="410637" cy="425986"/>
+            <a:off x="4662157" y="4247778"/>
+            <a:ext cx="410637" cy="215444"/>
           </a:xfrm>
-        </p:grpSpPr>
-        <p:sp>
-          <p:nvSpPr>
-            <p:cNvPr id="35" name="TextBox 34">
-              <a:extLst>
-                <a:ext uri="{FF2B5EF4-FFF2-40B4-BE49-F238E27FC236}">
-                  <a16:creationId xmlns:a16="http://schemas.microsoft.com/office/drawing/2014/main" id="{5DC61E03-FF78-DFF9-4187-F15C7A758D43}"/>
-                </a:ext>
-              </a:extLst>
-            </p:cNvPr>
-            <p:cNvSpPr txBox="1"/>
-            <p:nvPr/>
-          </p:nvSpPr>
-          <p:spPr>
-            <a:xfrm>
-              <a:off x="4662157" y="4210710"/>
-              <a:ext cx="410637" cy="215444"/>
-            </a:xfrm>
-            <a:prstGeom prst="rect">
-              <a:avLst/>
-            </a:prstGeom>
-            <a:noFill/>
-          </p:spPr>
-          <p:txBody>
-            <a:bodyPr wrap="square" rtlCol="0">
-              <a:spAutoFit/>
-            </a:bodyPr>
-            <a:lstStyle/>
-            <a:p>
-              <a:pPr algn="ctr"/>
-              <a:r>
-                <a:rPr lang="en-US" sz="800" dirty="0" err="1">
-                  <a:solidFill>
-                    <a:schemeClr val="tx1">
-                      <a:lumMod val="50000"/>
-                      <a:lumOff val="50000"/>
-                    </a:schemeClr>
-                  </a:solidFill>
-                </a:rPr>
-                <a:t>json</a:t>
-              </a:r>
-              <a:endParaRPr lang="en-US" sz="800" dirty="0">
+          <a:prstGeom prst="rect">
+            <a:avLst/>
+          </a:prstGeom>
+          <a:noFill/>
+        </p:spPr>
+        <p:txBody>
+          <a:bodyPr wrap="square" rtlCol="0">
+            <a:spAutoFit/>
+          </a:bodyPr>
+          <a:lstStyle/>
+          <a:p>
+            <a:pPr algn="ctr"/>
+            <a:r>
+              <a:rPr lang="en-US" sz="800" dirty="0" err="1">
                 <a:solidFill>
                   <a:schemeClr val="tx1">
                     <a:lumMod val="50000"/>
                     <a:lumOff val="50000"/>
                   </a:schemeClr>
                 </a:solidFill>
-              </a:endParaRPr>
-            </a:p>
-          </p:txBody>
-        </p:sp>
-        <p:cxnSp>
-          <p:nvCxnSpPr>
-            <p:cNvPr id="36" name="Connector: Elbow 5">
-              <a:extLst>
-                <a:ext uri="{FF2B5EF4-FFF2-40B4-BE49-F238E27FC236}">
-                  <a16:creationId xmlns:a16="http://schemas.microsoft.com/office/drawing/2014/main" id="{2BBE9138-9DF7-AF81-1212-A3E397813612}"/>
-                </a:ext>
-              </a:extLst>
-            </p:cNvPr>
-            <p:cNvCxnSpPr>
-              <a:cxnSpLocks/>
-            </p:cNvCxnSpPr>
-            <p:nvPr/>
-          </p:nvCxnSpPr>
-          <p:spPr>
-            <a:xfrm flipV="1">
-              <a:off x="4867476" y="4134792"/>
-              <a:ext cx="0" cy="143948"/>
-            </a:xfrm>
-            <a:prstGeom prst="straightConnector1">
-              <a:avLst/>
-            </a:prstGeom>
-            <a:ln>
-              <a:tailEnd type="triangle"/>
-            </a:ln>
-          </p:spPr>
-          <p:style>
-            <a:lnRef idx="1">
-              <a:schemeClr val="accent1"/>
-            </a:lnRef>
-            <a:fillRef idx="0">
-              <a:schemeClr val="accent1"/>
-            </a:fillRef>
-            <a:effectRef idx="0">
-              <a:schemeClr val="accent1"/>
-            </a:effectRef>
-            <a:fontRef idx="minor">
-              <a:schemeClr val="tx1"/>
-            </a:fontRef>
-          </p:style>
-        </p:cxnSp>
-        <p:cxnSp>
-          <p:nvCxnSpPr>
-            <p:cNvPr id="45" name="Connector: Elbow 5">
-              <a:extLst>
-                <a:ext uri="{FF2B5EF4-FFF2-40B4-BE49-F238E27FC236}">
-                  <a16:creationId xmlns:a16="http://schemas.microsoft.com/office/drawing/2014/main" id="{59DDAC9C-1E48-285E-0AED-97C2522CF8E1}"/>
-                </a:ext>
-              </a:extLst>
-            </p:cNvPr>
-            <p:cNvCxnSpPr>
-              <a:cxnSpLocks/>
-            </p:cNvCxnSpPr>
-            <p:nvPr/>
-          </p:nvCxnSpPr>
-          <p:spPr>
-            <a:xfrm>
-              <a:off x="4867476" y="4416830"/>
-              <a:ext cx="0" cy="143948"/>
-            </a:xfrm>
-            <a:prstGeom prst="straightConnector1">
-              <a:avLst/>
-            </a:prstGeom>
-            <a:ln>
-              <a:tailEnd type="triangle"/>
-            </a:ln>
-          </p:spPr>
-          <p:style>
-            <a:lnRef idx="1">
-              <a:schemeClr val="accent1"/>
-            </a:lnRef>
-            <a:fillRef idx="0">
-              <a:schemeClr val="accent1"/>
-            </a:fillRef>
-            <a:effectRef idx="0">
-              <a:schemeClr val="accent1"/>
-            </a:effectRef>
-            <a:fontRef idx="minor">
-              <a:schemeClr val="tx1"/>
-            </a:fontRef>
-          </p:style>
-        </p:cxnSp>
-      </p:grpSp>
+              </a:rPr>
+              <a:t>json</a:t>
+            </a:r>
+            <a:endParaRPr lang="en-US" sz="800" dirty="0">
+              <a:solidFill>
+                <a:schemeClr val="tx1">
+                  <a:lumMod val="50000"/>
+                  <a:lumOff val="50000"/>
+                </a:schemeClr>
+              </a:solidFill>
+            </a:endParaRPr>
+          </a:p>
+        </p:txBody>
+      </p:sp>
+      <p:cxnSp>
+        <p:nvCxnSpPr>
+          <p:cNvPr id="36" name="Connector: Elbow 5">
+            <a:extLst>
+              <a:ext uri="{FF2B5EF4-FFF2-40B4-BE49-F238E27FC236}">
+                <a16:creationId xmlns:a16="http://schemas.microsoft.com/office/drawing/2014/main" id="{2BBE9138-9DF7-AF81-1212-A3E397813612}"/>
+              </a:ext>
+            </a:extLst>
+          </p:cNvPr>
+          <p:cNvCxnSpPr>
+            <a:cxnSpLocks/>
+          </p:cNvCxnSpPr>
+          <p:nvPr/>
+        </p:nvCxnSpPr>
+        <p:spPr>
+          <a:xfrm flipV="1">
+            <a:off x="4867476" y="4171860"/>
+            <a:ext cx="0" cy="143948"/>
+          </a:xfrm>
+          <a:prstGeom prst="straightConnector1">
+            <a:avLst/>
+          </a:prstGeom>
+          <a:ln>
+            <a:tailEnd type="triangle"/>
+          </a:ln>
+        </p:spPr>
+        <p:style>
+          <a:lnRef idx="1">
+            <a:schemeClr val="accent1"/>
+          </a:lnRef>
+          <a:fillRef idx="0">
+            <a:schemeClr val="accent1"/>
+          </a:fillRef>
+          <a:effectRef idx="0">
+            <a:schemeClr val="accent1"/>
+          </a:effectRef>
+          <a:fontRef idx="minor">
+            <a:schemeClr val="tx1"/>
+          </a:fontRef>
+        </p:style>
+      </p:cxnSp>
+      <p:cxnSp>
+        <p:nvCxnSpPr>
+          <p:cNvPr id="45" name="Connector: Elbow 5">
+            <a:extLst>
+              <a:ext uri="{FF2B5EF4-FFF2-40B4-BE49-F238E27FC236}">
+                <a16:creationId xmlns:a16="http://schemas.microsoft.com/office/drawing/2014/main" id="{59DDAC9C-1E48-285E-0AED-97C2522CF8E1}"/>
+              </a:ext>
+            </a:extLst>
+          </p:cNvPr>
+          <p:cNvCxnSpPr>
+            <a:cxnSpLocks/>
+          </p:cNvCxnSpPr>
+          <p:nvPr/>
+        </p:nvCxnSpPr>
+        <p:spPr>
+          <a:xfrm>
+            <a:off x="4867476" y="4453898"/>
+            <a:ext cx="0" cy="143948"/>
+          </a:xfrm>
+          <a:prstGeom prst="straightConnector1">
+            <a:avLst/>
+          </a:prstGeom>
+          <a:ln>
+            <a:tailEnd type="triangle"/>
+          </a:ln>
+        </p:spPr>
+        <p:style>
+          <a:lnRef idx="1">
+            <a:schemeClr val="accent1"/>
+          </a:lnRef>
+          <a:fillRef idx="0">
+            <a:schemeClr val="accent1"/>
+          </a:fillRef>
+          <a:effectRef idx="0">
+            <a:schemeClr val="accent1"/>
+          </a:effectRef>
+          <a:fontRef idx="minor">
+            <a:schemeClr val="tx1"/>
+          </a:fontRef>
+        </p:style>
+      </p:cxnSp>
       <p:sp>
         <p:nvSpPr>
           <p:cNvPr id="104" name="TextBox 103">
@@ -20506,7 +20589,7 @@
         </p:nvSpPr>
         <p:spPr>
           <a:xfrm>
-            <a:off x="2770517" y="4831064"/>
+            <a:off x="2770517" y="4868132"/>
             <a:ext cx="847656" cy="246221"/>
           </a:xfrm>
           <a:prstGeom prst="rect">
@@ -20546,7 +20629,7 @@
         </p:nvSpPr>
         <p:spPr>
           <a:xfrm>
-            <a:off x="4083876" y="4223727"/>
+            <a:off x="4083876" y="4260795"/>
             <a:ext cx="847656" cy="246221"/>
           </a:xfrm>
           <a:prstGeom prst="rect">

</xml_diff>

<commit_message>
Fix typo in roadmap diagrams
</commit_message>
<xml_diff>
--- a/AVXSearch/AVX-Framework.pptx
+++ b/AVXSearch/AVX-Framework.pptx
@@ -13837,7 +13837,7 @@
               <a:p>
                 <a:pPr algn="ctr"/>
                 <a:r>
-                  <a:rPr lang="en-US" sz="800" dirty="0" err="1">
+                  <a:rPr lang="en-US" sz="800" dirty="0">
                     <a:solidFill>
                       <a:schemeClr val="tx1">
                         <a:lumMod val="50000"/>
@@ -13845,16 +13845,8 @@
                       </a:schemeClr>
                     </a:solidFill>
                   </a:rPr>
-                  <a:t>json</a:t>
+                  <a:t>string</a:t>
                 </a:r>
-                <a:endParaRPr lang="en-US" sz="800" dirty="0">
-                  <a:solidFill>
-                    <a:schemeClr val="tx1">
-                      <a:lumMod val="50000"/>
-                      <a:lumOff val="50000"/>
-                    </a:schemeClr>
-                  </a:solidFill>
-                </a:endParaRPr>
               </a:p>
             </p:txBody>
           </p:sp>
@@ -18201,7 +18193,7 @@
               <a:p>
                 <a:pPr algn="ctr"/>
                 <a:r>
-                  <a:rPr lang="en-US" sz="800" dirty="0" err="1">
+                  <a:rPr lang="en-US" sz="800" dirty="0">
                     <a:solidFill>
                       <a:schemeClr val="tx1">
                         <a:lumMod val="50000"/>
@@ -18209,16 +18201,8 @@
                       </a:schemeClr>
                     </a:solidFill>
                   </a:rPr>
-                  <a:t>json</a:t>
+                  <a:t>string</a:t>
                 </a:r>
-                <a:endParaRPr lang="en-US" sz="800" dirty="0">
-                  <a:solidFill>
-                    <a:schemeClr val="tx1">
-                      <a:lumMod val="50000"/>
-                      <a:lumOff val="50000"/>
-                    </a:schemeClr>
-                  </a:solidFill>
-                </a:endParaRPr>
               </a:p>
             </p:txBody>
           </p:sp>

</xml_diff>

<commit_message>
Skeleton implementation of AV-Engine + updated color-coding in diagrams/readme.
</commit_message>
<xml_diff>
--- a/AVXSearch/AVX-Framework.pptx
+++ b/AVXSearch/AVX-Framework.pptx
@@ -266,7 +266,7 @@
           <a:p>
             <a:fld id="{00872148-4BA6-4738-8A8B-AEF1C14E9646}" type="datetimeFigureOut">
               <a:rPr lang="en-US" smtClean="0"/>
-              <a:t>10/26/2023</a:t>
+              <a:t>10/31/2023</a:t>
             </a:fld>
             <a:endParaRPr lang="en-US"/>
           </a:p>
@@ -464,7 +464,7 @@
           <a:p>
             <a:fld id="{00872148-4BA6-4738-8A8B-AEF1C14E9646}" type="datetimeFigureOut">
               <a:rPr lang="en-US" smtClean="0"/>
-              <a:t>10/26/2023</a:t>
+              <a:t>10/31/2023</a:t>
             </a:fld>
             <a:endParaRPr lang="en-US"/>
           </a:p>
@@ -672,7 +672,7 @@
           <a:p>
             <a:fld id="{00872148-4BA6-4738-8A8B-AEF1C14E9646}" type="datetimeFigureOut">
               <a:rPr lang="en-US" smtClean="0"/>
-              <a:t>10/26/2023</a:t>
+              <a:t>10/31/2023</a:t>
             </a:fld>
             <a:endParaRPr lang="en-US"/>
           </a:p>
@@ -870,7 +870,7 @@
           <a:p>
             <a:fld id="{00872148-4BA6-4738-8A8B-AEF1C14E9646}" type="datetimeFigureOut">
               <a:rPr lang="en-US" smtClean="0"/>
-              <a:t>10/26/2023</a:t>
+              <a:t>10/31/2023</a:t>
             </a:fld>
             <a:endParaRPr lang="en-US"/>
           </a:p>
@@ -1145,7 +1145,7 @@
           <a:p>
             <a:fld id="{00872148-4BA6-4738-8A8B-AEF1C14E9646}" type="datetimeFigureOut">
               <a:rPr lang="en-US" smtClean="0"/>
-              <a:t>10/26/2023</a:t>
+              <a:t>10/31/2023</a:t>
             </a:fld>
             <a:endParaRPr lang="en-US"/>
           </a:p>
@@ -1410,7 +1410,7 @@
           <a:p>
             <a:fld id="{00872148-4BA6-4738-8A8B-AEF1C14E9646}" type="datetimeFigureOut">
               <a:rPr lang="en-US" smtClean="0"/>
-              <a:t>10/26/2023</a:t>
+              <a:t>10/31/2023</a:t>
             </a:fld>
             <a:endParaRPr lang="en-US"/>
           </a:p>
@@ -1822,7 +1822,7 @@
           <a:p>
             <a:fld id="{00872148-4BA6-4738-8A8B-AEF1C14E9646}" type="datetimeFigureOut">
               <a:rPr lang="en-US" smtClean="0"/>
-              <a:t>10/26/2023</a:t>
+              <a:t>10/31/2023</a:t>
             </a:fld>
             <a:endParaRPr lang="en-US"/>
           </a:p>
@@ -1963,7 +1963,7 @@
           <a:p>
             <a:fld id="{00872148-4BA6-4738-8A8B-AEF1C14E9646}" type="datetimeFigureOut">
               <a:rPr lang="en-US" smtClean="0"/>
-              <a:t>10/26/2023</a:t>
+              <a:t>10/31/2023</a:t>
             </a:fld>
             <a:endParaRPr lang="en-US"/>
           </a:p>
@@ -2076,7 +2076,7 @@
           <a:p>
             <a:fld id="{00872148-4BA6-4738-8A8B-AEF1C14E9646}" type="datetimeFigureOut">
               <a:rPr lang="en-US" smtClean="0"/>
-              <a:t>10/26/2023</a:t>
+              <a:t>10/31/2023</a:t>
             </a:fld>
             <a:endParaRPr lang="en-US"/>
           </a:p>
@@ -2387,7 +2387,7 @@
           <a:p>
             <a:fld id="{00872148-4BA6-4738-8A8B-AEF1C14E9646}" type="datetimeFigureOut">
               <a:rPr lang="en-US" smtClean="0"/>
-              <a:t>10/26/2023</a:t>
+              <a:t>10/31/2023</a:t>
             </a:fld>
             <a:endParaRPr lang="en-US"/>
           </a:p>
@@ -2675,7 +2675,7 @@
           <a:p>
             <a:fld id="{00872148-4BA6-4738-8A8B-AEF1C14E9646}" type="datetimeFigureOut">
               <a:rPr lang="en-US" smtClean="0"/>
-              <a:t>10/26/2023</a:t>
+              <a:t>10/31/2023</a:t>
             </a:fld>
             <a:endParaRPr lang="en-US"/>
           </a:p>
@@ -2916,7 +2916,7 @@
           <a:p>
             <a:fld id="{00872148-4BA6-4738-8A8B-AEF1C14E9646}" type="datetimeFigureOut">
               <a:rPr lang="en-US" smtClean="0"/>
-              <a:t>10/26/2023</a:t>
+              <a:t>10/31/2023</a:t>
             </a:fld>
             <a:endParaRPr lang="en-US"/>
           </a:p>
@@ -3454,7 +3454,7 @@
             <a:pPr algn="ctr"/>
             <a:r>
               <a:rPr lang="en-US" dirty="0"/>
-              <a:t>AVX-Framework dependencies – 3A24</a:t>
+              <a:t>AVX-Framework dependencies – 3B01</a:t>
             </a:r>
           </a:p>
         </p:txBody>
@@ -3484,7 +3484,9 @@
           </a:solidFill>
           <a:ln w="28575">
             <a:solidFill>
-              <a:srgbClr val="4472C4"/>
+              <a:schemeClr val="accent1">
+                <a:lumMod val="75000"/>
+              </a:schemeClr>
             </a:solidFill>
           </a:ln>
         </p:spPr>
@@ -3512,7 +3514,9 @@
             <a:r>
               <a:rPr lang="en-US" sz="1600" b="1" dirty="0">
                 <a:solidFill>
-                  <a:srgbClr val="4472C4"/>
+                  <a:schemeClr val="accent1">
+                    <a:lumMod val="75000"/>
+                  </a:schemeClr>
                 </a:solidFill>
               </a:rPr>
               <a:t>AVX Framework</a:t>
@@ -4752,7 +4756,9 @@
             <a:avLst/>
           </a:prstGeom>
           <a:solidFill>
-            <a:srgbClr val="7030A0"/>
+            <a:schemeClr val="accent1">
+              <a:lumMod val="50000"/>
+            </a:schemeClr>
           </a:solidFill>
         </p:spPr>
         <p:style>
@@ -4878,7 +4884,9 @@
             <a:avLst/>
           </a:prstGeom>
           <a:solidFill>
-            <a:srgbClr val="7030A0"/>
+            <a:schemeClr val="accent1">
+              <a:lumMod val="50000"/>
+            </a:schemeClr>
           </a:solidFill>
         </p:spPr>
         <p:style>
@@ -5036,6 +5044,11 @@
           <a:prstGeom prst="rect">
             <a:avLst/>
           </a:prstGeom>
+          <a:solidFill>
+            <a:schemeClr val="accent6">
+              <a:lumMod val="50000"/>
+            </a:schemeClr>
+          </a:solidFill>
         </p:spPr>
         <p:style>
           <a:lnRef idx="2">
@@ -5322,6 +5335,11 @@
           <a:prstGeom prst="rect">
             <a:avLst/>
           </a:prstGeom>
+          <a:solidFill>
+            <a:schemeClr val="accent6">
+              <a:lumMod val="50000"/>
+            </a:schemeClr>
+          </a:solidFill>
         </p:spPr>
         <p:style>
           <a:lnRef idx="2">
@@ -5609,7 +5627,9 @@
             <a:avLst/>
           </a:prstGeom>
           <a:solidFill>
-            <a:srgbClr val="4472C4"/>
+            <a:schemeClr val="accent6">
+              <a:lumMod val="50000"/>
+            </a:schemeClr>
           </a:solidFill>
         </p:spPr>
         <p:style>
@@ -5991,7 +6011,9 @@
             <a:avLst/>
           </a:prstGeom>
           <a:solidFill>
-            <a:srgbClr val="7030A0"/>
+            <a:schemeClr val="accent1">
+              <a:lumMod val="50000"/>
+            </a:schemeClr>
           </a:solidFill>
         </p:spPr>
         <p:style>
@@ -6161,7 +6183,9 @@
             <a:avLst/>
           </a:prstGeom>
           <a:solidFill>
-            <a:srgbClr val="7030A0"/>
+            <a:schemeClr val="accent1">
+              <a:lumMod val="50000"/>
+            </a:schemeClr>
           </a:solidFill>
         </p:spPr>
         <p:style>
@@ -6887,8 +6911,9 @@
               <a:r>
                 <a:rPr lang="en-US" sz="800" dirty="0">
                   <a:solidFill>
-                    <a:schemeClr val="bg1">
-                      <a:lumMod val="50000"/>
+                    <a:schemeClr val="tx1">
+                      <a:lumMod val="65000"/>
+                      <a:lumOff val="35000"/>
                     </a:schemeClr>
                   </a:solidFill>
                 </a:rPr>
@@ -6919,8 +6944,9 @@
                     <a:noFill/>
                   </a:ln>
                   <a:solidFill>
-                    <a:schemeClr val="bg1">
-                      <a:lumMod val="50000"/>
+                    <a:schemeClr val="tx1">
+                      <a:lumMod val="65000"/>
+                      <a:lumOff val="35000"/>
                     </a:schemeClr>
                   </a:solidFill>
                   <a:effectLst/>
@@ -10739,7 +10765,9 @@
             </a:solidFill>
             <a:ln w="28575">
               <a:solidFill>
-                <a:srgbClr val="4472C4"/>
+                <a:schemeClr val="accent1">
+                  <a:lumMod val="75000"/>
+                </a:schemeClr>
               </a:solidFill>
             </a:ln>
           </p:spPr>
@@ -10767,7 +10795,9 @@
               <a:r>
                 <a:rPr lang="en-US" sz="1600" b="1" dirty="0">
                   <a:solidFill>
-                    <a:srgbClr val="4472C4"/>
+                    <a:schemeClr val="accent1">
+                      <a:lumMod val="75000"/>
+                    </a:schemeClr>
                   </a:solidFill>
                 </a:rPr>
                 <a:t>AVX Framework</a:t>
@@ -10937,8 +10967,8 @@
             <a:ln>
               <a:solidFill>
                 <a:schemeClr val="tx1">
-                  <a:lumMod val="50000"/>
-                  <a:lumOff val="50000"/>
+                  <a:lumMod val="65000"/>
+                  <a:lumOff val="35000"/>
                 </a:schemeClr>
               </a:solidFill>
               <a:headEnd type="triangle"/>
@@ -10981,7 +11011,9 @@
               <a:avLst/>
             </a:prstGeom>
             <a:solidFill>
-              <a:srgbClr val="7030A0"/>
+              <a:schemeClr val="accent1">
+                <a:lumMod val="50000"/>
+              </a:schemeClr>
             </a:solidFill>
           </p:spPr>
           <p:style>
@@ -11110,7 +11142,9 @@
               <a:avLst/>
             </a:prstGeom>
             <a:solidFill>
-              <a:srgbClr val="7030A0"/>
+              <a:schemeClr val="accent1">
+                <a:lumMod val="50000"/>
+              </a:schemeClr>
             </a:solidFill>
           </p:spPr>
           <p:style>
@@ -11271,6 +11305,11 @@
             <a:prstGeom prst="rect">
               <a:avLst/>
             </a:prstGeom>
+            <a:solidFill>
+              <a:schemeClr val="accent6">
+                <a:lumMod val="50000"/>
+              </a:schemeClr>
+            </a:solidFill>
           </p:spPr>
           <p:style>
             <a:lnRef idx="2">
@@ -11560,6 +11599,11 @@
             <a:prstGeom prst="rect">
               <a:avLst/>
             </a:prstGeom>
+            <a:solidFill>
+              <a:schemeClr val="accent6">
+                <a:lumMod val="50000"/>
+              </a:schemeClr>
+            </a:solidFill>
           </p:spPr>
           <p:style>
             <a:lnRef idx="2">
@@ -11850,7 +11894,9 @@
               <a:avLst/>
             </a:prstGeom>
             <a:solidFill>
-              <a:srgbClr val="4472C4"/>
+              <a:schemeClr val="accent6">
+                <a:lumMod val="50000"/>
+              </a:schemeClr>
             </a:solidFill>
           </p:spPr>
           <p:style>
@@ -12231,8 +12277,8 @@
             <a:ln>
               <a:solidFill>
                 <a:schemeClr val="tx1">
-                  <a:lumMod val="50000"/>
-                  <a:lumOff val="50000"/>
+                  <a:lumMod val="65000"/>
+                  <a:lumOff val="35000"/>
                 </a:schemeClr>
               </a:solidFill>
               <a:tailEnd type="triangle"/>
@@ -12282,8 +12328,8 @@
             <a:ln>
               <a:solidFill>
                 <a:schemeClr val="tx1">
-                  <a:lumMod val="50000"/>
-                  <a:lumOff val="50000"/>
+                  <a:lumMod val="65000"/>
+                  <a:lumOff val="35000"/>
                 </a:schemeClr>
               </a:solidFill>
               <a:tailEnd type="triangle"/>
@@ -12325,7 +12371,9 @@
               <a:avLst/>
             </a:prstGeom>
             <a:solidFill>
-              <a:srgbClr val="7030A0"/>
+              <a:schemeClr val="accent1">
+                <a:lumMod val="50000"/>
+              </a:schemeClr>
             </a:solidFill>
           </p:spPr>
           <p:style>
@@ -12455,8 +12503,8 @@
             <a:ln>
               <a:solidFill>
                 <a:schemeClr val="tx1">
-                  <a:lumMod val="50000"/>
-                  <a:lumOff val="50000"/>
+                  <a:lumMod val="65000"/>
+                  <a:lumOff val="35000"/>
                 </a:schemeClr>
               </a:solidFill>
               <a:tailEnd type="triangle"/>
@@ -12543,7 +12591,9 @@
               <a:avLst/>
             </a:prstGeom>
             <a:solidFill>
-              <a:srgbClr val="7030A0"/>
+              <a:schemeClr val="accent1">
+                <a:lumMod val="50000"/>
+              </a:schemeClr>
             </a:solidFill>
           </p:spPr>
           <p:style>
@@ -13272,8 +13322,9 @@
                 <a:r>
                   <a:rPr lang="en-US" sz="800" dirty="0">
                     <a:solidFill>
-                      <a:schemeClr val="bg1">
-                        <a:lumMod val="50000"/>
+                      <a:schemeClr val="tx1">
+                        <a:lumMod val="65000"/>
+                        <a:lumOff val="35000"/>
                       </a:schemeClr>
                     </a:solidFill>
                   </a:rPr>
@@ -13304,8 +13355,9 @@
                       <a:noFill/>
                     </a:ln>
                     <a:solidFill>
-                      <a:schemeClr val="bg1">
-                        <a:lumMod val="50000"/>
+                      <a:schemeClr val="tx1">
+                        <a:lumMod val="65000"/>
+                        <a:lumOff val="35000"/>
                       </a:schemeClr>
                     </a:solidFill>
                     <a:effectLst/>
@@ -13347,8 +13399,8 @@
             <a:ln>
               <a:solidFill>
                 <a:schemeClr val="tx1">
-                  <a:lumMod val="50000"/>
-                  <a:lumOff val="50000"/>
+                  <a:lumMod val="65000"/>
+                  <a:lumOff val="35000"/>
                 </a:schemeClr>
               </a:solidFill>
               <a:tailEnd type="triangle"/>
@@ -13395,8 +13447,8 @@
             <a:ln>
               <a:solidFill>
                 <a:schemeClr val="tx1">
-                  <a:lumMod val="50000"/>
-                  <a:lumOff val="50000"/>
+                  <a:lumMod val="65000"/>
+                  <a:lumOff val="35000"/>
                 </a:schemeClr>
               </a:solidFill>
               <a:tailEnd type="triangle"/>
@@ -14374,7 +14426,7 @@
             <a:pPr algn="ctr"/>
             <a:r>
               <a:rPr lang="en-US" dirty="0"/>
-              <a:t>AVX Roadmap – 3A24 – CY2023</a:t>
+              <a:t>AVX Roadmap – 3B01 – CY2023</a:t>
             </a:r>
           </a:p>
         </p:txBody>
@@ -14439,6 +14491,13 @@
               <a:prstGeom prst="ellipse">
                 <a:avLst/>
               </a:prstGeom>
+              <a:ln>
+                <a:solidFill>
+                  <a:schemeClr val="accent1">
+                    <a:lumMod val="75000"/>
+                  </a:schemeClr>
+                </a:solidFill>
+              </a:ln>
             </p:spPr>
             <p:style>
               <a:lnRef idx="2">
@@ -14461,7 +14520,13 @@
               <a:lstStyle/>
               <a:p>
                 <a:pPr algn="ctr"/>
-                <a:endParaRPr lang="en-US"/>
+                <a:endParaRPr lang="en-US">
+                  <a:solidFill>
+                    <a:schemeClr val="accent1">
+                      <a:lumMod val="75000"/>
+                    </a:schemeClr>
+                  </a:solidFill>
+                </a:endParaRPr>
               </a:p>
             </p:txBody>
           </p:sp>
@@ -14488,7 +14553,13 @@
               <a:prstGeom prst="line">
                 <a:avLst/>
               </a:prstGeom>
-              <a:ln w="31750"/>
+              <a:ln w="31750">
+                <a:solidFill>
+                  <a:schemeClr val="accent1">
+                    <a:lumMod val="75000"/>
+                  </a:schemeClr>
+                </a:solidFill>
+              </a:ln>
             </p:spPr>
             <p:style>
               <a:lnRef idx="1">
@@ -14527,7 +14598,13 @@
               <a:prstGeom prst="line">
                 <a:avLst/>
               </a:prstGeom>
-              <a:ln w="31750"/>
+              <a:ln w="31750">
+                <a:solidFill>
+                  <a:schemeClr val="accent1">
+                    <a:lumMod val="75000"/>
+                  </a:schemeClr>
+                </a:solidFill>
+              </a:ln>
             </p:spPr>
             <p:style>
               <a:lnRef idx="1">
@@ -14566,7 +14643,13 @@
               <a:prstGeom prst="line">
                 <a:avLst/>
               </a:prstGeom>
-              <a:ln w="31750"/>
+              <a:ln w="31750">
+                <a:solidFill>
+                  <a:schemeClr val="accent1">
+                    <a:lumMod val="75000"/>
+                  </a:schemeClr>
+                </a:solidFill>
+              </a:ln>
             </p:spPr>
             <p:style>
               <a:lnRef idx="1">
@@ -14605,7 +14688,13 @@
               <a:prstGeom prst="line">
                 <a:avLst/>
               </a:prstGeom>
-              <a:ln w="31750"/>
+              <a:ln w="31750">
+                <a:solidFill>
+                  <a:schemeClr val="accent1">
+                    <a:lumMod val="75000"/>
+                  </a:schemeClr>
+                </a:solidFill>
+              </a:ln>
             </p:spPr>
             <p:style>
               <a:lnRef idx="1">
@@ -14644,6 +14733,9 @@
               <a:avLst/>
             </a:prstGeom>
             <a:noFill/>
+            <a:ln>
+              <a:noFill/>
+            </a:ln>
           </p:spPr>
           <p:txBody>
             <a:bodyPr wrap="square" rtlCol="0">
@@ -14655,7 +14747,9 @@
               <a:r>
                 <a:rPr lang="en-US" sz="1200" dirty="0">
                   <a:solidFill>
-                    <a:schemeClr val="accent1"/>
+                    <a:schemeClr val="accent1">
+                      <a:lumMod val="75000"/>
+                    </a:schemeClr>
                   </a:solidFill>
                 </a:rPr>
                 <a:t>Windows User</a:t>
@@ -14684,6 +14778,11 @@
           <a:prstGeom prst="rect">
             <a:avLst/>
           </a:prstGeom>
+          <a:solidFill>
+            <a:schemeClr val="accent1">
+              <a:lumMod val="50000"/>
+            </a:schemeClr>
+          </a:solidFill>
         </p:spPr>
         <p:style>
           <a:lnRef idx="2">
@@ -14708,7 +14807,7 @@
             <a:pPr algn="ctr"/>
             <a:r>
               <a:rPr lang="en-US" sz="800" dirty="0"/>
-              <a:t>http://github.com/AV-Text</a:t>
+              <a:t>http://github.com/kwonus </a:t>
             </a:r>
           </a:p>
           <a:p>
@@ -14766,7 +14865,7 @@
             <a:avLst/>
           </a:prstGeom>
           <a:solidFill>
-            <a:schemeClr val="bg1">
+            <a:schemeClr val="accent6">
               <a:lumMod val="50000"/>
             </a:schemeClr>
           </a:solidFill>
@@ -14857,8 +14956,8 @@
           <a:ln>
             <a:solidFill>
               <a:schemeClr val="tx1">
-                <a:lumMod val="50000"/>
-                <a:lumOff val="50000"/>
+                <a:lumMod val="65000"/>
+                <a:lumOff val="35000"/>
               </a:schemeClr>
             </a:solidFill>
             <a:tailEnd type="triangle"/>
@@ -14904,8 +15003,8 @@
           <a:ln>
             <a:solidFill>
               <a:schemeClr val="tx1">
-                <a:lumMod val="50000"/>
-                <a:lumOff val="50000"/>
+                <a:lumMod val="65000"/>
+                <a:lumOff val="35000"/>
               </a:schemeClr>
             </a:solidFill>
             <a:tailEnd type="triangle"/>
@@ -14951,8 +15050,8 @@
           <a:ln>
             <a:solidFill>
               <a:schemeClr val="tx1">
-                <a:lumMod val="50000"/>
-                <a:lumOff val="50000"/>
+                <a:lumMod val="65000"/>
+                <a:lumOff val="35000"/>
               </a:schemeClr>
             </a:solidFill>
             <a:tailEnd type="triangle"/>
@@ -14998,8 +15097,8 @@
           <a:ln>
             <a:solidFill>
               <a:schemeClr val="tx1">
-                <a:lumMod val="50000"/>
-                <a:lumOff val="50000"/>
+                <a:lumMod val="65000"/>
+                <a:lumOff val="35000"/>
               </a:schemeClr>
             </a:solidFill>
             <a:tailEnd type="triangle"/>
@@ -15095,7 +15194,9 @@
             </a:solidFill>
             <a:ln w="28575">
               <a:solidFill>
-                <a:srgbClr val="4472C4"/>
+                <a:schemeClr val="accent1">
+                  <a:lumMod val="75000"/>
+                </a:schemeClr>
               </a:solidFill>
             </a:ln>
           </p:spPr>
@@ -15123,7 +15224,9 @@
               <a:r>
                 <a:rPr lang="en-US" sz="1600" b="1" dirty="0">
                   <a:solidFill>
-                    <a:srgbClr val="4472C4"/>
+                    <a:schemeClr val="accent1">
+                      <a:lumMod val="75000"/>
+                    </a:schemeClr>
                   </a:solidFill>
                 </a:rPr>
                 <a:t>AVX Framework</a:t>
@@ -15293,8 +15396,8 @@
             <a:ln>
               <a:solidFill>
                 <a:schemeClr val="tx1">
-                  <a:lumMod val="50000"/>
-                  <a:lumOff val="50000"/>
+                  <a:lumMod val="65000"/>
+                  <a:lumOff val="35000"/>
                 </a:schemeClr>
               </a:solidFill>
               <a:headEnd type="triangle"/>
@@ -15337,7 +15440,9 @@
               <a:avLst/>
             </a:prstGeom>
             <a:solidFill>
-              <a:srgbClr val="7030A0"/>
+              <a:schemeClr val="accent1">
+                <a:lumMod val="50000"/>
+              </a:schemeClr>
             </a:solidFill>
           </p:spPr>
           <p:style>
@@ -15466,7 +15571,9 @@
               <a:avLst/>
             </a:prstGeom>
             <a:solidFill>
-              <a:srgbClr val="7030A0"/>
+              <a:schemeClr val="accent1">
+                <a:lumMod val="50000"/>
+              </a:schemeClr>
             </a:solidFill>
           </p:spPr>
           <p:style>
@@ -15627,6 +15734,11 @@
             <a:prstGeom prst="rect">
               <a:avLst/>
             </a:prstGeom>
+            <a:solidFill>
+              <a:schemeClr val="accent6">
+                <a:lumMod val="50000"/>
+              </a:schemeClr>
+            </a:solidFill>
           </p:spPr>
           <p:style>
             <a:lnRef idx="2">
@@ -15916,6 +16028,11 @@
             <a:prstGeom prst="rect">
               <a:avLst/>
             </a:prstGeom>
+            <a:solidFill>
+              <a:schemeClr val="accent6">
+                <a:lumMod val="50000"/>
+              </a:schemeClr>
+            </a:solidFill>
           </p:spPr>
           <p:style>
             <a:lnRef idx="2">
@@ -16206,7 +16323,9 @@
               <a:avLst/>
             </a:prstGeom>
             <a:solidFill>
-              <a:srgbClr val="4472C4"/>
+              <a:schemeClr val="accent6">
+                <a:lumMod val="50000"/>
+              </a:schemeClr>
             </a:solidFill>
           </p:spPr>
           <p:style>
@@ -16587,8 +16706,8 @@
             <a:ln>
               <a:solidFill>
                 <a:schemeClr val="tx1">
-                  <a:lumMod val="50000"/>
-                  <a:lumOff val="50000"/>
+                  <a:lumMod val="65000"/>
+                  <a:lumOff val="35000"/>
                 </a:schemeClr>
               </a:solidFill>
               <a:tailEnd type="triangle"/>
@@ -16638,8 +16757,8 @@
             <a:ln>
               <a:solidFill>
                 <a:schemeClr val="tx1">
-                  <a:lumMod val="50000"/>
-                  <a:lumOff val="50000"/>
+                  <a:lumMod val="65000"/>
+                  <a:lumOff val="35000"/>
                 </a:schemeClr>
               </a:solidFill>
               <a:tailEnd type="triangle"/>
@@ -16681,7 +16800,9 @@
               <a:avLst/>
             </a:prstGeom>
             <a:solidFill>
-              <a:srgbClr val="7030A0"/>
+              <a:schemeClr val="accent1">
+                <a:lumMod val="50000"/>
+              </a:schemeClr>
             </a:solidFill>
           </p:spPr>
           <p:style>
@@ -16811,8 +16932,8 @@
             <a:ln>
               <a:solidFill>
                 <a:schemeClr val="tx1">
-                  <a:lumMod val="50000"/>
-                  <a:lumOff val="50000"/>
+                  <a:lumMod val="65000"/>
+                  <a:lumOff val="35000"/>
                 </a:schemeClr>
               </a:solidFill>
               <a:tailEnd type="triangle"/>
@@ -16899,7 +17020,9 @@
               <a:avLst/>
             </a:prstGeom>
             <a:solidFill>
-              <a:srgbClr val="7030A0"/>
+              <a:schemeClr val="accent1">
+                <a:lumMod val="50000"/>
+              </a:schemeClr>
             </a:solidFill>
           </p:spPr>
           <p:style>
@@ -17628,8 +17751,9 @@
                 <a:r>
                   <a:rPr lang="en-US" sz="800" dirty="0">
                     <a:solidFill>
-                      <a:schemeClr val="bg1">
-                        <a:lumMod val="50000"/>
+                      <a:schemeClr val="tx1">
+                        <a:lumMod val="65000"/>
+                        <a:lumOff val="35000"/>
                       </a:schemeClr>
                     </a:solidFill>
                   </a:rPr>
@@ -17660,8 +17784,9 @@
                       <a:noFill/>
                     </a:ln>
                     <a:solidFill>
-                      <a:schemeClr val="bg1">
-                        <a:lumMod val="50000"/>
+                      <a:schemeClr val="tx1">
+                        <a:lumMod val="65000"/>
+                        <a:lumOff val="35000"/>
                       </a:schemeClr>
                     </a:solidFill>
                     <a:effectLst/>
@@ -17703,8 +17828,8 @@
             <a:ln>
               <a:solidFill>
                 <a:schemeClr val="tx1">
-                  <a:lumMod val="50000"/>
-                  <a:lumOff val="50000"/>
+                  <a:lumMod val="65000"/>
+                  <a:lumOff val="35000"/>
                 </a:schemeClr>
               </a:solidFill>
               <a:tailEnd type="triangle"/>
@@ -17751,8 +17876,8 @@
             <a:ln>
               <a:solidFill>
                 <a:schemeClr val="tx1">
-                  <a:lumMod val="50000"/>
-                  <a:lumOff val="50000"/>
+                  <a:lumMod val="65000"/>
+                  <a:lumOff val="35000"/>
                 </a:schemeClr>
               </a:solidFill>
               <a:tailEnd type="triangle"/>
@@ -18685,7 +18810,7 @@
             <a:pPr algn="ctr"/>
             <a:r>
               <a:rPr lang="en-US" dirty="0"/>
-              <a:t>AVX Roadmap – 3A24 – CY2024</a:t>
+              <a:t>AVX Roadmap – 3B01 – CY2024</a:t>
             </a:r>
           </a:p>
         </p:txBody>
@@ -18945,7 +19070,9 @@
             <a:r>
               <a:rPr lang="en-US" sz="1200" dirty="0">
                 <a:solidFill>
-                  <a:schemeClr val="accent1"/>
+                  <a:schemeClr val="accent1">
+                    <a:lumMod val="75000"/>
+                  </a:schemeClr>
                 </a:solidFill>
               </a:rPr>
               <a:t>Windows User</a:t>
@@ -19250,9 +19377,8 @@
             <a:r>
               <a:rPr lang="en-US" sz="1200" dirty="0">
                 <a:solidFill>
-                  <a:schemeClr val="tx1">
-                    <a:lumMod val="50000"/>
-                    <a:lumOff val="50000"/>
+                  <a:schemeClr val="bg2">
+                    <a:lumMod val="25000"/>
                   </a:schemeClr>
                 </a:solidFill>
               </a:rPr>
@@ -19281,6 +19407,11 @@
           <a:prstGeom prst="rect">
             <a:avLst/>
           </a:prstGeom>
+          <a:solidFill>
+            <a:schemeClr val="accent1">
+              <a:lumMod val="50000"/>
+            </a:schemeClr>
+          </a:solidFill>
         </p:spPr>
         <p:style>
           <a:lnRef idx="2">
@@ -19305,7 +19436,7 @@
             <a:pPr algn="ctr"/>
             <a:r>
               <a:rPr lang="en-US" sz="800" dirty="0"/>
-              <a:t>http://github.com/AV-Text</a:t>
+              <a:t>http://github.com/kwonus </a:t>
             </a:r>
           </a:p>
           <a:p>
@@ -19363,8 +19494,8 @@
             <a:avLst/>
           </a:prstGeom>
           <a:solidFill>
-            <a:schemeClr val="bg1">
-              <a:lumMod val="50000"/>
+            <a:schemeClr val="bg2">
+              <a:lumMod val="25000"/>
             </a:schemeClr>
           </a:solidFill>
         </p:spPr>
@@ -19622,8 +19753,8 @@
           <a:ln>
             <a:solidFill>
               <a:schemeClr val="tx1">
-                <a:lumMod val="50000"/>
-                <a:lumOff val="50000"/>
+                <a:lumMod val="65000"/>
+                <a:lumOff val="35000"/>
               </a:schemeClr>
             </a:solidFill>
             <a:tailEnd type="triangle"/>
@@ -19672,8 +19803,8 @@
           <a:ln>
             <a:solidFill>
               <a:schemeClr val="tx1">
-                <a:lumMod val="50000"/>
-                <a:lumOff val="50000"/>
+                <a:lumMod val="65000"/>
+                <a:lumOff val="35000"/>
               </a:schemeClr>
             </a:solidFill>
             <a:tailEnd type="triangle"/>
@@ -19721,8 +19852,8 @@
           <a:ln>
             <a:solidFill>
               <a:schemeClr val="tx1">
-                <a:lumMod val="50000"/>
-                <a:lumOff val="50000"/>
+                <a:lumMod val="65000"/>
+                <a:lumOff val="35000"/>
               </a:schemeClr>
             </a:solidFill>
             <a:tailEnd type="triangle"/>
@@ -19764,7 +19895,9 @@
             <a:avLst/>
           </a:prstGeom>
           <a:solidFill>
-            <a:srgbClr val="7F7F7F"/>
+            <a:schemeClr val="bg2">
+              <a:lumMod val="25000"/>
+            </a:schemeClr>
           </a:solidFill>
         </p:spPr>
         <p:style>
@@ -19955,8 +20088,8 @@
           <a:ln>
             <a:solidFill>
               <a:schemeClr val="tx1">
-                <a:lumMod val="50000"/>
-                <a:lumOff val="50000"/>
+                <a:lumMod val="65000"/>
+                <a:lumOff val="35000"/>
               </a:schemeClr>
             </a:solidFill>
             <a:tailEnd type="triangle"/>
@@ -19998,9 +20131,8 @@
             <a:avLst/>
           </a:prstGeom>
           <a:solidFill>
-            <a:schemeClr val="tx1">
-              <a:lumMod val="50000"/>
-              <a:lumOff val="50000"/>
+            <a:schemeClr val="bg2">
+              <a:lumMod val="25000"/>
             </a:schemeClr>
           </a:solidFill>
         </p:spPr>
@@ -20104,8 +20236,8 @@
           <a:ln>
             <a:solidFill>
               <a:schemeClr val="tx1">
-                <a:lumMod val="50000"/>
-                <a:lumOff val="50000"/>
+                <a:lumMod val="65000"/>
+                <a:lumOff val="35000"/>
               </a:schemeClr>
             </a:solidFill>
             <a:tailEnd type="triangle"/>
@@ -20152,8 +20284,8 @@
           <a:ln>
             <a:solidFill>
               <a:schemeClr val="tx1">
-                <a:lumMod val="50000"/>
-                <a:lumOff val="50000"/>
+                <a:lumMod val="65000"/>
+                <a:lumOff val="35000"/>
               </a:schemeClr>
             </a:solidFill>
             <a:tailEnd type="triangle"/>
@@ -20202,8 +20334,8 @@
           <a:ln>
             <a:solidFill>
               <a:schemeClr val="tx1">
-                <a:lumMod val="50000"/>
-                <a:lumOff val="50000"/>
+                <a:lumMod val="65000"/>
+                <a:lumOff val="35000"/>
               </a:schemeClr>
             </a:solidFill>
             <a:tailEnd type="triangle"/>
@@ -20250,8 +20382,8 @@
           <a:ln>
             <a:solidFill>
               <a:schemeClr val="tx1">
-                <a:lumMod val="50000"/>
-                <a:lumOff val="50000"/>
+                <a:lumMod val="65000"/>
+                <a:lumOff val="35000"/>
               </a:schemeClr>
             </a:solidFill>
             <a:tailEnd type="triangle"/>
@@ -20693,7 +20825,9 @@
             </a:solidFill>
             <a:ln w="28575">
               <a:solidFill>
-                <a:srgbClr val="4472C4"/>
+                <a:schemeClr val="accent1">
+                  <a:lumMod val="75000"/>
+                </a:schemeClr>
               </a:solidFill>
             </a:ln>
           </p:spPr>
@@ -20721,7 +20855,9 @@
               <a:r>
                 <a:rPr lang="en-US" sz="1600" b="1" dirty="0">
                   <a:solidFill>
-                    <a:srgbClr val="4472C4"/>
+                    <a:schemeClr val="accent1">
+                      <a:lumMod val="75000"/>
+                    </a:schemeClr>
                   </a:solidFill>
                 </a:rPr>
                 <a:t>AVX Fully-Native Framework</a:t>
@@ -20750,7 +20886,9 @@
               <a:avLst/>
             </a:prstGeom>
             <a:solidFill>
-              <a:srgbClr val="7030A0"/>
+              <a:schemeClr val="accent1">
+                <a:lumMod val="50000"/>
+              </a:schemeClr>
             </a:solidFill>
           </p:spPr>
           <p:style>
@@ -20909,7 +21047,9 @@
               <a:avLst/>
             </a:prstGeom>
             <a:solidFill>
-              <a:srgbClr val="7030A0"/>
+              <a:schemeClr val="accent1">
+                <a:lumMod val="50000"/>
+              </a:schemeClr>
             </a:solidFill>
           </p:spPr>
           <p:style>
@@ -21018,6 +21158,11 @@
             <a:prstGeom prst="rect">
               <a:avLst/>
             </a:prstGeom>
+            <a:solidFill>
+              <a:schemeClr val="accent6">
+                <a:lumMod val="50000"/>
+              </a:schemeClr>
+            </a:solidFill>
           </p:spPr>
           <p:style>
             <a:lnRef idx="2">
@@ -21180,6 +21325,11 @@
             <a:prstGeom prst="rect">
               <a:avLst/>
             </a:prstGeom>
+            <a:solidFill>
+              <a:schemeClr val="accent6">
+                <a:lumMod val="50000"/>
+              </a:schemeClr>
+            </a:solidFill>
           </p:spPr>
           <p:style>
             <a:lnRef idx="2">
@@ -21492,7 +21642,9 @@
               <a:avLst/>
             </a:prstGeom>
             <a:solidFill>
-              <a:srgbClr val="7030A0"/>
+              <a:schemeClr val="accent1">
+                <a:lumMod val="50000"/>
+              </a:schemeClr>
             </a:solidFill>
           </p:spPr>
           <p:style>
@@ -21679,7 +21831,7 @@
             <a:pPr algn="ctr"/>
             <a:r>
               <a:rPr lang="en-US" dirty="0"/>
-              <a:t>AVX Roadmap – 3A21 – CY2025</a:t>
+              <a:t>AVX Roadmap – 3B01 – CY2025</a:t>
             </a:r>
           </a:p>
         </p:txBody>
@@ -22002,9 +22154,8 @@
               <a:r>
                 <a:rPr lang="en-US" sz="1200" dirty="0">
                   <a:solidFill>
-                    <a:schemeClr val="tx1">
-                      <a:lumMod val="50000"/>
-                      <a:lumOff val="50000"/>
+                    <a:schemeClr val="bg2">
+                      <a:lumMod val="25000"/>
                     </a:schemeClr>
                   </a:solidFill>
                 </a:rPr>
@@ -22035,8 +22186,8 @@
             <a:avLst/>
           </a:prstGeom>
           <a:solidFill>
-            <a:schemeClr val="bg1">
-              <a:lumMod val="50000"/>
+            <a:schemeClr val="bg2">
+              <a:lumMod val="25000"/>
             </a:schemeClr>
           </a:solidFill>
         </p:spPr>

</xml_diff>

<commit_message>
Slightly refactored nomenclature in design doc (README)
</commit_message>
<xml_diff>
--- a/AVXSearch/AVX-Framework.pptx
+++ b/AVXSearch/AVX-Framework.pptx
@@ -266,7 +266,7 @@
           <a:p>
             <a:fld id="{00872148-4BA6-4738-8A8B-AEF1C14E9646}" type="datetimeFigureOut">
               <a:rPr lang="en-US" smtClean="0"/>
-              <a:t>10/31/2023</a:t>
+              <a:t>11/2/2023</a:t>
             </a:fld>
             <a:endParaRPr lang="en-US"/>
           </a:p>
@@ -464,7 +464,7 @@
           <a:p>
             <a:fld id="{00872148-4BA6-4738-8A8B-AEF1C14E9646}" type="datetimeFigureOut">
               <a:rPr lang="en-US" smtClean="0"/>
-              <a:t>10/31/2023</a:t>
+              <a:t>11/2/2023</a:t>
             </a:fld>
             <a:endParaRPr lang="en-US"/>
           </a:p>
@@ -672,7 +672,7 @@
           <a:p>
             <a:fld id="{00872148-4BA6-4738-8A8B-AEF1C14E9646}" type="datetimeFigureOut">
               <a:rPr lang="en-US" smtClean="0"/>
-              <a:t>10/31/2023</a:t>
+              <a:t>11/2/2023</a:t>
             </a:fld>
             <a:endParaRPr lang="en-US"/>
           </a:p>
@@ -870,7 +870,7 @@
           <a:p>
             <a:fld id="{00872148-4BA6-4738-8A8B-AEF1C14E9646}" type="datetimeFigureOut">
               <a:rPr lang="en-US" smtClean="0"/>
-              <a:t>10/31/2023</a:t>
+              <a:t>11/2/2023</a:t>
             </a:fld>
             <a:endParaRPr lang="en-US"/>
           </a:p>
@@ -1145,7 +1145,7 @@
           <a:p>
             <a:fld id="{00872148-4BA6-4738-8A8B-AEF1C14E9646}" type="datetimeFigureOut">
               <a:rPr lang="en-US" smtClean="0"/>
-              <a:t>10/31/2023</a:t>
+              <a:t>11/2/2023</a:t>
             </a:fld>
             <a:endParaRPr lang="en-US"/>
           </a:p>
@@ -1410,7 +1410,7 @@
           <a:p>
             <a:fld id="{00872148-4BA6-4738-8A8B-AEF1C14E9646}" type="datetimeFigureOut">
               <a:rPr lang="en-US" smtClean="0"/>
-              <a:t>10/31/2023</a:t>
+              <a:t>11/2/2023</a:t>
             </a:fld>
             <a:endParaRPr lang="en-US"/>
           </a:p>
@@ -1822,7 +1822,7 @@
           <a:p>
             <a:fld id="{00872148-4BA6-4738-8A8B-AEF1C14E9646}" type="datetimeFigureOut">
               <a:rPr lang="en-US" smtClean="0"/>
-              <a:t>10/31/2023</a:t>
+              <a:t>11/2/2023</a:t>
             </a:fld>
             <a:endParaRPr lang="en-US"/>
           </a:p>
@@ -1963,7 +1963,7 @@
           <a:p>
             <a:fld id="{00872148-4BA6-4738-8A8B-AEF1C14E9646}" type="datetimeFigureOut">
               <a:rPr lang="en-US" smtClean="0"/>
-              <a:t>10/31/2023</a:t>
+              <a:t>11/2/2023</a:t>
             </a:fld>
             <a:endParaRPr lang="en-US"/>
           </a:p>
@@ -2076,7 +2076,7 @@
           <a:p>
             <a:fld id="{00872148-4BA6-4738-8A8B-AEF1C14E9646}" type="datetimeFigureOut">
               <a:rPr lang="en-US" smtClean="0"/>
-              <a:t>10/31/2023</a:t>
+              <a:t>11/2/2023</a:t>
             </a:fld>
             <a:endParaRPr lang="en-US"/>
           </a:p>
@@ -2387,7 +2387,7 @@
           <a:p>
             <a:fld id="{00872148-4BA6-4738-8A8B-AEF1C14E9646}" type="datetimeFigureOut">
               <a:rPr lang="en-US" smtClean="0"/>
-              <a:t>10/31/2023</a:t>
+              <a:t>11/2/2023</a:t>
             </a:fld>
             <a:endParaRPr lang="en-US"/>
           </a:p>
@@ -2675,7 +2675,7 @@
           <a:p>
             <a:fld id="{00872148-4BA6-4738-8A8B-AEF1C14E9646}" type="datetimeFigureOut">
               <a:rPr lang="en-US" smtClean="0"/>
-              <a:t>10/31/2023</a:t>
+              <a:t>11/2/2023</a:t>
             </a:fld>
             <a:endParaRPr lang="en-US"/>
           </a:p>
@@ -2916,7 +2916,7 @@
           <a:p>
             <a:fld id="{00872148-4BA6-4738-8A8B-AEF1C14E9646}" type="datetimeFigureOut">
               <a:rPr lang="en-US" smtClean="0"/>
-              <a:t>10/31/2023</a:t>
+              <a:t>11/2/2023</a:t>
             </a:fld>
             <a:endParaRPr lang="en-US"/>
           </a:p>
@@ -3454,7 +3454,7 @@
             <a:pPr algn="ctr"/>
             <a:r>
               <a:rPr lang="en-US" dirty="0"/>
-              <a:t>AVX-Framework dependencies – 3B01</a:t>
+              <a:t>AVX-Framework dependencies – 3B02</a:t>
             </a:r>
           </a:p>
         </p:txBody>
@@ -5465,8 +5465,39 @@
                 <a:ea typeface="+mn-ea"/>
                 <a:cs typeface="+mn-cs"/>
               </a:rPr>
-              <a:t>AVX-Lib</a:t>
+              <a:t>AVX-</a:t>
             </a:r>
+            <a:r>
+              <a:rPr kumimoji="0" lang="en-US" sz="1800" b="0" i="0" u="none" strike="noStrike" kern="1200" cap="none" spc="0" normalizeH="0" baseline="0" noProof="0" dirty="0" err="1">
+                <a:ln>
+                  <a:noFill/>
+                </a:ln>
+                <a:solidFill>
+                  <a:prstClr val="white"/>
+                </a:solidFill>
+                <a:effectLst/>
+                <a:uLnTx/>
+                <a:uFillTx/>
+                <a:latin typeface="Calibri" panose="020F0502020204030204"/>
+                <a:ea typeface="+mn-ea"/>
+                <a:cs typeface="+mn-cs"/>
+              </a:rPr>
+              <a:t>CLib</a:t>
+            </a:r>
+            <a:endParaRPr kumimoji="0" lang="en-US" sz="1800" b="0" i="0" u="none" strike="noStrike" kern="1200" cap="none" spc="0" normalizeH="0" baseline="0" noProof="0" dirty="0">
+              <a:ln>
+                <a:noFill/>
+              </a:ln>
+              <a:solidFill>
+                <a:prstClr val="white"/>
+              </a:solidFill>
+              <a:effectLst/>
+              <a:uLnTx/>
+              <a:uFillTx/>
+              <a:latin typeface="Calibri" panose="020F0502020204030204"/>
+              <a:ea typeface="+mn-ea"/>
+              <a:cs typeface="+mn-cs"/>
+            </a:endParaRPr>
           </a:p>
           <a:p>
             <a:pPr marL="0" marR="0" lvl="0" indent="0" algn="ctr" defTabSz="914400" rtl="0" eaLnBrk="1" fontAlgn="auto" latinLnBrk="0" hangingPunct="1">
@@ -6304,7 +6335,7 @@
                 <a:ea typeface="+mn-ea"/>
                 <a:cs typeface="+mn-cs"/>
               </a:rPr>
-              <a:t>AVX-Lib-Net</a:t>
+              <a:t>AVX-Lib</a:t>
             </a:r>
           </a:p>
           <a:p>
@@ -10221,7 +10252,7 @@
           <p:nvPr>
             <p:extLst>
               <p:ext uri="{D42A27DB-BD31-4B8C-83A1-F6EECF244321}">
-                <p14:modId xmlns:p14="http://schemas.microsoft.com/office/powerpoint/2010/main" val="2885092314"/>
+                <p14:modId xmlns:p14="http://schemas.microsoft.com/office/powerpoint/2010/main" val="3281022747"/>
               </p:ext>
             </p:extLst>
           </p:nvPr>
@@ -10363,7 +10394,7 @@
                     <a:p>
                       <a:r>
                         <a:rPr lang="en-US" sz="1100" b="1" dirty="0"/>
-                        <a:t>AVX-Lib-Net</a:t>
+                        <a:t>AVX-Lib</a:t>
                       </a:r>
                     </a:p>
                   </a:txBody>
@@ -10475,8 +10506,13 @@
                     <a:p>
                       <a:r>
                         <a:rPr lang="en-US" sz="1100" b="1" dirty="0"/>
-                        <a:t>AVX-Lib</a:t>
+                        <a:t>AVX-</a:t>
                       </a:r>
+                      <a:r>
+                        <a:rPr lang="en-US" sz="1100" b="1" dirty="0" err="1"/>
+                        <a:t>CLib</a:t>
+                      </a:r>
+                      <a:endParaRPr lang="en-US" sz="1100" b="1" dirty="0"/>
                     </a:p>
                   </a:txBody>
                   <a:tcPr anchor="ctr"/>
@@ -11729,8 +11765,39 @@
                   <a:ea typeface="+mn-ea"/>
                   <a:cs typeface="+mn-cs"/>
                 </a:rPr>
-                <a:t>AVX-Lib</a:t>
+                <a:t>AVX-</a:t>
               </a:r>
+              <a:r>
+                <a:rPr kumimoji="0" lang="en-US" sz="1800" b="0" i="0" u="none" strike="noStrike" kern="1200" cap="none" spc="0" normalizeH="0" baseline="0" noProof="0" dirty="0" err="1">
+                  <a:ln>
+                    <a:noFill/>
+                  </a:ln>
+                  <a:solidFill>
+                    <a:prstClr val="white"/>
+                  </a:solidFill>
+                  <a:effectLst/>
+                  <a:uLnTx/>
+                  <a:uFillTx/>
+                  <a:latin typeface="Calibri" panose="020F0502020204030204"/>
+                  <a:ea typeface="+mn-ea"/>
+                  <a:cs typeface="+mn-cs"/>
+                </a:rPr>
+                <a:t>CLib</a:t>
+              </a:r>
+              <a:endParaRPr kumimoji="0" lang="en-US" sz="1800" b="0" i="0" u="none" strike="noStrike" kern="1200" cap="none" spc="0" normalizeH="0" baseline="0" noProof="0" dirty="0">
+                <a:ln>
+                  <a:noFill/>
+                </a:ln>
+                <a:solidFill>
+                  <a:prstClr val="white"/>
+                </a:solidFill>
+                <a:effectLst/>
+                <a:uLnTx/>
+                <a:uFillTx/>
+                <a:latin typeface="Calibri" panose="020F0502020204030204"/>
+                <a:ea typeface="+mn-ea"/>
+                <a:cs typeface="+mn-cs"/>
+              </a:endParaRPr>
             </a:p>
             <a:p>
               <a:pPr marL="0" marR="0" lvl="0" indent="0" algn="ctr" defTabSz="914400" rtl="0" eaLnBrk="1" fontAlgn="auto" latinLnBrk="0" hangingPunct="1">
@@ -12712,7 +12779,7 @@
                   <a:ea typeface="+mn-ea"/>
                   <a:cs typeface="+mn-cs"/>
                 </a:rPr>
-                <a:t>AVX-Lib-Net</a:t>
+                <a:t>AVX-Lib</a:t>
               </a:r>
             </a:p>
             <a:p>
@@ -14426,7 +14493,7 @@
             <a:pPr algn="ctr"/>
             <a:r>
               <a:rPr lang="en-US" dirty="0"/>
-              <a:t>AVX Roadmap – 3B01 – CY2023</a:t>
+              <a:t>AVX Roadmap – 3B02 – CY2023</a:t>
             </a:r>
           </a:p>
         </p:txBody>
@@ -16158,8 +16225,39 @@
                   <a:ea typeface="+mn-ea"/>
                   <a:cs typeface="+mn-cs"/>
                 </a:rPr>
-                <a:t>AVX-Lib</a:t>
+                <a:t>AVX-</a:t>
               </a:r>
+              <a:r>
+                <a:rPr kumimoji="0" lang="en-US" sz="1800" b="0" i="0" u="none" strike="noStrike" kern="1200" cap="none" spc="0" normalizeH="0" baseline="0" noProof="0" dirty="0" err="1">
+                  <a:ln>
+                    <a:noFill/>
+                  </a:ln>
+                  <a:solidFill>
+                    <a:prstClr val="white"/>
+                  </a:solidFill>
+                  <a:effectLst/>
+                  <a:uLnTx/>
+                  <a:uFillTx/>
+                  <a:latin typeface="Calibri" panose="020F0502020204030204"/>
+                  <a:ea typeface="+mn-ea"/>
+                  <a:cs typeface="+mn-cs"/>
+                </a:rPr>
+                <a:t>CLib</a:t>
+              </a:r>
+              <a:endParaRPr kumimoji="0" lang="en-US" sz="1800" b="0" i="0" u="none" strike="noStrike" kern="1200" cap="none" spc="0" normalizeH="0" baseline="0" noProof="0" dirty="0">
+                <a:ln>
+                  <a:noFill/>
+                </a:ln>
+                <a:solidFill>
+                  <a:prstClr val="white"/>
+                </a:solidFill>
+                <a:effectLst/>
+                <a:uLnTx/>
+                <a:uFillTx/>
+                <a:latin typeface="Calibri" panose="020F0502020204030204"/>
+                <a:ea typeface="+mn-ea"/>
+                <a:cs typeface="+mn-cs"/>
+              </a:endParaRPr>
             </a:p>
             <a:p>
               <a:pPr marL="0" marR="0" lvl="0" indent="0" algn="ctr" defTabSz="914400" rtl="0" eaLnBrk="1" fontAlgn="auto" latinLnBrk="0" hangingPunct="1">
@@ -17141,7 +17239,7 @@
                   <a:ea typeface="+mn-ea"/>
                   <a:cs typeface="+mn-cs"/>
                 </a:rPr>
-                <a:t>AVX-Lib-Net</a:t>
+                <a:t>AVX-Lib</a:t>
               </a:r>
             </a:p>
             <a:p>
@@ -18810,7 +18908,7 @@
             <a:pPr algn="ctr"/>
             <a:r>
               <a:rPr lang="en-US" dirty="0"/>
-              <a:t>AVX Roadmap – 3B01 – CY2024</a:t>
+              <a:t>AVX Roadmap – 3B02 – CY2024</a:t>
             </a:r>
           </a:p>
         </p:txBody>
@@ -21426,8 +21524,39 @@
                   <a:ea typeface="+mn-ea"/>
                   <a:cs typeface="+mn-cs"/>
                 </a:rPr>
-                <a:t>AVX-Lib</a:t>
+                <a:t>AVX-</a:t>
               </a:r>
+              <a:r>
+                <a:rPr kumimoji="0" lang="en-US" sz="1800" b="0" i="0" u="none" strike="noStrike" kern="1200" cap="none" spc="0" normalizeH="0" baseline="0" noProof="0" dirty="0" err="1">
+                  <a:ln>
+                    <a:noFill/>
+                  </a:ln>
+                  <a:solidFill>
+                    <a:prstClr val="white"/>
+                  </a:solidFill>
+                  <a:effectLst/>
+                  <a:uLnTx/>
+                  <a:uFillTx/>
+                  <a:latin typeface="Calibri" panose="020F0502020204030204"/>
+                  <a:ea typeface="+mn-ea"/>
+                  <a:cs typeface="+mn-cs"/>
+                </a:rPr>
+                <a:t>CLib</a:t>
+              </a:r>
+              <a:endParaRPr kumimoji="0" lang="en-US" sz="1800" b="0" i="0" u="none" strike="noStrike" kern="1200" cap="none" spc="0" normalizeH="0" baseline="0" noProof="0" dirty="0">
+                <a:ln>
+                  <a:noFill/>
+                </a:ln>
+                <a:solidFill>
+                  <a:prstClr val="white"/>
+                </a:solidFill>
+                <a:effectLst/>
+                <a:uLnTx/>
+                <a:uFillTx/>
+                <a:latin typeface="Calibri" panose="020F0502020204030204"/>
+                <a:ea typeface="+mn-ea"/>
+                <a:cs typeface="+mn-cs"/>
+              </a:endParaRPr>
             </a:p>
             <a:p>
               <a:pPr marL="0" marR="0" lvl="0" indent="0" algn="ctr" defTabSz="914400" rtl="0" eaLnBrk="1" fontAlgn="auto" latinLnBrk="0" hangingPunct="1">
@@ -21831,7 +21960,7 @@
             <a:pPr algn="ctr"/>
             <a:r>
               <a:rPr lang="en-US" dirty="0"/>
-              <a:t>AVX Roadmap – 3B01 – CY2025</a:t>
+              <a:t>AVX Roadmap – 3B02 – CY2025</a:t>
             </a:r>
           </a:p>
         </p:txBody>

</xml_diff>

<commit_message>
C++ AVXLib has been renamed AVXText, because Digital-AV has a C# library named AVXLib.
</commit_message>
<xml_diff>
--- a/AVXSearch/AVX-Framework.pptx
+++ b/AVXSearch/AVX-Framework.pptx
@@ -266,7 +266,7 @@
           <a:p>
             <a:fld id="{00872148-4BA6-4738-8A8B-AEF1C14E9646}" type="datetimeFigureOut">
               <a:rPr lang="en-US" smtClean="0"/>
-              <a:t>11/2/2023</a:t>
+              <a:t>11/3/2023</a:t>
             </a:fld>
             <a:endParaRPr lang="en-US"/>
           </a:p>
@@ -464,7 +464,7 @@
           <a:p>
             <a:fld id="{00872148-4BA6-4738-8A8B-AEF1C14E9646}" type="datetimeFigureOut">
               <a:rPr lang="en-US" smtClean="0"/>
-              <a:t>11/2/2023</a:t>
+              <a:t>11/3/2023</a:t>
             </a:fld>
             <a:endParaRPr lang="en-US"/>
           </a:p>
@@ -672,7 +672,7 @@
           <a:p>
             <a:fld id="{00872148-4BA6-4738-8A8B-AEF1C14E9646}" type="datetimeFigureOut">
               <a:rPr lang="en-US" smtClean="0"/>
-              <a:t>11/2/2023</a:t>
+              <a:t>11/3/2023</a:t>
             </a:fld>
             <a:endParaRPr lang="en-US"/>
           </a:p>
@@ -870,7 +870,7 @@
           <a:p>
             <a:fld id="{00872148-4BA6-4738-8A8B-AEF1C14E9646}" type="datetimeFigureOut">
               <a:rPr lang="en-US" smtClean="0"/>
-              <a:t>11/2/2023</a:t>
+              <a:t>11/3/2023</a:t>
             </a:fld>
             <a:endParaRPr lang="en-US"/>
           </a:p>
@@ -1145,7 +1145,7 @@
           <a:p>
             <a:fld id="{00872148-4BA6-4738-8A8B-AEF1C14E9646}" type="datetimeFigureOut">
               <a:rPr lang="en-US" smtClean="0"/>
-              <a:t>11/2/2023</a:t>
+              <a:t>11/3/2023</a:t>
             </a:fld>
             <a:endParaRPr lang="en-US"/>
           </a:p>
@@ -1410,7 +1410,7 @@
           <a:p>
             <a:fld id="{00872148-4BA6-4738-8A8B-AEF1C14E9646}" type="datetimeFigureOut">
               <a:rPr lang="en-US" smtClean="0"/>
-              <a:t>11/2/2023</a:t>
+              <a:t>11/3/2023</a:t>
             </a:fld>
             <a:endParaRPr lang="en-US"/>
           </a:p>
@@ -1822,7 +1822,7 @@
           <a:p>
             <a:fld id="{00872148-4BA6-4738-8A8B-AEF1C14E9646}" type="datetimeFigureOut">
               <a:rPr lang="en-US" smtClean="0"/>
-              <a:t>11/2/2023</a:t>
+              <a:t>11/3/2023</a:t>
             </a:fld>
             <a:endParaRPr lang="en-US"/>
           </a:p>
@@ -1963,7 +1963,7 @@
           <a:p>
             <a:fld id="{00872148-4BA6-4738-8A8B-AEF1C14E9646}" type="datetimeFigureOut">
               <a:rPr lang="en-US" smtClean="0"/>
-              <a:t>11/2/2023</a:t>
+              <a:t>11/3/2023</a:t>
             </a:fld>
             <a:endParaRPr lang="en-US"/>
           </a:p>
@@ -2076,7 +2076,7 @@
           <a:p>
             <a:fld id="{00872148-4BA6-4738-8A8B-AEF1C14E9646}" type="datetimeFigureOut">
               <a:rPr lang="en-US" smtClean="0"/>
-              <a:t>11/2/2023</a:t>
+              <a:t>11/3/2023</a:t>
             </a:fld>
             <a:endParaRPr lang="en-US"/>
           </a:p>
@@ -2387,7 +2387,7 @@
           <a:p>
             <a:fld id="{00872148-4BA6-4738-8A8B-AEF1C14E9646}" type="datetimeFigureOut">
               <a:rPr lang="en-US" smtClean="0"/>
-              <a:t>11/2/2023</a:t>
+              <a:t>11/3/2023</a:t>
             </a:fld>
             <a:endParaRPr lang="en-US"/>
           </a:p>
@@ -2675,7 +2675,7 @@
           <a:p>
             <a:fld id="{00872148-4BA6-4738-8A8B-AEF1C14E9646}" type="datetimeFigureOut">
               <a:rPr lang="en-US" smtClean="0"/>
-              <a:t>11/2/2023</a:t>
+              <a:t>11/3/2023</a:t>
             </a:fld>
             <a:endParaRPr lang="en-US"/>
           </a:p>
@@ -2916,7 +2916,7 @@
           <a:p>
             <a:fld id="{00872148-4BA6-4738-8A8B-AEF1C14E9646}" type="datetimeFigureOut">
               <a:rPr lang="en-US" smtClean="0"/>
-              <a:t>11/2/2023</a:t>
+              <a:t>11/3/2023</a:t>
             </a:fld>
             <a:endParaRPr lang="en-US"/>
           </a:p>
@@ -3454,7 +3454,7 @@
             <a:pPr algn="ctr"/>
             <a:r>
               <a:rPr lang="en-US" dirty="0"/>
-              <a:t>AVX-Framework dependencies – 3B02</a:t>
+              <a:t>AVX-Framework dependencies – 3B07</a:t>
             </a:r>
           </a:p>
         </p:txBody>
@@ -5465,39 +5465,8 @@
                 <a:ea typeface="+mn-ea"/>
                 <a:cs typeface="+mn-cs"/>
               </a:rPr>
-              <a:t>AVX-</a:t>
+              <a:t>AVX-Text</a:t>
             </a:r>
-            <a:r>
-              <a:rPr kumimoji="0" lang="en-US" sz="1800" b="0" i="0" u="none" strike="noStrike" kern="1200" cap="none" spc="0" normalizeH="0" baseline="0" noProof="0" dirty="0" err="1">
-                <a:ln>
-                  <a:noFill/>
-                </a:ln>
-                <a:solidFill>
-                  <a:prstClr val="white"/>
-                </a:solidFill>
-                <a:effectLst/>
-                <a:uLnTx/>
-                <a:uFillTx/>
-                <a:latin typeface="Calibri" panose="020F0502020204030204"/>
-                <a:ea typeface="+mn-ea"/>
-                <a:cs typeface="+mn-cs"/>
-              </a:rPr>
-              <a:t>CLib</a:t>
-            </a:r>
-            <a:endParaRPr kumimoji="0" lang="en-US" sz="1800" b="0" i="0" u="none" strike="noStrike" kern="1200" cap="none" spc="0" normalizeH="0" baseline="0" noProof="0" dirty="0">
-              <a:ln>
-                <a:noFill/>
-              </a:ln>
-              <a:solidFill>
-                <a:prstClr val="white"/>
-              </a:solidFill>
-              <a:effectLst/>
-              <a:uLnTx/>
-              <a:uFillTx/>
-              <a:latin typeface="Calibri" panose="020F0502020204030204"/>
-              <a:ea typeface="+mn-ea"/>
-              <a:cs typeface="+mn-cs"/>
-            </a:endParaRPr>
           </a:p>
           <a:p>
             <a:pPr marL="0" marR="0" lvl="0" indent="0" algn="ctr" defTabSz="914400" rtl="0" eaLnBrk="1" fontAlgn="auto" latinLnBrk="0" hangingPunct="1">
@@ -10252,7 +10221,7 @@
           <p:nvPr>
             <p:extLst>
               <p:ext uri="{D42A27DB-BD31-4B8C-83A1-F6EECF244321}">
-                <p14:modId xmlns:p14="http://schemas.microsoft.com/office/powerpoint/2010/main" val="3281022747"/>
+                <p14:modId xmlns:p14="http://schemas.microsoft.com/office/powerpoint/2010/main" val="4027621923"/>
               </p:ext>
             </p:extLst>
           </p:nvPr>
@@ -10343,9 +10312,10 @@
                     <a:lstStyle/>
                     <a:p>
                       <a:r>
-                        <a:rPr lang="en-US" sz="1100" b="1" dirty="0"/>
+                        <a:rPr lang="en-US" sz="1100" b="1"/>
                         <a:t>AV-Engine</a:t>
                       </a:r>
+                      <a:endParaRPr lang="en-US" sz="1100" b="1" dirty="0"/>
                     </a:p>
                   </a:txBody>
                   <a:tcPr anchor="ctr"/>
@@ -10506,13 +10476,8 @@
                     <a:p>
                       <a:r>
                         <a:rPr lang="en-US" sz="1100" b="1" dirty="0"/>
-                        <a:t>AVX-</a:t>
+                        <a:t>AVX-Text</a:t>
                       </a:r>
-                      <a:r>
-                        <a:rPr lang="en-US" sz="1100" b="1" dirty="0" err="1"/>
-                        <a:t>CLib</a:t>
-                      </a:r>
-                      <a:endParaRPr lang="en-US" sz="1100" b="1" dirty="0"/>
                     </a:p>
                   </a:txBody>
                   <a:tcPr anchor="ctr"/>
@@ -11765,39 +11730,8 @@
                   <a:ea typeface="+mn-ea"/>
                   <a:cs typeface="+mn-cs"/>
                 </a:rPr>
-                <a:t>AVX-</a:t>
+                <a:t>AVX-Text</a:t>
               </a:r>
-              <a:r>
-                <a:rPr kumimoji="0" lang="en-US" sz="1800" b="0" i="0" u="none" strike="noStrike" kern="1200" cap="none" spc="0" normalizeH="0" baseline="0" noProof="0" dirty="0" err="1">
-                  <a:ln>
-                    <a:noFill/>
-                  </a:ln>
-                  <a:solidFill>
-                    <a:prstClr val="white"/>
-                  </a:solidFill>
-                  <a:effectLst/>
-                  <a:uLnTx/>
-                  <a:uFillTx/>
-                  <a:latin typeface="Calibri" panose="020F0502020204030204"/>
-                  <a:ea typeface="+mn-ea"/>
-                  <a:cs typeface="+mn-cs"/>
-                </a:rPr>
-                <a:t>CLib</a:t>
-              </a:r>
-              <a:endParaRPr kumimoji="0" lang="en-US" sz="1800" b="0" i="0" u="none" strike="noStrike" kern="1200" cap="none" spc="0" normalizeH="0" baseline="0" noProof="0" dirty="0">
-                <a:ln>
-                  <a:noFill/>
-                </a:ln>
-                <a:solidFill>
-                  <a:prstClr val="white"/>
-                </a:solidFill>
-                <a:effectLst/>
-                <a:uLnTx/>
-                <a:uFillTx/>
-                <a:latin typeface="Calibri" panose="020F0502020204030204"/>
-                <a:ea typeface="+mn-ea"/>
-                <a:cs typeface="+mn-cs"/>
-              </a:endParaRPr>
             </a:p>
             <a:p>
               <a:pPr marL="0" marR="0" lvl="0" indent="0" algn="ctr" defTabSz="914400" rtl="0" eaLnBrk="1" fontAlgn="auto" latinLnBrk="0" hangingPunct="1">
@@ -12779,8 +12713,31 @@
                   <a:ea typeface="+mn-ea"/>
                   <a:cs typeface="+mn-cs"/>
                 </a:rPr>
-                <a:t>AVX-Lib</a:t>
+                <a:t>AVX-</a:t>
               </a:r>
+              <a:r>
+                <a:rPr lang="en-US" dirty="0">
+                  <a:solidFill>
+                    <a:prstClr val="white"/>
+                  </a:solidFill>
+                  <a:latin typeface="Calibri" panose="020F0502020204030204"/>
+                </a:rPr>
+                <a:t>Lib</a:t>
+              </a:r>
+              <a:endParaRPr kumimoji="0" lang="en-US" sz="1800" b="0" i="0" u="none" strike="noStrike" kern="1200" cap="none" spc="0" normalizeH="0" baseline="0" noProof="0" dirty="0">
+                <a:ln>
+                  <a:noFill/>
+                </a:ln>
+                <a:solidFill>
+                  <a:prstClr val="white"/>
+                </a:solidFill>
+                <a:effectLst/>
+                <a:uLnTx/>
+                <a:uFillTx/>
+                <a:latin typeface="Calibri" panose="020F0502020204030204"/>
+                <a:ea typeface="+mn-ea"/>
+                <a:cs typeface="+mn-cs"/>
+              </a:endParaRPr>
             </a:p>
             <a:p>
               <a:pPr marL="0" marR="0" lvl="0" indent="0" algn="ctr" defTabSz="914400" rtl="0" eaLnBrk="1" fontAlgn="auto" latinLnBrk="0" hangingPunct="1">
@@ -14493,7 +14450,7 @@
             <a:pPr algn="ctr"/>
             <a:r>
               <a:rPr lang="en-US" dirty="0"/>
-              <a:t>AVX Roadmap – 3B02 – CY2023</a:t>
+              <a:t>AVX Roadmap – 3B07 – CY2023</a:t>
             </a:r>
           </a:p>
         </p:txBody>
@@ -16225,39 +16182,8 @@
                   <a:ea typeface="+mn-ea"/>
                   <a:cs typeface="+mn-cs"/>
                 </a:rPr>
-                <a:t>AVX-</a:t>
+                <a:t>AVX-Text</a:t>
               </a:r>
-              <a:r>
-                <a:rPr kumimoji="0" lang="en-US" sz="1800" b="0" i="0" u="none" strike="noStrike" kern="1200" cap="none" spc="0" normalizeH="0" baseline="0" noProof="0" dirty="0" err="1">
-                  <a:ln>
-                    <a:noFill/>
-                  </a:ln>
-                  <a:solidFill>
-                    <a:prstClr val="white"/>
-                  </a:solidFill>
-                  <a:effectLst/>
-                  <a:uLnTx/>
-                  <a:uFillTx/>
-                  <a:latin typeface="Calibri" panose="020F0502020204030204"/>
-                  <a:ea typeface="+mn-ea"/>
-                  <a:cs typeface="+mn-cs"/>
-                </a:rPr>
-                <a:t>CLib</a:t>
-              </a:r>
-              <a:endParaRPr kumimoji="0" lang="en-US" sz="1800" b="0" i="0" u="none" strike="noStrike" kern="1200" cap="none" spc="0" normalizeH="0" baseline="0" noProof="0" dirty="0">
-                <a:ln>
-                  <a:noFill/>
-                </a:ln>
-                <a:solidFill>
-                  <a:prstClr val="white"/>
-                </a:solidFill>
-                <a:effectLst/>
-                <a:uLnTx/>
-                <a:uFillTx/>
-                <a:latin typeface="Calibri" panose="020F0502020204030204"/>
-                <a:ea typeface="+mn-ea"/>
-                <a:cs typeface="+mn-cs"/>
-              </a:endParaRPr>
             </a:p>
             <a:p>
               <a:pPr marL="0" marR="0" lvl="0" indent="0" algn="ctr" defTabSz="914400" rtl="0" eaLnBrk="1" fontAlgn="auto" latinLnBrk="0" hangingPunct="1">
@@ -17239,8 +17165,31 @@
                   <a:ea typeface="+mn-ea"/>
                   <a:cs typeface="+mn-cs"/>
                 </a:rPr>
-                <a:t>AVX-Lib</a:t>
+                <a:t>AVX-</a:t>
               </a:r>
+              <a:r>
+                <a:rPr lang="en-US" dirty="0">
+                  <a:solidFill>
+                    <a:prstClr val="white"/>
+                  </a:solidFill>
+                  <a:latin typeface="Calibri" panose="020F0502020204030204"/>
+                </a:rPr>
+                <a:t>Lib</a:t>
+              </a:r>
+              <a:endParaRPr kumimoji="0" lang="en-US" sz="1800" b="0" i="0" u="none" strike="noStrike" kern="1200" cap="none" spc="0" normalizeH="0" baseline="0" noProof="0" dirty="0">
+                <a:ln>
+                  <a:noFill/>
+                </a:ln>
+                <a:solidFill>
+                  <a:prstClr val="white"/>
+                </a:solidFill>
+                <a:effectLst/>
+                <a:uLnTx/>
+                <a:uFillTx/>
+                <a:latin typeface="Calibri" panose="020F0502020204030204"/>
+                <a:ea typeface="+mn-ea"/>
+                <a:cs typeface="+mn-cs"/>
+              </a:endParaRPr>
             </a:p>
             <a:p>
               <a:pPr marL="0" marR="0" lvl="0" indent="0" algn="ctr" defTabSz="914400" rtl="0" eaLnBrk="1" fontAlgn="auto" latinLnBrk="0" hangingPunct="1">
@@ -18908,7 +18857,7 @@
             <a:pPr algn="ctr"/>
             <a:r>
               <a:rPr lang="en-US" dirty="0"/>
-              <a:t>AVX Roadmap – 3B02 – CY2024</a:t>
+              <a:t>AVX Roadmap – 3B07 – CY2024</a:t>
             </a:r>
           </a:p>
         </p:txBody>

</xml_diff>

<commit_message>
Moved all projects, including LLVM c++ projects into AVX-Framework solution.
</commit_message>
<xml_diff>
--- a/AVXSearch/AVX-Framework.pptx
+++ b/AVXSearch/AVX-Framework.pptx
@@ -266,7 +266,7 @@
           <a:p>
             <a:fld id="{00872148-4BA6-4738-8A8B-AEF1C14E9646}" type="datetimeFigureOut">
               <a:rPr lang="en-US" smtClean="0"/>
-              <a:t>11/3/2023</a:t>
+              <a:t>11/18/2023</a:t>
             </a:fld>
             <a:endParaRPr lang="en-US"/>
           </a:p>
@@ -464,7 +464,7 @@
           <a:p>
             <a:fld id="{00872148-4BA6-4738-8A8B-AEF1C14E9646}" type="datetimeFigureOut">
               <a:rPr lang="en-US" smtClean="0"/>
-              <a:t>11/3/2023</a:t>
+              <a:t>11/18/2023</a:t>
             </a:fld>
             <a:endParaRPr lang="en-US"/>
           </a:p>
@@ -672,7 +672,7 @@
           <a:p>
             <a:fld id="{00872148-4BA6-4738-8A8B-AEF1C14E9646}" type="datetimeFigureOut">
               <a:rPr lang="en-US" smtClean="0"/>
-              <a:t>11/3/2023</a:t>
+              <a:t>11/18/2023</a:t>
             </a:fld>
             <a:endParaRPr lang="en-US"/>
           </a:p>
@@ -870,7 +870,7 @@
           <a:p>
             <a:fld id="{00872148-4BA6-4738-8A8B-AEF1C14E9646}" type="datetimeFigureOut">
               <a:rPr lang="en-US" smtClean="0"/>
-              <a:t>11/3/2023</a:t>
+              <a:t>11/18/2023</a:t>
             </a:fld>
             <a:endParaRPr lang="en-US"/>
           </a:p>
@@ -1145,7 +1145,7 @@
           <a:p>
             <a:fld id="{00872148-4BA6-4738-8A8B-AEF1C14E9646}" type="datetimeFigureOut">
               <a:rPr lang="en-US" smtClean="0"/>
-              <a:t>11/3/2023</a:t>
+              <a:t>11/18/2023</a:t>
             </a:fld>
             <a:endParaRPr lang="en-US"/>
           </a:p>
@@ -1410,7 +1410,7 @@
           <a:p>
             <a:fld id="{00872148-4BA6-4738-8A8B-AEF1C14E9646}" type="datetimeFigureOut">
               <a:rPr lang="en-US" smtClean="0"/>
-              <a:t>11/3/2023</a:t>
+              <a:t>11/18/2023</a:t>
             </a:fld>
             <a:endParaRPr lang="en-US"/>
           </a:p>
@@ -1822,7 +1822,7 @@
           <a:p>
             <a:fld id="{00872148-4BA6-4738-8A8B-AEF1C14E9646}" type="datetimeFigureOut">
               <a:rPr lang="en-US" smtClean="0"/>
-              <a:t>11/3/2023</a:t>
+              <a:t>11/18/2023</a:t>
             </a:fld>
             <a:endParaRPr lang="en-US"/>
           </a:p>
@@ -1963,7 +1963,7 @@
           <a:p>
             <a:fld id="{00872148-4BA6-4738-8A8B-AEF1C14E9646}" type="datetimeFigureOut">
               <a:rPr lang="en-US" smtClean="0"/>
-              <a:t>11/3/2023</a:t>
+              <a:t>11/18/2023</a:t>
             </a:fld>
             <a:endParaRPr lang="en-US"/>
           </a:p>
@@ -2076,7 +2076,7 @@
           <a:p>
             <a:fld id="{00872148-4BA6-4738-8A8B-AEF1C14E9646}" type="datetimeFigureOut">
               <a:rPr lang="en-US" smtClean="0"/>
-              <a:t>11/3/2023</a:t>
+              <a:t>11/18/2023</a:t>
             </a:fld>
             <a:endParaRPr lang="en-US"/>
           </a:p>
@@ -2387,7 +2387,7 @@
           <a:p>
             <a:fld id="{00872148-4BA6-4738-8A8B-AEF1C14E9646}" type="datetimeFigureOut">
               <a:rPr lang="en-US" smtClean="0"/>
-              <a:t>11/3/2023</a:t>
+              <a:t>11/18/2023</a:t>
             </a:fld>
             <a:endParaRPr lang="en-US"/>
           </a:p>
@@ -2675,7 +2675,7 @@
           <a:p>
             <a:fld id="{00872148-4BA6-4738-8A8B-AEF1C14E9646}" type="datetimeFigureOut">
               <a:rPr lang="en-US" smtClean="0"/>
-              <a:t>11/3/2023</a:t>
+              <a:t>11/18/2023</a:t>
             </a:fld>
             <a:endParaRPr lang="en-US"/>
           </a:p>
@@ -2916,7 +2916,7 @@
           <a:p>
             <a:fld id="{00872148-4BA6-4738-8A8B-AEF1C14E9646}" type="datetimeFigureOut">
               <a:rPr lang="en-US" smtClean="0"/>
-              <a:t>11/3/2023</a:t>
+              <a:t>11/18/2023</a:t>
             </a:fld>
             <a:endParaRPr lang="en-US"/>
           </a:p>
@@ -3356,7 +3356,7 @@
           <a:p>
             <a:r>
               <a:rPr lang="en-US" dirty="0"/>
-              <a:t>AVX-Search</a:t>
+              <a:t>AVX-Framework</a:t>
             </a:r>
           </a:p>
         </p:txBody>
@@ -3390,7 +3390,7 @@
           <a:p>
             <a:r>
               <a:rPr lang="en-US" sz="1800" dirty="0"/>
-              <a:t>9-03-2023</a:t>
+              <a:t>11-16-2023</a:t>
             </a:r>
           </a:p>
         </p:txBody>
@@ -3454,7 +3454,7 @@
             <a:pPr algn="ctr"/>
             <a:r>
               <a:rPr lang="en-US" dirty="0"/>
-              <a:t>AVX-Framework dependencies – 3B07</a:t>
+              <a:t>AVX-Framework dependencies – 3B16</a:t>
             </a:r>
           </a:p>
         </p:txBody>
@@ -5429,7 +5429,7 @@
                 <a:ea typeface="+mn-ea"/>
                 <a:cs typeface="+mn-cs"/>
               </a:rPr>
-              <a:t>&lt;&lt; C++  / x64 / DLL &gt;&gt;</a:t>
+              <a:t>&lt;&lt; C++  / x64 / static lib &gt;&gt;</a:t>
             </a:r>
           </a:p>
           <a:p>
@@ -11694,7 +11694,7 @@
                   <a:ea typeface="+mn-ea"/>
                   <a:cs typeface="+mn-cs"/>
                 </a:rPr>
-                <a:t>&lt;&lt; C++  / x64 / DLL &gt;&gt;</a:t>
+                <a:t>&lt;&lt; C++  / x64 / static lib &gt;&gt;</a:t>
               </a:r>
             </a:p>
             <a:p>
@@ -14450,7 +14450,7 @@
             <a:pPr algn="ctr"/>
             <a:r>
               <a:rPr lang="en-US" dirty="0"/>
-              <a:t>AVX Roadmap – 3B07 – CY2023</a:t>
+              <a:t>AVX Roadmap – 3B16 – CY2023</a:t>
             </a:r>
           </a:p>
         </p:txBody>
@@ -16146,7 +16146,7 @@
                   <a:ea typeface="+mn-ea"/>
                   <a:cs typeface="+mn-cs"/>
                 </a:rPr>
-                <a:t>&lt;&lt; C++  / x64 / DLL &gt;&gt;</a:t>
+                <a:t>&lt;&lt; C++  / x64 / static lib &gt;&gt;</a:t>
               </a:r>
             </a:p>
             <a:p>
@@ -18857,7 +18857,7 @@
             <a:pPr algn="ctr"/>
             <a:r>
               <a:rPr lang="en-US" dirty="0"/>
-              <a:t>AVX Roadmap – 3B07 – CY2024</a:t>
+              <a:t>AVX Roadmap – 3B16 – CY2024</a:t>
             </a:r>
           </a:p>
         </p:txBody>
@@ -21417,7 +21417,7 @@
               </a:pPr>
               <a:r>
                 <a:rPr lang="en-US" sz="800" dirty="0"/>
-                <a:t>&lt;&lt; C++  / x64 / DLL &gt;&gt;</a:t>
+                <a:t>&lt;&lt; C++  / x64 / static lib &gt;&gt;</a:t>
               </a:r>
             </a:p>
             <a:p>
@@ -21473,39 +21473,8 @@
                   <a:ea typeface="+mn-ea"/>
                   <a:cs typeface="+mn-cs"/>
                 </a:rPr>
-                <a:t>AVX-</a:t>
+                <a:t>AVX-Text</a:t>
               </a:r>
-              <a:r>
-                <a:rPr kumimoji="0" lang="en-US" sz="1800" b="0" i="0" u="none" strike="noStrike" kern="1200" cap="none" spc="0" normalizeH="0" baseline="0" noProof="0" dirty="0" err="1">
-                  <a:ln>
-                    <a:noFill/>
-                  </a:ln>
-                  <a:solidFill>
-                    <a:prstClr val="white"/>
-                  </a:solidFill>
-                  <a:effectLst/>
-                  <a:uLnTx/>
-                  <a:uFillTx/>
-                  <a:latin typeface="Calibri" panose="020F0502020204030204"/>
-                  <a:ea typeface="+mn-ea"/>
-                  <a:cs typeface="+mn-cs"/>
-                </a:rPr>
-                <a:t>CLib</a:t>
-              </a:r>
-              <a:endParaRPr kumimoji="0" lang="en-US" sz="1800" b="0" i="0" u="none" strike="noStrike" kern="1200" cap="none" spc="0" normalizeH="0" baseline="0" noProof="0" dirty="0">
-                <a:ln>
-                  <a:noFill/>
-                </a:ln>
-                <a:solidFill>
-                  <a:prstClr val="white"/>
-                </a:solidFill>
-                <a:effectLst/>
-                <a:uLnTx/>
-                <a:uFillTx/>
-                <a:latin typeface="Calibri" panose="020F0502020204030204"/>
-                <a:ea typeface="+mn-ea"/>
-                <a:cs typeface="+mn-cs"/>
-              </a:endParaRPr>
             </a:p>
             <a:p>
               <a:pPr marL="0" marR="0" lvl="0" indent="0" algn="ctr" defTabSz="914400" rtl="0" eaLnBrk="1" fontAlgn="auto" latinLnBrk="0" hangingPunct="1">
@@ -21909,7 +21878,7 @@
             <a:pPr algn="ctr"/>
             <a:r>
               <a:rPr lang="en-US" dirty="0"/>
-              <a:t>AVX Roadmap – 3B02 – CY2025</a:t>
+              <a:t>AVX Roadmap – 3B16 – CY2025</a:t>
             </a:r>
           </a:p>
         </p:txBody>

</xml_diff>

<commit_message>
Update diagrams to reflect that AVXText is a static library
</commit_message>
<xml_diff>
--- a/AVXSearch/AVX-Framework.pptx
+++ b/AVXSearch/AVX-Framework.pptx
@@ -266,7 +266,7 @@
           <a:p>
             <a:fld id="{00872148-4BA6-4738-8A8B-AEF1C14E9646}" type="datetimeFigureOut">
               <a:rPr lang="en-US" smtClean="0"/>
-              <a:t>11/18/2023</a:t>
+              <a:t>11/19/2023</a:t>
             </a:fld>
             <a:endParaRPr lang="en-US"/>
           </a:p>
@@ -464,7 +464,7 @@
           <a:p>
             <a:fld id="{00872148-4BA6-4738-8A8B-AEF1C14E9646}" type="datetimeFigureOut">
               <a:rPr lang="en-US" smtClean="0"/>
-              <a:t>11/18/2023</a:t>
+              <a:t>11/19/2023</a:t>
             </a:fld>
             <a:endParaRPr lang="en-US"/>
           </a:p>
@@ -672,7 +672,7 @@
           <a:p>
             <a:fld id="{00872148-4BA6-4738-8A8B-AEF1C14E9646}" type="datetimeFigureOut">
               <a:rPr lang="en-US" smtClean="0"/>
-              <a:t>11/18/2023</a:t>
+              <a:t>11/19/2023</a:t>
             </a:fld>
             <a:endParaRPr lang="en-US"/>
           </a:p>
@@ -870,7 +870,7 @@
           <a:p>
             <a:fld id="{00872148-4BA6-4738-8A8B-AEF1C14E9646}" type="datetimeFigureOut">
               <a:rPr lang="en-US" smtClean="0"/>
-              <a:t>11/18/2023</a:t>
+              <a:t>11/19/2023</a:t>
             </a:fld>
             <a:endParaRPr lang="en-US"/>
           </a:p>
@@ -1145,7 +1145,7 @@
           <a:p>
             <a:fld id="{00872148-4BA6-4738-8A8B-AEF1C14E9646}" type="datetimeFigureOut">
               <a:rPr lang="en-US" smtClean="0"/>
-              <a:t>11/18/2023</a:t>
+              <a:t>11/19/2023</a:t>
             </a:fld>
             <a:endParaRPr lang="en-US"/>
           </a:p>
@@ -1410,7 +1410,7 @@
           <a:p>
             <a:fld id="{00872148-4BA6-4738-8A8B-AEF1C14E9646}" type="datetimeFigureOut">
               <a:rPr lang="en-US" smtClean="0"/>
-              <a:t>11/18/2023</a:t>
+              <a:t>11/19/2023</a:t>
             </a:fld>
             <a:endParaRPr lang="en-US"/>
           </a:p>
@@ -1822,7 +1822,7 @@
           <a:p>
             <a:fld id="{00872148-4BA6-4738-8A8B-AEF1C14E9646}" type="datetimeFigureOut">
               <a:rPr lang="en-US" smtClean="0"/>
-              <a:t>11/18/2023</a:t>
+              <a:t>11/19/2023</a:t>
             </a:fld>
             <a:endParaRPr lang="en-US"/>
           </a:p>
@@ -1963,7 +1963,7 @@
           <a:p>
             <a:fld id="{00872148-4BA6-4738-8A8B-AEF1C14E9646}" type="datetimeFigureOut">
               <a:rPr lang="en-US" smtClean="0"/>
-              <a:t>11/18/2023</a:t>
+              <a:t>11/19/2023</a:t>
             </a:fld>
             <a:endParaRPr lang="en-US"/>
           </a:p>
@@ -2076,7 +2076,7 @@
           <a:p>
             <a:fld id="{00872148-4BA6-4738-8A8B-AEF1C14E9646}" type="datetimeFigureOut">
               <a:rPr lang="en-US" smtClean="0"/>
-              <a:t>11/18/2023</a:t>
+              <a:t>11/19/2023</a:t>
             </a:fld>
             <a:endParaRPr lang="en-US"/>
           </a:p>
@@ -2387,7 +2387,7 @@
           <a:p>
             <a:fld id="{00872148-4BA6-4738-8A8B-AEF1C14E9646}" type="datetimeFigureOut">
               <a:rPr lang="en-US" smtClean="0"/>
-              <a:t>11/18/2023</a:t>
+              <a:t>11/19/2023</a:t>
             </a:fld>
             <a:endParaRPr lang="en-US"/>
           </a:p>
@@ -2675,7 +2675,7 @@
           <a:p>
             <a:fld id="{00872148-4BA6-4738-8A8B-AEF1C14E9646}" type="datetimeFigureOut">
               <a:rPr lang="en-US" smtClean="0"/>
-              <a:t>11/18/2023</a:t>
+              <a:t>11/19/2023</a:t>
             </a:fld>
             <a:endParaRPr lang="en-US"/>
           </a:p>
@@ -2916,7 +2916,7 @@
           <a:p>
             <a:fld id="{00872148-4BA6-4738-8A8B-AEF1C14E9646}" type="datetimeFigureOut">
               <a:rPr lang="en-US" smtClean="0"/>
-              <a:t>11/18/2023</a:t>
+              <a:t>11/19/2023</a:t>
             </a:fld>
             <a:endParaRPr lang="en-US"/>
           </a:p>
@@ -3389,9 +3389,10 @@
           </a:p>
           <a:p>
             <a:r>
-              <a:rPr lang="en-US" sz="1800" dirty="0"/>
-              <a:t>11-16-2023</a:t>
+              <a:rPr lang="en-US" sz="1800"/>
+              <a:t>11-19-2023</a:t>
             </a:r>
+            <a:endParaRPr lang="en-US" sz="1800" dirty="0"/>
           </a:p>
         </p:txBody>
       </p:sp>

</xml_diff>

<commit_message>
Added a little more detail on the AVX-Framework Dependencies diagram
</commit_message>
<xml_diff>
--- a/AVXSearch/AVX-Framework.pptx
+++ b/AVXSearch/AVX-Framework.pptx
@@ -9646,224 +9646,182 @@
           </p:style>
         </p:cxnSp>
       </p:grpSp>
-      <p:grpSp>
-        <p:nvGrpSpPr>
-          <p:cNvPr id="487" name="Group 486">
+      <p:sp>
+        <p:nvSpPr>
+          <p:cNvPr id="488" name="TextBox 487">
             <a:extLst>
               <a:ext uri="{FF2B5EF4-FFF2-40B4-BE49-F238E27FC236}">
-                <a16:creationId xmlns:a16="http://schemas.microsoft.com/office/drawing/2014/main" id="{28C25517-97C4-41C8-2B70-454C8A7C6994}"/>
+                <a16:creationId xmlns:a16="http://schemas.microsoft.com/office/drawing/2014/main" id="{D796FF54-65A3-6B66-0A33-A183A52F3937}"/>
               </a:ext>
             </a:extLst>
           </p:cNvPr>
-          <p:cNvGrpSpPr/>
+          <p:cNvSpPr txBox="1"/>
           <p:nvPr/>
-        </p:nvGrpSpPr>
-        <p:grpSpPr>
-          <a:xfrm rot="16200000">
-            <a:off x="4300247" y="4944681"/>
-            <a:ext cx="741133" cy="260141"/>
-            <a:chOff x="7686586" y="4456943"/>
-            <a:chExt cx="741133" cy="260141"/>
+        </p:nvSpPr>
+        <p:spPr>
+          <a:xfrm>
+            <a:off x="4243320" y="4856047"/>
+            <a:ext cx="741133" cy="215444"/>
           </a:xfrm>
-        </p:grpSpPr>
-        <p:sp>
-          <p:nvSpPr>
-            <p:cNvPr id="488" name="TextBox 487">
-              <a:extLst>
-                <a:ext uri="{FF2B5EF4-FFF2-40B4-BE49-F238E27FC236}">
-                  <a16:creationId xmlns:a16="http://schemas.microsoft.com/office/drawing/2014/main" id="{D796FF54-65A3-6B66-0A33-A183A52F3937}"/>
-                </a:ext>
-              </a:extLst>
-            </p:cNvPr>
-            <p:cNvSpPr txBox="1"/>
-            <p:nvPr/>
-          </p:nvSpPr>
-          <p:spPr>
-            <a:xfrm>
-              <a:off x="7686586" y="4501640"/>
-              <a:ext cx="741133" cy="215444"/>
-            </a:xfrm>
-            <a:prstGeom prst="rect">
-              <a:avLst/>
-            </a:prstGeom>
-            <a:noFill/>
-          </p:spPr>
-          <p:txBody>
-            <a:bodyPr wrap="square" rtlCol="0">
-              <a:spAutoFit/>
-            </a:bodyPr>
-            <a:lstStyle/>
-            <a:p>
-              <a:pPr algn="ctr"/>
-              <a:r>
-                <a:rPr lang="en-US" sz="800" dirty="0" err="1">
-                  <a:solidFill>
-                    <a:schemeClr val="tx1">
-                      <a:lumMod val="50000"/>
-                      <a:lumOff val="50000"/>
-                    </a:schemeClr>
-                  </a:solidFill>
-                </a:rPr>
-                <a:t>json</a:t>
-              </a:r>
-              <a:endParaRPr lang="en-US" sz="800" dirty="0">
+          <a:prstGeom prst="rect">
+            <a:avLst/>
+          </a:prstGeom>
+          <a:noFill/>
+        </p:spPr>
+        <p:txBody>
+          <a:bodyPr wrap="square" rtlCol="0">
+            <a:spAutoFit/>
+          </a:bodyPr>
+          <a:lstStyle/>
+          <a:p>
+            <a:pPr algn="ctr"/>
+            <a:r>
+              <a:rPr lang="en-US" sz="800" dirty="0" err="1">
                 <a:solidFill>
                   <a:schemeClr val="tx1">
                     <a:lumMod val="50000"/>
                     <a:lumOff val="50000"/>
                   </a:schemeClr>
                 </a:solidFill>
-              </a:endParaRPr>
-            </a:p>
-          </p:txBody>
-        </p:sp>
-        <p:cxnSp>
-          <p:nvCxnSpPr>
-            <p:cNvPr id="489" name="Connector: Elbow 5">
-              <a:extLst>
-                <a:ext uri="{FF2B5EF4-FFF2-40B4-BE49-F238E27FC236}">
-                  <a16:creationId xmlns:a16="http://schemas.microsoft.com/office/drawing/2014/main" id="{3FFA0169-F142-F420-1047-52CAF63BCC55}"/>
-                </a:ext>
-              </a:extLst>
-            </p:cNvPr>
-            <p:cNvCxnSpPr>
-              <a:cxnSpLocks/>
-            </p:cNvCxnSpPr>
-            <p:nvPr/>
-          </p:nvCxnSpPr>
-          <p:spPr>
-            <a:xfrm flipV="1">
-              <a:off x="8032289" y="4456943"/>
-              <a:ext cx="0" cy="109794"/>
-            </a:xfrm>
-            <a:prstGeom prst="straightConnector1">
-              <a:avLst/>
-            </a:prstGeom>
-            <a:ln>
-              <a:tailEnd type="triangle"/>
-            </a:ln>
-          </p:spPr>
-          <p:style>
-            <a:lnRef idx="1">
-              <a:schemeClr val="accent1"/>
-            </a:lnRef>
-            <a:fillRef idx="0">
-              <a:schemeClr val="accent1"/>
-            </a:fillRef>
-            <a:effectRef idx="0">
-              <a:schemeClr val="accent1"/>
-            </a:effectRef>
-            <a:fontRef idx="minor">
-              <a:schemeClr val="tx1"/>
-            </a:fontRef>
-          </p:style>
-        </p:cxnSp>
-      </p:grpSp>
-      <p:grpSp>
-        <p:nvGrpSpPr>
-          <p:cNvPr id="490" name="Group 489">
+              </a:rPr>
+              <a:t>json</a:t>
+            </a:r>
+            <a:endParaRPr lang="en-US" sz="800" dirty="0">
+              <a:solidFill>
+                <a:schemeClr val="tx1">
+                  <a:lumMod val="50000"/>
+                  <a:lumOff val="50000"/>
+                </a:schemeClr>
+              </a:solidFill>
+            </a:endParaRPr>
+          </a:p>
+        </p:txBody>
+      </p:sp>
+      <p:cxnSp>
+        <p:nvCxnSpPr>
+          <p:cNvPr id="489" name="Connector: Elbow 5">
             <a:extLst>
               <a:ext uri="{FF2B5EF4-FFF2-40B4-BE49-F238E27FC236}">
-                <a16:creationId xmlns:a16="http://schemas.microsoft.com/office/drawing/2014/main" id="{FD0AD75E-483D-1294-457C-1703CC965DAB}"/>
+                <a16:creationId xmlns:a16="http://schemas.microsoft.com/office/drawing/2014/main" id="{3FFA0169-F142-F420-1047-52CAF63BCC55}"/>
               </a:ext>
             </a:extLst>
           </p:cNvPr>
-          <p:cNvGrpSpPr/>
+          <p:cNvCxnSpPr>
+            <a:cxnSpLocks/>
+          </p:cNvCxnSpPr>
           <p:nvPr/>
-        </p:nvGrpSpPr>
-        <p:grpSpPr>
+        </p:nvCxnSpPr>
+        <p:spPr>
+          <a:xfrm rot="16200000" flipV="1">
+            <a:off x="4595641" y="5044718"/>
+            <a:ext cx="0" cy="109794"/>
+          </a:xfrm>
+          <a:prstGeom prst="straightConnector1">
+            <a:avLst/>
+          </a:prstGeom>
+          <a:ln>
+            <a:tailEnd type="triangle"/>
+          </a:ln>
+        </p:spPr>
+        <p:style>
+          <a:lnRef idx="1">
+            <a:schemeClr val="accent1"/>
+          </a:lnRef>
+          <a:fillRef idx="0">
+            <a:schemeClr val="accent1"/>
+          </a:fillRef>
+          <a:effectRef idx="0">
+            <a:schemeClr val="accent1"/>
+          </a:effectRef>
+          <a:fontRef idx="minor">
+            <a:schemeClr val="tx1"/>
+          </a:fontRef>
+        </p:style>
+      </p:cxnSp>
+      <p:sp>
+        <p:nvSpPr>
+          <p:cNvPr id="491" name="TextBox 490">
+            <a:extLst>
+              <a:ext uri="{FF2B5EF4-FFF2-40B4-BE49-F238E27FC236}">
+                <a16:creationId xmlns:a16="http://schemas.microsoft.com/office/drawing/2014/main" id="{D33A1204-01AA-353E-AAA5-15299D71AFD8}"/>
+              </a:ext>
+            </a:extLst>
+          </p:cNvPr>
+          <p:cNvSpPr txBox="1"/>
+          <p:nvPr/>
+        </p:nvSpPr>
+        <p:spPr>
+          <a:xfrm>
+            <a:off x="4265482" y="4709681"/>
+            <a:ext cx="741133" cy="215444"/>
+          </a:xfrm>
+          <a:prstGeom prst="rect">
+            <a:avLst/>
+          </a:prstGeom>
+          <a:noFill/>
+        </p:spPr>
+        <p:txBody>
+          <a:bodyPr wrap="square" rtlCol="0">
+            <a:spAutoFit/>
+          </a:bodyPr>
+          <a:lstStyle/>
+          <a:p>
+            <a:pPr algn="ctr"/>
+            <a:r>
+              <a:rPr lang="en-US" sz="800" dirty="0">
+                <a:solidFill>
+                  <a:schemeClr val="tx1">
+                    <a:lumMod val="50000"/>
+                    <a:lumOff val="50000"/>
+                  </a:schemeClr>
+                </a:solidFill>
+              </a:rPr>
+              <a:t>string</a:t>
+            </a:r>
+          </a:p>
+        </p:txBody>
+      </p:sp>
+      <p:cxnSp>
+        <p:nvCxnSpPr>
+          <p:cNvPr id="492" name="Connector: Elbow 5">
+            <a:extLst>
+              <a:ext uri="{FF2B5EF4-FFF2-40B4-BE49-F238E27FC236}">
+                <a16:creationId xmlns:a16="http://schemas.microsoft.com/office/drawing/2014/main" id="{F30B2DAE-C037-B5F8-CD13-2C18CC3A8B6A}"/>
+              </a:ext>
+            </a:extLst>
+          </p:cNvPr>
+          <p:cNvCxnSpPr>
+            <a:cxnSpLocks/>
+          </p:cNvCxnSpPr>
+          <p:nvPr/>
+        </p:nvCxnSpPr>
+        <p:spPr>
           <a:xfrm rot="16200000">
-            <a:off x="4300248" y="4555284"/>
-            <a:ext cx="741133" cy="260141"/>
-            <a:chOff x="7686586" y="4456943"/>
-            <a:chExt cx="741133" cy="260141"/>
+            <a:off x="4595642" y="4655321"/>
+            <a:ext cx="0" cy="109794"/>
           </a:xfrm>
-        </p:grpSpPr>
-        <p:sp>
-          <p:nvSpPr>
-            <p:cNvPr id="491" name="TextBox 490">
-              <a:extLst>
-                <a:ext uri="{FF2B5EF4-FFF2-40B4-BE49-F238E27FC236}">
-                  <a16:creationId xmlns:a16="http://schemas.microsoft.com/office/drawing/2014/main" id="{D33A1204-01AA-353E-AAA5-15299D71AFD8}"/>
-                </a:ext>
-              </a:extLst>
-            </p:cNvPr>
-            <p:cNvSpPr txBox="1"/>
-            <p:nvPr/>
-          </p:nvSpPr>
-          <p:spPr>
-            <a:xfrm>
-              <a:off x="7686586" y="4501640"/>
-              <a:ext cx="741133" cy="215444"/>
-            </a:xfrm>
-            <a:prstGeom prst="rect">
-              <a:avLst/>
-            </a:prstGeom>
-            <a:noFill/>
-          </p:spPr>
-          <p:txBody>
-            <a:bodyPr wrap="square" rtlCol="0">
-              <a:spAutoFit/>
-            </a:bodyPr>
-            <a:lstStyle/>
-            <a:p>
-              <a:pPr algn="ctr"/>
-              <a:r>
-                <a:rPr lang="en-US" sz="800" dirty="0">
-                  <a:solidFill>
-                    <a:schemeClr val="tx1">
-                      <a:lumMod val="50000"/>
-                      <a:lumOff val="50000"/>
-                    </a:schemeClr>
-                  </a:solidFill>
-                </a:rPr>
-                <a:t>string</a:t>
-              </a:r>
-            </a:p>
-          </p:txBody>
-        </p:sp>
-        <p:cxnSp>
-          <p:nvCxnSpPr>
-            <p:cNvPr id="492" name="Connector: Elbow 5">
-              <a:extLst>
-                <a:ext uri="{FF2B5EF4-FFF2-40B4-BE49-F238E27FC236}">
-                  <a16:creationId xmlns:a16="http://schemas.microsoft.com/office/drawing/2014/main" id="{F30B2DAE-C037-B5F8-CD13-2C18CC3A8B6A}"/>
-                </a:ext>
-              </a:extLst>
-            </p:cNvPr>
-            <p:cNvCxnSpPr>
-              <a:cxnSpLocks/>
-            </p:cNvCxnSpPr>
-            <p:nvPr/>
-          </p:nvCxnSpPr>
-          <p:spPr>
-            <a:xfrm>
-              <a:off x="8032289" y="4456943"/>
-              <a:ext cx="0" cy="109794"/>
-            </a:xfrm>
-            <a:prstGeom prst="straightConnector1">
-              <a:avLst/>
-            </a:prstGeom>
-            <a:ln>
-              <a:tailEnd type="triangle"/>
-            </a:ln>
-          </p:spPr>
-          <p:style>
-            <a:lnRef idx="1">
-              <a:schemeClr val="accent1"/>
-            </a:lnRef>
-            <a:fillRef idx="0">
-              <a:schemeClr val="accent1"/>
-            </a:fillRef>
-            <a:effectRef idx="0">
-              <a:schemeClr val="accent1"/>
-            </a:effectRef>
-            <a:fontRef idx="minor">
-              <a:schemeClr val="tx1"/>
-            </a:fontRef>
-          </p:style>
-        </p:cxnSp>
-      </p:grpSp>
+          <a:prstGeom prst="straightConnector1">
+            <a:avLst/>
+          </a:prstGeom>
+          <a:ln>
+            <a:tailEnd type="triangle"/>
+          </a:ln>
+        </p:spPr>
+        <p:style>
+          <a:lnRef idx="1">
+            <a:schemeClr val="accent1"/>
+          </a:lnRef>
+          <a:fillRef idx="0">
+            <a:schemeClr val="accent1"/>
+          </a:fillRef>
+          <a:effectRef idx="0">
+            <a:schemeClr val="accent1"/>
+          </a:effectRef>
+          <a:fontRef idx="minor">
+            <a:schemeClr val="tx1"/>
+          </a:fontRef>
+        </p:style>
+      </p:cxnSp>
       <p:grpSp>
         <p:nvGrpSpPr>
           <p:cNvPr id="493" name="Group 492">
@@ -10692,6 +10650,90 @@
           </a:graphicData>
         </a:graphic>
       </p:graphicFrame>
+      <p:sp>
+        <p:nvSpPr>
+          <p:cNvPr id="3" name="TextBox 2">
+            <a:extLst>
+              <a:ext uri="{FF2B5EF4-FFF2-40B4-BE49-F238E27FC236}">
+                <a16:creationId xmlns:a16="http://schemas.microsoft.com/office/drawing/2014/main" id="{BEA61E66-AE1F-99F1-764A-FA899D882B14}"/>
+              </a:ext>
+            </a:extLst>
+          </p:cNvPr>
+          <p:cNvSpPr txBox="1"/>
+          <p:nvPr/>
+        </p:nvSpPr>
+        <p:spPr>
+          <a:xfrm>
+            <a:off x="2441845" y="2319882"/>
+            <a:ext cx="772005" cy="230832"/>
+          </a:xfrm>
+          <a:prstGeom prst="rect">
+            <a:avLst/>
+          </a:prstGeom>
+          <a:noFill/>
+        </p:spPr>
+        <p:txBody>
+          <a:bodyPr wrap="square" rtlCol="0">
+            <a:spAutoFit/>
+          </a:bodyPr>
+          <a:lstStyle/>
+          <a:p>
+            <a:pPr algn="ctr"/>
+            <a:r>
+              <a:rPr lang="en-US" sz="900" b="1" dirty="0">
+                <a:solidFill>
+                  <a:schemeClr val="bg1">
+                    <a:lumMod val="75000"/>
+                  </a:schemeClr>
+                </a:solidFill>
+              </a:rPr>
+              <a:t>P/Invoke</a:t>
+            </a:r>
+          </a:p>
+        </p:txBody>
+      </p:sp>
+      <p:sp>
+        <p:nvSpPr>
+          <p:cNvPr id="11" name="TextBox 10">
+            <a:extLst>
+              <a:ext uri="{FF2B5EF4-FFF2-40B4-BE49-F238E27FC236}">
+                <a16:creationId xmlns:a16="http://schemas.microsoft.com/office/drawing/2014/main" id="{EFD78339-753F-64FA-1C42-85FA1161D998}"/>
+              </a:ext>
+            </a:extLst>
+          </p:cNvPr>
+          <p:cNvSpPr txBox="1"/>
+          <p:nvPr/>
+        </p:nvSpPr>
+        <p:spPr>
+          <a:xfrm rot="5400000">
+            <a:off x="4487168" y="4823087"/>
+            <a:ext cx="772005" cy="230832"/>
+          </a:xfrm>
+          <a:prstGeom prst="rect">
+            <a:avLst/>
+          </a:prstGeom>
+          <a:noFill/>
+        </p:spPr>
+        <p:txBody>
+          <a:bodyPr wrap="square" rtlCol="0">
+            <a:spAutoFit/>
+          </a:bodyPr>
+          <a:lstStyle/>
+          <a:p>
+            <a:pPr algn="ctr"/>
+            <a:r>
+              <a:rPr lang="en-US" sz="900" b="1" dirty="0">
+                <a:solidFill>
+                  <a:schemeClr val="bg1">
+                    <a:lumMod val="75000"/>
+                  </a:schemeClr>
+                </a:solidFill>
+              </a:rPr>
+              <a:t>P/Invoke</a:t>
+            </a:r>
+          </a:p>
+        </p:txBody>
+      </p:sp>
     </p:spTree>
     <p:extLst>
       <p:ext uri="{BB962C8B-B14F-4D97-AF65-F5344CB8AC3E}">

</xml_diff>

<commit_message>
Design now uses YAML in lieu of flatbuffers: implementation to follow.
</commit_message>
<xml_diff>
--- a/AVXSearch/AVX-Framework.pptx
+++ b/AVXSearch/AVX-Framework.pptx
@@ -10,9 +10,10 @@
     <p:sldId id="266" r:id="rId4"/>
     <p:sldId id="265" r:id="rId5"/>
     <p:sldId id="264" r:id="rId6"/>
-    <p:sldId id="263" r:id="rId7"/>
-    <p:sldId id="259" r:id="rId8"/>
-    <p:sldId id="257" r:id="rId9"/>
+    <p:sldId id="267" r:id="rId7"/>
+    <p:sldId id="263" r:id="rId8"/>
+    <p:sldId id="259" r:id="rId9"/>
+    <p:sldId id="257" r:id="rId10"/>
   </p:sldIdLst>
   <p:sldSz cx="12192000" cy="6858000"/>
   <p:notesSz cx="6858000" cy="9144000"/>
@@ -266,7 +267,7 @@
           <a:p>
             <a:fld id="{00872148-4BA6-4738-8A8B-AEF1C14E9646}" type="datetimeFigureOut">
               <a:rPr lang="en-US" smtClean="0"/>
-              <a:t>11/19/2023</a:t>
+              <a:t>11/27/2023</a:t>
             </a:fld>
             <a:endParaRPr lang="en-US"/>
           </a:p>
@@ -464,7 +465,7 @@
           <a:p>
             <a:fld id="{00872148-4BA6-4738-8A8B-AEF1C14E9646}" type="datetimeFigureOut">
               <a:rPr lang="en-US" smtClean="0"/>
-              <a:t>11/19/2023</a:t>
+              <a:t>11/27/2023</a:t>
             </a:fld>
             <a:endParaRPr lang="en-US"/>
           </a:p>
@@ -672,7 +673,7 @@
           <a:p>
             <a:fld id="{00872148-4BA6-4738-8A8B-AEF1C14E9646}" type="datetimeFigureOut">
               <a:rPr lang="en-US" smtClean="0"/>
-              <a:t>11/19/2023</a:t>
+              <a:t>11/27/2023</a:t>
             </a:fld>
             <a:endParaRPr lang="en-US"/>
           </a:p>
@@ -870,7 +871,7 @@
           <a:p>
             <a:fld id="{00872148-4BA6-4738-8A8B-AEF1C14E9646}" type="datetimeFigureOut">
               <a:rPr lang="en-US" smtClean="0"/>
-              <a:t>11/19/2023</a:t>
+              <a:t>11/27/2023</a:t>
             </a:fld>
             <a:endParaRPr lang="en-US"/>
           </a:p>
@@ -1145,7 +1146,7 @@
           <a:p>
             <a:fld id="{00872148-4BA6-4738-8A8B-AEF1C14E9646}" type="datetimeFigureOut">
               <a:rPr lang="en-US" smtClean="0"/>
-              <a:t>11/19/2023</a:t>
+              <a:t>11/27/2023</a:t>
             </a:fld>
             <a:endParaRPr lang="en-US"/>
           </a:p>
@@ -1410,7 +1411,7 @@
           <a:p>
             <a:fld id="{00872148-4BA6-4738-8A8B-AEF1C14E9646}" type="datetimeFigureOut">
               <a:rPr lang="en-US" smtClean="0"/>
-              <a:t>11/19/2023</a:t>
+              <a:t>11/27/2023</a:t>
             </a:fld>
             <a:endParaRPr lang="en-US"/>
           </a:p>
@@ -1822,7 +1823,7 @@
           <a:p>
             <a:fld id="{00872148-4BA6-4738-8A8B-AEF1C14E9646}" type="datetimeFigureOut">
               <a:rPr lang="en-US" smtClean="0"/>
-              <a:t>11/19/2023</a:t>
+              <a:t>11/27/2023</a:t>
             </a:fld>
             <a:endParaRPr lang="en-US"/>
           </a:p>
@@ -1963,7 +1964,7 @@
           <a:p>
             <a:fld id="{00872148-4BA6-4738-8A8B-AEF1C14E9646}" type="datetimeFigureOut">
               <a:rPr lang="en-US" smtClean="0"/>
-              <a:t>11/19/2023</a:t>
+              <a:t>11/27/2023</a:t>
             </a:fld>
             <a:endParaRPr lang="en-US"/>
           </a:p>
@@ -2076,7 +2077,7 @@
           <a:p>
             <a:fld id="{00872148-4BA6-4738-8A8B-AEF1C14E9646}" type="datetimeFigureOut">
               <a:rPr lang="en-US" smtClean="0"/>
-              <a:t>11/19/2023</a:t>
+              <a:t>11/27/2023</a:t>
             </a:fld>
             <a:endParaRPr lang="en-US"/>
           </a:p>
@@ -2387,7 +2388,7 @@
           <a:p>
             <a:fld id="{00872148-4BA6-4738-8A8B-AEF1C14E9646}" type="datetimeFigureOut">
               <a:rPr lang="en-US" smtClean="0"/>
-              <a:t>11/19/2023</a:t>
+              <a:t>11/27/2023</a:t>
             </a:fld>
             <a:endParaRPr lang="en-US"/>
           </a:p>
@@ -2675,7 +2676,7 @@
           <a:p>
             <a:fld id="{00872148-4BA6-4738-8A8B-AEF1C14E9646}" type="datetimeFigureOut">
               <a:rPr lang="en-US" smtClean="0"/>
-              <a:t>11/19/2023</a:t>
+              <a:t>11/27/2023</a:t>
             </a:fld>
             <a:endParaRPr lang="en-US"/>
           </a:p>
@@ -2916,7 +2917,7 @@
           <a:p>
             <a:fld id="{00872148-4BA6-4738-8A8B-AEF1C14E9646}" type="datetimeFigureOut">
               <a:rPr lang="en-US" smtClean="0"/>
-              <a:t>11/19/2023</a:t>
+              <a:t>11/27/2023</a:t>
             </a:fld>
             <a:endParaRPr lang="en-US"/>
           </a:p>
@@ -3455,7 +3456,7 @@
             <a:pPr algn="ctr"/>
             <a:r>
               <a:rPr lang="en-US" dirty="0"/>
-              <a:t>AVX-Framework dependencies – 3B16</a:t>
+              <a:t>AVX-Framework dependencies – 3B27</a:t>
             </a:r>
           </a:p>
         </p:txBody>
@@ -5211,41 +5212,7 @@
                 <a:ea typeface="+mn-ea"/>
                 <a:cs typeface="+mn-cs"/>
               </a:rPr>
-              <a:t>[</a:t>
-            </a:r>
-            <a:r>
-              <a:rPr kumimoji="0" lang="en-US" sz="800" b="0" i="0" u="none" strike="noStrike" kern="1200" cap="none" spc="0" normalizeH="0" baseline="0" noProof="0" dirty="0" err="1">
-                <a:ln>
-                  <a:noFill/>
-                </a:ln>
-                <a:solidFill>
-                  <a:prstClr val="white"/>
-                </a:solidFill>
-                <a:effectLst/>
-                <a:uLnTx/>
-                <a:uFillTx/>
-                <a:latin typeface="Calibri" panose="020F0502020204030204"/>
-                <a:ea typeface="+mn-ea"/>
-                <a:cs typeface="+mn-cs"/>
-              </a:rPr>
-              <a:t>flatbuffers</a:t>
-            </a:r>
-            <a:r>
-              <a:rPr kumimoji="0" lang="en-US" sz="800" b="0" i="0" u="none" strike="noStrike" kern="1200" cap="none" spc="0" normalizeH="0" baseline="0" noProof="0" dirty="0">
-                <a:ln>
-                  <a:noFill/>
-                </a:ln>
-                <a:solidFill>
-                  <a:prstClr val="white"/>
-                </a:solidFill>
-                <a:effectLst/>
-                <a:uLnTx/>
-                <a:uFillTx/>
-                <a:latin typeface="Calibri" panose="020F0502020204030204"/>
-                <a:ea typeface="+mn-ea"/>
-                <a:cs typeface="+mn-cs"/>
-              </a:rPr>
-              <a:t>]</a:t>
+              <a:t>[Rapid YAML]</a:t>
             </a:r>
           </a:p>
           <a:p>
@@ -5810,7 +5777,7 @@
                 <a:ea typeface="+mn-ea"/>
                 <a:cs typeface="+mn-cs"/>
               </a:rPr>
-              <a:t>FlatSharp</a:t>
+              <a:t>YamlDotNet</a:t>
             </a:r>
             <a:r>
               <a:rPr kumimoji="0" lang="en-US" sz="800" b="0" i="0" u="none" strike="noStrike" kern="1200" cap="none" spc="0" normalizeH="0" baseline="0" noProof="0" dirty="0">
@@ -9442,9 +9409,9 @@
         </p:nvGrpSpPr>
         <p:grpSpPr>
           <a:xfrm>
-            <a:off x="3651967" y="4201589"/>
+            <a:off x="3633799" y="4201589"/>
             <a:ext cx="741133" cy="260141"/>
-            <a:chOff x="7686586" y="4456943"/>
+            <a:chOff x="7668418" y="4456943"/>
             <a:chExt cx="741133" cy="260141"/>
           </a:xfrm>
         </p:grpSpPr>
@@ -9462,7 +9429,7 @@
           </p:nvSpPr>
           <p:spPr>
             <a:xfrm>
-              <a:off x="7686586" y="4501640"/>
+              <a:off x="7668418" y="4501640"/>
               <a:ext cx="741133" cy="215444"/>
             </a:xfrm>
             <a:prstGeom prst="rect">
@@ -9486,7 +9453,7 @@
                     </a:schemeClr>
                   </a:solidFill>
                 </a:rPr>
-                <a:t>flatbuffers</a:t>
+                <a:t>yaml</a:t>
               </a:r>
               <a:endParaRPr lang="en-US" sz="800" dirty="0">
                 <a:solidFill>
@@ -10087,7 +10054,7 @@
         </p:nvSpPr>
         <p:spPr>
           <a:xfrm>
-            <a:off x="2803225" y="2612363"/>
+            <a:off x="2762229" y="2618496"/>
             <a:ext cx="741133" cy="215444"/>
           </a:xfrm>
           <a:prstGeom prst="rect">
@@ -10111,7 +10078,7 @@
                   </a:schemeClr>
                 </a:solidFill>
               </a:rPr>
-              <a:t>flatbuffers</a:t>
+              <a:t>yaml</a:t>
             </a:r>
             <a:endParaRPr lang="en-US" sz="800" dirty="0">
               <a:solidFill>
@@ -10180,7 +10147,7 @@
           <p:nvPr>
             <p:extLst>
               <p:ext uri="{D42A27DB-BD31-4B8C-83A1-F6EECF244321}">
-                <p14:modId xmlns:p14="http://schemas.microsoft.com/office/powerpoint/2010/main" val="4027621923"/>
+                <p14:modId xmlns:p14="http://schemas.microsoft.com/office/powerpoint/2010/main" val="3138071089"/>
               </p:ext>
             </p:extLst>
           </p:nvPr>
@@ -10386,7 +10353,7 @@
                       </a:r>
                       <a:r>
                         <a:rPr lang="en-US" sz="1100" dirty="0" err="1"/>
-                        <a:t>flatbuffer</a:t>
+                        <a:t>yaml</a:t>
                       </a:r>
                       <a:r>
                         <a:rPr lang="en-US" sz="1100" dirty="0"/>
@@ -10411,7 +10378,7 @@
                       </a:r>
                       <a:r>
                         <a:rPr lang="en-US" sz="1100" dirty="0" err="1"/>
-                        <a:t>flatbuffer</a:t>
+                        <a:t>yaml</a:t>
                       </a:r>
                       <a:r>
                         <a:rPr lang="en-US" sz="1100" dirty="0"/>
@@ -10583,7 +10550,7 @@
                       </a:r>
                       <a:r>
                         <a:rPr lang="en-US" sz="1100" dirty="0" err="1"/>
-                        <a:t>flatbuffer</a:t>
+                        <a:t>yaml</a:t>
                       </a:r>
                       <a:r>
                         <a:rPr lang="en-US" sz="1100" dirty="0"/>
@@ -10904,7 +10871,7 @@
           </p:nvSpPr>
           <p:spPr>
             <a:xfrm>
-              <a:off x="6890092" y="2879987"/>
+              <a:off x="6859032" y="2886127"/>
               <a:ext cx="741133" cy="215444"/>
             </a:xfrm>
             <a:prstGeom prst="rect">
@@ -10928,7 +10895,7 @@
                     </a:schemeClr>
                   </a:solidFill>
                 </a:rPr>
-                <a:t>flatbuffers</a:t>
+                <a:t>yaml</a:t>
               </a:r>
               <a:endParaRPr lang="en-US" sz="800" dirty="0">
                 <a:solidFill>
@@ -11515,41 +11482,7 @@
                   <a:ea typeface="+mn-ea"/>
                   <a:cs typeface="+mn-cs"/>
                 </a:rPr>
-                <a:t>[</a:t>
-              </a:r>
-              <a:r>
-                <a:rPr kumimoji="0" lang="en-US" sz="800" b="0" i="0" u="none" strike="noStrike" kern="1200" cap="none" spc="0" normalizeH="0" baseline="0" noProof="0" dirty="0" err="1">
-                  <a:ln>
-                    <a:noFill/>
-                  </a:ln>
-                  <a:solidFill>
-                    <a:prstClr val="white"/>
-                  </a:solidFill>
-                  <a:effectLst/>
-                  <a:uLnTx/>
-                  <a:uFillTx/>
-                  <a:latin typeface="Calibri" panose="020F0502020204030204"/>
-                  <a:ea typeface="+mn-ea"/>
-                  <a:cs typeface="+mn-cs"/>
-                </a:rPr>
-                <a:t>flatbuffers</a:t>
-              </a:r>
-              <a:r>
-                <a:rPr kumimoji="0" lang="en-US" sz="800" b="0" i="0" u="none" strike="noStrike" kern="1200" cap="none" spc="0" normalizeH="0" baseline="0" noProof="0" dirty="0">
-                  <a:ln>
-                    <a:noFill/>
-                  </a:ln>
-                  <a:solidFill>
-                    <a:prstClr val="white"/>
-                  </a:solidFill>
-                  <a:effectLst/>
-                  <a:uLnTx/>
-                  <a:uFillTx/>
-                  <a:latin typeface="Calibri" panose="020F0502020204030204"/>
-                  <a:ea typeface="+mn-ea"/>
-                  <a:cs typeface="+mn-cs"/>
-                </a:rPr>
-                <a:t>]</a:t>
+                <a:t>[Rapid YAML]</a:t>
               </a:r>
             </a:p>
             <a:p>
@@ -12120,7 +12053,7 @@
                   <a:ea typeface="+mn-ea"/>
                   <a:cs typeface="+mn-cs"/>
                 </a:rPr>
-                <a:t>FlatSharp</a:t>
+                <a:t>YamlDotNet</a:t>
               </a:r>
               <a:r>
                 <a:rPr kumimoji="0" lang="en-US" sz="800" b="0" i="0" u="none" strike="noStrike" kern="1200" cap="none" spc="0" normalizeH="0" baseline="0" noProof="0" dirty="0">
@@ -13830,7 +13763,7 @@
                       </a:schemeClr>
                     </a:solidFill>
                   </a:rPr>
-                  <a:t>flatbuffers</a:t>
+                  <a:t>yaml</a:t>
                 </a:r>
                 <a:endParaRPr lang="en-US" sz="800" dirty="0">
                   <a:solidFill>
@@ -14493,7 +14426,7 @@
             <a:pPr algn="ctr"/>
             <a:r>
               <a:rPr lang="en-US" dirty="0"/>
-              <a:t>AVX Roadmap – 3B16 – CY2023</a:t>
+              <a:t>AVX Roadmap – 3B27 – CY2023</a:t>
             </a:r>
           </a:p>
         </p:txBody>
@@ -15356,7 +15289,7 @@
           </p:nvSpPr>
           <p:spPr>
             <a:xfrm>
-              <a:off x="8151948" y="2796434"/>
+              <a:off x="8108153" y="2802574"/>
               <a:ext cx="741133" cy="215444"/>
             </a:xfrm>
             <a:prstGeom prst="rect">
@@ -15380,7 +15313,7 @@
                     </a:schemeClr>
                   </a:solidFill>
                 </a:rPr>
-                <a:t>flatbuffers</a:t>
+                <a:t>yaml</a:t>
               </a:r>
               <a:endParaRPr lang="en-US" sz="800" dirty="0">
                 <a:solidFill>
@@ -15967,41 +15900,7 @@
                   <a:ea typeface="+mn-ea"/>
                   <a:cs typeface="+mn-cs"/>
                 </a:rPr>
-                <a:t>[</a:t>
-              </a:r>
-              <a:r>
-                <a:rPr kumimoji="0" lang="en-US" sz="800" b="0" i="0" u="none" strike="noStrike" kern="1200" cap="none" spc="0" normalizeH="0" baseline="0" noProof="0" dirty="0" err="1">
-                  <a:ln>
-                    <a:noFill/>
-                  </a:ln>
-                  <a:solidFill>
-                    <a:prstClr val="white"/>
-                  </a:solidFill>
-                  <a:effectLst/>
-                  <a:uLnTx/>
-                  <a:uFillTx/>
-                  <a:latin typeface="Calibri" panose="020F0502020204030204"/>
-                  <a:ea typeface="+mn-ea"/>
-                  <a:cs typeface="+mn-cs"/>
-                </a:rPr>
-                <a:t>flatbuffers</a:t>
-              </a:r>
-              <a:r>
-                <a:rPr kumimoji="0" lang="en-US" sz="800" b="0" i="0" u="none" strike="noStrike" kern="1200" cap="none" spc="0" normalizeH="0" baseline="0" noProof="0" dirty="0">
-                  <a:ln>
-                    <a:noFill/>
-                  </a:ln>
-                  <a:solidFill>
-                    <a:prstClr val="white"/>
-                  </a:solidFill>
-                  <a:effectLst/>
-                  <a:uLnTx/>
-                  <a:uFillTx/>
-                  <a:latin typeface="Calibri" panose="020F0502020204030204"/>
-                  <a:ea typeface="+mn-ea"/>
-                  <a:cs typeface="+mn-cs"/>
-                </a:rPr>
-                <a:t>]</a:t>
+                <a:t>[Rapid YAML]</a:t>
               </a:r>
             </a:p>
             <a:p>
@@ -16572,7 +16471,7 @@
                   <a:ea typeface="+mn-ea"/>
                   <a:cs typeface="+mn-cs"/>
                 </a:rPr>
-                <a:t>FlatSharp</a:t>
+                <a:t>YamlDotNet</a:t>
               </a:r>
               <a:r>
                 <a:rPr kumimoji="0" lang="en-US" sz="800" b="0" i="0" u="none" strike="noStrike" kern="1200" cap="none" spc="0" normalizeH="0" baseline="0" noProof="0" dirty="0">
@@ -18282,7 +18181,7 @@
                       </a:schemeClr>
                     </a:solidFill>
                   </a:rPr>
-                  <a:t>flatbuffers</a:t>
+                  <a:t>yaml</a:t>
                 </a:r>
                 <a:endParaRPr lang="en-US" sz="800" dirty="0">
                   <a:solidFill>
@@ -18900,7 +18799,7 @@
             <a:pPr algn="ctr"/>
             <a:r>
               <a:rPr lang="en-US" dirty="0"/>
-              <a:t>AVX Roadmap – 3B16 – CY2024</a:t>
+              <a:t>AVX Roadmap – 3B27 – CY2024</a:t>
             </a:r>
           </a:p>
         </p:txBody>
@@ -21921,7 +21820,7 @@
             <a:pPr algn="ctr"/>
             <a:r>
               <a:rPr lang="en-US" dirty="0"/>
-              <a:t>AVX Roadmap – 3B16 – CY2025</a:t>
+              <a:t>AVX Roadmap – 3B27 – CY2025</a:t>
             </a:r>
           </a:p>
         </p:txBody>
@@ -22497,6 +22396,93 @@
 </file>
 
 <file path=ppt/slides/slide6.xml><?xml version="1.0" encoding="utf-8"?>
+<p:sld xmlns:a="http://schemas.openxmlformats.org/drawingml/2006/main" xmlns:r="http://schemas.openxmlformats.org/officeDocument/2006/relationships" xmlns:p="http://schemas.openxmlformats.org/presentationml/2006/main">
+  <p:cSld>
+    <p:spTree>
+      <p:nvGrpSpPr>
+        <p:cNvPr id="1" name=""/>
+        <p:cNvGrpSpPr/>
+        <p:nvPr/>
+      </p:nvGrpSpPr>
+      <p:grpSpPr>
+        <a:xfrm>
+          <a:off x="0" y="0"/>
+          <a:ext cx="0" cy="0"/>
+          <a:chOff x="0" y="0"/>
+          <a:chExt cx="0" cy="0"/>
+        </a:xfrm>
+      </p:grpSpPr>
+      <p:sp>
+        <p:nvSpPr>
+          <p:cNvPr id="2" name="Title 1">
+            <a:extLst>
+              <a:ext uri="{FF2B5EF4-FFF2-40B4-BE49-F238E27FC236}">
+                <a16:creationId xmlns:a16="http://schemas.microsoft.com/office/drawing/2014/main" id="{C683B92A-0B05-F199-6826-81B80A5D82DD}"/>
+              </a:ext>
+            </a:extLst>
+          </p:cNvPr>
+          <p:cNvSpPr>
+            <a:spLocks noGrp="1"/>
+          </p:cNvSpPr>
+          <p:nvPr>
+            <p:ph type="title"/>
+          </p:nvPr>
+        </p:nvSpPr>
+        <p:spPr/>
+        <p:txBody>
+          <a:bodyPr/>
+          <a:lstStyle/>
+          <a:p>
+            <a:r>
+              <a:rPr lang="en-US" dirty="0"/>
+              <a:t>Results: C++ to C# via staged YAML</a:t>
+            </a:r>
+          </a:p>
+        </p:txBody>
+      </p:sp>
+      <p:pic>
+        <p:nvPicPr>
+          <p:cNvPr id="5" name="Content Placeholder 4">
+            <a:extLst>
+              <a:ext uri="{FF2B5EF4-FFF2-40B4-BE49-F238E27FC236}">
+                <a16:creationId xmlns:a16="http://schemas.microsoft.com/office/drawing/2014/main" id="{E16C7E83-3CBB-AF42-3586-19224D887DA6}"/>
+              </a:ext>
+            </a:extLst>
+          </p:cNvPr>
+          <p:cNvPicPr>
+            <a:picLocks noGrp="1" noChangeAspect="1"/>
+          </p:cNvPicPr>
+          <p:nvPr>
+            <p:ph idx="1"/>
+          </p:nvPr>
+        </p:nvPicPr>
+        <p:blipFill>
+          <a:blip r:embed="rId2"/>
+          <a:stretch>
+            <a:fillRect/>
+          </a:stretch>
+        </p:blipFill>
+        <p:spPr>
+          <a:xfrm>
+            <a:off x="2278975" y="1825625"/>
+            <a:ext cx="7634049" cy="4351338"/>
+          </a:xfrm>
+        </p:spPr>
+      </p:pic>
+    </p:spTree>
+    <p:extLst>
+      <p:ext uri="{BB962C8B-B14F-4D97-AF65-F5344CB8AC3E}">
+        <p14:creationId xmlns:p14="http://schemas.microsoft.com/office/powerpoint/2010/main" val="3974386611"/>
+      </p:ext>
+    </p:extLst>
+  </p:cSld>
+  <p:clrMapOvr>
+    <a:masterClrMapping/>
+  </p:clrMapOvr>
+</p:sld>
+</file>
+
+<file path=ppt/slides/slide7.xml><?xml version="1.0" encoding="utf-8"?>
 <p:sld xmlns:a="http://schemas.openxmlformats.org/drawingml/2006/main" xmlns:r="http://schemas.openxmlformats.org/officeDocument/2006/relationships" xmlns:p="http://schemas.openxmlformats.org/presentationml/2006/main" show="0">
   <p:cSld>
     <p:spTree>
@@ -25490,7 +25476,7 @@
 </p:sld>
 </file>
 
-<file path=ppt/slides/slide7.xml><?xml version="1.0" encoding="utf-8"?>
+<file path=ppt/slides/slide8.xml><?xml version="1.0" encoding="utf-8"?>
 <p:sld xmlns:a="http://schemas.openxmlformats.org/drawingml/2006/main" xmlns:r="http://schemas.openxmlformats.org/officeDocument/2006/relationships" xmlns:p="http://schemas.openxmlformats.org/presentationml/2006/main" show="0">
   <p:cSld>
     <p:spTree>
@@ -32370,7 +32356,7 @@
 </p:sld>
 </file>
 
-<file path=ppt/slides/slide8.xml><?xml version="1.0" encoding="utf-8"?>
+<file path=ppt/slides/slide9.xml><?xml version="1.0" encoding="utf-8"?>
 <p:sld xmlns:a="http://schemas.openxmlformats.org/drawingml/2006/main" xmlns:r="http://schemas.openxmlformats.org/officeDocument/2006/relationships" xmlns:p="http://schemas.openxmlformats.org/presentationml/2006/main" show="0">
   <p:cSld>
     <p:spTree>

</xml_diff>

<commit_message>
More details on YAML results
</commit_message>
<xml_diff>
--- a/AVXSearch/AVX-Framework.pptx
+++ b/AVXSearch/AVX-Framework.pptx
@@ -267,7 +267,7 @@
           <a:p>
             <a:fld id="{00872148-4BA6-4738-8A8B-AEF1C14E9646}" type="datetimeFigureOut">
               <a:rPr lang="en-US" smtClean="0"/>
-              <a:t>11/27/2023</a:t>
+              <a:t>11/28/2023</a:t>
             </a:fld>
             <a:endParaRPr lang="en-US"/>
           </a:p>
@@ -465,7 +465,7 @@
           <a:p>
             <a:fld id="{00872148-4BA6-4738-8A8B-AEF1C14E9646}" type="datetimeFigureOut">
               <a:rPr lang="en-US" smtClean="0"/>
-              <a:t>11/27/2023</a:t>
+              <a:t>11/28/2023</a:t>
             </a:fld>
             <a:endParaRPr lang="en-US"/>
           </a:p>
@@ -673,7 +673,7 @@
           <a:p>
             <a:fld id="{00872148-4BA6-4738-8A8B-AEF1C14E9646}" type="datetimeFigureOut">
               <a:rPr lang="en-US" smtClean="0"/>
-              <a:t>11/27/2023</a:t>
+              <a:t>11/28/2023</a:t>
             </a:fld>
             <a:endParaRPr lang="en-US"/>
           </a:p>
@@ -871,7 +871,7 @@
           <a:p>
             <a:fld id="{00872148-4BA6-4738-8A8B-AEF1C14E9646}" type="datetimeFigureOut">
               <a:rPr lang="en-US" smtClean="0"/>
-              <a:t>11/27/2023</a:t>
+              <a:t>11/28/2023</a:t>
             </a:fld>
             <a:endParaRPr lang="en-US"/>
           </a:p>
@@ -1146,7 +1146,7 @@
           <a:p>
             <a:fld id="{00872148-4BA6-4738-8A8B-AEF1C14E9646}" type="datetimeFigureOut">
               <a:rPr lang="en-US" smtClean="0"/>
-              <a:t>11/27/2023</a:t>
+              <a:t>11/28/2023</a:t>
             </a:fld>
             <a:endParaRPr lang="en-US"/>
           </a:p>
@@ -1411,7 +1411,7 @@
           <a:p>
             <a:fld id="{00872148-4BA6-4738-8A8B-AEF1C14E9646}" type="datetimeFigureOut">
               <a:rPr lang="en-US" smtClean="0"/>
-              <a:t>11/27/2023</a:t>
+              <a:t>11/28/2023</a:t>
             </a:fld>
             <a:endParaRPr lang="en-US"/>
           </a:p>
@@ -1823,7 +1823,7 @@
           <a:p>
             <a:fld id="{00872148-4BA6-4738-8A8B-AEF1C14E9646}" type="datetimeFigureOut">
               <a:rPr lang="en-US" smtClean="0"/>
-              <a:t>11/27/2023</a:t>
+              <a:t>11/28/2023</a:t>
             </a:fld>
             <a:endParaRPr lang="en-US"/>
           </a:p>
@@ -1964,7 +1964,7 @@
           <a:p>
             <a:fld id="{00872148-4BA6-4738-8A8B-AEF1C14E9646}" type="datetimeFigureOut">
               <a:rPr lang="en-US" smtClean="0"/>
-              <a:t>11/27/2023</a:t>
+              <a:t>11/28/2023</a:t>
             </a:fld>
             <a:endParaRPr lang="en-US"/>
           </a:p>
@@ -2077,7 +2077,7 @@
           <a:p>
             <a:fld id="{00872148-4BA6-4738-8A8B-AEF1C14E9646}" type="datetimeFigureOut">
               <a:rPr lang="en-US" smtClean="0"/>
-              <a:t>11/27/2023</a:t>
+              <a:t>11/28/2023</a:t>
             </a:fld>
             <a:endParaRPr lang="en-US"/>
           </a:p>
@@ -2388,7 +2388,7 @@
           <a:p>
             <a:fld id="{00872148-4BA6-4738-8A8B-AEF1C14E9646}" type="datetimeFigureOut">
               <a:rPr lang="en-US" smtClean="0"/>
-              <a:t>11/27/2023</a:t>
+              <a:t>11/28/2023</a:t>
             </a:fld>
             <a:endParaRPr lang="en-US"/>
           </a:p>
@@ -2676,7 +2676,7 @@
           <a:p>
             <a:fld id="{00872148-4BA6-4738-8A8B-AEF1C14E9646}" type="datetimeFigureOut">
               <a:rPr lang="en-US" smtClean="0"/>
-              <a:t>11/27/2023</a:t>
+              <a:t>11/28/2023</a:t>
             </a:fld>
             <a:endParaRPr lang="en-US"/>
           </a:p>
@@ -2917,7 +2917,7 @@
           <a:p>
             <a:fld id="{00872148-4BA6-4738-8A8B-AEF1C14E9646}" type="datetimeFigureOut">
               <a:rPr lang="en-US" smtClean="0"/>
-              <a:t>11/27/2023</a:t>
+              <a:t>11/28/2023</a:t>
             </a:fld>
             <a:endParaRPr lang="en-US"/>
           </a:p>
@@ -22464,9 +22464,397 @@
         </p:blipFill>
         <p:spPr>
           <a:xfrm>
-            <a:off x="2278975" y="1825625"/>
+            <a:off x="2185669" y="1769642"/>
             <a:ext cx="7634049" cy="4351338"/>
           </a:xfrm>
+        </p:spPr>
+      </p:pic>
+      <p:sp>
+        <p:nvSpPr>
+          <p:cNvPr id="3" name="TextBox 2">
+            <a:extLst>
+              <a:ext uri="{FF2B5EF4-FFF2-40B4-BE49-F238E27FC236}">
+                <a16:creationId xmlns:a16="http://schemas.microsoft.com/office/drawing/2014/main" id="{8EE926CA-894A-470F-4FD5-D63E0402AEFD}"/>
+              </a:ext>
+            </a:extLst>
+          </p:cNvPr>
+          <p:cNvSpPr txBox="1"/>
+          <p:nvPr/>
+        </p:nvSpPr>
+        <p:spPr>
+          <a:xfrm>
+            <a:off x="597159" y="5010539"/>
+            <a:ext cx="1681816" cy="1477328"/>
+          </a:xfrm>
+          <a:prstGeom prst="rect">
+            <a:avLst/>
+          </a:prstGeom>
+          <a:noFill/>
+        </p:spPr>
+        <p:txBody>
+          <a:bodyPr wrap="square" rtlCol="0">
+            <a:spAutoFit/>
+          </a:bodyPr>
+          <a:lstStyle/>
+          <a:p>
+            <a:r>
+              <a:rPr lang="en-US" sz="1000" dirty="0" err="1"/>
+              <a:t>Total_hits</a:t>
+            </a:r>
+            <a:endParaRPr lang="en-US" sz="1000" dirty="0"/>
+          </a:p>
+          <a:p>
+            <a:r>
+              <a:rPr lang="en-US" sz="1000" dirty="0" err="1"/>
+              <a:t>Book_hits</a:t>
+            </a:r>
+            <a:endParaRPr lang="en-US" sz="1000" dirty="0"/>
+          </a:p>
+          <a:p>
+            <a:r>
+              <a:rPr lang="en-US" sz="1000" dirty="0" err="1"/>
+              <a:t>Chapter_hits</a:t>
+            </a:r>
+            <a:endParaRPr lang="en-US" sz="1000" dirty="0"/>
+          </a:p>
+          <a:p>
+            <a:r>
+              <a:rPr lang="en-US" sz="1000" dirty="0" err="1"/>
+              <a:t>Verse_hits</a:t>
+            </a:r>
+            <a:endParaRPr lang="en-US" sz="1000" dirty="0"/>
+          </a:p>
+          <a:p>
+            <a:endParaRPr lang="en-US" sz="1000" dirty="0"/>
+          </a:p>
+          <a:p>
+            <a:r>
+              <a:rPr lang="en-US" sz="1000" dirty="0" err="1"/>
+              <a:t>Book_cnt</a:t>
+            </a:r>
+            <a:endParaRPr lang="en-US" sz="1000" dirty="0"/>
+          </a:p>
+          <a:p>
+            <a:r>
+              <a:rPr lang="en-US" sz="1000" dirty="0"/>
+              <a:t>Byte </a:t>
+            </a:r>
+            <a:r>
+              <a:rPr lang="en-US" sz="1000" dirty="0" err="1"/>
+              <a:t>Chapter_cnt</a:t>
+            </a:r>
+            <a:r>
+              <a:rPr lang="en-US" sz="1000" dirty="0"/>
+              <a:t>[66]</a:t>
+            </a:r>
+          </a:p>
+          <a:p>
+            <a:r>
+              <a:rPr lang="en-US" sz="1000" dirty="0"/>
+              <a:t>Byte </a:t>
+            </a:r>
+            <a:r>
+              <a:rPr lang="en-US" sz="1000" dirty="0" err="1"/>
+              <a:t>Chapter_hit_cnt</a:t>
+            </a:r>
+            <a:r>
+              <a:rPr lang="en-US" sz="1000" dirty="0"/>
+              <a:t>[66]</a:t>
+            </a:r>
+          </a:p>
+          <a:p>
+            <a:r>
+              <a:rPr lang="en-US" sz="1000" dirty="0"/>
+              <a:t>Map&lt;</a:t>
+            </a:r>
+            <a:r>
+              <a:rPr lang="en-US" sz="1000" dirty="0" err="1"/>
+              <a:t>book_num</a:t>
+            </a:r>
+            <a:r>
+              <a:rPr lang="en-US" sz="1000" dirty="0"/>
+              <a:t>, </a:t>
+            </a:r>
+            <a:r>
+              <a:rPr lang="en-US" sz="1000" dirty="0" err="1"/>
+              <a:t>TChapter</a:t>
+            </a:r>
+            <a:r>
+              <a:rPr lang="en-US" sz="1000" dirty="0"/>
+              <a:t>&gt;</a:t>
+            </a:r>
+          </a:p>
+        </p:txBody>
+      </p:sp>
+      <p:sp>
+        <p:nvSpPr>
+          <p:cNvPr id="4" name="TextBox 3">
+            <a:extLst>
+              <a:ext uri="{FF2B5EF4-FFF2-40B4-BE49-F238E27FC236}">
+                <a16:creationId xmlns:a16="http://schemas.microsoft.com/office/drawing/2014/main" id="{FF7C1C23-B8A6-B5EE-6EAF-EF2BFB7C3143}"/>
+              </a:ext>
+            </a:extLst>
+          </p:cNvPr>
+          <p:cNvSpPr txBox="1"/>
+          <p:nvPr/>
+        </p:nvSpPr>
+        <p:spPr>
+          <a:xfrm>
+            <a:off x="0" y="6487867"/>
+            <a:ext cx="5575041" cy="369332"/>
+          </a:xfrm>
+          <a:prstGeom prst="rect">
+            <a:avLst/>
+          </a:prstGeom>
+          <a:noFill/>
+        </p:spPr>
+        <p:txBody>
+          <a:bodyPr wrap="square" rtlCol="0">
+            <a:spAutoFit/>
+          </a:bodyPr>
+          <a:lstStyle/>
+          <a:p>
+            <a:r>
+              <a:rPr lang="en-US" dirty="0" err="1"/>
+              <a:t>TResults</a:t>
+            </a:r>
+            <a:r>
+              <a:rPr lang="en-US" dirty="0"/>
+              <a:t> maps to </a:t>
+            </a:r>
+            <a:r>
+              <a:rPr lang="en-US" dirty="0" err="1"/>
+              <a:t>Tfind</a:t>
+            </a:r>
+            <a:r>
+              <a:rPr lang="en-US" dirty="0"/>
+              <a:t> list</a:t>
+            </a:r>
+          </a:p>
+        </p:txBody>
+      </p:sp>
+      <p:sp>
+        <p:nvSpPr>
+          <p:cNvPr id="6" name="TextBox 5">
+            <a:extLst>
+              <a:ext uri="{FF2B5EF4-FFF2-40B4-BE49-F238E27FC236}">
+                <a16:creationId xmlns:a16="http://schemas.microsoft.com/office/drawing/2014/main" id="{9D698FBE-C36B-1D61-BBE5-BA02A5010AF1}"/>
+              </a:ext>
+            </a:extLst>
+          </p:cNvPr>
+          <p:cNvSpPr txBox="1"/>
+          <p:nvPr/>
+        </p:nvSpPr>
+        <p:spPr>
+          <a:xfrm>
+            <a:off x="3940628" y="6119758"/>
+            <a:ext cx="11361104" cy="369332"/>
+          </a:xfrm>
+          <a:prstGeom prst="rect">
+            <a:avLst/>
+          </a:prstGeom>
+          <a:noFill/>
+        </p:spPr>
+        <p:txBody>
+          <a:bodyPr wrap="square" rtlCol="0">
+            <a:spAutoFit/>
+          </a:bodyPr>
+          <a:lstStyle/>
+          <a:p>
+            <a:r>
+              <a:rPr lang="en-US" dirty="0" err="1"/>
+              <a:t>TFound</a:t>
+            </a:r>
+            <a:r>
+              <a:rPr lang="en-US" dirty="0"/>
+              <a:t> includes </a:t>
+            </a:r>
+            <a:r>
+              <a:rPr lang="en-US" dirty="0" err="1"/>
+              <a:t>TFind</a:t>
+            </a:r>
+            <a:r>
+              <a:rPr lang="en-US" dirty="0"/>
+              <a:t> (bidirectional) // </a:t>
+            </a:r>
+            <a:r>
+              <a:rPr lang="en-US" dirty="0" err="1"/>
+              <a:t>Tfind</a:t>
+            </a:r>
+            <a:r>
+              <a:rPr lang="en-US" dirty="0"/>
+              <a:t> includes </a:t>
+            </a:r>
+            <a:r>
+              <a:rPr lang="en-US" dirty="0" err="1"/>
+              <a:t>Tfragment</a:t>
+            </a:r>
+            <a:r>
+              <a:rPr lang="en-US" dirty="0"/>
+              <a:t> // </a:t>
+            </a:r>
+            <a:r>
+              <a:rPr lang="en-US" dirty="0" err="1"/>
+              <a:t>TFound</a:t>
+            </a:r>
+            <a:r>
+              <a:rPr lang="en-US" dirty="0"/>
+              <a:t> includes </a:t>
+            </a:r>
+            <a:r>
+              <a:rPr lang="en-US"/>
+              <a:t>matched features </a:t>
+            </a:r>
+            <a:r>
+              <a:rPr lang="en-US" dirty="0"/>
+              <a:t>from </a:t>
+            </a:r>
+            <a:r>
+              <a:rPr lang="en-US" dirty="0" err="1"/>
+              <a:t>matchany</a:t>
+            </a:r>
+            <a:endParaRPr lang="en-US" dirty="0"/>
+          </a:p>
+        </p:txBody>
+      </p:sp>
+      <p:sp>
+        <p:nvSpPr>
+          <p:cNvPr id="7" name="TextBox 6">
+            <a:extLst>
+              <a:ext uri="{FF2B5EF4-FFF2-40B4-BE49-F238E27FC236}">
+                <a16:creationId xmlns:a16="http://schemas.microsoft.com/office/drawing/2014/main" id="{255EDB83-EA61-5D11-530D-0914B9DE5F70}"/>
+              </a:ext>
+            </a:extLst>
+          </p:cNvPr>
+          <p:cNvSpPr txBox="1"/>
+          <p:nvPr/>
+        </p:nvSpPr>
+        <p:spPr>
+          <a:xfrm>
+            <a:off x="4169229" y="4561115"/>
+            <a:ext cx="3792893" cy="369332"/>
+          </a:xfrm>
+          <a:prstGeom prst="rect">
+            <a:avLst/>
+          </a:prstGeom>
+          <a:noFill/>
+        </p:spPr>
+        <p:txBody>
+          <a:bodyPr wrap="square" rtlCol="0">
+            <a:spAutoFit/>
+          </a:bodyPr>
+          <a:lstStyle/>
+          <a:p>
+            <a:r>
+              <a:rPr lang="en-US" dirty="0" err="1"/>
+              <a:t>TBook</a:t>
+            </a:r>
+            <a:r>
+              <a:rPr lang="en-US" dirty="0"/>
+              <a:t> maps to </a:t>
+            </a:r>
+            <a:r>
+              <a:rPr lang="en-US" dirty="0" err="1"/>
+              <a:t>TFound</a:t>
+            </a:r>
+            <a:r>
+              <a:rPr lang="en-US" dirty="0"/>
+              <a:t> and </a:t>
+            </a:r>
+            <a:r>
+              <a:rPr lang="en-US" dirty="0" err="1"/>
+              <a:t>TChapter</a:t>
+            </a:r>
+            <a:r>
+              <a:rPr lang="en-US" dirty="0"/>
+              <a:t> </a:t>
+            </a:r>
+          </a:p>
+        </p:txBody>
+      </p:sp>
+      <p:sp>
+        <p:nvSpPr>
+          <p:cNvPr id="8" name="TextBox 7">
+            <a:extLst>
+              <a:ext uri="{FF2B5EF4-FFF2-40B4-BE49-F238E27FC236}">
+                <a16:creationId xmlns:a16="http://schemas.microsoft.com/office/drawing/2014/main" id="{27CAF17B-6B26-E7AC-E038-FDAD87814EBF}"/>
+              </a:ext>
+            </a:extLst>
+          </p:cNvPr>
+          <p:cNvSpPr txBox="1"/>
+          <p:nvPr/>
+        </p:nvSpPr>
+        <p:spPr>
+          <a:xfrm>
+            <a:off x="3940629" y="6464855"/>
+            <a:ext cx="9439469" cy="369332"/>
+          </a:xfrm>
+          <a:prstGeom prst="rect">
+            <a:avLst/>
+          </a:prstGeom>
+          <a:noFill/>
+        </p:spPr>
+        <p:txBody>
+          <a:bodyPr wrap="square" rtlCol="0">
+            <a:spAutoFit/>
+          </a:bodyPr>
+          <a:lstStyle/>
+          <a:p>
+            <a:r>
+              <a:rPr lang="en-US" dirty="0" err="1"/>
+              <a:t>Tchapter</a:t>
+            </a:r>
+            <a:r>
+              <a:rPr lang="en-US" dirty="0"/>
+              <a:t> has list of </a:t>
+            </a:r>
+            <a:r>
+              <a:rPr lang="en-US" dirty="0" err="1"/>
+              <a:t>Chapter_hits</a:t>
+            </a:r>
+            <a:r>
+              <a:rPr lang="en-US" dirty="0"/>
+              <a:t> (one per chapter); and a map&lt;uint32, </a:t>
+            </a:r>
+            <a:r>
+              <a:rPr lang="en-US" dirty="0" err="1"/>
+              <a:t>Tfound</a:t>
+            </a:r>
+            <a:r>
+              <a:rPr lang="en-US" dirty="0"/>
+              <a:t>&gt;[] by chapter</a:t>
+            </a:r>
+          </a:p>
+        </p:txBody>
+      </p:sp>
+      <p:pic>
+        <p:nvPicPr>
+          <p:cNvPr id="9" name="Picture 8">
+            <a:extLst>
+              <a:ext uri="{FF2B5EF4-FFF2-40B4-BE49-F238E27FC236}">
+                <a16:creationId xmlns:a16="http://schemas.microsoft.com/office/drawing/2014/main" id="{B9D57505-709B-A9A1-C8B6-FB97170DE4C1}"/>
+              </a:ext>
+            </a:extLst>
+          </p:cNvPr>
+          <p:cNvPicPr>
+            <a:picLocks noChangeAspect="1"/>
+          </p:cNvPicPr>
+          <p:nvPr/>
+        </p:nvPicPr>
+        <p:blipFill>
+          <a:blip r:embed="rId3"/>
+          <a:stretch>
+            <a:fillRect/>
+          </a:stretch>
+        </p:blipFill>
+        <p:spPr>
+          <a:xfrm>
+            <a:off x="254668" y="1236346"/>
+            <a:ext cx="5627096" cy="493819"/>
+          </a:xfrm>
+          <a:prstGeom prst="rect">
+            <a:avLst/>
+          </a:prstGeom>
         </p:spPr>
       </p:pic>
     </p:spTree>

</xml_diff>

<commit_message>
I am nearing completion of refactored YAML commication layer (C#->C++)
</commit_message>
<xml_diff>
--- a/AVXSearch/AVX-Framework.pptx
+++ b/AVXSearch/AVX-Framework.pptx
@@ -10,10 +10,9 @@
     <p:sldId id="266" r:id="rId4"/>
     <p:sldId id="265" r:id="rId5"/>
     <p:sldId id="264" r:id="rId6"/>
-    <p:sldId id="267" r:id="rId7"/>
-    <p:sldId id="263" r:id="rId8"/>
-    <p:sldId id="259" r:id="rId9"/>
-    <p:sldId id="257" r:id="rId10"/>
+    <p:sldId id="263" r:id="rId7"/>
+    <p:sldId id="259" r:id="rId8"/>
+    <p:sldId id="257" r:id="rId9"/>
   </p:sldIdLst>
   <p:sldSz cx="12192000" cy="6858000"/>
   <p:notesSz cx="6858000" cy="9144000"/>
@@ -3391,7 +3390,7 @@
           <a:p>
             <a:r>
               <a:rPr lang="en-US" sz="1800"/>
-              <a:t>11-19-2023</a:t>
+              <a:t>11-29-2023</a:t>
             </a:r>
             <a:endParaRPr lang="en-US" sz="1800" dirty="0"/>
           </a:p>
@@ -22396,481 +22395,6 @@
 </file>
 
 <file path=ppt/slides/slide6.xml><?xml version="1.0" encoding="utf-8"?>
-<p:sld xmlns:a="http://schemas.openxmlformats.org/drawingml/2006/main" xmlns:r="http://schemas.openxmlformats.org/officeDocument/2006/relationships" xmlns:p="http://schemas.openxmlformats.org/presentationml/2006/main">
-  <p:cSld>
-    <p:spTree>
-      <p:nvGrpSpPr>
-        <p:cNvPr id="1" name=""/>
-        <p:cNvGrpSpPr/>
-        <p:nvPr/>
-      </p:nvGrpSpPr>
-      <p:grpSpPr>
-        <a:xfrm>
-          <a:off x="0" y="0"/>
-          <a:ext cx="0" cy="0"/>
-          <a:chOff x="0" y="0"/>
-          <a:chExt cx="0" cy="0"/>
-        </a:xfrm>
-      </p:grpSpPr>
-      <p:sp>
-        <p:nvSpPr>
-          <p:cNvPr id="2" name="Title 1">
-            <a:extLst>
-              <a:ext uri="{FF2B5EF4-FFF2-40B4-BE49-F238E27FC236}">
-                <a16:creationId xmlns:a16="http://schemas.microsoft.com/office/drawing/2014/main" id="{C683B92A-0B05-F199-6826-81B80A5D82DD}"/>
-              </a:ext>
-            </a:extLst>
-          </p:cNvPr>
-          <p:cNvSpPr>
-            <a:spLocks noGrp="1"/>
-          </p:cNvSpPr>
-          <p:nvPr>
-            <p:ph type="title"/>
-          </p:nvPr>
-        </p:nvSpPr>
-        <p:spPr/>
-        <p:txBody>
-          <a:bodyPr/>
-          <a:lstStyle/>
-          <a:p>
-            <a:r>
-              <a:rPr lang="en-US" dirty="0"/>
-              <a:t>Results: C++ to C# via staged YAML</a:t>
-            </a:r>
-          </a:p>
-        </p:txBody>
-      </p:sp>
-      <p:pic>
-        <p:nvPicPr>
-          <p:cNvPr id="5" name="Content Placeholder 4">
-            <a:extLst>
-              <a:ext uri="{FF2B5EF4-FFF2-40B4-BE49-F238E27FC236}">
-                <a16:creationId xmlns:a16="http://schemas.microsoft.com/office/drawing/2014/main" id="{E16C7E83-3CBB-AF42-3586-19224D887DA6}"/>
-              </a:ext>
-            </a:extLst>
-          </p:cNvPr>
-          <p:cNvPicPr>
-            <a:picLocks noGrp="1" noChangeAspect="1"/>
-          </p:cNvPicPr>
-          <p:nvPr>
-            <p:ph idx="1"/>
-          </p:nvPr>
-        </p:nvPicPr>
-        <p:blipFill>
-          <a:blip r:embed="rId2"/>
-          <a:stretch>
-            <a:fillRect/>
-          </a:stretch>
-        </p:blipFill>
-        <p:spPr>
-          <a:xfrm>
-            <a:off x="2185669" y="1769642"/>
-            <a:ext cx="7634049" cy="4351338"/>
-          </a:xfrm>
-        </p:spPr>
-      </p:pic>
-      <p:sp>
-        <p:nvSpPr>
-          <p:cNvPr id="3" name="TextBox 2">
-            <a:extLst>
-              <a:ext uri="{FF2B5EF4-FFF2-40B4-BE49-F238E27FC236}">
-                <a16:creationId xmlns:a16="http://schemas.microsoft.com/office/drawing/2014/main" id="{8EE926CA-894A-470F-4FD5-D63E0402AEFD}"/>
-              </a:ext>
-            </a:extLst>
-          </p:cNvPr>
-          <p:cNvSpPr txBox="1"/>
-          <p:nvPr/>
-        </p:nvSpPr>
-        <p:spPr>
-          <a:xfrm>
-            <a:off x="597159" y="5010539"/>
-            <a:ext cx="1681816" cy="1477328"/>
-          </a:xfrm>
-          <a:prstGeom prst="rect">
-            <a:avLst/>
-          </a:prstGeom>
-          <a:noFill/>
-        </p:spPr>
-        <p:txBody>
-          <a:bodyPr wrap="square" rtlCol="0">
-            <a:spAutoFit/>
-          </a:bodyPr>
-          <a:lstStyle/>
-          <a:p>
-            <a:r>
-              <a:rPr lang="en-US" sz="1000" dirty="0" err="1"/>
-              <a:t>Total_hits</a:t>
-            </a:r>
-            <a:endParaRPr lang="en-US" sz="1000" dirty="0"/>
-          </a:p>
-          <a:p>
-            <a:r>
-              <a:rPr lang="en-US" sz="1000" dirty="0" err="1"/>
-              <a:t>Book_hits</a:t>
-            </a:r>
-            <a:endParaRPr lang="en-US" sz="1000" dirty="0"/>
-          </a:p>
-          <a:p>
-            <a:r>
-              <a:rPr lang="en-US" sz="1000" dirty="0" err="1"/>
-              <a:t>Chapter_hits</a:t>
-            </a:r>
-            <a:endParaRPr lang="en-US" sz="1000" dirty="0"/>
-          </a:p>
-          <a:p>
-            <a:r>
-              <a:rPr lang="en-US" sz="1000" dirty="0" err="1"/>
-              <a:t>Verse_hits</a:t>
-            </a:r>
-            <a:endParaRPr lang="en-US" sz="1000" dirty="0"/>
-          </a:p>
-          <a:p>
-            <a:endParaRPr lang="en-US" sz="1000" dirty="0"/>
-          </a:p>
-          <a:p>
-            <a:r>
-              <a:rPr lang="en-US" sz="1000" dirty="0" err="1"/>
-              <a:t>Book_cnt</a:t>
-            </a:r>
-            <a:endParaRPr lang="en-US" sz="1000" dirty="0"/>
-          </a:p>
-          <a:p>
-            <a:r>
-              <a:rPr lang="en-US" sz="1000" dirty="0"/>
-              <a:t>Byte </a:t>
-            </a:r>
-            <a:r>
-              <a:rPr lang="en-US" sz="1000" dirty="0" err="1"/>
-              <a:t>Chapter_cnt</a:t>
-            </a:r>
-            <a:r>
-              <a:rPr lang="en-US" sz="1000" dirty="0"/>
-              <a:t>[66]</a:t>
-            </a:r>
-          </a:p>
-          <a:p>
-            <a:r>
-              <a:rPr lang="en-US" sz="1000" dirty="0"/>
-              <a:t>Byte </a:t>
-            </a:r>
-            <a:r>
-              <a:rPr lang="en-US" sz="1000" dirty="0" err="1"/>
-              <a:t>Chapter_hit_cnt</a:t>
-            </a:r>
-            <a:r>
-              <a:rPr lang="en-US" sz="1000" dirty="0"/>
-              <a:t>[66]</a:t>
-            </a:r>
-          </a:p>
-          <a:p>
-            <a:r>
-              <a:rPr lang="en-US" sz="1000" dirty="0"/>
-              <a:t>Map&lt;</a:t>
-            </a:r>
-            <a:r>
-              <a:rPr lang="en-US" sz="1000" dirty="0" err="1"/>
-              <a:t>book_num</a:t>
-            </a:r>
-            <a:r>
-              <a:rPr lang="en-US" sz="1000" dirty="0"/>
-              <a:t>, </a:t>
-            </a:r>
-            <a:r>
-              <a:rPr lang="en-US" sz="1000" dirty="0" err="1"/>
-              <a:t>TChapter</a:t>
-            </a:r>
-            <a:r>
-              <a:rPr lang="en-US" sz="1000" dirty="0"/>
-              <a:t>&gt;</a:t>
-            </a:r>
-          </a:p>
-        </p:txBody>
-      </p:sp>
-      <p:sp>
-        <p:nvSpPr>
-          <p:cNvPr id="4" name="TextBox 3">
-            <a:extLst>
-              <a:ext uri="{FF2B5EF4-FFF2-40B4-BE49-F238E27FC236}">
-                <a16:creationId xmlns:a16="http://schemas.microsoft.com/office/drawing/2014/main" id="{FF7C1C23-B8A6-B5EE-6EAF-EF2BFB7C3143}"/>
-              </a:ext>
-            </a:extLst>
-          </p:cNvPr>
-          <p:cNvSpPr txBox="1"/>
-          <p:nvPr/>
-        </p:nvSpPr>
-        <p:spPr>
-          <a:xfrm>
-            <a:off x="0" y="6487867"/>
-            <a:ext cx="5575041" cy="369332"/>
-          </a:xfrm>
-          <a:prstGeom prst="rect">
-            <a:avLst/>
-          </a:prstGeom>
-          <a:noFill/>
-        </p:spPr>
-        <p:txBody>
-          <a:bodyPr wrap="square" rtlCol="0">
-            <a:spAutoFit/>
-          </a:bodyPr>
-          <a:lstStyle/>
-          <a:p>
-            <a:r>
-              <a:rPr lang="en-US" dirty="0" err="1"/>
-              <a:t>TResults</a:t>
-            </a:r>
-            <a:r>
-              <a:rPr lang="en-US" dirty="0"/>
-              <a:t> maps to </a:t>
-            </a:r>
-            <a:r>
-              <a:rPr lang="en-US" dirty="0" err="1"/>
-              <a:t>Tfind</a:t>
-            </a:r>
-            <a:r>
-              <a:rPr lang="en-US" dirty="0"/>
-              <a:t> list</a:t>
-            </a:r>
-          </a:p>
-        </p:txBody>
-      </p:sp>
-      <p:sp>
-        <p:nvSpPr>
-          <p:cNvPr id="6" name="TextBox 5">
-            <a:extLst>
-              <a:ext uri="{FF2B5EF4-FFF2-40B4-BE49-F238E27FC236}">
-                <a16:creationId xmlns:a16="http://schemas.microsoft.com/office/drawing/2014/main" id="{9D698FBE-C36B-1D61-BBE5-BA02A5010AF1}"/>
-              </a:ext>
-            </a:extLst>
-          </p:cNvPr>
-          <p:cNvSpPr txBox="1"/>
-          <p:nvPr/>
-        </p:nvSpPr>
-        <p:spPr>
-          <a:xfrm>
-            <a:off x="3940628" y="6119758"/>
-            <a:ext cx="11361104" cy="369332"/>
-          </a:xfrm>
-          <a:prstGeom prst="rect">
-            <a:avLst/>
-          </a:prstGeom>
-          <a:noFill/>
-        </p:spPr>
-        <p:txBody>
-          <a:bodyPr wrap="square" rtlCol="0">
-            <a:spAutoFit/>
-          </a:bodyPr>
-          <a:lstStyle/>
-          <a:p>
-            <a:r>
-              <a:rPr lang="en-US" dirty="0" err="1"/>
-              <a:t>TFound</a:t>
-            </a:r>
-            <a:r>
-              <a:rPr lang="en-US" dirty="0"/>
-              <a:t> includes </a:t>
-            </a:r>
-            <a:r>
-              <a:rPr lang="en-US" dirty="0" err="1"/>
-              <a:t>TFind</a:t>
-            </a:r>
-            <a:r>
-              <a:rPr lang="en-US" dirty="0"/>
-              <a:t> (bidirectional) // </a:t>
-            </a:r>
-            <a:r>
-              <a:rPr lang="en-US" dirty="0" err="1"/>
-              <a:t>Tfind</a:t>
-            </a:r>
-            <a:r>
-              <a:rPr lang="en-US" dirty="0"/>
-              <a:t> includes </a:t>
-            </a:r>
-            <a:r>
-              <a:rPr lang="en-US" dirty="0" err="1"/>
-              <a:t>Tfragment</a:t>
-            </a:r>
-            <a:r>
-              <a:rPr lang="en-US" dirty="0"/>
-              <a:t> // </a:t>
-            </a:r>
-            <a:r>
-              <a:rPr lang="en-US" dirty="0" err="1"/>
-              <a:t>TFound</a:t>
-            </a:r>
-            <a:r>
-              <a:rPr lang="en-US" dirty="0"/>
-              <a:t> includes </a:t>
-            </a:r>
-            <a:r>
-              <a:rPr lang="en-US"/>
-              <a:t>matched features </a:t>
-            </a:r>
-            <a:r>
-              <a:rPr lang="en-US" dirty="0"/>
-              <a:t>from </a:t>
-            </a:r>
-            <a:r>
-              <a:rPr lang="en-US" dirty="0" err="1"/>
-              <a:t>matchany</a:t>
-            </a:r>
-            <a:endParaRPr lang="en-US" dirty="0"/>
-          </a:p>
-        </p:txBody>
-      </p:sp>
-      <p:sp>
-        <p:nvSpPr>
-          <p:cNvPr id="7" name="TextBox 6">
-            <a:extLst>
-              <a:ext uri="{FF2B5EF4-FFF2-40B4-BE49-F238E27FC236}">
-                <a16:creationId xmlns:a16="http://schemas.microsoft.com/office/drawing/2014/main" id="{255EDB83-EA61-5D11-530D-0914B9DE5F70}"/>
-              </a:ext>
-            </a:extLst>
-          </p:cNvPr>
-          <p:cNvSpPr txBox="1"/>
-          <p:nvPr/>
-        </p:nvSpPr>
-        <p:spPr>
-          <a:xfrm>
-            <a:off x="4169229" y="4561115"/>
-            <a:ext cx="3792893" cy="369332"/>
-          </a:xfrm>
-          <a:prstGeom prst="rect">
-            <a:avLst/>
-          </a:prstGeom>
-          <a:noFill/>
-        </p:spPr>
-        <p:txBody>
-          <a:bodyPr wrap="square" rtlCol="0">
-            <a:spAutoFit/>
-          </a:bodyPr>
-          <a:lstStyle/>
-          <a:p>
-            <a:r>
-              <a:rPr lang="en-US" dirty="0" err="1"/>
-              <a:t>TBook</a:t>
-            </a:r>
-            <a:r>
-              <a:rPr lang="en-US" dirty="0"/>
-              <a:t> maps to </a:t>
-            </a:r>
-            <a:r>
-              <a:rPr lang="en-US" dirty="0" err="1"/>
-              <a:t>TFound</a:t>
-            </a:r>
-            <a:r>
-              <a:rPr lang="en-US" dirty="0"/>
-              <a:t> and </a:t>
-            </a:r>
-            <a:r>
-              <a:rPr lang="en-US" dirty="0" err="1"/>
-              <a:t>TChapter</a:t>
-            </a:r>
-            <a:r>
-              <a:rPr lang="en-US" dirty="0"/>
-              <a:t> </a:t>
-            </a:r>
-          </a:p>
-        </p:txBody>
-      </p:sp>
-      <p:sp>
-        <p:nvSpPr>
-          <p:cNvPr id="8" name="TextBox 7">
-            <a:extLst>
-              <a:ext uri="{FF2B5EF4-FFF2-40B4-BE49-F238E27FC236}">
-                <a16:creationId xmlns:a16="http://schemas.microsoft.com/office/drawing/2014/main" id="{27CAF17B-6B26-E7AC-E038-FDAD87814EBF}"/>
-              </a:ext>
-            </a:extLst>
-          </p:cNvPr>
-          <p:cNvSpPr txBox="1"/>
-          <p:nvPr/>
-        </p:nvSpPr>
-        <p:spPr>
-          <a:xfrm>
-            <a:off x="3940629" y="6464855"/>
-            <a:ext cx="9439469" cy="369332"/>
-          </a:xfrm>
-          <a:prstGeom prst="rect">
-            <a:avLst/>
-          </a:prstGeom>
-          <a:noFill/>
-        </p:spPr>
-        <p:txBody>
-          <a:bodyPr wrap="square" rtlCol="0">
-            <a:spAutoFit/>
-          </a:bodyPr>
-          <a:lstStyle/>
-          <a:p>
-            <a:r>
-              <a:rPr lang="en-US" dirty="0" err="1"/>
-              <a:t>Tchapter</a:t>
-            </a:r>
-            <a:r>
-              <a:rPr lang="en-US" dirty="0"/>
-              <a:t> has list of </a:t>
-            </a:r>
-            <a:r>
-              <a:rPr lang="en-US" dirty="0" err="1"/>
-              <a:t>Chapter_hits</a:t>
-            </a:r>
-            <a:r>
-              <a:rPr lang="en-US" dirty="0"/>
-              <a:t> (one per chapter); and a map&lt;uint32, </a:t>
-            </a:r>
-            <a:r>
-              <a:rPr lang="en-US" dirty="0" err="1"/>
-              <a:t>Tfound</a:t>
-            </a:r>
-            <a:r>
-              <a:rPr lang="en-US" dirty="0"/>
-              <a:t>&gt;[] by chapter</a:t>
-            </a:r>
-          </a:p>
-        </p:txBody>
-      </p:sp>
-      <p:pic>
-        <p:nvPicPr>
-          <p:cNvPr id="9" name="Picture 8">
-            <a:extLst>
-              <a:ext uri="{FF2B5EF4-FFF2-40B4-BE49-F238E27FC236}">
-                <a16:creationId xmlns:a16="http://schemas.microsoft.com/office/drawing/2014/main" id="{B9D57505-709B-A9A1-C8B6-FB97170DE4C1}"/>
-              </a:ext>
-            </a:extLst>
-          </p:cNvPr>
-          <p:cNvPicPr>
-            <a:picLocks noChangeAspect="1"/>
-          </p:cNvPicPr>
-          <p:nvPr/>
-        </p:nvPicPr>
-        <p:blipFill>
-          <a:blip r:embed="rId3"/>
-          <a:stretch>
-            <a:fillRect/>
-          </a:stretch>
-        </p:blipFill>
-        <p:spPr>
-          <a:xfrm>
-            <a:off x="254668" y="1236346"/>
-            <a:ext cx="5627096" cy="493819"/>
-          </a:xfrm>
-          <a:prstGeom prst="rect">
-            <a:avLst/>
-          </a:prstGeom>
-        </p:spPr>
-      </p:pic>
-    </p:spTree>
-    <p:extLst>
-      <p:ext uri="{BB962C8B-B14F-4D97-AF65-F5344CB8AC3E}">
-        <p14:creationId xmlns:p14="http://schemas.microsoft.com/office/powerpoint/2010/main" val="3974386611"/>
-      </p:ext>
-    </p:extLst>
-  </p:cSld>
-  <p:clrMapOvr>
-    <a:masterClrMapping/>
-  </p:clrMapOvr>
-</p:sld>
-</file>
-
-<file path=ppt/slides/slide7.xml><?xml version="1.0" encoding="utf-8"?>
 <p:sld xmlns:a="http://schemas.openxmlformats.org/drawingml/2006/main" xmlns:r="http://schemas.openxmlformats.org/officeDocument/2006/relationships" xmlns:p="http://schemas.openxmlformats.org/presentationml/2006/main" show="0">
   <p:cSld>
     <p:spTree>
@@ -25864,7 +25388,7 @@
 </p:sld>
 </file>
 
-<file path=ppt/slides/slide8.xml><?xml version="1.0" encoding="utf-8"?>
+<file path=ppt/slides/slide7.xml><?xml version="1.0" encoding="utf-8"?>
 <p:sld xmlns:a="http://schemas.openxmlformats.org/drawingml/2006/main" xmlns:r="http://schemas.openxmlformats.org/officeDocument/2006/relationships" xmlns:p="http://schemas.openxmlformats.org/presentationml/2006/main" show="0">
   <p:cSld>
     <p:spTree>
@@ -32744,7 +32268,7 @@
 </p:sld>
 </file>
 
-<file path=ppt/slides/slide9.xml><?xml version="1.0" encoding="utf-8"?>
+<file path=ppt/slides/slide8.xml><?xml version="1.0" encoding="utf-8"?>
 <p:sld xmlns:a="http://schemas.openxmlformats.org/drawingml/2006/main" xmlns:r="http://schemas.openxmlformats.org/officeDocument/2006/relationships" xmlns:p="http://schemas.openxmlformats.org/presentationml/2006/main" show="0">
   <p:cSld>
     <p:spTree>

</xml_diff>

<commit_message>
Remove remaing references to FlatSharp and FlatBuffers in diagrams
</commit_message>
<xml_diff>
--- a/AVXSearch/AVX-Framework.pptx
+++ b/AVXSearch/AVX-Framework.pptx
@@ -266,7 +266,7 @@
           <a:p>
             <a:fld id="{00872148-4BA6-4738-8A8B-AEF1C14E9646}" type="datetimeFigureOut">
               <a:rPr lang="en-US" smtClean="0"/>
-              <a:t>11/28/2023</a:t>
+              <a:t>11/29/2023</a:t>
             </a:fld>
             <a:endParaRPr lang="en-US"/>
           </a:p>
@@ -464,7 +464,7 @@
           <a:p>
             <a:fld id="{00872148-4BA6-4738-8A8B-AEF1C14E9646}" type="datetimeFigureOut">
               <a:rPr lang="en-US" smtClean="0"/>
-              <a:t>11/28/2023</a:t>
+              <a:t>11/29/2023</a:t>
             </a:fld>
             <a:endParaRPr lang="en-US"/>
           </a:p>
@@ -672,7 +672,7 @@
           <a:p>
             <a:fld id="{00872148-4BA6-4738-8A8B-AEF1C14E9646}" type="datetimeFigureOut">
               <a:rPr lang="en-US" smtClean="0"/>
-              <a:t>11/28/2023</a:t>
+              <a:t>11/29/2023</a:t>
             </a:fld>
             <a:endParaRPr lang="en-US"/>
           </a:p>
@@ -870,7 +870,7 @@
           <a:p>
             <a:fld id="{00872148-4BA6-4738-8A8B-AEF1C14E9646}" type="datetimeFigureOut">
               <a:rPr lang="en-US" smtClean="0"/>
-              <a:t>11/28/2023</a:t>
+              <a:t>11/29/2023</a:t>
             </a:fld>
             <a:endParaRPr lang="en-US"/>
           </a:p>
@@ -1145,7 +1145,7 @@
           <a:p>
             <a:fld id="{00872148-4BA6-4738-8A8B-AEF1C14E9646}" type="datetimeFigureOut">
               <a:rPr lang="en-US" smtClean="0"/>
-              <a:t>11/28/2023</a:t>
+              <a:t>11/29/2023</a:t>
             </a:fld>
             <a:endParaRPr lang="en-US"/>
           </a:p>
@@ -1410,7 +1410,7 @@
           <a:p>
             <a:fld id="{00872148-4BA6-4738-8A8B-AEF1C14E9646}" type="datetimeFigureOut">
               <a:rPr lang="en-US" smtClean="0"/>
-              <a:t>11/28/2023</a:t>
+              <a:t>11/29/2023</a:t>
             </a:fld>
             <a:endParaRPr lang="en-US"/>
           </a:p>
@@ -1822,7 +1822,7 @@
           <a:p>
             <a:fld id="{00872148-4BA6-4738-8A8B-AEF1C14E9646}" type="datetimeFigureOut">
               <a:rPr lang="en-US" smtClean="0"/>
-              <a:t>11/28/2023</a:t>
+              <a:t>11/29/2023</a:t>
             </a:fld>
             <a:endParaRPr lang="en-US"/>
           </a:p>
@@ -1963,7 +1963,7 @@
           <a:p>
             <a:fld id="{00872148-4BA6-4738-8A8B-AEF1C14E9646}" type="datetimeFigureOut">
               <a:rPr lang="en-US" smtClean="0"/>
-              <a:t>11/28/2023</a:t>
+              <a:t>11/29/2023</a:t>
             </a:fld>
             <a:endParaRPr lang="en-US"/>
           </a:p>
@@ -2076,7 +2076,7 @@
           <a:p>
             <a:fld id="{00872148-4BA6-4738-8A8B-AEF1C14E9646}" type="datetimeFigureOut">
               <a:rPr lang="en-US" smtClean="0"/>
-              <a:t>11/28/2023</a:t>
+              <a:t>11/29/2023</a:t>
             </a:fld>
             <a:endParaRPr lang="en-US"/>
           </a:p>
@@ -2387,7 +2387,7 @@
           <a:p>
             <a:fld id="{00872148-4BA6-4738-8A8B-AEF1C14E9646}" type="datetimeFigureOut">
               <a:rPr lang="en-US" smtClean="0"/>
-              <a:t>11/28/2023</a:t>
+              <a:t>11/29/2023</a:t>
             </a:fld>
             <a:endParaRPr lang="en-US"/>
           </a:p>
@@ -2675,7 +2675,7 @@
           <a:p>
             <a:fld id="{00872148-4BA6-4738-8A8B-AEF1C14E9646}" type="datetimeFigureOut">
               <a:rPr lang="en-US" smtClean="0"/>
-              <a:t>11/28/2023</a:t>
+              <a:t>11/29/2023</a:t>
             </a:fld>
             <a:endParaRPr lang="en-US"/>
           </a:p>
@@ -2916,7 +2916,7 @@
           <a:p>
             <a:fld id="{00872148-4BA6-4738-8A8B-AEF1C14E9646}" type="datetimeFigureOut">
               <a:rPr lang="en-US" smtClean="0"/>
-              <a:t>11/28/2023</a:t>
+              <a:t>11/29/2023</a:t>
             </a:fld>
             <a:endParaRPr lang="en-US"/>
           </a:p>
@@ -4960,7 +4960,21 @@
             </a:r>
           </a:p>
           <a:p>
-            <a:pPr algn="ctr">
+            <a:pPr marL="0" marR="0" lvl="0" indent="0" algn="ctr" defTabSz="914400" rtl="0" eaLnBrk="1" fontAlgn="auto" latinLnBrk="0" hangingPunct="1">
+              <a:lnSpc>
+                <a:spcPct val="100000"/>
+              </a:lnSpc>
+              <a:spcBef>
+                <a:spcPts val="0"/>
+              </a:spcBef>
+              <a:spcAft>
+                <a:spcPts val="0"/>
+              </a:spcAft>
+              <a:buClrTx/>
+              <a:buSzTx/>
+              <a:buFontTx/>
+              <a:buNone/>
+              <a:tabLst/>
               <a:defRPr/>
             </a:pPr>
             <a:r>
@@ -4995,7 +5009,7 @@
                 <a:ea typeface="+mn-ea"/>
                 <a:cs typeface="+mn-cs"/>
               </a:rPr>
-              <a:t>FlatSharp</a:t>
+              <a:t>YamlDotNet</a:t>
             </a:r>
             <a:r>
               <a:rPr kumimoji="0" lang="en-US" sz="800" b="0" i="0" u="none" strike="noStrike" kern="1200" cap="none" spc="0" normalizeH="0" baseline="0" noProof="0" dirty="0">
@@ -5014,7 +5028,6 @@
               </a:rPr>
               <a:t>]</a:t>
             </a:r>
-            <a:endParaRPr lang="en-US" sz="800" dirty="0"/>
           </a:p>
           <a:p>
             <a:pPr algn="ctr"/>
@@ -7026,2376 +7039,6 @@
       </p:cxnSp>
       <p:grpSp>
         <p:nvGrpSpPr>
-          <p:cNvPr id="12" name="Group 11">
-            <a:extLst>
-              <a:ext uri="{FF2B5EF4-FFF2-40B4-BE49-F238E27FC236}">
-                <a16:creationId xmlns:a16="http://schemas.microsoft.com/office/drawing/2014/main" id="{FC1272BC-9F03-D22B-A6D0-8D94EE6669BD}"/>
-              </a:ext>
-            </a:extLst>
-          </p:cNvPr>
-          <p:cNvGrpSpPr/>
-          <p:nvPr/>
-        </p:nvGrpSpPr>
-        <p:grpSpPr>
-          <a:xfrm>
-            <a:off x="3137933" y="5515736"/>
-            <a:ext cx="1015341" cy="760389"/>
-            <a:chOff x="3752896" y="3615014"/>
-            <a:chExt cx="1498417" cy="1119069"/>
-          </a:xfrm>
-        </p:grpSpPr>
-        <p:grpSp>
-          <p:nvGrpSpPr>
-            <p:cNvPr id="18" name="Group 17">
-              <a:extLst>
-                <a:ext uri="{FF2B5EF4-FFF2-40B4-BE49-F238E27FC236}">
-                  <a16:creationId xmlns:a16="http://schemas.microsoft.com/office/drawing/2014/main" id="{2EC2142B-24A8-959C-4AF5-18DCE94BDFD3}"/>
-                </a:ext>
-              </a:extLst>
-            </p:cNvPr>
-            <p:cNvGrpSpPr/>
-            <p:nvPr/>
-          </p:nvGrpSpPr>
-          <p:grpSpPr>
-            <a:xfrm>
-              <a:off x="4266872" y="3615014"/>
-              <a:ext cx="488454" cy="707199"/>
-              <a:chOff x="1272930" y="2721801"/>
-              <a:chExt cx="488454" cy="707199"/>
-            </a:xfrm>
-          </p:grpSpPr>
-          <p:grpSp>
-            <p:nvGrpSpPr>
-              <p:cNvPr id="38" name="Group 37">
-                <a:extLst>
-                  <a:ext uri="{FF2B5EF4-FFF2-40B4-BE49-F238E27FC236}">
-                    <a16:creationId xmlns:a16="http://schemas.microsoft.com/office/drawing/2014/main" id="{646C29AB-E9E2-BD89-1E31-6DF6AF475BC0}"/>
-                  </a:ext>
-                </a:extLst>
-              </p:cNvPr>
-              <p:cNvGrpSpPr/>
-              <p:nvPr/>
-            </p:nvGrpSpPr>
-            <p:grpSpPr>
-              <a:xfrm>
-                <a:off x="1272930" y="2721801"/>
-                <a:ext cx="488454" cy="707199"/>
-                <a:chOff x="2082555" y="2721801"/>
-                <a:chExt cx="488454" cy="707199"/>
-              </a:xfrm>
-            </p:grpSpPr>
-            <p:sp>
-              <p:nvSpPr>
-                <p:cNvPr id="45" name="Rectangle 44">
-                  <a:extLst>
-                    <a:ext uri="{FF2B5EF4-FFF2-40B4-BE49-F238E27FC236}">
-                      <a16:creationId xmlns:a16="http://schemas.microsoft.com/office/drawing/2014/main" id="{5E2E7C27-571D-0BB3-6106-C4B2C7335261}"/>
-                    </a:ext>
-                  </a:extLst>
-                </p:cNvPr>
-                <p:cNvSpPr/>
-                <p:nvPr/>
-              </p:nvSpPr>
-              <p:spPr>
-                <a:xfrm>
-                  <a:off x="2107871" y="2796639"/>
-                  <a:ext cx="463138" cy="632361"/>
-                </a:xfrm>
-                <a:prstGeom prst="rect">
-                  <a:avLst/>
-                </a:prstGeom>
-                <a:solidFill>
-                  <a:schemeClr val="accent1">
-                    <a:lumMod val="60000"/>
-                    <a:lumOff val="40000"/>
-                  </a:schemeClr>
-                </a:solidFill>
-              </p:spPr>
-              <p:style>
-                <a:lnRef idx="2">
-                  <a:schemeClr val="accent1">
-                    <a:shade val="50000"/>
-                  </a:schemeClr>
-                </a:lnRef>
-                <a:fillRef idx="1">
-                  <a:schemeClr val="accent1"/>
-                </a:fillRef>
-                <a:effectRef idx="0">
-                  <a:schemeClr val="accent1"/>
-                </a:effectRef>
-                <a:fontRef idx="minor">
-                  <a:schemeClr val="lt1"/>
-                </a:fontRef>
-              </p:style>
-              <p:txBody>
-                <a:bodyPr rtlCol="0" anchor="ctr"/>
-                <a:lstStyle/>
-                <a:p>
-                  <a:pPr algn="ctr"/>
-                  <a:endParaRPr lang="en-US"/>
-                </a:p>
-              </p:txBody>
-            </p:sp>
-            <p:sp>
-              <p:nvSpPr>
-                <p:cNvPr id="46" name="Isosceles Triangle 45">
-                  <a:extLst>
-                    <a:ext uri="{FF2B5EF4-FFF2-40B4-BE49-F238E27FC236}">
-                      <a16:creationId xmlns:a16="http://schemas.microsoft.com/office/drawing/2014/main" id="{E6E56AAB-793F-2B50-585E-2B5471CA0403}"/>
-                    </a:ext>
-                  </a:extLst>
-                </p:cNvPr>
-                <p:cNvSpPr/>
-                <p:nvPr/>
-              </p:nvSpPr>
-              <p:spPr>
-                <a:xfrm rot="7947381" flipV="1">
-                  <a:off x="2035459" y="2768897"/>
-                  <a:ext cx="201880" cy="107688"/>
-                </a:xfrm>
-                <a:prstGeom prst="triangle">
-                  <a:avLst>
-                    <a:gd name="adj" fmla="val 50415"/>
-                  </a:avLst>
-                </a:prstGeom>
-                <a:solidFill>
-                  <a:schemeClr val="bg1"/>
-                </a:solidFill>
-                <a:ln>
-                  <a:solidFill>
-                    <a:schemeClr val="bg1"/>
-                  </a:solidFill>
-                </a:ln>
-              </p:spPr>
-              <p:style>
-                <a:lnRef idx="2">
-                  <a:schemeClr val="accent1">
-                    <a:shade val="50000"/>
-                  </a:schemeClr>
-                </a:lnRef>
-                <a:fillRef idx="1">
-                  <a:schemeClr val="accent1"/>
-                </a:fillRef>
-                <a:effectRef idx="0">
-                  <a:schemeClr val="accent1"/>
-                </a:effectRef>
-                <a:fontRef idx="minor">
-                  <a:schemeClr val="lt1"/>
-                </a:fontRef>
-              </p:style>
-              <p:txBody>
-                <a:bodyPr rtlCol="0" anchor="ctr"/>
-                <a:lstStyle/>
-                <a:p>
-                  <a:pPr algn="ctr"/>
-                  <a:endParaRPr lang="en-US"/>
-                </a:p>
-              </p:txBody>
-            </p:sp>
-            <p:sp>
-              <p:nvSpPr>
-                <p:cNvPr id="47" name="Isosceles Triangle 46">
-                  <a:extLst>
-                    <a:ext uri="{FF2B5EF4-FFF2-40B4-BE49-F238E27FC236}">
-                      <a16:creationId xmlns:a16="http://schemas.microsoft.com/office/drawing/2014/main" id="{289DB0A6-A62A-5413-185C-B5523DFC0FB1}"/>
-                    </a:ext>
-                  </a:extLst>
-                </p:cNvPr>
-                <p:cNvSpPr/>
-                <p:nvPr/>
-              </p:nvSpPr>
-              <p:spPr>
-                <a:xfrm rot="18762502" flipV="1">
-                  <a:off x="2123370" y="2859537"/>
-                  <a:ext cx="201880" cy="107688"/>
-                </a:xfrm>
-                <a:prstGeom prst="triangle">
-                  <a:avLst>
-                    <a:gd name="adj" fmla="val 50415"/>
-                  </a:avLst>
-                </a:prstGeom>
-                <a:solidFill>
-                  <a:schemeClr val="bg1"/>
-                </a:solidFill>
-                <a:ln>
-                  <a:solidFill>
-                    <a:schemeClr val="accent1"/>
-                  </a:solidFill>
-                </a:ln>
-              </p:spPr>
-              <p:style>
-                <a:lnRef idx="2">
-                  <a:schemeClr val="accent1">
-                    <a:shade val="50000"/>
-                  </a:schemeClr>
-                </a:lnRef>
-                <a:fillRef idx="1">
-                  <a:schemeClr val="accent1"/>
-                </a:fillRef>
-                <a:effectRef idx="0">
-                  <a:schemeClr val="accent1"/>
-                </a:effectRef>
-                <a:fontRef idx="minor">
-                  <a:schemeClr val="lt1"/>
-                </a:fontRef>
-              </p:style>
-              <p:txBody>
-                <a:bodyPr rtlCol="0" anchor="ctr"/>
-                <a:lstStyle/>
-                <a:p>
-                  <a:pPr algn="ctr"/>
-                  <a:endParaRPr lang="en-US"/>
-                </a:p>
-              </p:txBody>
-            </p:sp>
-          </p:grpSp>
-          <p:grpSp>
-            <p:nvGrpSpPr>
-              <p:cNvPr id="39" name="Group 38">
-                <a:extLst>
-                  <a:ext uri="{FF2B5EF4-FFF2-40B4-BE49-F238E27FC236}">
-                    <a16:creationId xmlns:a16="http://schemas.microsoft.com/office/drawing/2014/main" id="{E0256C42-D3A0-1707-509D-0951C735BF97}"/>
-                  </a:ext>
-                </a:extLst>
-              </p:cNvPr>
-              <p:cNvGrpSpPr/>
-              <p:nvPr/>
-            </p:nvGrpSpPr>
-            <p:grpSpPr>
-              <a:xfrm>
-                <a:off x="1371411" y="3024074"/>
-                <a:ext cx="326420" cy="325909"/>
-                <a:chOff x="1371411" y="3024074"/>
-                <a:chExt cx="342900" cy="325909"/>
-              </a:xfrm>
-            </p:grpSpPr>
-            <p:cxnSp>
-              <p:nvCxnSpPr>
-                <p:cNvPr id="40" name="Straight Connector 39">
-                  <a:extLst>
-                    <a:ext uri="{FF2B5EF4-FFF2-40B4-BE49-F238E27FC236}">
-                      <a16:creationId xmlns:a16="http://schemas.microsoft.com/office/drawing/2014/main" id="{BB017987-B46B-494F-2709-7ECC91A25A69}"/>
-                    </a:ext>
-                  </a:extLst>
-                </p:cNvPr>
-                <p:cNvCxnSpPr>
-                  <a:cxnSpLocks/>
-                </p:cNvCxnSpPr>
-                <p:nvPr/>
-              </p:nvCxnSpPr>
-              <p:spPr>
-                <a:xfrm>
-                  <a:off x="1371411" y="3024074"/>
-                  <a:ext cx="342900" cy="0"/>
-                </a:xfrm>
-                <a:prstGeom prst="line">
-                  <a:avLst/>
-                </a:prstGeom>
-                <a:ln>
-                  <a:solidFill>
-                    <a:schemeClr val="bg1">
-                      <a:lumMod val="95000"/>
-                    </a:schemeClr>
-                  </a:solidFill>
-                </a:ln>
-              </p:spPr>
-              <p:style>
-                <a:lnRef idx="1">
-                  <a:schemeClr val="accent1"/>
-                </a:lnRef>
-                <a:fillRef idx="0">
-                  <a:schemeClr val="accent1"/>
-                </a:fillRef>
-                <a:effectRef idx="0">
-                  <a:schemeClr val="accent1"/>
-                </a:effectRef>
-                <a:fontRef idx="minor">
-                  <a:schemeClr val="tx1"/>
-                </a:fontRef>
-              </p:style>
-            </p:cxnSp>
-            <p:cxnSp>
-              <p:nvCxnSpPr>
-                <p:cNvPr id="41" name="Straight Connector 40">
-                  <a:extLst>
-                    <a:ext uri="{FF2B5EF4-FFF2-40B4-BE49-F238E27FC236}">
-                      <a16:creationId xmlns:a16="http://schemas.microsoft.com/office/drawing/2014/main" id="{4E4DA3B5-C7C4-C7AD-C8A3-22C9373A077E}"/>
-                    </a:ext>
-                  </a:extLst>
-                </p:cNvPr>
-                <p:cNvCxnSpPr>
-                  <a:cxnSpLocks/>
-                </p:cNvCxnSpPr>
-                <p:nvPr/>
-              </p:nvCxnSpPr>
-              <p:spPr>
-                <a:xfrm>
-                  <a:off x="1371411" y="3105551"/>
-                  <a:ext cx="342900" cy="0"/>
-                </a:xfrm>
-                <a:prstGeom prst="line">
-                  <a:avLst/>
-                </a:prstGeom>
-                <a:ln>
-                  <a:solidFill>
-                    <a:schemeClr val="bg1">
-                      <a:lumMod val="95000"/>
-                    </a:schemeClr>
-                  </a:solidFill>
-                </a:ln>
-              </p:spPr>
-              <p:style>
-                <a:lnRef idx="1">
-                  <a:schemeClr val="accent1"/>
-                </a:lnRef>
-                <a:fillRef idx="0">
-                  <a:schemeClr val="accent1"/>
-                </a:fillRef>
-                <a:effectRef idx="0">
-                  <a:schemeClr val="accent1"/>
-                </a:effectRef>
-                <a:fontRef idx="minor">
-                  <a:schemeClr val="tx1"/>
-                </a:fontRef>
-              </p:style>
-            </p:cxnSp>
-            <p:cxnSp>
-              <p:nvCxnSpPr>
-                <p:cNvPr id="42" name="Straight Connector 41">
-                  <a:extLst>
-                    <a:ext uri="{FF2B5EF4-FFF2-40B4-BE49-F238E27FC236}">
-                      <a16:creationId xmlns:a16="http://schemas.microsoft.com/office/drawing/2014/main" id="{C7FA5655-09B6-8EAC-A9EB-8A0222E06F37}"/>
-                    </a:ext>
-                  </a:extLst>
-                </p:cNvPr>
-                <p:cNvCxnSpPr>
-                  <a:cxnSpLocks/>
-                </p:cNvCxnSpPr>
-                <p:nvPr/>
-              </p:nvCxnSpPr>
-              <p:spPr>
-                <a:xfrm>
-                  <a:off x="1371411" y="3187028"/>
-                  <a:ext cx="342900" cy="0"/>
-                </a:xfrm>
-                <a:prstGeom prst="line">
-                  <a:avLst/>
-                </a:prstGeom>
-                <a:ln>
-                  <a:solidFill>
-                    <a:schemeClr val="bg1">
-                      <a:lumMod val="95000"/>
-                    </a:schemeClr>
-                  </a:solidFill>
-                </a:ln>
-              </p:spPr>
-              <p:style>
-                <a:lnRef idx="1">
-                  <a:schemeClr val="accent1"/>
-                </a:lnRef>
-                <a:fillRef idx="0">
-                  <a:schemeClr val="accent1"/>
-                </a:fillRef>
-                <a:effectRef idx="0">
-                  <a:schemeClr val="accent1"/>
-                </a:effectRef>
-                <a:fontRef idx="minor">
-                  <a:schemeClr val="tx1"/>
-                </a:fontRef>
-              </p:style>
-            </p:cxnSp>
-            <p:cxnSp>
-              <p:nvCxnSpPr>
-                <p:cNvPr id="43" name="Straight Connector 42">
-                  <a:extLst>
-                    <a:ext uri="{FF2B5EF4-FFF2-40B4-BE49-F238E27FC236}">
-                      <a16:creationId xmlns:a16="http://schemas.microsoft.com/office/drawing/2014/main" id="{33476F0C-6244-617B-AAEE-F8592073A694}"/>
-                    </a:ext>
-                  </a:extLst>
-                </p:cNvPr>
-                <p:cNvCxnSpPr>
-                  <a:cxnSpLocks/>
-                </p:cNvCxnSpPr>
-                <p:nvPr/>
-              </p:nvCxnSpPr>
-              <p:spPr>
-                <a:xfrm>
-                  <a:off x="1371411" y="3268505"/>
-                  <a:ext cx="342900" cy="0"/>
-                </a:xfrm>
-                <a:prstGeom prst="line">
-                  <a:avLst/>
-                </a:prstGeom>
-                <a:ln>
-                  <a:solidFill>
-                    <a:schemeClr val="bg1">
-                      <a:lumMod val="95000"/>
-                    </a:schemeClr>
-                  </a:solidFill>
-                </a:ln>
-              </p:spPr>
-              <p:style>
-                <a:lnRef idx="1">
-                  <a:schemeClr val="accent1"/>
-                </a:lnRef>
-                <a:fillRef idx="0">
-                  <a:schemeClr val="accent1"/>
-                </a:fillRef>
-                <a:effectRef idx="0">
-                  <a:schemeClr val="accent1"/>
-                </a:effectRef>
-                <a:fontRef idx="minor">
-                  <a:schemeClr val="tx1"/>
-                </a:fontRef>
-              </p:style>
-            </p:cxnSp>
-            <p:cxnSp>
-              <p:nvCxnSpPr>
-                <p:cNvPr id="44" name="Straight Connector 43">
-                  <a:extLst>
-                    <a:ext uri="{FF2B5EF4-FFF2-40B4-BE49-F238E27FC236}">
-                      <a16:creationId xmlns:a16="http://schemas.microsoft.com/office/drawing/2014/main" id="{A601BE90-2F34-FF71-695C-CCC8B940C296}"/>
-                    </a:ext>
-                  </a:extLst>
-                </p:cNvPr>
-                <p:cNvCxnSpPr>
-                  <a:cxnSpLocks/>
-                </p:cNvCxnSpPr>
-                <p:nvPr/>
-              </p:nvCxnSpPr>
-              <p:spPr>
-                <a:xfrm>
-                  <a:off x="1371411" y="3349983"/>
-                  <a:ext cx="342900" cy="0"/>
-                </a:xfrm>
-                <a:prstGeom prst="line">
-                  <a:avLst/>
-                </a:prstGeom>
-                <a:ln>
-                  <a:solidFill>
-                    <a:schemeClr val="bg1">
-                      <a:lumMod val="95000"/>
-                    </a:schemeClr>
-                  </a:solidFill>
-                </a:ln>
-              </p:spPr>
-              <p:style>
-                <a:lnRef idx="1">
-                  <a:schemeClr val="accent1"/>
-                </a:lnRef>
-                <a:fillRef idx="0">
-                  <a:schemeClr val="accent1"/>
-                </a:fillRef>
-                <a:effectRef idx="0">
-                  <a:schemeClr val="accent1"/>
-                </a:effectRef>
-                <a:fontRef idx="minor">
-                  <a:schemeClr val="tx1"/>
-                </a:fontRef>
-              </p:style>
-            </p:cxnSp>
-          </p:grpSp>
-        </p:grpSp>
-        <p:sp>
-          <p:nvSpPr>
-            <p:cNvPr id="36" name="TextBox 35">
-              <a:extLst>
-                <a:ext uri="{FF2B5EF4-FFF2-40B4-BE49-F238E27FC236}">
-                  <a16:creationId xmlns:a16="http://schemas.microsoft.com/office/drawing/2014/main" id="{FF3C256B-D56A-0AE3-6FB4-42E060F2316B}"/>
-                </a:ext>
-              </a:extLst>
-            </p:cNvPr>
-            <p:cNvSpPr txBox="1"/>
-            <p:nvPr/>
-          </p:nvSpPr>
-          <p:spPr>
-            <a:xfrm>
-              <a:off x="3752896" y="4281126"/>
-              <a:ext cx="1498417" cy="452957"/>
-            </a:xfrm>
-            <a:prstGeom prst="rect">
-              <a:avLst/>
-            </a:prstGeom>
-            <a:noFill/>
-          </p:spPr>
-          <p:txBody>
-            <a:bodyPr wrap="square" rtlCol="0">
-              <a:spAutoFit/>
-            </a:bodyPr>
-            <a:lstStyle/>
-            <a:p>
-              <a:pPr algn="ctr"/>
-              <a:r>
-                <a:rPr lang="en-US" sz="800" dirty="0" err="1">
-                  <a:solidFill>
-                    <a:schemeClr val="bg1">
-                      <a:lumMod val="50000"/>
-                    </a:schemeClr>
-                  </a:solidFill>
-                </a:rPr>
-                <a:t>blueprint_blue.fbs</a:t>
-              </a:r>
-              <a:endParaRPr lang="en-US" sz="800" dirty="0">
-                <a:solidFill>
-                  <a:schemeClr val="bg1">
-                    <a:lumMod val="50000"/>
-                  </a:schemeClr>
-                </a:solidFill>
-              </a:endParaRPr>
-            </a:p>
-            <a:p>
-              <a:pPr algn="ctr"/>
-              <a:r>
-                <a:rPr lang="en-US" sz="600" dirty="0">
-                  <a:solidFill>
-                    <a:schemeClr val="bg1">
-                      <a:lumMod val="50000"/>
-                    </a:schemeClr>
-                  </a:solidFill>
-                </a:rPr>
-                <a:t>&lt;&lt; </a:t>
-              </a:r>
-              <a:r>
-                <a:rPr lang="en-US" sz="600" dirty="0" err="1">
-                  <a:solidFill>
-                    <a:schemeClr val="bg1">
-                      <a:lumMod val="50000"/>
-                    </a:schemeClr>
-                  </a:solidFill>
-                </a:rPr>
-                <a:t>flattbuffers</a:t>
-              </a:r>
-              <a:r>
-                <a:rPr lang="en-US" sz="600" dirty="0">
-                  <a:solidFill>
-                    <a:schemeClr val="bg1">
-                      <a:lumMod val="50000"/>
-                    </a:schemeClr>
-                  </a:solidFill>
-                </a:rPr>
-                <a:t>  schema &gt;&gt;</a:t>
-              </a:r>
-            </a:p>
-          </p:txBody>
-        </p:sp>
-      </p:grpSp>
-      <p:cxnSp>
-        <p:nvCxnSpPr>
-          <p:cNvPr id="48" name="Straight Arrow Connector 47">
-            <a:extLst>
-              <a:ext uri="{FF2B5EF4-FFF2-40B4-BE49-F238E27FC236}">
-                <a16:creationId xmlns:a16="http://schemas.microsoft.com/office/drawing/2014/main" id="{622E801C-9832-AC8A-8220-E7970DE5F27D}"/>
-              </a:ext>
-            </a:extLst>
-          </p:cNvPr>
-          <p:cNvCxnSpPr>
-            <a:cxnSpLocks/>
-          </p:cNvCxnSpPr>
-          <p:nvPr/>
-        </p:nvCxnSpPr>
-        <p:spPr>
-          <a:xfrm>
-            <a:off x="3660275" y="5389478"/>
-            <a:ext cx="4216" cy="177538"/>
-          </a:xfrm>
-          <a:prstGeom prst="straightConnector1">
-            <a:avLst/>
-          </a:prstGeom>
-          <a:ln>
-            <a:solidFill>
-              <a:schemeClr val="tx1">
-                <a:lumMod val="50000"/>
-                <a:lumOff val="50000"/>
-              </a:schemeClr>
-            </a:solidFill>
-            <a:tailEnd type="triangle"/>
-          </a:ln>
-        </p:spPr>
-        <p:style>
-          <a:lnRef idx="1">
-            <a:schemeClr val="accent1"/>
-          </a:lnRef>
-          <a:fillRef idx="0">
-            <a:schemeClr val="accent1"/>
-          </a:fillRef>
-          <a:effectRef idx="0">
-            <a:schemeClr val="accent1"/>
-          </a:effectRef>
-          <a:fontRef idx="minor">
-            <a:schemeClr val="tx1"/>
-          </a:fontRef>
-        </p:style>
-      </p:cxnSp>
-      <p:grpSp>
-        <p:nvGrpSpPr>
-          <p:cNvPr id="49" name="Group 48">
-            <a:extLst>
-              <a:ext uri="{FF2B5EF4-FFF2-40B4-BE49-F238E27FC236}">
-                <a16:creationId xmlns:a16="http://schemas.microsoft.com/office/drawing/2014/main" id="{92AC8B2F-31AF-0912-6079-A59934C17BAB}"/>
-              </a:ext>
-            </a:extLst>
-          </p:cNvPr>
-          <p:cNvGrpSpPr/>
-          <p:nvPr/>
-        </p:nvGrpSpPr>
-        <p:grpSpPr>
-          <a:xfrm>
-            <a:off x="923103" y="1318765"/>
-            <a:ext cx="987891" cy="760389"/>
-            <a:chOff x="3793406" y="3615014"/>
-            <a:chExt cx="1457907" cy="1119069"/>
-          </a:xfrm>
-        </p:grpSpPr>
-        <p:grpSp>
-          <p:nvGrpSpPr>
-            <p:cNvPr id="50" name="Group 49">
-              <a:extLst>
-                <a:ext uri="{FF2B5EF4-FFF2-40B4-BE49-F238E27FC236}">
-                  <a16:creationId xmlns:a16="http://schemas.microsoft.com/office/drawing/2014/main" id="{38B9B1F1-78A9-AE67-1397-BB94FC155D95}"/>
-                </a:ext>
-              </a:extLst>
-            </p:cNvPr>
-            <p:cNvGrpSpPr/>
-            <p:nvPr/>
-          </p:nvGrpSpPr>
-          <p:grpSpPr>
-            <a:xfrm>
-              <a:off x="4266872" y="3615014"/>
-              <a:ext cx="488454" cy="707199"/>
-              <a:chOff x="1272930" y="2721801"/>
-              <a:chExt cx="488454" cy="707199"/>
-            </a:xfrm>
-          </p:grpSpPr>
-          <p:grpSp>
-            <p:nvGrpSpPr>
-              <p:cNvPr id="52" name="Group 51">
-                <a:extLst>
-                  <a:ext uri="{FF2B5EF4-FFF2-40B4-BE49-F238E27FC236}">
-                    <a16:creationId xmlns:a16="http://schemas.microsoft.com/office/drawing/2014/main" id="{C4ADBF62-EDEA-D82F-FB0B-0769DF7B996D}"/>
-                  </a:ext>
-                </a:extLst>
-              </p:cNvPr>
-              <p:cNvGrpSpPr/>
-              <p:nvPr/>
-            </p:nvGrpSpPr>
-            <p:grpSpPr>
-              <a:xfrm>
-                <a:off x="1272930" y="2721801"/>
-                <a:ext cx="488454" cy="707199"/>
-                <a:chOff x="2082555" y="2721801"/>
-                <a:chExt cx="488454" cy="707199"/>
-              </a:xfrm>
-            </p:grpSpPr>
-            <p:sp>
-              <p:nvSpPr>
-                <p:cNvPr id="59" name="Rectangle 58">
-                  <a:extLst>
-                    <a:ext uri="{FF2B5EF4-FFF2-40B4-BE49-F238E27FC236}">
-                      <a16:creationId xmlns:a16="http://schemas.microsoft.com/office/drawing/2014/main" id="{165987D3-2D34-8051-1AF8-178D1A9E44D3}"/>
-                    </a:ext>
-                  </a:extLst>
-                </p:cNvPr>
-                <p:cNvSpPr/>
-                <p:nvPr/>
-              </p:nvSpPr>
-              <p:spPr>
-                <a:xfrm>
-                  <a:off x="2107871" y="2796639"/>
-                  <a:ext cx="463138" cy="632361"/>
-                </a:xfrm>
-                <a:prstGeom prst="rect">
-                  <a:avLst/>
-                </a:prstGeom>
-                <a:solidFill>
-                  <a:schemeClr val="accent1">
-                    <a:lumMod val="60000"/>
-                    <a:lumOff val="40000"/>
-                  </a:schemeClr>
-                </a:solidFill>
-              </p:spPr>
-              <p:style>
-                <a:lnRef idx="2">
-                  <a:schemeClr val="accent1">
-                    <a:shade val="50000"/>
-                  </a:schemeClr>
-                </a:lnRef>
-                <a:fillRef idx="1">
-                  <a:schemeClr val="accent1"/>
-                </a:fillRef>
-                <a:effectRef idx="0">
-                  <a:schemeClr val="accent1"/>
-                </a:effectRef>
-                <a:fontRef idx="minor">
-                  <a:schemeClr val="lt1"/>
-                </a:fontRef>
-              </p:style>
-              <p:txBody>
-                <a:bodyPr rtlCol="0" anchor="ctr"/>
-                <a:lstStyle/>
-                <a:p>
-                  <a:pPr algn="ctr"/>
-                  <a:endParaRPr lang="en-US"/>
-                </a:p>
-              </p:txBody>
-            </p:sp>
-            <p:sp>
-              <p:nvSpPr>
-                <p:cNvPr id="60" name="Isosceles Triangle 59">
-                  <a:extLst>
-                    <a:ext uri="{FF2B5EF4-FFF2-40B4-BE49-F238E27FC236}">
-                      <a16:creationId xmlns:a16="http://schemas.microsoft.com/office/drawing/2014/main" id="{0FCBF5C0-3EAD-CDAA-E5D5-562F93897E74}"/>
-                    </a:ext>
-                  </a:extLst>
-                </p:cNvPr>
-                <p:cNvSpPr/>
-                <p:nvPr/>
-              </p:nvSpPr>
-              <p:spPr>
-                <a:xfrm rot="7947381" flipV="1">
-                  <a:off x="2035459" y="2768897"/>
-                  <a:ext cx="201880" cy="107688"/>
-                </a:xfrm>
-                <a:prstGeom prst="triangle">
-                  <a:avLst>
-                    <a:gd name="adj" fmla="val 50415"/>
-                  </a:avLst>
-                </a:prstGeom>
-                <a:solidFill>
-                  <a:schemeClr val="bg1"/>
-                </a:solidFill>
-                <a:ln>
-                  <a:solidFill>
-                    <a:schemeClr val="bg1"/>
-                  </a:solidFill>
-                </a:ln>
-              </p:spPr>
-              <p:style>
-                <a:lnRef idx="2">
-                  <a:schemeClr val="accent1">
-                    <a:shade val="50000"/>
-                  </a:schemeClr>
-                </a:lnRef>
-                <a:fillRef idx="1">
-                  <a:schemeClr val="accent1"/>
-                </a:fillRef>
-                <a:effectRef idx="0">
-                  <a:schemeClr val="accent1"/>
-                </a:effectRef>
-                <a:fontRef idx="minor">
-                  <a:schemeClr val="lt1"/>
-                </a:fontRef>
-              </p:style>
-              <p:txBody>
-                <a:bodyPr rtlCol="0" anchor="ctr"/>
-                <a:lstStyle/>
-                <a:p>
-                  <a:pPr algn="ctr"/>
-                  <a:endParaRPr lang="en-US"/>
-                </a:p>
-              </p:txBody>
-            </p:sp>
-            <p:sp>
-              <p:nvSpPr>
-                <p:cNvPr id="61" name="Isosceles Triangle 60">
-                  <a:extLst>
-                    <a:ext uri="{FF2B5EF4-FFF2-40B4-BE49-F238E27FC236}">
-                      <a16:creationId xmlns:a16="http://schemas.microsoft.com/office/drawing/2014/main" id="{354A2A51-6C0A-F74A-89EA-E95C72ADDAD2}"/>
-                    </a:ext>
-                  </a:extLst>
-                </p:cNvPr>
-                <p:cNvSpPr/>
-                <p:nvPr/>
-              </p:nvSpPr>
-              <p:spPr>
-                <a:xfrm rot="18762502" flipV="1">
-                  <a:off x="2123370" y="2859537"/>
-                  <a:ext cx="201880" cy="107688"/>
-                </a:xfrm>
-                <a:prstGeom prst="triangle">
-                  <a:avLst>
-                    <a:gd name="adj" fmla="val 50415"/>
-                  </a:avLst>
-                </a:prstGeom>
-                <a:solidFill>
-                  <a:schemeClr val="bg1"/>
-                </a:solidFill>
-                <a:ln>
-                  <a:solidFill>
-                    <a:schemeClr val="accent1"/>
-                  </a:solidFill>
-                </a:ln>
-              </p:spPr>
-              <p:style>
-                <a:lnRef idx="2">
-                  <a:schemeClr val="accent1">
-                    <a:shade val="50000"/>
-                  </a:schemeClr>
-                </a:lnRef>
-                <a:fillRef idx="1">
-                  <a:schemeClr val="accent1"/>
-                </a:fillRef>
-                <a:effectRef idx="0">
-                  <a:schemeClr val="accent1"/>
-                </a:effectRef>
-                <a:fontRef idx="minor">
-                  <a:schemeClr val="lt1"/>
-                </a:fontRef>
-              </p:style>
-              <p:txBody>
-                <a:bodyPr rtlCol="0" anchor="ctr"/>
-                <a:lstStyle/>
-                <a:p>
-                  <a:pPr algn="ctr"/>
-                  <a:endParaRPr lang="en-US"/>
-                </a:p>
-              </p:txBody>
-            </p:sp>
-          </p:grpSp>
-          <p:grpSp>
-            <p:nvGrpSpPr>
-              <p:cNvPr id="53" name="Group 52">
-                <a:extLst>
-                  <a:ext uri="{FF2B5EF4-FFF2-40B4-BE49-F238E27FC236}">
-                    <a16:creationId xmlns:a16="http://schemas.microsoft.com/office/drawing/2014/main" id="{E6A88357-EEB3-40AE-58DD-9BA9662F41B1}"/>
-                  </a:ext>
-                </a:extLst>
-              </p:cNvPr>
-              <p:cNvGrpSpPr/>
-              <p:nvPr/>
-            </p:nvGrpSpPr>
-            <p:grpSpPr>
-              <a:xfrm>
-                <a:off x="1371411" y="3024074"/>
-                <a:ext cx="326420" cy="325909"/>
-                <a:chOff x="1371411" y="3024074"/>
-                <a:chExt cx="342900" cy="325909"/>
-              </a:xfrm>
-            </p:grpSpPr>
-            <p:cxnSp>
-              <p:nvCxnSpPr>
-                <p:cNvPr id="54" name="Straight Connector 53">
-                  <a:extLst>
-                    <a:ext uri="{FF2B5EF4-FFF2-40B4-BE49-F238E27FC236}">
-                      <a16:creationId xmlns:a16="http://schemas.microsoft.com/office/drawing/2014/main" id="{E70BA9D1-8BB2-5DCB-5DA8-D88E515FA162}"/>
-                    </a:ext>
-                  </a:extLst>
-                </p:cNvPr>
-                <p:cNvCxnSpPr>
-                  <a:cxnSpLocks/>
-                </p:cNvCxnSpPr>
-                <p:nvPr/>
-              </p:nvCxnSpPr>
-              <p:spPr>
-                <a:xfrm>
-                  <a:off x="1371411" y="3024074"/>
-                  <a:ext cx="342900" cy="0"/>
-                </a:xfrm>
-                <a:prstGeom prst="line">
-                  <a:avLst/>
-                </a:prstGeom>
-                <a:ln>
-                  <a:solidFill>
-                    <a:schemeClr val="bg1">
-                      <a:lumMod val="95000"/>
-                    </a:schemeClr>
-                  </a:solidFill>
-                </a:ln>
-              </p:spPr>
-              <p:style>
-                <a:lnRef idx="1">
-                  <a:schemeClr val="accent1"/>
-                </a:lnRef>
-                <a:fillRef idx="0">
-                  <a:schemeClr val="accent1"/>
-                </a:fillRef>
-                <a:effectRef idx="0">
-                  <a:schemeClr val="accent1"/>
-                </a:effectRef>
-                <a:fontRef idx="minor">
-                  <a:schemeClr val="tx1"/>
-                </a:fontRef>
-              </p:style>
-            </p:cxnSp>
-            <p:cxnSp>
-              <p:nvCxnSpPr>
-                <p:cNvPr id="55" name="Straight Connector 54">
-                  <a:extLst>
-                    <a:ext uri="{FF2B5EF4-FFF2-40B4-BE49-F238E27FC236}">
-                      <a16:creationId xmlns:a16="http://schemas.microsoft.com/office/drawing/2014/main" id="{06A6D6A6-02DD-D613-DD8E-A082433B84C3}"/>
-                    </a:ext>
-                  </a:extLst>
-                </p:cNvPr>
-                <p:cNvCxnSpPr>
-                  <a:cxnSpLocks/>
-                </p:cNvCxnSpPr>
-                <p:nvPr/>
-              </p:nvCxnSpPr>
-              <p:spPr>
-                <a:xfrm>
-                  <a:off x="1371411" y="3105551"/>
-                  <a:ext cx="342900" cy="0"/>
-                </a:xfrm>
-                <a:prstGeom prst="line">
-                  <a:avLst/>
-                </a:prstGeom>
-                <a:ln>
-                  <a:solidFill>
-                    <a:schemeClr val="bg1">
-                      <a:lumMod val="95000"/>
-                    </a:schemeClr>
-                  </a:solidFill>
-                </a:ln>
-              </p:spPr>
-              <p:style>
-                <a:lnRef idx="1">
-                  <a:schemeClr val="accent1"/>
-                </a:lnRef>
-                <a:fillRef idx="0">
-                  <a:schemeClr val="accent1"/>
-                </a:fillRef>
-                <a:effectRef idx="0">
-                  <a:schemeClr val="accent1"/>
-                </a:effectRef>
-                <a:fontRef idx="minor">
-                  <a:schemeClr val="tx1"/>
-                </a:fontRef>
-              </p:style>
-            </p:cxnSp>
-            <p:cxnSp>
-              <p:nvCxnSpPr>
-                <p:cNvPr id="56" name="Straight Connector 55">
-                  <a:extLst>
-                    <a:ext uri="{FF2B5EF4-FFF2-40B4-BE49-F238E27FC236}">
-                      <a16:creationId xmlns:a16="http://schemas.microsoft.com/office/drawing/2014/main" id="{C236DE19-F9D3-AC81-E3FF-1AFD1A8A80B4}"/>
-                    </a:ext>
-                  </a:extLst>
-                </p:cNvPr>
-                <p:cNvCxnSpPr>
-                  <a:cxnSpLocks/>
-                </p:cNvCxnSpPr>
-                <p:nvPr/>
-              </p:nvCxnSpPr>
-              <p:spPr>
-                <a:xfrm>
-                  <a:off x="1371411" y="3187028"/>
-                  <a:ext cx="342900" cy="0"/>
-                </a:xfrm>
-                <a:prstGeom prst="line">
-                  <a:avLst/>
-                </a:prstGeom>
-                <a:ln>
-                  <a:solidFill>
-                    <a:schemeClr val="bg1">
-                      <a:lumMod val="95000"/>
-                    </a:schemeClr>
-                  </a:solidFill>
-                </a:ln>
-              </p:spPr>
-              <p:style>
-                <a:lnRef idx="1">
-                  <a:schemeClr val="accent1"/>
-                </a:lnRef>
-                <a:fillRef idx="0">
-                  <a:schemeClr val="accent1"/>
-                </a:fillRef>
-                <a:effectRef idx="0">
-                  <a:schemeClr val="accent1"/>
-                </a:effectRef>
-                <a:fontRef idx="minor">
-                  <a:schemeClr val="tx1"/>
-                </a:fontRef>
-              </p:style>
-            </p:cxnSp>
-            <p:cxnSp>
-              <p:nvCxnSpPr>
-                <p:cNvPr id="57" name="Straight Connector 56">
-                  <a:extLst>
-                    <a:ext uri="{FF2B5EF4-FFF2-40B4-BE49-F238E27FC236}">
-                      <a16:creationId xmlns:a16="http://schemas.microsoft.com/office/drawing/2014/main" id="{1AC106DA-5A75-968A-7805-60F2E73D1E5B}"/>
-                    </a:ext>
-                  </a:extLst>
-                </p:cNvPr>
-                <p:cNvCxnSpPr>
-                  <a:cxnSpLocks/>
-                </p:cNvCxnSpPr>
-                <p:nvPr/>
-              </p:nvCxnSpPr>
-              <p:spPr>
-                <a:xfrm>
-                  <a:off x="1371411" y="3268505"/>
-                  <a:ext cx="342900" cy="0"/>
-                </a:xfrm>
-                <a:prstGeom prst="line">
-                  <a:avLst/>
-                </a:prstGeom>
-                <a:ln>
-                  <a:solidFill>
-                    <a:schemeClr val="bg1">
-                      <a:lumMod val="95000"/>
-                    </a:schemeClr>
-                  </a:solidFill>
-                </a:ln>
-              </p:spPr>
-              <p:style>
-                <a:lnRef idx="1">
-                  <a:schemeClr val="accent1"/>
-                </a:lnRef>
-                <a:fillRef idx="0">
-                  <a:schemeClr val="accent1"/>
-                </a:fillRef>
-                <a:effectRef idx="0">
-                  <a:schemeClr val="accent1"/>
-                </a:effectRef>
-                <a:fontRef idx="minor">
-                  <a:schemeClr val="tx1"/>
-                </a:fontRef>
-              </p:style>
-            </p:cxnSp>
-            <p:cxnSp>
-              <p:nvCxnSpPr>
-                <p:cNvPr id="58" name="Straight Connector 57">
-                  <a:extLst>
-                    <a:ext uri="{FF2B5EF4-FFF2-40B4-BE49-F238E27FC236}">
-                      <a16:creationId xmlns:a16="http://schemas.microsoft.com/office/drawing/2014/main" id="{68FF44E3-71DC-8E51-9B6B-847FD8606A71}"/>
-                    </a:ext>
-                  </a:extLst>
-                </p:cNvPr>
-                <p:cNvCxnSpPr>
-                  <a:cxnSpLocks/>
-                </p:cNvCxnSpPr>
-                <p:nvPr/>
-              </p:nvCxnSpPr>
-              <p:spPr>
-                <a:xfrm>
-                  <a:off x="1371411" y="3349983"/>
-                  <a:ext cx="342900" cy="0"/>
-                </a:xfrm>
-                <a:prstGeom prst="line">
-                  <a:avLst/>
-                </a:prstGeom>
-                <a:ln>
-                  <a:solidFill>
-                    <a:schemeClr val="bg1">
-                      <a:lumMod val="95000"/>
-                    </a:schemeClr>
-                  </a:solidFill>
-                </a:ln>
-              </p:spPr>
-              <p:style>
-                <a:lnRef idx="1">
-                  <a:schemeClr val="accent1"/>
-                </a:lnRef>
-                <a:fillRef idx="0">
-                  <a:schemeClr val="accent1"/>
-                </a:fillRef>
-                <a:effectRef idx="0">
-                  <a:schemeClr val="accent1"/>
-                </a:effectRef>
-                <a:fontRef idx="minor">
-                  <a:schemeClr val="tx1"/>
-                </a:fontRef>
-              </p:style>
-            </p:cxnSp>
-          </p:grpSp>
-        </p:grpSp>
-        <p:sp>
-          <p:nvSpPr>
-            <p:cNvPr id="51" name="TextBox 50">
-              <a:extLst>
-                <a:ext uri="{FF2B5EF4-FFF2-40B4-BE49-F238E27FC236}">
-                  <a16:creationId xmlns:a16="http://schemas.microsoft.com/office/drawing/2014/main" id="{2E21B2BA-7E4C-96AC-A9EE-1A3404F28048}"/>
-                </a:ext>
-              </a:extLst>
-            </p:cNvPr>
-            <p:cNvSpPr txBox="1"/>
-            <p:nvPr/>
-          </p:nvSpPr>
-          <p:spPr>
-            <a:xfrm>
-              <a:off x="3793406" y="4281126"/>
-              <a:ext cx="1457907" cy="452957"/>
-            </a:xfrm>
-            <a:prstGeom prst="rect">
-              <a:avLst/>
-            </a:prstGeom>
-            <a:noFill/>
-          </p:spPr>
-          <p:txBody>
-            <a:bodyPr wrap="square" rtlCol="0">
-              <a:spAutoFit/>
-            </a:bodyPr>
-            <a:lstStyle/>
-            <a:p>
-              <a:pPr algn="ctr"/>
-              <a:r>
-                <a:rPr lang="en-US" sz="800" dirty="0" err="1">
-                  <a:solidFill>
-                    <a:schemeClr val="bg1">
-                      <a:lumMod val="50000"/>
-                    </a:schemeClr>
-                  </a:solidFill>
-                </a:rPr>
-                <a:t>blueprint_blue.h</a:t>
-              </a:r>
-              <a:endParaRPr lang="en-US" sz="800" dirty="0">
-                <a:solidFill>
-                  <a:schemeClr val="bg1">
-                    <a:lumMod val="50000"/>
-                  </a:schemeClr>
-                </a:solidFill>
-              </a:endParaRPr>
-            </a:p>
-            <a:p>
-              <a:pPr algn="ctr"/>
-              <a:r>
-                <a:rPr lang="en-US" sz="600" dirty="0">
-                  <a:solidFill>
-                    <a:schemeClr val="bg1">
-                      <a:lumMod val="50000"/>
-                    </a:schemeClr>
-                  </a:solidFill>
-                </a:rPr>
-                <a:t>&lt;&lt; generated  header &gt;&gt;</a:t>
-              </a:r>
-            </a:p>
-          </p:txBody>
-        </p:sp>
-      </p:grpSp>
-      <p:grpSp>
-        <p:nvGrpSpPr>
-          <p:cNvPr id="62" name="Group 61">
-            <a:extLst>
-              <a:ext uri="{FF2B5EF4-FFF2-40B4-BE49-F238E27FC236}">
-                <a16:creationId xmlns:a16="http://schemas.microsoft.com/office/drawing/2014/main" id="{66ADC46A-B3F3-4D91-0274-6F45778754E3}"/>
-              </a:ext>
-            </a:extLst>
-          </p:cNvPr>
-          <p:cNvGrpSpPr/>
-          <p:nvPr/>
-        </p:nvGrpSpPr>
-        <p:grpSpPr>
-          <a:xfrm>
-            <a:off x="895653" y="3193261"/>
-            <a:ext cx="1015341" cy="760389"/>
-            <a:chOff x="3752896" y="3615014"/>
-            <a:chExt cx="1498417" cy="1119069"/>
-          </a:xfrm>
-        </p:grpSpPr>
-        <p:grpSp>
-          <p:nvGrpSpPr>
-            <p:cNvPr id="63" name="Group 62">
-              <a:extLst>
-                <a:ext uri="{FF2B5EF4-FFF2-40B4-BE49-F238E27FC236}">
-                  <a16:creationId xmlns:a16="http://schemas.microsoft.com/office/drawing/2014/main" id="{920C4922-72AC-ADC2-EB7D-46639B8AB157}"/>
-                </a:ext>
-              </a:extLst>
-            </p:cNvPr>
-            <p:cNvGrpSpPr/>
-            <p:nvPr/>
-          </p:nvGrpSpPr>
-          <p:grpSpPr>
-            <a:xfrm>
-              <a:off x="4266872" y="3615014"/>
-              <a:ext cx="488454" cy="707199"/>
-              <a:chOff x="1272930" y="2721801"/>
-              <a:chExt cx="488454" cy="707199"/>
-            </a:xfrm>
-          </p:grpSpPr>
-          <p:grpSp>
-            <p:nvGrpSpPr>
-              <p:cNvPr id="449" name="Group 448">
-                <a:extLst>
-                  <a:ext uri="{FF2B5EF4-FFF2-40B4-BE49-F238E27FC236}">
-                    <a16:creationId xmlns:a16="http://schemas.microsoft.com/office/drawing/2014/main" id="{322704B7-A61C-3D1A-B9A6-253BA471B2D6}"/>
-                  </a:ext>
-                </a:extLst>
-              </p:cNvPr>
-              <p:cNvGrpSpPr/>
-              <p:nvPr/>
-            </p:nvGrpSpPr>
-            <p:grpSpPr>
-              <a:xfrm>
-                <a:off x="1272930" y="2721801"/>
-                <a:ext cx="488454" cy="707199"/>
-                <a:chOff x="2082555" y="2721801"/>
-                <a:chExt cx="488454" cy="707199"/>
-              </a:xfrm>
-            </p:grpSpPr>
-            <p:sp>
-              <p:nvSpPr>
-                <p:cNvPr id="456" name="Rectangle 455">
-                  <a:extLst>
-                    <a:ext uri="{FF2B5EF4-FFF2-40B4-BE49-F238E27FC236}">
-                      <a16:creationId xmlns:a16="http://schemas.microsoft.com/office/drawing/2014/main" id="{5F11788A-5710-367B-B0D4-3FAFAB22E678}"/>
-                    </a:ext>
-                  </a:extLst>
-                </p:cNvPr>
-                <p:cNvSpPr/>
-                <p:nvPr/>
-              </p:nvSpPr>
-              <p:spPr>
-                <a:xfrm>
-                  <a:off x="2107871" y="2796639"/>
-                  <a:ext cx="463138" cy="632361"/>
-                </a:xfrm>
-                <a:prstGeom prst="rect">
-                  <a:avLst/>
-                </a:prstGeom>
-                <a:solidFill>
-                  <a:schemeClr val="accent1">
-                    <a:lumMod val="60000"/>
-                    <a:lumOff val="40000"/>
-                  </a:schemeClr>
-                </a:solidFill>
-              </p:spPr>
-              <p:style>
-                <a:lnRef idx="2">
-                  <a:schemeClr val="accent1">
-                    <a:shade val="50000"/>
-                  </a:schemeClr>
-                </a:lnRef>
-                <a:fillRef idx="1">
-                  <a:schemeClr val="accent1"/>
-                </a:fillRef>
-                <a:effectRef idx="0">
-                  <a:schemeClr val="accent1"/>
-                </a:effectRef>
-                <a:fontRef idx="minor">
-                  <a:schemeClr val="lt1"/>
-                </a:fontRef>
-              </p:style>
-              <p:txBody>
-                <a:bodyPr rtlCol="0" anchor="ctr"/>
-                <a:lstStyle/>
-                <a:p>
-                  <a:pPr algn="ctr"/>
-                  <a:endParaRPr lang="en-US"/>
-                </a:p>
-              </p:txBody>
-            </p:sp>
-            <p:sp>
-              <p:nvSpPr>
-                <p:cNvPr id="457" name="Isosceles Triangle 456">
-                  <a:extLst>
-                    <a:ext uri="{FF2B5EF4-FFF2-40B4-BE49-F238E27FC236}">
-                      <a16:creationId xmlns:a16="http://schemas.microsoft.com/office/drawing/2014/main" id="{FCC7579B-5FEC-A51C-E3C6-22D823E0D4ED}"/>
-                    </a:ext>
-                  </a:extLst>
-                </p:cNvPr>
-                <p:cNvSpPr/>
-                <p:nvPr/>
-              </p:nvSpPr>
-              <p:spPr>
-                <a:xfrm rot="7947381" flipV="1">
-                  <a:off x="2035459" y="2768897"/>
-                  <a:ext cx="201880" cy="107688"/>
-                </a:xfrm>
-                <a:prstGeom prst="triangle">
-                  <a:avLst>
-                    <a:gd name="adj" fmla="val 50415"/>
-                  </a:avLst>
-                </a:prstGeom>
-                <a:solidFill>
-                  <a:schemeClr val="bg1"/>
-                </a:solidFill>
-                <a:ln>
-                  <a:solidFill>
-                    <a:schemeClr val="bg1"/>
-                  </a:solidFill>
-                </a:ln>
-              </p:spPr>
-              <p:style>
-                <a:lnRef idx="2">
-                  <a:schemeClr val="accent1">
-                    <a:shade val="50000"/>
-                  </a:schemeClr>
-                </a:lnRef>
-                <a:fillRef idx="1">
-                  <a:schemeClr val="accent1"/>
-                </a:fillRef>
-                <a:effectRef idx="0">
-                  <a:schemeClr val="accent1"/>
-                </a:effectRef>
-                <a:fontRef idx="minor">
-                  <a:schemeClr val="lt1"/>
-                </a:fontRef>
-              </p:style>
-              <p:txBody>
-                <a:bodyPr rtlCol="0" anchor="ctr"/>
-                <a:lstStyle/>
-                <a:p>
-                  <a:pPr algn="ctr"/>
-                  <a:endParaRPr lang="en-US"/>
-                </a:p>
-              </p:txBody>
-            </p:sp>
-            <p:sp>
-              <p:nvSpPr>
-                <p:cNvPr id="458" name="Isosceles Triangle 457">
-                  <a:extLst>
-                    <a:ext uri="{FF2B5EF4-FFF2-40B4-BE49-F238E27FC236}">
-                      <a16:creationId xmlns:a16="http://schemas.microsoft.com/office/drawing/2014/main" id="{F132F610-2737-5845-91A3-9BE40AD64647}"/>
-                    </a:ext>
-                  </a:extLst>
-                </p:cNvPr>
-                <p:cNvSpPr/>
-                <p:nvPr/>
-              </p:nvSpPr>
-              <p:spPr>
-                <a:xfrm rot="18762502" flipV="1">
-                  <a:off x="2123370" y="2859537"/>
-                  <a:ext cx="201880" cy="107688"/>
-                </a:xfrm>
-                <a:prstGeom prst="triangle">
-                  <a:avLst>
-                    <a:gd name="adj" fmla="val 50415"/>
-                  </a:avLst>
-                </a:prstGeom>
-                <a:solidFill>
-                  <a:schemeClr val="bg1"/>
-                </a:solidFill>
-                <a:ln>
-                  <a:solidFill>
-                    <a:schemeClr val="accent1"/>
-                  </a:solidFill>
-                </a:ln>
-              </p:spPr>
-              <p:style>
-                <a:lnRef idx="2">
-                  <a:schemeClr val="accent1">
-                    <a:shade val="50000"/>
-                  </a:schemeClr>
-                </a:lnRef>
-                <a:fillRef idx="1">
-                  <a:schemeClr val="accent1"/>
-                </a:fillRef>
-                <a:effectRef idx="0">
-                  <a:schemeClr val="accent1"/>
-                </a:effectRef>
-                <a:fontRef idx="minor">
-                  <a:schemeClr val="lt1"/>
-                </a:fontRef>
-              </p:style>
-              <p:txBody>
-                <a:bodyPr rtlCol="0" anchor="ctr"/>
-                <a:lstStyle/>
-                <a:p>
-                  <a:pPr algn="ctr"/>
-                  <a:endParaRPr lang="en-US"/>
-                </a:p>
-              </p:txBody>
-            </p:sp>
-          </p:grpSp>
-          <p:grpSp>
-            <p:nvGrpSpPr>
-              <p:cNvPr id="450" name="Group 449">
-                <a:extLst>
-                  <a:ext uri="{FF2B5EF4-FFF2-40B4-BE49-F238E27FC236}">
-                    <a16:creationId xmlns:a16="http://schemas.microsoft.com/office/drawing/2014/main" id="{44A6AE8C-08F4-03C5-02CE-94C4B1781BB4}"/>
-                  </a:ext>
-                </a:extLst>
-              </p:cNvPr>
-              <p:cNvGrpSpPr/>
-              <p:nvPr/>
-            </p:nvGrpSpPr>
-            <p:grpSpPr>
-              <a:xfrm>
-                <a:off x="1371411" y="3024074"/>
-                <a:ext cx="326420" cy="325909"/>
-                <a:chOff x="1371411" y="3024074"/>
-                <a:chExt cx="342900" cy="325909"/>
-              </a:xfrm>
-            </p:grpSpPr>
-            <p:cxnSp>
-              <p:nvCxnSpPr>
-                <p:cNvPr id="451" name="Straight Connector 450">
-                  <a:extLst>
-                    <a:ext uri="{FF2B5EF4-FFF2-40B4-BE49-F238E27FC236}">
-                      <a16:creationId xmlns:a16="http://schemas.microsoft.com/office/drawing/2014/main" id="{FEAEE1C6-ADD0-BE14-2061-36148E8275EF}"/>
-                    </a:ext>
-                  </a:extLst>
-                </p:cNvPr>
-                <p:cNvCxnSpPr>
-                  <a:cxnSpLocks/>
-                </p:cNvCxnSpPr>
-                <p:nvPr/>
-              </p:nvCxnSpPr>
-              <p:spPr>
-                <a:xfrm>
-                  <a:off x="1371411" y="3024074"/>
-                  <a:ext cx="342900" cy="0"/>
-                </a:xfrm>
-                <a:prstGeom prst="line">
-                  <a:avLst/>
-                </a:prstGeom>
-                <a:ln>
-                  <a:solidFill>
-                    <a:schemeClr val="bg1">
-                      <a:lumMod val="95000"/>
-                    </a:schemeClr>
-                  </a:solidFill>
-                </a:ln>
-              </p:spPr>
-              <p:style>
-                <a:lnRef idx="1">
-                  <a:schemeClr val="accent1"/>
-                </a:lnRef>
-                <a:fillRef idx="0">
-                  <a:schemeClr val="accent1"/>
-                </a:fillRef>
-                <a:effectRef idx="0">
-                  <a:schemeClr val="accent1"/>
-                </a:effectRef>
-                <a:fontRef idx="minor">
-                  <a:schemeClr val="tx1"/>
-                </a:fontRef>
-              </p:style>
-            </p:cxnSp>
-            <p:cxnSp>
-              <p:nvCxnSpPr>
-                <p:cNvPr id="452" name="Straight Connector 451">
-                  <a:extLst>
-                    <a:ext uri="{FF2B5EF4-FFF2-40B4-BE49-F238E27FC236}">
-                      <a16:creationId xmlns:a16="http://schemas.microsoft.com/office/drawing/2014/main" id="{42B451C4-200B-C354-048F-2F5A47CA63ED}"/>
-                    </a:ext>
-                  </a:extLst>
-                </p:cNvPr>
-                <p:cNvCxnSpPr>
-                  <a:cxnSpLocks/>
-                </p:cNvCxnSpPr>
-                <p:nvPr/>
-              </p:nvCxnSpPr>
-              <p:spPr>
-                <a:xfrm>
-                  <a:off x="1371411" y="3105551"/>
-                  <a:ext cx="342900" cy="0"/>
-                </a:xfrm>
-                <a:prstGeom prst="line">
-                  <a:avLst/>
-                </a:prstGeom>
-                <a:ln>
-                  <a:solidFill>
-                    <a:schemeClr val="bg1">
-                      <a:lumMod val="95000"/>
-                    </a:schemeClr>
-                  </a:solidFill>
-                </a:ln>
-              </p:spPr>
-              <p:style>
-                <a:lnRef idx="1">
-                  <a:schemeClr val="accent1"/>
-                </a:lnRef>
-                <a:fillRef idx="0">
-                  <a:schemeClr val="accent1"/>
-                </a:fillRef>
-                <a:effectRef idx="0">
-                  <a:schemeClr val="accent1"/>
-                </a:effectRef>
-                <a:fontRef idx="minor">
-                  <a:schemeClr val="tx1"/>
-                </a:fontRef>
-              </p:style>
-            </p:cxnSp>
-            <p:cxnSp>
-              <p:nvCxnSpPr>
-                <p:cNvPr id="453" name="Straight Connector 452">
-                  <a:extLst>
-                    <a:ext uri="{FF2B5EF4-FFF2-40B4-BE49-F238E27FC236}">
-                      <a16:creationId xmlns:a16="http://schemas.microsoft.com/office/drawing/2014/main" id="{DBCF1D8F-D06E-2A8F-1795-4ED4E1DE103E}"/>
-                    </a:ext>
-                  </a:extLst>
-                </p:cNvPr>
-                <p:cNvCxnSpPr>
-                  <a:cxnSpLocks/>
-                </p:cNvCxnSpPr>
-                <p:nvPr/>
-              </p:nvCxnSpPr>
-              <p:spPr>
-                <a:xfrm>
-                  <a:off x="1371411" y="3187028"/>
-                  <a:ext cx="342900" cy="0"/>
-                </a:xfrm>
-                <a:prstGeom prst="line">
-                  <a:avLst/>
-                </a:prstGeom>
-                <a:ln>
-                  <a:solidFill>
-                    <a:schemeClr val="bg1">
-                      <a:lumMod val="95000"/>
-                    </a:schemeClr>
-                  </a:solidFill>
-                </a:ln>
-              </p:spPr>
-              <p:style>
-                <a:lnRef idx="1">
-                  <a:schemeClr val="accent1"/>
-                </a:lnRef>
-                <a:fillRef idx="0">
-                  <a:schemeClr val="accent1"/>
-                </a:fillRef>
-                <a:effectRef idx="0">
-                  <a:schemeClr val="accent1"/>
-                </a:effectRef>
-                <a:fontRef idx="minor">
-                  <a:schemeClr val="tx1"/>
-                </a:fontRef>
-              </p:style>
-            </p:cxnSp>
-            <p:cxnSp>
-              <p:nvCxnSpPr>
-                <p:cNvPr id="454" name="Straight Connector 453">
-                  <a:extLst>
-                    <a:ext uri="{FF2B5EF4-FFF2-40B4-BE49-F238E27FC236}">
-                      <a16:creationId xmlns:a16="http://schemas.microsoft.com/office/drawing/2014/main" id="{C2871897-18A7-8FDA-020F-AB5EE1C6198A}"/>
-                    </a:ext>
-                  </a:extLst>
-                </p:cNvPr>
-                <p:cNvCxnSpPr>
-                  <a:cxnSpLocks/>
-                </p:cNvCxnSpPr>
-                <p:nvPr/>
-              </p:nvCxnSpPr>
-              <p:spPr>
-                <a:xfrm>
-                  <a:off x="1371411" y="3268505"/>
-                  <a:ext cx="342900" cy="0"/>
-                </a:xfrm>
-                <a:prstGeom prst="line">
-                  <a:avLst/>
-                </a:prstGeom>
-                <a:ln>
-                  <a:solidFill>
-                    <a:schemeClr val="bg1">
-                      <a:lumMod val="95000"/>
-                    </a:schemeClr>
-                  </a:solidFill>
-                </a:ln>
-              </p:spPr>
-              <p:style>
-                <a:lnRef idx="1">
-                  <a:schemeClr val="accent1"/>
-                </a:lnRef>
-                <a:fillRef idx="0">
-                  <a:schemeClr val="accent1"/>
-                </a:fillRef>
-                <a:effectRef idx="0">
-                  <a:schemeClr val="accent1"/>
-                </a:effectRef>
-                <a:fontRef idx="minor">
-                  <a:schemeClr val="tx1"/>
-                </a:fontRef>
-              </p:style>
-            </p:cxnSp>
-            <p:cxnSp>
-              <p:nvCxnSpPr>
-                <p:cNvPr id="455" name="Straight Connector 454">
-                  <a:extLst>
-                    <a:ext uri="{FF2B5EF4-FFF2-40B4-BE49-F238E27FC236}">
-                      <a16:creationId xmlns:a16="http://schemas.microsoft.com/office/drawing/2014/main" id="{9B52DF5D-4080-29D0-702B-BEFD2B2F20A1}"/>
-                    </a:ext>
-                  </a:extLst>
-                </p:cNvPr>
-                <p:cNvCxnSpPr>
-                  <a:cxnSpLocks/>
-                </p:cNvCxnSpPr>
-                <p:nvPr/>
-              </p:nvCxnSpPr>
-              <p:spPr>
-                <a:xfrm>
-                  <a:off x="1371411" y="3349983"/>
-                  <a:ext cx="342900" cy="0"/>
-                </a:xfrm>
-                <a:prstGeom prst="line">
-                  <a:avLst/>
-                </a:prstGeom>
-                <a:ln>
-                  <a:solidFill>
-                    <a:schemeClr val="bg1">
-                      <a:lumMod val="95000"/>
-                    </a:schemeClr>
-                  </a:solidFill>
-                </a:ln>
-              </p:spPr>
-              <p:style>
-                <a:lnRef idx="1">
-                  <a:schemeClr val="accent1"/>
-                </a:lnRef>
-                <a:fillRef idx="0">
-                  <a:schemeClr val="accent1"/>
-                </a:fillRef>
-                <a:effectRef idx="0">
-                  <a:schemeClr val="accent1"/>
-                </a:effectRef>
-                <a:fontRef idx="minor">
-                  <a:schemeClr val="tx1"/>
-                </a:fontRef>
-              </p:style>
-            </p:cxnSp>
-          </p:grpSp>
-        </p:grpSp>
-        <p:sp>
-          <p:nvSpPr>
-            <p:cNvPr id="448" name="TextBox 447">
-              <a:extLst>
-                <a:ext uri="{FF2B5EF4-FFF2-40B4-BE49-F238E27FC236}">
-                  <a16:creationId xmlns:a16="http://schemas.microsoft.com/office/drawing/2014/main" id="{41C24A0B-63A0-74F9-129D-FFC4EDE07C55}"/>
-                </a:ext>
-              </a:extLst>
-            </p:cNvPr>
-            <p:cNvSpPr txBox="1"/>
-            <p:nvPr/>
-          </p:nvSpPr>
-          <p:spPr>
-            <a:xfrm>
-              <a:off x="3752896" y="4281126"/>
-              <a:ext cx="1498417" cy="452957"/>
-            </a:xfrm>
-            <a:prstGeom prst="rect">
-              <a:avLst/>
-            </a:prstGeom>
-            <a:noFill/>
-          </p:spPr>
-          <p:txBody>
-            <a:bodyPr wrap="square" rtlCol="0">
-              <a:spAutoFit/>
-            </a:bodyPr>
-            <a:lstStyle/>
-            <a:p>
-              <a:pPr algn="ctr"/>
-              <a:r>
-                <a:rPr lang="en-US" sz="800" dirty="0" err="1">
-                  <a:solidFill>
-                    <a:schemeClr val="bg1">
-                      <a:lumMod val="50000"/>
-                    </a:schemeClr>
-                  </a:solidFill>
-                </a:rPr>
-                <a:t>avx_search.fbs</a:t>
-              </a:r>
-              <a:endParaRPr lang="en-US" sz="800" dirty="0">
-                <a:solidFill>
-                  <a:schemeClr val="bg1">
-                    <a:lumMod val="50000"/>
-                  </a:schemeClr>
-                </a:solidFill>
-              </a:endParaRPr>
-            </a:p>
-            <a:p>
-              <a:pPr algn="ctr"/>
-              <a:r>
-                <a:rPr lang="en-US" sz="600" dirty="0">
-                  <a:solidFill>
-                    <a:schemeClr val="bg1">
-                      <a:lumMod val="50000"/>
-                    </a:schemeClr>
-                  </a:solidFill>
-                </a:rPr>
-                <a:t>&lt;&lt; </a:t>
-              </a:r>
-              <a:r>
-                <a:rPr lang="en-US" sz="600" dirty="0" err="1">
-                  <a:solidFill>
-                    <a:schemeClr val="bg1">
-                      <a:lumMod val="50000"/>
-                    </a:schemeClr>
-                  </a:solidFill>
-                </a:rPr>
-                <a:t>flattbuffers</a:t>
-              </a:r>
-              <a:r>
-                <a:rPr lang="en-US" sz="600" dirty="0">
-                  <a:solidFill>
-                    <a:schemeClr val="bg1">
-                      <a:lumMod val="50000"/>
-                    </a:schemeClr>
-                  </a:solidFill>
-                </a:rPr>
-                <a:t>  schema &gt;&gt;</a:t>
-              </a:r>
-            </a:p>
-          </p:txBody>
-        </p:sp>
-      </p:grpSp>
-      <p:grpSp>
-        <p:nvGrpSpPr>
-          <p:cNvPr id="459" name="Group 458">
-            <a:extLst>
-              <a:ext uri="{FF2B5EF4-FFF2-40B4-BE49-F238E27FC236}">
-                <a16:creationId xmlns:a16="http://schemas.microsoft.com/office/drawing/2014/main" id="{7A046DBD-478C-3AAD-7986-32FF3585C363}"/>
-              </a:ext>
-            </a:extLst>
-          </p:cNvPr>
-          <p:cNvGrpSpPr/>
-          <p:nvPr/>
-        </p:nvGrpSpPr>
-        <p:grpSpPr>
-          <a:xfrm>
-            <a:off x="895653" y="2103602"/>
-            <a:ext cx="1015341" cy="760389"/>
-            <a:chOff x="3752896" y="3615014"/>
-            <a:chExt cx="1498417" cy="1119069"/>
-          </a:xfrm>
-        </p:grpSpPr>
-        <p:grpSp>
-          <p:nvGrpSpPr>
-            <p:cNvPr id="460" name="Group 459">
-              <a:extLst>
-                <a:ext uri="{FF2B5EF4-FFF2-40B4-BE49-F238E27FC236}">
-                  <a16:creationId xmlns:a16="http://schemas.microsoft.com/office/drawing/2014/main" id="{93E1AFAA-AB5A-90E4-651E-0AD853A42B62}"/>
-                </a:ext>
-              </a:extLst>
-            </p:cNvPr>
-            <p:cNvGrpSpPr/>
-            <p:nvPr/>
-          </p:nvGrpSpPr>
-          <p:grpSpPr>
-            <a:xfrm>
-              <a:off x="4266872" y="3615014"/>
-              <a:ext cx="488454" cy="707199"/>
-              <a:chOff x="1272930" y="2721801"/>
-              <a:chExt cx="488454" cy="707199"/>
-            </a:xfrm>
-          </p:grpSpPr>
-          <p:grpSp>
-            <p:nvGrpSpPr>
-              <p:cNvPr id="462" name="Group 461">
-                <a:extLst>
-                  <a:ext uri="{FF2B5EF4-FFF2-40B4-BE49-F238E27FC236}">
-                    <a16:creationId xmlns:a16="http://schemas.microsoft.com/office/drawing/2014/main" id="{C08117BD-91F9-2A44-57C2-A58A14744479}"/>
-                  </a:ext>
-                </a:extLst>
-              </p:cNvPr>
-              <p:cNvGrpSpPr/>
-              <p:nvPr/>
-            </p:nvGrpSpPr>
-            <p:grpSpPr>
-              <a:xfrm>
-                <a:off x="1272930" y="2721801"/>
-                <a:ext cx="488454" cy="707199"/>
-                <a:chOff x="2082555" y="2721801"/>
-                <a:chExt cx="488454" cy="707199"/>
-              </a:xfrm>
-            </p:grpSpPr>
-            <p:sp>
-              <p:nvSpPr>
-                <p:cNvPr id="469" name="Rectangle 468">
-                  <a:extLst>
-                    <a:ext uri="{FF2B5EF4-FFF2-40B4-BE49-F238E27FC236}">
-                      <a16:creationId xmlns:a16="http://schemas.microsoft.com/office/drawing/2014/main" id="{43479659-610C-A164-F0A5-A37E6772D6BC}"/>
-                    </a:ext>
-                  </a:extLst>
-                </p:cNvPr>
-                <p:cNvSpPr/>
-                <p:nvPr/>
-              </p:nvSpPr>
-              <p:spPr>
-                <a:xfrm>
-                  <a:off x="2107871" y="2796639"/>
-                  <a:ext cx="463138" cy="632361"/>
-                </a:xfrm>
-                <a:prstGeom prst="rect">
-                  <a:avLst/>
-                </a:prstGeom>
-                <a:solidFill>
-                  <a:schemeClr val="accent1">
-                    <a:lumMod val="60000"/>
-                    <a:lumOff val="40000"/>
-                  </a:schemeClr>
-                </a:solidFill>
-              </p:spPr>
-              <p:style>
-                <a:lnRef idx="2">
-                  <a:schemeClr val="accent1">
-                    <a:shade val="50000"/>
-                  </a:schemeClr>
-                </a:lnRef>
-                <a:fillRef idx="1">
-                  <a:schemeClr val="accent1"/>
-                </a:fillRef>
-                <a:effectRef idx="0">
-                  <a:schemeClr val="accent1"/>
-                </a:effectRef>
-                <a:fontRef idx="minor">
-                  <a:schemeClr val="lt1"/>
-                </a:fontRef>
-              </p:style>
-              <p:txBody>
-                <a:bodyPr rtlCol="0" anchor="ctr"/>
-                <a:lstStyle/>
-                <a:p>
-                  <a:pPr algn="ctr"/>
-                  <a:endParaRPr lang="en-US"/>
-                </a:p>
-              </p:txBody>
-            </p:sp>
-            <p:sp>
-              <p:nvSpPr>
-                <p:cNvPr id="470" name="Isosceles Triangle 469">
-                  <a:extLst>
-                    <a:ext uri="{FF2B5EF4-FFF2-40B4-BE49-F238E27FC236}">
-                      <a16:creationId xmlns:a16="http://schemas.microsoft.com/office/drawing/2014/main" id="{0800FC9D-4D72-F065-D9A2-5D7A811DDF87}"/>
-                    </a:ext>
-                  </a:extLst>
-                </p:cNvPr>
-                <p:cNvSpPr/>
-                <p:nvPr/>
-              </p:nvSpPr>
-              <p:spPr>
-                <a:xfrm rot="7947381" flipV="1">
-                  <a:off x="2035459" y="2768897"/>
-                  <a:ext cx="201880" cy="107688"/>
-                </a:xfrm>
-                <a:prstGeom prst="triangle">
-                  <a:avLst>
-                    <a:gd name="adj" fmla="val 50415"/>
-                  </a:avLst>
-                </a:prstGeom>
-                <a:solidFill>
-                  <a:schemeClr val="bg1"/>
-                </a:solidFill>
-                <a:ln>
-                  <a:solidFill>
-                    <a:schemeClr val="bg1"/>
-                  </a:solidFill>
-                </a:ln>
-              </p:spPr>
-              <p:style>
-                <a:lnRef idx="2">
-                  <a:schemeClr val="accent1">
-                    <a:shade val="50000"/>
-                  </a:schemeClr>
-                </a:lnRef>
-                <a:fillRef idx="1">
-                  <a:schemeClr val="accent1"/>
-                </a:fillRef>
-                <a:effectRef idx="0">
-                  <a:schemeClr val="accent1"/>
-                </a:effectRef>
-                <a:fontRef idx="minor">
-                  <a:schemeClr val="lt1"/>
-                </a:fontRef>
-              </p:style>
-              <p:txBody>
-                <a:bodyPr rtlCol="0" anchor="ctr"/>
-                <a:lstStyle/>
-                <a:p>
-                  <a:pPr algn="ctr"/>
-                  <a:endParaRPr lang="en-US"/>
-                </a:p>
-              </p:txBody>
-            </p:sp>
-            <p:sp>
-              <p:nvSpPr>
-                <p:cNvPr id="471" name="Isosceles Triangle 470">
-                  <a:extLst>
-                    <a:ext uri="{FF2B5EF4-FFF2-40B4-BE49-F238E27FC236}">
-                      <a16:creationId xmlns:a16="http://schemas.microsoft.com/office/drawing/2014/main" id="{8DE15E19-CB30-FC82-6001-5013458FC078}"/>
-                    </a:ext>
-                  </a:extLst>
-                </p:cNvPr>
-                <p:cNvSpPr/>
-                <p:nvPr/>
-              </p:nvSpPr>
-              <p:spPr>
-                <a:xfrm rot="18762502" flipV="1">
-                  <a:off x="2123370" y="2859537"/>
-                  <a:ext cx="201880" cy="107688"/>
-                </a:xfrm>
-                <a:prstGeom prst="triangle">
-                  <a:avLst>
-                    <a:gd name="adj" fmla="val 50415"/>
-                  </a:avLst>
-                </a:prstGeom>
-                <a:solidFill>
-                  <a:schemeClr val="bg1"/>
-                </a:solidFill>
-                <a:ln>
-                  <a:solidFill>
-                    <a:schemeClr val="accent1"/>
-                  </a:solidFill>
-                </a:ln>
-              </p:spPr>
-              <p:style>
-                <a:lnRef idx="2">
-                  <a:schemeClr val="accent1">
-                    <a:shade val="50000"/>
-                  </a:schemeClr>
-                </a:lnRef>
-                <a:fillRef idx="1">
-                  <a:schemeClr val="accent1"/>
-                </a:fillRef>
-                <a:effectRef idx="0">
-                  <a:schemeClr val="accent1"/>
-                </a:effectRef>
-                <a:fontRef idx="minor">
-                  <a:schemeClr val="lt1"/>
-                </a:fontRef>
-              </p:style>
-              <p:txBody>
-                <a:bodyPr rtlCol="0" anchor="ctr"/>
-                <a:lstStyle/>
-                <a:p>
-                  <a:pPr algn="ctr"/>
-                  <a:endParaRPr lang="en-US"/>
-                </a:p>
-              </p:txBody>
-            </p:sp>
-          </p:grpSp>
-          <p:grpSp>
-            <p:nvGrpSpPr>
-              <p:cNvPr id="463" name="Group 462">
-                <a:extLst>
-                  <a:ext uri="{FF2B5EF4-FFF2-40B4-BE49-F238E27FC236}">
-                    <a16:creationId xmlns:a16="http://schemas.microsoft.com/office/drawing/2014/main" id="{F5CF101A-46B2-13B6-5AEF-1CEBBBF050B1}"/>
-                  </a:ext>
-                </a:extLst>
-              </p:cNvPr>
-              <p:cNvGrpSpPr/>
-              <p:nvPr/>
-            </p:nvGrpSpPr>
-            <p:grpSpPr>
-              <a:xfrm>
-                <a:off x="1371411" y="3024074"/>
-                <a:ext cx="326420" cy="325909"/>
-                <a:chOff x="1371411" y="3024074"/>
-                <a:chExt cx="342900" cy="325909"/>
-              </a:xfrm>
-            </p:grpSpPr>
-            <p:cxnSp>
-              <p:nvCxnSpPr>
-                <p:cNvPr id="464" name="Straight Connector 463">
-                  <a:extLst>
-                    <a:ext uri="{FF2B5EF4-FFF2-40B4-BE49-F238E27FC236}">
-                      <a16:creationId xmlns:a16="http://schemas.microsoft.com/office/drawing/2014/main" id="{2521A6DD-7D70-EB5D-AA2C-D0885BD0F8AC}"/>
-                    </a:ext>
-                  </a:extLst>
-                </p:cNvPr>
-                <p:cNvCxnSpPr>
-                  <a:cxnSpLocks/>
-                </p:cNvCxnSpPr>
-                <p:nvPr/>
-              </p:nvCxnSpPr>
-              <p:spPr>
-                <a:xfrm>
-                  <a:off x="1371411" y="3024074"/>
-                  <a:ext cx="342900" cy="0"/>
-                </a:xfrm>
-                <a:prstGeom prst="line">
-                  <a:avLst/>
-                </a:prstGeom>
-                <a:ln>
-                  <a:solidFill>
-                    <a:schemeClr val="bg1">
-                      <a:lumMod val="95000"/>
-                    </a:schemeClr>
-                  </a:solidFill>
-                </a:ln>
-              </p:spPr>
-              <p:style>
-                <a:lnRef idx="1">
-                  <a:schemeClr val="accent1"/>
-                </a:lnRef>
-                <a:fillRef idx="0">
-                  <a:schemeClr val="accent1"/>
-                </a:fillRef>
-                <a:effectRef idx="0">
-                  <a:schemeClr val="accent1"/>
-                </a:effectRef>
-                <a:fontRef idx="minor">
-                  <a:schemeClr val="tx1"/>
-                </a:fontRef>
-              </p:style>
-            </p:cxnSp>
-            <p:cxnSp>
-              <p:nvCxnSpPr>
-                <p:cNvPr id="465" name="Straight Connector 464">
-                  <a:extLst>
-                    <a:ext uri="{FF2B5EF4-FFF2-40B4-BE49-F238E27FC236}">
-                      <a16:creationId xmlns:a16="http://schemas.microsoft.com/office/drawing/2014/main" id="{43CA7E14-BBC7-714F-5914-D9DCE5FAF8A1}"/>
-                    </a:ext>
-                  </a:extLst>
-                </p:cNvPr>
-                <p:cNvCxnSpPr>
-                  <a:cxnSpLocks/>
-                </p:cNvCxnSpPr>
-                <p:nvPr/>
-              </p:nvCxnSpPr>
-              <p:spPr>
-                <a:xfrm>
-                  <a:off x="1371411" y="3105551"/>
-                  <a:ext cx="342900" cy="0"/>
-                </a:xfrm>
-                <a:prstGeom prst="line">
-                  <a:avLst/>
-                </a:prstGeom>
-                <a:ln>
-                  <a:solidFill>
-                    <a:schemeClr val="bg1">
-                      <a:lumMod val="95000"/>
-                    </a:schemeClr>
-                  </a:solidFill>
-                </a:ln>
-              </p:spPr>
-              <p:style>
-                <a:lnRef idx="1">
-                  <a:schemeClr val="accent1"/>
-                </a:lnRef>
-                <a:fillRef idx="0">
-                  <a:schemeClr val="accent1"/>
-                </a:fillRef>
-                <a:effectRef idx="0">
-                  <a:schemeClr val="accent1"/>
-                </a:effectRef>
-                <a:fontRef idx="minor">
-                  <a:schemeClr val="tx1"/>
-                </a:fontRef>
-              </p:style>
-            </p:cxnSp>
-            <p:cxnSp>
-              <p:nvCxnSpPr>
-                <p:cNvPr id="466" name="Straight Connector 465">
-                  <a:extLst>
-                    <a:ext uri="{FF2B5EF4-FFF2-40B4-BE49-F238E27FC236}">
-                      <a16:creationId xmlns:a16="http://schemas.microsoft.com/office/drawing/2014/main" id="{F920FE74-CFE8-5FEE-1437-665B2D71053D}"/>
-                    </a:ext>
-                  </a:extLst>
-                </p:cNvPr>
-                <p:cNvCxnSpPr>
-                  <a:cxnSpLocks/>
-                </p:cNvCxnSpPr>
-                <p:nvPr/>
-              </p:nvCxnSpPr>
-              <p:spPr>
-                <a:xfrm>
-                  <a:off x="1371411" y="3187028"/>
-                  <a:ext cx="342900" cy="0"/>
-                </a:xfrm>
-                <a:prstGeom prst="line">
-                  <a:avLst/>
-                </a:prstGeom>
-                <a:ln>
-                  <a:solidFill>
-                    <a:schemeClr val="bg1">
-                      <a:lumMod val="95000"/>
-                    </a:schemeClr>
-                  </a:solidFill>
-                </a:ln>
-              </p:spPr>
-              <p:style>
-                <a:lnRef idx="1">
-                  <a:schemeClr val="accent1"/>
-                </a:lnRef>
-                <a:fillRef idx="0">
-                  <a:schemeClr val="accent1"/>
-                </a:fillRef>
-                <a:effectRef idx="0">
-                  <a:schemeClr val="accent1"/>
-                </a:effectRef>
-                <a:fontRef idx="minor">
-                  <a:schemeClr val="tx1"/>
-                </a:fontRef>
-              </p:style>
-            </p:cxnSp>
-            <p:cxnSp>
-              <p:nvCxnSpPr>
-                <p:cNvPr id="467" name="Straight Connector 466">
-                  <a:extLst>
-                    <a:ext uri="{FF2B5EF4-FFF2-40B4-BE49-F238E27FC236}">
-                      <a16:creationId xmlns:a16="http://schemas.microsoft.com/office/drawing/2014/main" id="{9F16D3DA-5676-A3D6-E2DF-7F938AD9FECC}"/>
-                    </a:ext>
-                  </a:extLst>
-                </p:cNvPr>
-                <p:cNvCxnSpPr>
-                  <a:cxnSpLocks/>
-                </p:cNvCxnSpPr>
-                <p:nvPr/>
-              </p:nvCxnSpPr>
-              <p:spPr>
-                <a:xfrm>
-                  <a:off x="1371411" y="3268505"/>
-                  <a:ext cx="342900" cy="0"/>
-                </a:xfrm>
-                <a:prstGeom prst="line">
-                  <a:avLst/>
-                </a:prstGeom>
-                <a:ln>
-                  <a:solidFill>
-                    <a:schemeClr val="bg1">
-                      <a:lumMod val="95000"/>
-                    </a:schemeClr>
-                  </a:solidFill>
-                </a:ln>
-              </p:spPr>
-              <p:style>
-                <a:lnRef idx="1">
-                  <a:schemeClr val="accent1"/>
-                </a:lnRef>
-                <a:fillRef idx="0">
-                  <a:schemeClr val="accent1"/>
-                </a:fillRef>
-                <a:effectRef idx="0">
-                  <a:schemeClr val="accent1"/>
-                </a:effectRef>
-                <a:fontRef idx="minor">
-                  <a:schemeClr val="tx1"/>
-                </a:fontRef>
-              </p:style>
-            </p:cxnSp>
-            <p:cxnSp>
-              <p:nvCxnSpPr>
-                <p:cNvPr id="468" name="Straight Connector 467">
-                  <a:extLst>
-                    <a:ext uri="{FF2B5EF4-FFF2-40B4-BE49-F238E27FC236}">
-                      <a16:creationId xmlns:a16="http://schemas.microsoft.com/office/drawing/2014/main" id="{E0703D86-31DA-AEAA-6130-D6C613704B62}"/>
-                    </a:ext>
-                  </a:extLst>
-                </p:cNvPr>
-                <p:cNvCxnSpPr>
-                  <a:cxnSpLocks/>
-                </p:cNvCxnSpPr>
-                <p:nvPr/>
-              </p:nvCxnSpPr>
-              <p:spPr>
-                <a:xfrm>
-                  <a:off x="1371411" y="3349983"/>
-                  <a:ext cx="342900" cy="0"/>
-                </a:xfrm>
-                <a:prstGeom prst="line">
-                  <a:avLst/>
-                </a:prstGeom>
-                <a:ln>
-                  <a:solidFill>
-                    <a:schemeClr val="bg1">
-                      <a:lumMod val="95000"/>
-                    </a:schemeClr>
-                  </a:solidFill>
-                </a:ln>
-              </p:spPr>
-              <p:style>
-                <a:lnRef idx="1">
-                  <a:schemeClr val="accent1"/>
-                </a:lnRef>
-                <a:fillRef idx="0">
-                  <a:schemeClr val="accent1"/>
-                </a:fillRef>
-                <a:effectRef idx="0">
-                  <a:schemeClr val="accent1"/>
-                </a:effectRef>
-                <a:fontRef idx="minor">
-                  <a:schemeClr val="tx1"/>
-                </a:fontRef>
-              </p:style>
-            </p:cxnSp>
-          </p:grpSp>
-        </p:grpSp>
-        <p:sp>
-          <p:nvSpPr>
-            <p:cNvPr id="461" name="TextBox 460">
-              <a:extLst>
-                <a:ext uri="{FF2B5EF4-FFF2-40B4-BE49-F238E27FC236}">
-                  <a16:creationId xmlns:a16="http://schemas.microsoft.com/office/drawing/2014/main" id="{E6BF9955-D898-3EB6-6013-F21BE6B9CEDF}"/>
-                </a:ext>
-              </a:extLst>
-            </p:cNvPr>
-            <p:cNvSpPr txBox="1"/>
-            <p:nvPr/>
-          </p:nvSpPr>
-          <p:spPr>
-            <a:xfrm>
-              <a:off x="3752896" y="4281126"/>
-              <a:ext cx="1498417" cy="452957"/>
-            </a:xfrm>
-            <a:prstGeom prst="rect">
-              <a:avLst/>
-            </a:prstGeom>
-            <a:noFill/>
-          </p:spPr>
-          <p:txBody>
-            <a:bodyPr wrap="square" rtlCol="0">
-              <a:spAutoFit/>
-            </a:bodyPr>
-            <a:lstStyle/>
-            <a:p>
-              <a:pPr algn="ctr"/>
-              <a:r>
-                <a:rPr lang="en-US" sz="800" dirty="0" err="1">
-                  <a:solidFill>
-                    <a:schemeClr val="bg1">
-                      <a:lumMod val="50000"/>
-                    </a:schemeClr>
-                  </a:solidFill>
-                </a:rPr>
-                <a:t>avx_search.h</a:t>
-              </a:r>
-              <a:endParaRPr lang="en-US" sz="800" dirty="0">
-                <a:solidFill>
-                  <a:schemeClr val="bg1">
-                    <a:lumMod val="50000"/>
-                  </a:schemeClr>
-                </a:solidFill>
-              </a:endParaRPr>
-            </a:p>
-            <a:p>
-              <a:pPr algn="ctr"/>
-              <a:r>
-                <a:rPr lang="en-US" sz="600" dirty="0">
-                  <a:solidFill>
-                    <a:schemeClr val="bg1">
-                      <a:lumMod val="50000"/>
-                    </a:schemeClr>
-                  </a:solidFill>
-                </a:rPr>
-                <a:t>&lt;&lt; generated header &gt;&gt;</a:t>
-              </a:r>
-            </a:p>
-          </p:txBody>
-        </p:sp>
-      </p:grpSp>
-      <p:cxnSp>
-        <p:nvCxnSpPr>
-          <p:cNvPr id="472" name="Straight Arrow Connector 471">
-            <a:extLst>
-              <a:ext uri="{FF2B5EF4-FFF2-40B4-BE49-F238E27FC236}">
-                <a16:creationId xmlns:a16="http://schemas.microsoft.com/office/drawing/2014/main" id="{3D35BBE0-7DB7-0001-941E-F5514F47E362}"/>
-              </a:ext>
-            </a:extLst>
-          </p:cNvPr>
-          <p:cNvCxnSpPr>
-            <a:cxnSpLocks/>
-          </p:cNvCxnSpPr>
-          <p:nvPr/>
-        </p:nvCxnSpPr>
-        <p:spPr>
-          <a:xfrm flipH="1">
-            <a:off x="1574470" y="1660121"/>
-            <a:ext cx="441025" cy="0"/>
-          </a:xfrm>
-          <a:prstGeom prst="straightConnector1">
-            <a:avLst/>
-          </a:prstGeom>
-          <a:ln>
-            <a:solidFill>
-              <a:schemeClr val="tx1">
-                <a:lumMod val="50000"/>
-                <a:lumOff val="50000"/>
-              </a:schemeClr>
-            </a:solidFill>
-            <a:tailEnd type="triangle"/>
-          </a:ln>
-        </p:spPr>
-        <p:style>
-          <a:lnRef idx="1">
-            <a:schemeClr val="accent1"/>
-          </a:lnRef>
-          <a:fillRef idx="0">
-            <a:schemeClr val="accent1"/>
-          </a:fillRef>
-          <a:effectRef idx="0">
-            <a:schemeClr val="accent1"/>
-          </a:effectRef>
-          <a:fontRef idx="minor">
-            <a:schemeClr val="tx1"/>
-          </a:fontRef>
-        </p:style>
-      </p:cxnSp>
-      <p:cxnSp>
-        <p:nvCxnSpPr>
-          <p:cNvPr id="475" name="Straight Arrow Connector 474">
-            <a:extLst>
-              <a:ext uri="{FF2B5EF4-FFF2-40B4-BE49-F238E27FC236}">
-                <a16:creationId xmlns:a16="http://schemas.microsoft.com/office/drawing/2014/main" id="{577684C0-F15F-70C9-481E-F68D4868DFF4}"/>
-              </a:ext>
-            </a:extLst>
-          </p:cNvPr>
-          <p:cNvCxnSpPr>
-            <a:cxnSpLocks/>
-          </p:cNvCxnSpPr>
-          <p:nvPr/>
-        </p:nvCxnSpPr>
-        <p:spPr>
-          <a:xfrm flipH="1">
-            <a:off x="1574470" y="2365942"/>
-            <a:ext cx="441025" cy="0"/>
-          </a:xfrm>
-          <a:prstGeom prst="straightConnector1">
-            <a:avLst/>
-          </a:prstGeom>
-          <a:ln>
-            <a:solidFill>
-              <a:schemeClr val="tx1">
-                <a:lumMod val="50000"/>
-                <a:lumOff val="50000"/>
-              </a:schemeClr>
-            </a:solidFill>
-            <a:tailEnd type="triangle"/>
-          </a:ln>
-        </p:spPr>
-        <p:style>
-          <a:lnRef idx="1">
-            <a:schemeClr val="accent1"/>
-          </a:lnRef>
-          <a:fillRef idx="0">
-            <a:schemeClr val="accent1"/>
-          </a:fillRef>
-          <a:effectRef idx="0">
-            <a:schemeClr val="accent1"/>
-          </a:effectRef>
-          <a:fontRef idx="minor">
-            <a:schemeClr val="tx1"/>
-          </a:fontRef>
-        </p:style>
-      </p:cxnSp>
-      <p:cxnSp>
-        <p:nvCxnSpPr>
-          <p:cNvPr id="476" name="Straight Arrow Connector 475">
-            <a:extLst>
-              <a:ext uri="{FF2B5EF4-FFF2-40B4-BE49-F238E27FC236}">
-                <a16:creationId xmlns:a16="http://schemas.microsoft.com/office/drawing/2014/main" id="{2F68F9AD-2A44-2574-F0EE-9F3E581B489E}"/>
-              </a:ext>
-            </a:extLst>
-          </p:cNvPr>
-          <p:cNvCxnSpPr>
-            <a:cxnSpLocks/>
-            <a:stCxn id="10" idx="1"/>
-            <a:endCxn id="456" idx="3"/>
-          </p:cNvCxnSpPr>
-          <p:nvPr/>
-        </p:nvCxnSpPr>
-        <p:spPr>
-          <a:xfrm flipH="1" flipV="1">
-            <a:off x="1574909" y="3458952"/>
-            <a:ext cx="440586" cy="79"/>
-          </a:xfrm>
-          <a:prstGeom prst="straightConnector1">
-            <a:avLst/>
-          </a:prstGeom>
-          <a:ln>
-            <a:solidFill>
-              <a:schemeClr val="tx1">
-                <a:lumMod val="50000"/>
-                <a:lumOff val="50000"/>
-              </a:schemeClr>
-            </a:solidFill>
-            <a:tailEnd type="triangle"/>
-          </a:ln>
-        </p:spPr>
-        <p:style>
-          <a:lnRef idx="1">
-            <a:schemeClr val="accent1"/>
-          </a:lnRef>
-          <a:fillRef idx="0">
-            <a:schemeClr val="accent1"/>
-          </a:fillRef>
-          <a:effectRef idx="0">
-            <a:schemeClr val="accent1"/>
-          </a:effectRef>
-          <a:fontRef idx="minor">
-            <a:schemeClr val="tx1"/>
-          </a:fontRef>
-        </p:style>
-      </p:cxnSp>
-      <p:grpSp>
-        <p:nvGrpSpPr>
           <p:cNvPr id="481" name="Group 480">
             <a:extLst>
               <a:ext uri="{FF2B5EF4-FFF2-40B4-BE49-F238E27FC236}">
@@ -11265,7 +8908,7 @@
                   <a:ea typeface="+mn-ea"/>
                   <a:cs typeface="+mn-cs"/>
                 </a:rPr>
-                <a:t>FlatSharp</a:t>
+                <a:t>YamlDotNet</a:t>
               </a:r>
               <a:r>
                 <a:rPr kumimoji="0" lang="en-US" sz="800" b="0" i="0" u="none" strike="noStrike" kern="1200" cap="none" spc="0" normalizeH="0" baseline="0" noProof="0" dirty="0">
@@ -15683,7 +13326,7 @@
                   <a:ea typeface="+mn-ea"/>
                   <a:cs typeface="+mn-cs"/>
                 </a:rPr>
-                <a:t>FlatSharp</a:t>
+                <a:t>YamlDotNet</a:t>
               </a:r>
               <a:r>
                 <a:rPr kumimoji="0" lang="en-US" sz="800" b="0" i="0" u="none" strike="noStrike" kern="1200" cap="none" spc="0" normalizeH="0" baseline="0" noProof="0" dirty="0">

</xml_diff>

<commit_message>
Replaced RapidYAML serialization with RapidJSON in C++.
</commit_message>
<xml_diff>
--- a/AVXSearch/AVX-Framework.pptx
+++ b/AVXSearch/AVX-Framework.pptx
@@ -266,7 +266,7 @@
           <a:p>
             <a:fld id="{00872148-4BA6-4738-8A8B-AEF1C14E9646}" type="datetimeFigureOut">
               <a:rPr lang="en-US" smtClean="0"/>
-              <a:t>11/29/2023</a:t>
+              <a:t>12/4/2023</a:t>
             </a:fld>
             <a:endParaRPr lang="en-US"/>
           </a:p>
@@ -464,7 +464,7 @@
           <a:p>
             <a:fld id="{00872148-4BA6-4738-8A8B-AEF1C14E9646}" type="datetimeFigureOut">
               <a:rPr lang="en-US" smtClean="0"/>
-              <a:t>11/29/2023</a:t>
+              <a:t>12/4/2023</a:t>
             </a:fld>
             <a:endParaRPr lang="en-US"/>
           </a:p>
@@ -672,7 +672,7 @@
           <a:p>
             <a:fld id="{00872148-4BA6-4738-8A8B-AEF1C14E9646}" type="datetimeFigureOut">
               <a:rPr lang="en-US" smtClean="0"/>
-              <a:t>11/29/2023</a:t>
+              <a:t>12/4/2023</a:t>
             </a:fld>
             <a:endParaRPr lang="en-US"/>
           </a:p>
@@ -870,7 +870,7 @@
           <a:p>
             <a:fld id="{00872148-4BA6-4738-8A8B-AEF1C14E9646}" type="datetimeFigureOut">
               <a:rPr lang="en-US" smtClean="0"/>
-              <a:t>11/29/2023</a:t>
+              <a:t>12/4/2023</a:t>
             </a:fld>
             <a:endParaRPr lang="en-US"/>
           </a:p>
@@ -1145,7 +1145,7 @@
           <a:p>
             <a:fld id="{00872148-4BA6-4738-8A8B-AEF1C14E9646}" type="datetimeFigureOut">
               <a:rPr lang="en-US" smtClean="0"/>
-              <a:t>11/29/2023</a:t>
+              <a:t>12/4/2023</a:t>
             </a:fld>
             <a:endParaRPr lang="en-US"/>
           </a:p>
@@ -1410,7 +1410,7 @@
           <a:p>
             <a:fld id="{00872148-4BA6-4738-8A8B-AEF1C14E9646}" type="datetimeFigureOut">
               <a:rPr lang="en-US" smtClean="0"/>
-              <a:t>11/29/2023</a:t>
+              <a:t>12/4/2023</a:t>
             </a:fld>
             <a:endParaRPr lang="en-US"/>
           </a:p>
@@ -1822,7 +1822,7 @@
           <a:p>
             <a:fld id="{00872148-4BA6-4738-8A8B-AEF1C14E9646}" type="datetimeFigureOut">
               <a:rPr lang="en-US" smtClean="0"/>
-              <a:t>11/29/2023</a:t>
+              <a:t>12/4/2023</a:t>
             </a:fld>
             <a:endParaRPr lang="en-US"/>
           </a:p>
@@ -1963,7 +1963,7 @@
           <a:p>
             <a:fld id="{00872148-4BA6-4738-8A8B-AEF1C14E9646}" type="datetimeFigureOut">
               <a:rPr lang="en-US" smtClean="0"/>
-              <a:t>11/29/2023</a:t>
+              <a:t>12/4/2023</a:t>
             </a:fld>
             <a:endParaRPr lang="en-US"/>
           </a:p>
@@ -2076,7 +2076,7 @@
           <a:p>
             <a:fld id="{00872148-4BA6-4738-8A8B-AEF1C14E9646}" type="datetimeFigureOut">
               <a:rPr lang="en-US" smtClean="0"/>
-              <a:t>11/29/2023</a:t>
+              <a:t>12/4/2023</a:t>
             </a:fld>
             <a:endParaRPr lang="en-US"/>
           </a:p>
@@ -2387,7 +2387,7 @@
           <a:p>
             <a:fld id="{00872148-4BA6-4738-8A8B-AEF1C14E9646}" type="datetimeFigureOut">
               <a:rPr lang="en-US" smtClean="0"/>
-              <a:t>11/29/2023</a:t>
+              <a:t>12/4/2023</a:t>
             </a:fld>
             <a:endParaRPr lang="en-US"/>
           </a:p>
@@ -2675,7 +2675,7 @@
           <a:p>
             <a:fld id="{00872148-4BA6-4738-8A8B-AEF1C14E9646}" type="datetimeFigureOut">
               <a:rPr lang="en-US" smtClean="0"/>
-              <a:t>11/29/2023</a:t>
+              <a:t>12/4/2023</a:t>
             </a:fld>
             <a:endParaRPr lang="en-US"/>
           </a:p>
@@ -2916,7 +2916,7 @@
           <a:p>
             <a:fld id="{00872148-4BA6-4738-8A8B-AEF1C14E9646}" type="datetimeFigureOut">
               <a:rPr lang="en-US" smtClean="0"/>
-              <a:t>11/29/2023</a:t>
+              <a:t>12/4/2023</a:t>
             </a:fld>
             <a:endParaRPr lang="en-US"/>
           </a:p>
@@ -3390,7 +3390,7 @@
           <a:p>
             <a:r>
               <a:rPr lang="en-US" sz="1800"/>
-              <a:t>11-29-2023</a:t>
+              <a:t>12-04-2023</a:t>
             </a:r>
             <a:endParaRPr lang="en-US" sz="1800" dirty="0"/>
           </a:p>
@@ -3455,7 +3455,7 @@
             <a:pPr algn="ctr"/>
             <a:r>
               <a:rPr lang="en-US" dirty="0"/>
-              <a:t>AVX-Framework dependencies – 3B27</a:t>
+              <a:t>AVX-Framework dependencies – 3C02</a:t>
             </a:r>
           </a:p>
         </p:txBody>
@@ -5224,7 +5224,7 @@
                 <a:ea typeface="+mn-ea"/>
                 <a:cs typeface="+mn-cs"/>
               </a:rPr>
-              <a:t>[Rapid YAML]</a:t>
+              <a:t>[Rapid JSON]</a:t>
             </a:r>
           </a:p>
           <a:p>
@@ -7037,224 +7037,6 @@
           </a:fontRef>
         </p:style>
       </p:cxnSp>
-      <p:grpSp>
-        <p:nvGrpSpPr>
-          <p:cNvPr id="481" name="Group 480">
-            <a:extLst>
-              <a:ext uri="{FF2B5EF4-FFF2-40B4-BE49-F238E27FC236}">
-                <a16:creationId xmlns:a16="http://schemas.microsoft.com/office/drawing/2014/main" id="{5FCA2BB6-07E7-06BF-F046-A43FB257E20D}"/>
-              </a:ext>
-            </a:extLst>
-          </p:cNvPr>
-          <p:cNvGrpSpPr/>
-          <p:nvPr/>
-        </p:nvGrpSpPr>
-        <p:grpSpPr>
-          <a:xfrm>
-            <a:off x="3633799" y="4201589"/>
-            <a:ext cx="741133" cy="260141"/>
-            <a:chOff x="7668418" y="4456943"/>
-            <a:chExt cx="741133" cy="260141"/>
-          </a:xfrm>
-        </p:grpSpPr>
-        <p:sp>
-          <p:nvSpPr>
-            <p:cNvPr id="482" name="TextBox 481">
-              <a:extLst>
-                <a:ext uri="{FF2B5EF4-FFF2-40B4-BE49-F238E27FC236}">
-                  <a16:creationId xmlns:a16="http://schemas.microsoft.com/office/drawing/2014/main" id="{081C76D3-7777-E2EA-3942-6078AE023792}"/>
-                </a:ext>
-              </a:extLst>
-            </p:cNvPr>
-            <p:cNvSpPr txBox="1"/>
-            <p:nvPr/>
-          </p:nvSpPr>
-          <p:spPr>
-            <a:xfrm>
-              <a:off x="7668418" y="4501640"/>
-              <a:ext cx="741133" cy="215444"/>
-            </a:xfrm>
-            <a:prstGeom prst="rect">
-              <a:avLst/>
-            </a:prstGeom>
-            <a:noFill/>
-          </p:spPr>
-          <p:txBody>
-            <a:bodyPr wrap="square" rtlCol="0">
-              <a:spAutoFit/>
-            </a:bodyPr>
-            <a:lstStyle/>
-            <a:p>
-              <a:pPr algn="ctr"/>
-              <a:r>
-                <a:rPr lang="en-US" sz="800" dirty="0" err="1">
-                  <a:solidFill>
-                    <a:schemeClr val="tx1">
-                      <a:lumMod val="50000"/>
-                      <a:lumOff val="50000"/>
-                    </a:schemeClr>
-                  </a:solidFill>
-                </a:rPr>
-                <a:t>yaml</a:t>
-              </a:r>
-              <a:endParaRPr lang="en-US" sz="800" dirty="0">
-                <a:solidFill>
-                  <a:schemeClr val="tx1">
-                    <a:lumMod val="50000"/>
-                    <a:lumOff val="50000"/>
-                  </a:schemeClr>
-                </a:solidFill>
-              </a:endParaRPr>
-            </a:p>
-          </p:txBody>
-        </p:sp>
-        <p:cxnSp>
-          <p:nvCxnSpPr>
-            <p:cNvPr id="483" name="Connector: Elbow 5">
-              <a:extLst>
-                <a:ext uri="{FF2B5EF4-FFF2-40B4-BE49-F238E27FC236}">
-                  <a16:creationId xmlns:a16="http://schemas.microsoft.com/office/drawing/2014/main" id="{636C9A24-073A-7D74-FBB0-35473FD18C14}"/>
-                </a:ext>
-              </a:extLst>
-            </p:cNvPr>
-            <p:cNvCxnSpPr>
-              <a:cxnSpLocks/>
-            </p:cNvCxnSpPr>
-            <p:nvPr/>
-          </p:nvCxnSpPr>
-          <p:spPr>
-            <a:xfrm flipV="1">
-              <a:off x="8032289" y="4456943"/>
-              <a:ext cx="0" cy="109794"/>
-            </a:xfrm>
-            <a:prstGeom prst="straightConnector1">
-              <a:avLst/>
-            </a:prstGeom>
-            <a:ln>
-              <a:tailEnd type="triangle"/>
-            </a:ln>
-          </p:spPr>
-          <p:style>
-            <a:lnRef idx="1">
-              <a:schemeClr val="accent1"/>
-            </a:lnRef>
-            <a:fillRef idx="0">
-              <a:schemeClr val="accent1"/>
-            </a:fillRef>
-            <a:effectRef idx="0">
-              <a:schemeClr val="accent1"/>
-            </a:effectRef>
-            <a:fontRef idx="minor">
-              <a:schemeClr val="tx1"/>
-            </a:fontRef>
-          </p:style>
-        </p:cxnSp>
-      </p:grpSp>
-      <p:grpSp>
-        <p:nvGrpSpPr>
-          <p:cNvPr id="484" name="Group 483">
-            <a:extLst>
-              <a:ext uri="{FF2B5EF4-FFF2-40B4-BE49-F238E27FC236}">
-                <a16:creationId xmlns:a16="http://schemas.microsoft.com/office/drawing/2014/main" id="{CB7AA150-524B-C6BE-1F9D-F23E5824E057}"/>
-              </a:ext>
-            </a:extLst>
-          </p:cNvPr>
-          <p:cNvGrpSpPr/>
-          <p:nvPr/>
-        </p:nvGrpSpPr>
-        <p:grpSpPr>
-          <a:xfrm>
-            <a:off x="2988049" y="4201589"/>
-            <a:ext cx="741133" cy="260141"/>
-            <a:chOff x="7686586" y="4456943"/>
-            <a:chExt cx="741133" cy="260141"/>
-          </a:xfrm>
-        </p:grpSpPr>
-        <p:sp>
-          <p:nvSpPr>
-            <p:cNvPr id="485" name="TextBox 484">
-              <a:extLst>
-                <a:ext uri="{FF2B5EF4-FFF2-40B4-BE49-F238E27FC236}">
-                  <a16:creationId xmlns:a16="http://schemas.microsoft.com/office/drawing/2014/main" id="{51C5C9A3-3792-D98B-CC24-9EC278F2E4C7}"/>
-                </a:ext>
-              </a:extLst>
-            </p:cNvPr>
-            <p:cNvSpPr txBox="1"/>
-            <p:nvPr/>
-          </p:nvSpPr>
-          <p:spPr>
-            <a:xfrm>
-              <a:off x="7686586" y="4501640"/>
-              <a:ext cx="741133" cy="215444"/>
-            </a:xfrm>
-            <a:prstGeom prst="rect">
-              <a:avLst/>
-            </a:prstGeom>
-            <a:noFill/>
-          </p:spPr>
-          <p:txBody>
-            <a:bodyPr wrap="square" rtlCol="0">
-              <a:spAutoFit/>
-            </a:bodyPr>
-            <a:lstStyle/>
-            <a:p>
-              <a:pPr algn="ctr"/>
-              <a:r>
-                <a:rPr lang="en-US" sz="800" dirty="0">
-                  <a:solidFill>
-                    <a:schemeClr val="tx1">
-                      <a:lumMod val="50000"/>
-                      <a:lumOff val="50000"/>
-                    </a:schemeClr>
-                  </a:solidFill>
-                </a:rPr>
-                <a:t>string</a:t>
-              </a:r>
-            </a:p>
-          </p:txBody>
-        </p:sp>
-        <p:cxnSp>
-          <p:nvCxnSpPr>
-            <p:cNvPr id="486" name="Connector: Elbow 5">
-              <a:extLst>
-                <a:ext uri="{FF2B5EF4-FFF2-40B4-BE49-F238E27FC236}">
-                  <a16:creationId xmlns:a16="http://schemas.microsoft.com/office/drawing/2014/main" id="{20979C60-C9A0-831D-B53A-736E9BAECA77}"/>
-                </a:ext>
-              </a:extLst>
-            </p:cNvPr>
-            <p:cNvCxnSpPr>
-              <a:cxnSpLocks/>
-            </p:cNvCxnSpPr>
-            <p:nvPr/>
-          </p:nvCxnSpPr>
-          <p:spPr>
-            <a:xfrm>
-              <a:off x="8032289" y="4456943"/>
-              <a:ext cx="0" cy="109794"/>
-            </a:xfrm>
-            <a:prstGeom prst="straightConnector1">
-              <a:avLst/>
-            </a:prstGeom>
-            <a:ln>
-              <a:tailEnd type="triangle"/>
-            </a:ln>
-          </p:spPr>
-          <p:style>
-            <a:lnRef idx="1">
-              <a:schemeClr val="accent1"/>
-            </a:lnRef>
-            <a:fillRef idx="0">
-              <a:schemeClr val="accent1"/>
-            </a:fillRef>
-            <a:effectRef idx="0">
-              <a:schemeClr val="accent1"/>
-            </a:effectRef>
-            <a:fontRef idx="minor">
-              <a:schemeClr val="tx1"/>
-            </a:fontRef>
-          </p:style>
-        </p:cxnSp>
-      </p:grpSp>
       <p:sp>
         <p:nvSpPr>
           <p:cNvPr id="488" name="TextBox 487">
@@ -7431,216 +7213,6 @@
           </a:fontRef>
         </p:style>
       </p:cxnSp>
-      <p:grpSp>
-        <p:nvGrpSpPr>
-          <p:cNvPr id="493" name="Group 492">
-            <a:extLst>
-              <a:ext uri="{FF2B5EF4-FFF2-40B4-BE49-F238E27FC236}">
-                <a16:creationId xmlns:a16="http://schemas.microsoft.com/office/drawing/2014/main" id="{91E0F69F-C0A1-DD8C-D8A5-25315E649A99}"/>
-              </a:ext>
-            </a:extLst>
-          </p:cNvPr>
-          <p:cNvGrpSpPr/>
-          <p:nvPr/>
-        </p:nvGrpSpPr>
-        <p:grpSpPr>
-          <a:xfrm>
-            <a:off x="1781900" y="4200872"/>
-            <a:ext cx="741133" cy="260141"/>
-            <a:chOff x="7686586" y="4456943"/>
-            <a:chExt cx="741133" cy="260141"/>
-          </a:xfrm>
-        </p:grpSpPr>
-        <p:sp>
-          <p:nvSpPr>
-            <p:cNvPr id="494" name="TextBox 493">
-              <a:extLst>
-                <a:ext uri="{FF2B5EF4-FFF2-40B4-BE49-F238E27FC236}">
-                  <a16:creationId xmlns:a16="http://schemas.microsoft.com/office/drawing/2014/main" id="{542D629D-A64C-E6E5-1B4F-350B06F535A4}"/>
-                </a:ext>
-              </a:extLst>
-            </p:cNvPr>
-            <p:cNvSpPr txBox="1"/>
-            <p:nvPr/>
-          </p:nvSpPr>
-          <p:spPr>
-            <a:xfrm>
-              <a:off x="7686586" y="4501640"/>
-              <a:ext cx="741133" cy="215444"/>
-            </a:xfrm>
-            <a:prstGeom prst="rect">
-              <a:avLst/>
-            </a:prstGeom>
-            <a:noFill/>
-          </p:spPr>
-          <p:txBody>
-            <a:bodyPr wrap="square" rtlCol="0">
-              <a:spAutoFit/>
-            </a:bodyPr>
-            <a:lstStyle/>
-            <a:p>
-              <a:pPr algn="ctr"/>
-              <a:r>
-                <a:rPr lang="en-US" sz="800" dirty="0">
-                  <a:solidFill>
-                    <a:schemeClr val="tx1">
-                      <a:lumMod val="50000"/>
-                      <a:lumOff val="50000"/>
-                    </a:schemeClr>
-                  </a:solidFill>
-                </a:rPr>
-                <a:t>poco</a:t>
-              </a:r>
-            </a:p>
-          </p:txBody>
-        </p:sp>
-        <p:cxnSp>
-          <p:nvCxnSpPr>
-            <p:cNvPr id="495" name="Connector: Elbow 5">
-              <a:extLst>
-                <a:ext uri="{FF2B5EF4-FFF2-40B4-BE49-F238E27FC236}">
-                  <a16:creationId xmlns:a16="http://schemas.microsoft.com/office/drawing/2014/main" id="{D9512CCB-56DB-23C2-F630-3E5C248FB013}"/>
-                </a:ext>
-              </a:extLst>
-            </p:cNvPr>
-            <p:cNvCxnSpPr>
-              <a:cxnSpLocks/>
-            </p:cNvCxnSpPr>
-            <p:nvPr/>
-          </p:nvCxnSpPr>
-          <p:spPr>
-            <a:xfrm flipV="1">
-              <a:off x="8032289" y="4456943"/>
-              <a:ext cx="0" cy="109794"/>
-            </a:xfrm>
-            <a:prstGeom prst="straightConnector1">
-              <a:avLst/>
-            </a:prstGeom>
-            <a:ln>
-              <a:tailEnd type="triangle"/>
-            </a:ln>
-          </p:spPr>
-          <p:style>
-            <a:lnRef idx="1">
-              <a:schemeClr val="accent1"/>
-            </a:lnRef>
-            <a:fillRef idx="0">
-              <a:schemeClr val="accent1"/>
-            </a:fillRef>
-            <a:effectRef idx="0">
-              <a:schemeClr val="accent1"/>
-            </a:effectRef>
-            <a:fontRef idx="minor">
-              <a:schemeClr val="tx1"/>
-            </a:fontRef>
-          </p:style>
-        </p:cxnSp>
-      </p:grpSp>
-      <p:grpSp>
-        <p:nvGrpSpPr>
-          <p:cNvPr id="496" name="Group 495">
-            <a:extLst>
-              <a:ext uri="{FF2B5EF4-FFF2-40B4-BE49-F238E27FC236}">
-                <a16:creationId xmlns:a16="http://schemas.microsoft.com/office/drawing/2014/main" id="{22BC0987-98B4-03DE-16B1-F421A0AA737D}"/>
-              </a:ext>
-            </a:extLst>
-          </p:cNvPr>
-          <p:cNvGrpSpPr/>
-          <p:nvPr/>
-        </p:nvGrpSpPr>
-        <p:grpSpPr>
-          <a:xfrm>
-            <a:off x="1117982" y="4200872"/>
-            <a:ext cx="741133" cy="260141"/>
-            <a:chOff x="7686586" y="4456943"/>
-            <a:chExt cx="741133" cy="260141"/>
-          </a:xfrm>
-        </p:grpSpPr>
-        <p:sp>
-          <p:nvSpPr>
-            <p:cNvPr id="497" name="TextBox 496">
-              <a:extLst>
-                <a:ext uri="{FF2B5EF4-FFF2-40B4-BE49-F238E27FC236}">
-                  <a16:creationId xmlns:a16="http://schemas.microsoft.com/office/drawing/2014/main" id="{A3D479B3-5AB1-026A-5DAF-E3843FBDD81C}"/>
-                </a:ext>
-              </a:extLst>
-            </p:cNvPr>
-            <p:cNvSpPr txBox="1"/>
-            <p:nvPr/>
-          </p:nvSpPr>
-          <p:spPr>
-            <a:xfrm>
-              <a:off x="7686586" y="4501640"/>
-              <a:ext cx="741133" cy="215444"/>
-            </a:xfrm>
-            <a:prstGeom prst="rect">
-              <a:avLst/>
-            </a:prstGeom>
-            <a:noFill/>
-          </p:spPr>
-          <p:txBody>
-            <a:bodyPr wrap="square" rtlCol="0">
-              <a:spAutoFit/>
-            </a:bodyPr>
-            <a:lstStyle/>
-            <a:p>
-              <a:pPr algn="ctr"/>
-              <a:r>
-                <a:rPr lang="en-US" sz="800" dirty="0">
-                  <a:solidFill>
-                    <a:schemeClr val="tx1">
-                      <a:lumMod val="50000"/>
-                      <a:lumOff val="50000"/>
-                    </a:schemeClr>
-                  </a:solidFill>
-                </a:rPr>
-                <a:t>poco</a:t>
-              </a:r>
-            </a:p>
-          </p:txBody>
-        </p:sp>
-        <p:cxnSp>
-          <p:nvCxnSpPr>
-            <p:cNvPr id="498" name="Connector: Elbow 5">
-              <a:extLst>
-                <a:ext uri="{FF2B5EF4-FFF2-40B4-BE49-F238E27FC236}">
-                  <a16:creationId xmlns:a16="http://schemas.microsoft.com/office/drawing/2014/main" id="{6AB6350D-7209-9D52-213D-BA7B1FDF1FE7}"/>
-                </a:ext>
-              </a:extLst>
-            </p:cNvPr>
-            <p:cNvCxnSpPr>
-              <a:cxnSpLocks/>
-            </p:cNvCxnSpPr>
-            <p:nvPr/>
-          </p:nvCxnSpPr>
-          <p:spPr>
-            <a:xfrm>
-              <a:off x="8032289" y="4456943"/>
-              <a:ext cx="0" cy="109794"/>
-            </a:xfrm>
-            <a:prstGeom prst="straightConnector1">
-              <a:avLst/>
-            </a:prstGeom>
-            <a:ln>
-              <a:tailEnd type="triangle"/>
-            </a:ln>
-          </p:spPr>
-          <p:style>
-            <a:lnRef idx="1">
-              <a:schemeClr val="accent1"/>
-            </a:lnRef>
-            <a:fillRef idx="0">
-              <a:schemeClr val="accent1"/>
-            </a:fillRef>
-            <a:effectRef idx="0">
-              <a:schemeClr val="accent1"/>
-            </a:effectRef>
-            <a:fontRef idx="minor">
-              <a:schemeClr val="tx1"/>
-            </a:fontRef>
-          </p:style>
-        </p:cxnSp>
-      </p:grpSp>
       <p:cxnSp>
         <p:nvCxnSpPr>
           <p:cNvPr id="500" name="Connector: Elbow 5">
@@ -7697,7 +7269,7 @@
         <p:spPr>
           <a:xfrm>
             <a:off x="2762229" y="2618496"/>
-            <a:ext cx="741133" cy="215444"/>
+            <a:ext cx="827781" cy="215444"/>
           </a:xfrm>
           <a:prstGeom prst="rect">
             <a:avLst/>
@@ -7720,7 +7292,7 @@
                   </a:schemeClr>
                 </a:solidFill>
               </a:rPr>
-              <a:t>yaml</a:t>
+              <a:t>json</a:t>
             </a:r>
             <a:endParaRPr lang="en-US" sz="800" dirty="0">
               <a:solidFill>
@@ -8343,6 +7915,371 @@
           </a:p>
         </p:txBody>
       </p:sp>
+      <p:grpSp>
+        <p:nvGrpSpPr>
+          <p:cNvPr id="12" name="Group 11">
+            <a:extLst>
+              <a:ext uri="{FF2B5EF4-FFF2-40B4-BE49-F238E27FC236}">
+                <a16:creationId xmlns:a16="http://schemas.microsoft.com/office/drawing/2014/main" id="{107149E8-D2C4-2573-A4ED-6FCE2701F662}"/>
+              </a:ext>
+            </a:extLst>
+          </p:cNvPr>
+          <p:cNvGrpSpPr/>
+          <p:nvPr/>
+        </p:nvGrpSpPr>
+        <p:grpSpPr>
+          <a:xfrm>
+            <a:off x="1675022" y="4202388"/>
+            <a:ext cx="2174413" cy="266520"/>
+            <a:chOff x="5722209" y="4469922"/>
+            <a:chExt cx="2174413" cy="266520"/>
+          </a:xfrm>
+        </p:grpSpPr>
+        <p:sp>
+          <p:nvSpPr>
+            <p:cNvPr id="18" name="TextBox 17">
+              <a:extLst>
+                <a:ext uri="{FF2B5EF4-FFF2-40B4-BE49-F238E27FC236}">
+                  <a16:creationId xmlns:a16="http://schemas.microsoft.com/office/drawing/2014/main" id="{E988BF87-A46C-C6A0-FE70-610053604E98}"/>
+                </a:ext>
+              </a:extLst>
+            </p:cNvPr>
+            <p:cNvSpPr txBox="1"/>
+            <p:nvPr/>
+          </p:nvSpPr>
+          <p:spPr>
+            <a:xfrm>
+              <a:off x="6705586" y="4514619"/>
+              <a:ext cx="741133" cy="215444"/>
+            </a:xfrm>
+            <a:prstGeom prst="rect">
+              <a:avLst/>
+            </a:prstGeom>
+            <a:noFill/>
+          </p:spPr>
+          <p:txBody>
+            <a:bodyPr wrap="square" rtlCol="0">
+              <a:spAutoFit/>
+            </a:bodyPr>
+            <a:lstStyle/>
+            <a:p>
+              <a:pPr algn="ctr"/>
+              <a:r>
+                <a:rPr lang="en-US" sz="800" dirty="0" err="1">
+                  <a:solidFill>
+                    <a:schemeClr val="tx1">
+                      <a:lumMod val="50000"/>
+                      <a:lumOff val="50000"/>
+                    </a:schemeClr>
+                  </a:solidFill>
+                </a:rPr>
+                <a:t>json</a:t>
+              </a:r>
+              <a:endParaRPr lang="en-US" sz="800" dirty="0">
+                <a:solidFill>
+                  <a:schemeClr val="tx1">
+                    <a:lumMod val="50000"/>
+                    <a:lumOff val="50000"/>
+                  </a:schemeClr>
+                </a:solidFill>
+              </a:endParaRPr>
+            </a:p>
+          </p:txBody>
+        </p:sp>
+        <p:cxnSp>
+          <p:nvCxnSpPr>
+            <p:cNvPr id="36" name="Connector: Elbow 5">
+              <a:extLst>
+                <a:ext uri="{FF2B5EF4-FFF2-40B4-BE49-F238E27FC236}">
+                  <a16:creationId xmlns:a16="http://schemas.microsoft.com/office/drawing/2014/main" id="{D365DB82-C813-E43E-6BE6-F6B6B7095AAD}"/>
+                </a:ext>
+              </a:extLst>
+            </p:cNvPr>
+            <p:cNvCxnSpPr>
+              <a:cxnSpLocks/>
+            </p:cNvCxnSpPr>
+            <p:nvPr/>
+          </p:nvCxnSpPr>
+          <p:spPr>
+            <a:xfrm flipV="1">
+              <a:off x="7051289" y="4469922"/>
+              <a:ext cx="0" cy="109794"/>
+            </a:xfrm>
+            <a:prstGeom prst="straightConnector1">
+              <a:avLst/>
+            </a:prstGeom>
+            <a:ln>
+              <a:tailEnd type="triangle"/>
+            </a:ln>
+          </p:spPr>
+          <p:style>
+            <a:lnRef idx="1">
+              <a:schemeClr val="accent1"/>
+            </a:lnRef>
+            <a:fillRef idx="0">
+              <a:schemeClr val="accent1"/>
+            </a:fillRef>
+            <a:effectRef idx="0">
+              <a:schemeClr val="accent1"/>
+            </a:effectRef>
+            <a:fontRef idx="minor">
+              <a:schemeClr val="tx1"/>
+            </a:fontRef>
+          </p:style>
+        </p:cxnSp>
+        <p:sp>
+          <p:nvSpPr>
+            <p:cNvPr id="37" name="TextBox 36">
+              <a:extLst>
+                <a:ext uri="{FF2B5EF4-FFF2-40B4-BE49-F238E27FC236}">
+                  <a16:creationId xmlns:a16="http://schemas.microsoft.com/office/drawing/2014/main" id="{DF094897-857F-57F6-42F0-06643B4A590B}"/>
+                </a:ext>
+              </a:extLst>
+            </p:cNvPr>
+            <p:cNvSpPr txBox="1"/>
+            <p:nvPr/>
+          </p:nvSpPr>
+          <p:spPr>
+            <a:xfrm>
+              <a:off x="7155489" y="4520998"/>
+              <a:ext cx="741133" cy="215444"/>
+            </a:xfrm>
+            <a:prstGeom prst="rect">
+              <a:avLst/>
+            </a:prstGeom>
+            <a:noFill/>
+          </p:spPr>
+          <p:txBody>
+            <a:bodyPr wrap="square" rtlCol="0">
+              <a:spAutoFit/>
+            </a:bodyPr>
+            <a:lstStyle/>
+            <a:p>
+              <a:pPr algn="ctr"/>
+              <a:r>
+                <a:rPr lang="en-US" sz="800" dirty="0">
+                  <a:solidFill>
+                    <a:schemeClr val="tx1">
+                      <a:lumMod val="50000"/>
+                      <a:lumOff val="50000"/>
+                    </a:schemeClr>
+                  </a:solidFill>
+                </a:rPr>
+                <a:t>string</a:t>
+              </a:r>
+            </a:p>
+          </p:txBody>
+        </p:sp>
+        <p:cxnSp>
+          <p:nvCxnSpPr>
+            <p:cNvPr id="38" name="Connector: Elbow 5">
+              <a:extLst>
+                <a:ext uri="{FF2B5EF4-FFF2-40B4-BE49-F238E27FC236}">
+                  <a16:creationId xmlns:a16="http://schemas.microsoft.com/office/drawing/2014/main" id="{E9D8943E-C205-567B-63D7-48D787BCA2B5}"/>
+                </a:ext>
+              </a:extLst>
+            </p:cNvPr>
+            <p:cNvCxnSpPr>
+              <a:cxnSpLocks/>
+            </p:cNvCxnSpPr>
+            <p:nvPr/>
+          </p:nvCxnSpPr>
+          <p:spPr>
+            <a:xfrm>
+              <a:off x="7501192" y="4476301"/>
+              <a:ext cx="0" cy="109794"/>
+            </a:xfrm>
+            <a:prstGeom prst="straightConnector1">
+              <a:avLst/>
+            </a:prstGeom>
+            <a:ln>
+              <a:tailEnd type="triangle"/>
+            </a:ln>
+          </p:spPr>
+          <p:style>
+            <a:lnRef idx="1">
+              <a:schemeClr val="accent1"/>
+            </a:lnRef>
+            <a:fillRef idx="0">
+              <a:schemeClr val="accent1"/>
+            </a:fillRef>
+            <a:effectRef idx="0">
+              <a:schemeClr val="accent1"/>
+            </a:effectRef>
+            <a:fontRef idx="minor">
+              <a:schemeClr val="tx1"/>
+            </a:fontRef>
+          </p:style>
+        </p:cxnSp>
+        <p:sp>
+          <p:nvSpPr>
+            <p:cNvPr id="39" name="TextBox 38">
+              <a:extLst>
+                <a:ext uri="{FF2B5EF4-FFF2-40B4-BE49-F238E27FC236}">
+                  <a16:creationId xmlns:a16="http://schemas.microsoft.com/office/drawing/2014/main" id="{A90F797F-453F-2804-BCE8-49A5C576D3B3}"/>
+                </a:ext>
+              </a:extLst>
+            </p:cNvPr>
+            <p:cNvSpPr txBox="1"/>
+            <p:nvPr/>
+          </p:nvSpPr>
+          <p:spPr>
+            <a:xfrm>
+              <a:off x="6108683" y="4514619"/>
+              <a:ext cx="741133" cy="215444"/>
+            </a:xfrm>
+            <a:prstGeom prst="rect">
+              <a:avLst/>
+            </a:prstGeom>
+            <a:noFill/>
+          </p:spPr>
+          <p:txBody>
+            <a:bodyPr wrap="square" rtlCol="0">
+              <a:spAutoFit/>
+            </a:bodyPr>
+            <a:lstStyle/>
+            <a:p>
+              <a:pPr algn="ctr"/>
+              <a:r>
+                <a:rPr lang="en-US" sz="800" dirty="0">
+                  <a:solidFill>
+                    <a:schemeClr val="tx1">
+                      <a:lumMod val="50000"/>
+                      <a:lumOff val="50000"/>
+                    </a:schemeClr>
+                  </a:solidFill>
+                </a:rPr>
+                <a:t>poco</a:t>
+              </a:r>
+            </a:p>
+          </p:txBody>
+        </p:sp>
+        <p:cxnSp>
+          <p:nvCxnSpPr>
+            <p:cNvPr id="40" name="Connector: Elbow 5">
+              <a:extLst>
+                <a:ext uri="{FF2B5EF4-FFF2-40B4-BE49-F238E27FC236}">
+                  <a16:creationId xmlns:a16="http://schemas.microsoft.com/office/drawing/2014/main" id="{5DC54954-95DC-341A-E487-A359304D91CA}"/>
+                </a:ext>
+              </a:extLst>
+            </p:cNvPr>
+            <p:cNvCxnSpPr>
+              <a:cxnSpLocks/>
+            </p:cNvCxnSpPr>
+            <p:nvPr/>
+          </p:nvCxnSpPr>
+          <p:spPr>
+            <a:xfrm flipV="1">
+              <a:off x="6452005" y="4469922"/>
+              <a:ext cx="0" cy="109794"/>
+            </a:xfrm>
+            <a:prstGeom prst="straightConnector1">
+              <a:avLst/>
+            </a:prstGeom>
+            <a:ln>
+              <a:tailEnd type="triangle"/>
+            </a:ln>
+          </p:spPr>
+          <p:style>
+            <a:lnRef idx="1">
+              <a:schemeClr val="accent1"/>
+            </a:lnRef>
+            <a:fillRef idx="0">
+              <a:schemeClr val="accent1"/>
+            </a:fillRef>
+            <a:effectRef idx="0">
+              <a:schemeClr val="accent1"/>
+            </a:effectRef>
+            <a:fontRef idx="minor">
+              <a:schemeClr val="tx1"/>
+            </a:fontRef>
+          </p:style>
+        </p:cxnSp>
+        <p:sp>
+          <p:nvSpPr>
+            <p:cNvPr id="41" name="TextBox 40">
+              <a:extLst>
+                <a:ext uri="{FF2B5EF4-FFF2-40B4-BE49-F238E27FC236}">
+                  <a16:creationId xmlns:a16="http://schemas.microsoft.com/office/drawing/2014/main" id="{35CDA202-9F55-2EF7-8875-AAF6A4C6DC83}"/>
+                </a:ext>
+              </a:extLst>
+            </p:cNvPr>
+            <p:cNvSpPr txBox="1"/>
+            <p:nvPr/>
+          </p:nvSpPr>
+          <p:spPr>
+            <a:xfrm>
+              <a:off x="5722209" y="4520671"/>
+              <a:ext cx="741133" cy="215444"/>
+            </a:xfrm>
+            <a:prstGeom prst="rect">
+              <a:avLst/>
+            </a:prstGeom>
+            <a:noFill/>
+          </p:spPr>
+          <p:txBody>
+            <a:bodyPr wrap="square" rtlCol="0">
+              <a:spAutoFit/>
+            </a:bodyPr>
+            <a:lstStyle/>
+            <a:p>
+              <a:pPr algn="ctr"/>
+              <a:r>
+                <a:rPr lang="en-US" sz="800" dirty="0">
+                  <a:solidFill>
+                    <a:schemeClr val="tx1">
+                      <a:lumMod val="50000"/>
+                      <a:lumOff val="50000"/>
+                    </a:schemeClr>
+                  </a:solidFill>
+                </a:rPr>
+                <a:t>poco</a:t>
+              </a:r>
+            </a:p>
+          </p:txBody>
+        </p:sp>
+        <p:cxnSp>
+          <p:nvCxnSpPr>
+            <p:cNvPr id="42" name="Connector: Elbow 5">
+              <a:extLst>
+                <a:ext uri="{FF2B5EF4-FFF2-40B4-BE49-F238E27FC236}">
+                  <a16:creationId xmlns:a16="http://schemas.microsoft.com/office/drawing/2014/main" id="{FB916B80-79B3-AA32-0EF9-117CCC8F4905}"/>
+                </a:ext>
+              </a:extLst>
+            </p:cNvPr>
+            <p:cNvCxnSpPr>
+              <a:cxnSpLocks/>
+            </p:cNvCxnSpPr>
+            <p:nvPr/>
+          </p:nvCxnSpPr>
+          <p:spPr>
+            <a:xfrm>
+              <a:off x="6027435" y="4475974"/>
+              <a:ext cx="0" cy="109794"/>
+            </a:xfrm>
+            <a:prstGeom prst="straightConnector1">
+              <a:avLst/>
+            </a:prstGeom>
+            <a:ln>
+              <a:tailEnd type="triangle"/>
+            </a:ln>
+          </p:spPr>
+          <p:style>
+            <a:lnRef idx="1">
+              <a:schemeClr val="accent1"/>
+            </a:lnRef>
+            <a:fillRef idx="0">
+              <a:schemeClr val="accent1"/>
+            </a:fillRef>
+            <a:effectRef idx="0">
+              <a:schemeClr val="accent1"/>
+            </a:effectRef>
+            <a:fontRef idx="minor">
+              <a:schemeClr val="tx1"/>
+            </a:fontRef>
+          </p:style>
+        </p:cxnSp>
+      </p:grpSp>
     </p:spTree>
     <p:extLst>
       <p:ext uri="{BB962C8B-B14F-4D97-AF65-F5344CB8AC3E}">
@@ -8375,10 +8312,10 @@
       </p:grpSpPr>
       <p:grpSp>
         <p:nvGrpSpPr>
-          <p:cNvPr id="227" name="Group 226">
+          <p:cNvPr id="12" name="Group 11">
             <a:extLst>
               <a:ext uri="{FF2B5EF4-FFF2-40B4-BE49-F238E27FC236}">
-                <a16:creationId xmlns:a16="http://schemas.microsoft.com/office/drawing/2014/main" id="{00ADCB59-D113-1780-4EF7-867F3D14D91C}"/>
+                <a16:creationId xmlns:a16="http://schemas.microsoft.com/office/drawing/2014/main" id="{820961D0-B688-ABFD-A74B-3C7D4F94F021}"/>
               </a:ext>
             </a:extLst>
           </p:cNvPr>
@@ -8514,7 +8451,7 @@
           <p:spPr>
             <a:xfrm>
               <a:off x="6859032" y="2886127"/>
-              <a:ext cx="741133" cy="215444"/>
+              <a:ext cx="763015" cy="215444"/>
             </a:xfrm>
             <a:prstGeom prst="rect">
               <a:avLst/>
@@ -8537,7 +8474,7 @@
                     </a:schemeClr>
                   </a:solidFill>
                 </a:rPr>
-                <a:t>yaml</a:t>
+                <a:t>json</a:t>
               </a:r>
               <a:endParaRPr lang="en-US" sz="800" dirty="0">
                 <a:solidFill>
@@ -9124,7 +9061,7 @@
                   <a:ea typeface="+mn-ea"/>
                   <a:cs typeface="+mn-cs"/>
                 </a:rPr>
-                <a:t>[Rapid YAML]</a:t>
+                <a:t>[Rapid JSON]</a:t>
               </a:r>
             </a:p>
             <a:p>
@@ -11349,434 +11286,6 @@
         </p:sp>
         <p:grpSp>
           <p:nvGrpSpPr>
-            <p:cNvPr id="13" name="Group 12">
-              <a:extLst>
-                <a:ext uri="{FF2B5EF4-FFF2-40B4-BE49-F238E27FC236}">
-                  <a16:creationId xmlns:a16="http://schemas.microsoft.com/office/drawing/2014/main" id="{D2E99C53-C9A7-9815-789C-FEC47C63B43A}"/>
-                </a:ext>
-              </a:extLst>
-            </p:cNvPr>
-            <p:cNvGrpSpPr/>
-            <p:nvPr/>
-          </p:nvGrpSpPr>
-          <p:grpSpPr>
-            <a:xfrm>
-              <a:off x="7686586" y="4475974"/>
-              <a:ext cx="741133" cy="260141"/>
-              <a:chOff x="7686586" y="4456943"/>
-              <a:chExt cx="741133" cy="260141"/>
-            </a:xfrm>
-          </p:grpSpPr>
-          <p:sp>
-            <p:nvSpPr>
-              <p:cNvPr id="10" name="TextBox 9">
-                <a:extLst>
-                  <a:ext uri="{FF2B5EF4-FFF2-40B4-BE49-F238E27FC236}">
-                    <a16:creationId xmlns:a16="http://schemas.microsoft.com/office/drawing/2014/main" id="{D6B27012-4AC4-9B2E-5068-BD9EC7219C92}"/>
-                  </a:ext>
-                </a:extLst>
-              </p:cNvPr>
-              <p:cNvSpPr txBox="1"/>
-              <p:nvPr/>
-            </p:nvSpPr>
-            <p:spPr>
-              <a:xfrm>
-                <a:off x="7686586" y="4501640"/>
-                <a:ext cx="741133" cy="215444"/>
-              </a:xfrm>
-              <a:prstGeom prst="rect">
-                <a:avLst/>
-              </a:prstGeom>
-              <a:noFill/>
-            </p:spPr>
-            <p:txBody>
-              <a:bodyPr wrap="square" rtlCol="0">
-                <a:spAutoFit/>
-              </a:bodyPr>
-              <a:lstStyle/>
-              <a:p>
-                <a:pPr algn="ctr"/>
-                <a:r>
-                  <a:rPr lang="en-US" sz="800" dirty="0" err="1">
-                    <a:solidFill>
-                      <a:schemeClr val="tx1">
-                        <a:lumMod val="50000"/>
-                        <a:lumOff val="50000"/>
-                      </a:schemeClr>
-                    </a:solidFill>
-                  </a:rPr>
-                  <a:t>yaml</a:t>
-                </a:r>
-                <a:endParaRPr lang="en-US" sz="800" dirty="0">
-                  <a:solidFill>
-                    <a:schemeClr val="tx1">
-                      <a:lumMod val="50000"/>
-                      <a:lumOff val="50000"/>
-                    </a:schemeClr>
-                  </a:solidFill>
-                </a:endParaRPr>
-              </a:p>
-            </p:txBody>
-          </p:sp>
-          <p:cxnSp>
-            <p:nvCxnSpPr>
-              <p:cNvPr id="11" name="Connector: Elbow 5">
-                <a:extLst>
-                  <a:ext uri="{FF2B5EF4-FFF2-40B4-BE49-F238E27FC236}">
-                    <a16:creationId xmlns:a16="http://schemas.microsoft.com/office/drawing/2014/main" id="{9BC79F4E-C68A-D7C7-6842-8F798065BB31}"/>
-                  </a:ext>
-                </a:extLst>
-              </p:cNvPr>
-              <p:cNvCxnSpPr>
-                <a:cxnSpLocks/>
-              </p:cNvCxnSpPr>
-              <p:nvPr/>
-            </p:nvCxnSpPr>
-            <p:spPr>
-              <a:xfrm flipV="1">
-                <a:off x="8032289" y="4456943"/>
-                <a:ext cx="0" cy="109794"/>
-              </a:xfrm>
-              <a:prstGeom prst="straightConnector1">
-                <a:avLst/>
-              </a:prstGeom>
-              <a:ln>
-                <a:tailEnd type="triangle"/>
-              </a:ln>
-            </p:spPr>
-            <p:style>
-              <a:lnRef idx="1">
-                <a:schemeClr val="accent1"/>
-              </a:lnRef>
-              <a:fillRef idx="0">
-                <a:schemeClr val="accent1"/>
-              </a:fillRef>
-              <a:effectRef idx="0">
-                <a:schemeClr val="accent1"/>
-              </a:effectRef>
-              <a:fontRef idx="minor">
-                <a:schemeClr val="tx1"/>
-              </a:fontRef>
-            </p:style>
-          </p:cxnSp>
-        </p:grpSp>
-        <p:grpSp>
-          <p:nvGrpSpPr>
-            <p:cNvPr id="14" name="Group 13">
-              <a:extLst>
-                <a:ext uri="{FF2B5EF4-FFF2-40B4-BE49-F238E27FC236}">
-                  <a16:creationId xmlns:a16="http://schemas.microsoft.com/office/drawing/2014/main" id="{480AC056-F39F-E935-018D-D3F5488ECFD9}"/>
-                </a:ext>
-              </a:extLst>
-            </p:cNvPr>
-            <p:cNvGrpSpPr/>
-            <p:nvPr/>
-          </p:nvGrpSpPr>
-          <p:grpSpPr>
-            <a:xfrm>
-              <a:off x="7022668" y="4475974"/>
-              <a:ext cx="741133" cy="260141"/>
-              <a:chOff x="7686586" y="4456943"/>
-              <a:chExt cx="741133" cy="260141"/>
-            </a:xfrm>
-          </p:grpSpPr>
-          <p:sp>
-            <p:nvSpPr>
-              <p:cNvPr id="16" name="TextBox 15">
-                <a:extLst>
-                  <a:ext uri="{FF2B5EF4-FFF2-40B4-BE49-F238E27FC236}">
-                    <a16:creationId xmlns:a16="http://schemas.microsoft.com/office/drawing/2014/main" id="{42FD78FC-4540-0DB8-AC64-AB392F9CB36D}"/>
-                  </a:ext>
-                </a:extLst>
-              </p:cNvPr>
-              <p:cNvSpPr txBox="1"/>
-              <p:nvPr/>
-            </p:nvSpPr>
-            <p:spPr>
-              <a:xfrm>
-                <a:off x="7686586" y="4501640"/>
-                <a:ext cx="741133" cy="215444"/>
-              </a:xfrm>
-              <a:prstGeom prst="rect">
-                <a:avLst/>
-              </a:prstGeom>
-              <a:noFill/>
-            </p:spPr>
-            <p:txBody>
-              <a:bodyPr wrap="square" rtlCol="0">
-                <a:spAutoFit/>
-              </a:bodyPr>
-              <a:lstStyle/>
-              <a:p>
-                <a:pPr algn="ctr"/>
-                <a:r>
-                  <a:rPr lang="en-US" sz="800" dirty="0">
-                    <a:solidFill>
-                      <a:schemeClr val="tx1">
-                        <a:lumMod val="50000"/>
-                        <a:lumOff val="50000"/>
-                      </a:schemeClr>
-                    </a:solidFill>
-                  </a:rPr>
-                  <a:t>string</a:t>
-                </a:r>
-              </a:p>
-            </p:txBody>
-          </p:sp>
-          <p:cxnSp>
-            <p:nvCxnSpPr>
-              <p:cNvPr id="17" name="Connector: Elbow 5">
-                <a:extLst>
-                  <a:ext uri="{FF2B5EF4-FFF2-40B4-BE49-F238E27FC236}">
-                    <a16:creationId xmlns:a16="http://schemas.microsoft.com/office/drawing/2014/main" id="{3A08C62F-17EB-72B3-8D3E-ADE880D522EA}"/>
-                  </a:ext>
-                </a:extLst>
-              </p:cNvPr>
-              <p:cNvCxnSpPr>
-                <a:cxnSpLocks/>
-              </p:cNvCxnSpPr>
-              <p:nvPr/>
-            </p:nvCxnSpPr>
-            <p:spPr>
-              <a:xfrm>
-                <a:off x="8032289" y="4456943"/>
-                <a:ext cx="0" cy="109794"/>
-              </a:xfrm>
-              <a:prstGeom prst="straightConnector1">
-                <a:avLst/>
-              </a:prstGeom>
-              <a:ln>
-                <a:tailEnd type="triangle"/>
-              </a:ln>
-            </p:spPr>
-            <p:style>
-              <a:lnRef idx="1">
-                <a:schemeClr val="accent1"/>
-              </a:lnRef>
-              <a:fillRef idx="0">
-                <a:schemeClr val="accent1"/>
-              </a:fillRef>
-              <a:effectRef idx="0">
-                <a:schemeClr val="accent1"/>
-              </a:effectRef>
-              <a:fontRef idx="minor">
-                <a:schemeClr val="tx1"/>
-              </a:fontRef>
-            </p:style>
-          </p:cxnSp>
-        </p:grpSp>
-        <p:grpSp>
-          <p:nvGrpSpPr>
-            <p:cNvPr id="24" name="Group 23">
-              <a:extLst>
-                <a:ext uri="{FF2B5EF4-FFF2-40B4-BE49-F238E27FC236}">
-                  <a16:creationId xmlns:a16="http://schemas.microsoft.com/office/drawing/2014/main" id="{4795D504-6FD2-A267-A0B9-C11594736D05}"/>
-                </a:ext>
-              </a:extLst>
-            </p:cNvPr>
-            <p:cNvGrpSpPr/>
-            <p:nvPr/>
-          </p:nvGrpSpPr>
-          <p:grpSpPr>
-            <a:xfrm>
-              <a:off x="5828219" y="4469922"/>
-              <a:ext cx="741133" cy="260141"/>
-              <a:chOff x="7686586" y="4456943"/>
-              <a:chExt cx="741133" cy="260141"/>
-            </a:xfrm>
-          </p:grpSpPr>
-          <p:sp>
-            <p:nvSpPr>
-              <p:cNvPr id="26" name="TextBox 25">
-                <a:extLst>
-                  <a:ext uri="{FF2B5EF4-FFF2-40B4-BE49-F238E27FC236}">
-                    <a16:creationId xmlns:a16="http://schemas.microsoft.com/office/drawing/2014/main" id="{96A8F2BB-AAFC-DF13-80BB-4BC5D4C52327}"/>
-                  </a:ext>
-                </a:extLst>
-              </p:cNvPr>
-              <p:cNvSpPr txBox="1"/>
-              <p:nvPr/>
-            </p:nvSpPr>
-            <p:spPr>
-              <a:xfrm>
-                <a:off x="7686586" y="4501640"/>
-                <a:ext cx="741133" cy="215444"/>
-              </a:xfrm>
-              <a:prstGeom prst="rect">
-                <a:avLst/>
-              </a:prstGeom>
-              <a:noFill/>
-            </p:spPr>
-            <p:txBody>
-              <a:bodyPr wrap="square" rtlCol="0">
-                <a:spAutoFit/>
-              </a:bodyPr>
-              <a:lstStyle/>
-              <a:p>
-                <a:pPr algn="ctr"/>
-                <a:r>
-                  <a:rPr lang="en-US" sz="800" dirty="0">
-                    <a:solidFill>
-                      <a:schemeClr val="tx1">
-                        <a:lumMod val="50000"/>
-                        <a:lumOff val="50000"/>
-                      </a:schemeClr>
-                    </a:solidFill>
-                  </a:rPr>
-                  <a:t>poco</a:t>
-                </a:r>
-              </a:p>
-            </p:txBody>
-          </p:sp>
-          <p:cxnSp>
-            <p:nvCxnSpPr>
-              <p:cNvPr id="29" name="Connector: Elbow 5">
-                <a:extLst>
-                  <a:ext uri="{FF2B5EF4-FFF2-40B4-BE49-F238E27FC236}">
-                    <a16:creationId xmlns:a16="http://schemas.microsoft.com/office/drawing/2014/main" id="{F1269B71-CA41-CFE8-6D9E-C73D196EB113}"/>
-                  </a:ext>
-                </a:extLst>
-              </p:cNvPr>
-              <p:cNvCxnSpPr>
-                <a:cxnSpLocks/>
-              </p:cNvCxnSpPr>
-              <p:nvPr/>
-            </p:nvCxnSpPr>
-            <p:spPr>
-              <a:xfrm flipV="1">
-                <a:off x="8032289" y="4456943"/>
-                <a:ext cx="0" cy="109794"/>
-              </a:xfrm>
-              <a:prstGeom prst="straightConnector1">
-                <a:avLst/>
-              </a:prstGeom>
-              <a:ln>
-                <a:tailEnd type="triangle"/>
-              </a:ln>
-            </p:spPr>
-            <p:style>
-              <a:lnRef idx="1">
-                <a:schemeClr val="accent1"/>
-              </a:lnRef>
-              <a:fillRef idx="0">
-                <a:schemeClr val="accent1"/>
-              </a:fillRef>
-              <a:effectRef idx="0">
-                <a:schemeClr val="accent1"/>
-              </a:effectRef>
-              <a:fontRef idx="minor">
-                <a:schemeClr val="tx1"/>
-              </a:fontRef>
-            </p:style>
-          </p:cxnSp>
-        </p:grpSp>
-        <p:grpSp>
-          <p:nvGrpSpPr>
-            <p:cNvPr id="30" name="Group 29">
-              <a:extLst>
-                <a:ext uri="{FF2B5EF4-FFF2-40B4-BE49-F238E27FC236}">
-                  <a16:creationId xmlns:a16="http://schemas.microsoft.com/office/drawing/2014/main" id="{B61A5CAF-E747-E45D-D2BE-D543C910EC4B}"/>
-                </a:ext>
-              </a:extLst>
-            </p:cNvPr>
-            <p:cNvGrpSpPr/>
-            <p:nvPr/>
-          </p:nvGrpSpPr>
-          <p:grpSpPr>
-            <a:xfrm>
-              <a:off x="5164301" y="4469922"/>
-              <a:ext cx="741133" cy="260141"/>
-              <a:chOff x="7686586" y="4456943"/>
-              <a:chExt cx="741133" cy="260141"/>
-            </a:xfrm>
-          </p:grpSpPr>
-          <p:sp>
-            <p:nvSpPr>
-              <p:cNvPr id="31" name="TextBox 30">
-                <a:extLst>
-                  <a:ext uri="{FF2B5EF4-FFF2-40B4-BE49-F238E27FC236}">
-                    <a16:creationId xmlns:a16="http://schemas.microsoft.com/office/drawing/2014/main" id="{D813B333-2ADB-3DF7-4327-41883F890956}"/>
-                  </a:ext>
-                </a:extLst>
-              </p:cNvPr>
-              <p:cNvSpPr txBox="1"/>
-              <p:nvPr/>
-            </p:nvSpPr>
-            <p:spPr>
-              <a:xfrm>
-                <a:off x="7686586" y="4501640"/>
-                <a:ext cx="741133" cy="215444"/>
-              </a:xfrm>
-              <a:prstGeom prst="rect">
-                <a:avLst/>
-              </a:prstGeom>
-              <a:noFill/>
-            </p:spPr>
-            <p:txBody>
-              <a:bodyPr wrap="square" rtlCol="0">
-                <a:spAutoFit/>
-              </a:bodyPr>
-              <a:lstStyle/>
-              <a:p>
-                <a:pPr algn="ctr"/>
-                <a:r>
-                  <a:rPr lang="en-US" sz="800" dirty="0">
-                    <a:solidFill>
-                      <a:schemeClr val="tx1">
-                        <a:lumMod val="50000"/>
-                        <a:lumOff val="50000"/>
-                      </a:schemeClr>
-                    </a:solidFill>
-                  </a:rPr>
-                  <a:t>poco</a:t>
-                </a:r>
-              </a:p>
-            </p:txBody>
-          </p:sp>
-          <p:cxnSp>
-            <p:nvCxnSpPr>
-              <p:cNvPr id="35" name="Connector: Elbow 5">
-                <a:extLst>
-                  <a:ext uri="{FF2B5EF4-FFF2-40B4-BE49-F238E27FC236}">
-                    <a16:creationId xmlns:a16="http://schemas.microsoft.com/office/drawing/2014/main" id="{3B7F34B8-F9B4-30D8-0444-604669DCF1B7}"/>
-                  </a:ext>
-                </a:extLst>
-              </p:cNvPr>
-              <p:cNvCxnSpPr>
-                <a:cxnSpLocks/>
-              </p:cNvCxnSpPr>
-              <p:nvPr/>
-            </p:nvCxnSpPr>
-            <p:spPr>
-              <a:xfrm>
-                <a:off x="8032289" y="4456943"/>
-                <a:ext cx="0" cy="109794"/>
-              </a:xfrm>
-              <a:prstGeom prst="straightConnector1">
-                <a:avLst/>
-              </a:prstGeom>
-              <a:ln>
-                <a:tailEnd type="triangle"/>
-              </a:ln>
-            </p:spPr>
-            <p:style>
-              <a:lnRef idx="1">
-                <a:schemeClr val="accent1"/>
-              </a:lnRef>
-              <a:fillRef idx="0">
-                <a:schemeClr val="accent1"/>
-              </a:fillRef>
-              <a:effectRef idx="0">
-                <a:schemeClr val="accent1"/>
-              </a:effectRef>
-              <a:fontRef idx="minor">
-                <a:schemeClr val="tx1"/>
-              </a:fontRef>
-            </p:style>
-          </p:cxnSp>
-        </p:grpSp>
-        <p:grpSp>
-          <p:nvGrpSpPr>
             <p:cNvPr id="218" name="Group 217">
               <a:extLst>
                 <a:ext uri="{FF2B5EF4-FFF2-40B4-BE49-F238E27FC236}">
@@ -12068,7 +11577,7 @@
             <a:pPr algn="ctr"/>
             <a:r>
               <a:rPr lang="en-US" dirty="0"/>
-              <a:t>AVX Roadmap – 3B27 – CY2023</a:t>
+              <a:t>AVX Roadmap – 3C02 – CY2023</a:t>
             </a:r>
           </a:p>
         </p:txBody>
@@ -12761,6 +12270,371 @@
           </a:fontRef>
         </p:style>
       </p:cxnSp>
+      <p:grpSp>
+        <p:nvGrpSpPr>
+          <p:cNvPr id="42" name="Group 41">
+            <a:extLst>
+              <a:ext uri="{FF2B5EF4-FFF2-40B4-BE49-F238E27FC236}">
+                <a16:creationId xmlns:a16="http://schemas.microsoft.com/office/drawing/2014/main" id="{6804F219-E975-482A-0FEE-4E4164F00CEF}"/>
+              </a:ext>
+            </a:extLst>
+          </p:cNvPr>
+          <p:cNvGrpSpPr/>
+          <p:nvPr/>
+        </p:nvGrpSpPr>
+        <p:grpSpPr>
+          <a:xfrm>
+            <a:off x="5713691" y="4464428"/>
+            <a:ext cx="2174413" cy="266520"/>
+            <a:chOff x="5722209" y="4469922"/>
+            <a:chExt cx="2174413" cy="266520"/>
+          </a:xfrm>
+        </p:grpSpPr>
+        <p:sp>
+          <p:nvSpPr>
+            <p:cNvPr id="43" name="TextBox 42">
+              <a:extLst>
+                <a:ext uri="{FF2B5EF4-FFF2-40B4-BE49-F238E27FC236}">
+                  <a16:creationId xmlns:a16="http://schemas.microsoft.com/office/drawing/2014/main" id="{F3BE25D5-C38E-8F5E-2DBE-4F18C0A6A1C6}"/>
+                </a:ext>
+              </a:extLst>
+            </p:cNvPr>
+            <p:cNvSpPr txBox="1"/>
+            <p:nvPr/>
+          </p:nvSpPr>
+          <p:spPr>
+            <a:xfrm>
+              <a:off x="6705586" y="4514619"/>
+              <a:ext cx="741133" cy="215444"/>
+            </a:xfrm>
+            <a:prstGeom prst="rect">
+              <a:avLst/>
+            </a:prstGeom>
+            <a:noFill/>
+          </p:spPr>
+          <p:txBody>
+            <a:bodyPr wrap="square" rtlCol="0">
+              <a:spAutoFit/>
+            </a:bodyPr>
+            <a:lstStyle/>
+            <a:p>
+              <a:pPr algn="ctr"/>
+              <a:r>
+                <a:rPr lang="en-US" sz="800" dirty="0" err="1">
+                  <a:solidFill>
+                    <a:schemeClr val="tx1">
+                      <a:lumMod val="50000"/>
+                      <a:lumOff val="50000"/>
+                    </a:schemeClr>
+                  </a:solidFill>
+                </a:rPr>
+                <a:t>json</a:t>
+              </a:r>
+              <a:endParaRPr lang="en-US" sz="800" dirty="0">
+                <a:solidFill>
+                  <a:schemeClr val="tx1">
+                    <a:lumMod val="50000"/>
+                    <a:lumOff val="50000"/>
+                  </a:schemeClr>
+                </a:solidFill>
+              </a:endParaRPr>
+            </a:p>
+          </p:txBody>
+        </p:sp>
+        <p:cxnSp>
+          <p:nvCxnSpPr>
+            <p:cNvPr id="44" name="Connector: Elbow 5">
+              <a:extLst>
+                <a:ext uri="{FF2B5EF4-FFF2-40B4-BE49-F238E27FC236}">
+                  <a16:creationId xmlns:a16="http://schemas.microsoft.com/office/drawing/2014/main" id="{C3672E63-5339-A4A9-6A4F-F5DAA4C825FA}"/>
+                </a:ext>
+              </a:extLst>
+            </p:cNvPr>
+            <p:cNvCxnSpPr>
+              <a:cxnSpLocks/>
+            </p:cNvCxnSpPr>
+            <p:nvPr/>
+          </p:nvCxnSpPr>
+          <p:spPr>
+            <a:xfrm flipV="1">
+              <a:off x="7051289" y="4469922"/>
+              <a:ext cx="0" cy="109794"/>
+            </a:xfrm>
+            <a:prstGeom prst="straightConnector1">
+              <a:avLst/>
+            </a:prstGeom>
+            <a:ln>
+              <a:tailEnd type="triangle"/>
+            </a:ln>
+          </p:spPr>
+          <p:style>
+            <a:lnRef idx="1">
+              <a:schemeClr val="accent1"/>
+            </a:lnRef>
+            <a:fillRef idx="0">
+              <a:schemeClr val="accent1"/>
+            </a:fillRef>
+            <a:effectRef idx="0">
+              <a:schemeClr val="accent1"/>
+            </a:effectRef>
+            <a:fontRef idx="minor">
+              <a:schemeClr val="tx1"/>
+            </a:fontRef>
+          </p:style>
+        </p:cxnSp>
+        <p:sp>
+          <p:nvSpPr>
+            <p:cNvPr id="45" name="TextBox 44">
+              <a:extLst>
+                <a:ext uri="{FF2B5EF4-FFF2-40B4-BE49-F238E27FC236}">
+                  <a16:creationId xmlns:a16="http://schemas.microsoft.com/office/drawing/2014/main" id="{805F6914-46FB-A099-DB30-FBFBF31FD963}"/>
+                </a:ext>
+              </a:extLst>
+            </p:cNvPr>
+            <p:cNvSpPr txBox="1"/>
+            <p:nvPr/>
+          </p:nvSpPr>
+          <p:spPr>
+            <a:xfrm>
+              <a:off x="7155489" y="4520998"/>
+              <a:ext cx="741133" cy="215444"/>
+            </a:xfrm>
+            <a:prstGeom prst="rect">
+              <a:avLst/>
+            </a:prstGeom>
+            <a:noFill/>
+          </p:spPr>
+          <p:txBody>
+            <a:bodyPr wrap="square" rtlCol="0">
+              <a:spAutoFit/>
+            </a:bodyPr>
+            <a:lstStyle/>
+            <a:p>
+              <a:pPr algn="ctr"/>
+              <a:r>
+                <a:rPr lang="en-US" sz="800" dirty="0">
+                  <a:solidFill>
+                    <a:schemeClr val="tx1">
+                      <a:lumMod val="50000"/>
+                      <a:lumOff val="50000"/>
+                    </a:schemeClr>
+                  </a:solidFill>
+                </a:rPr>
+                <a:t>string</a:t>
+              </a:r>
+            </a:p>
+          </p:txBody>
+        </p:sp>
+        <p:cxnSp>
+          <p:nvCxnSpPr>
+            <p:cNvPr id="46" name="Connector: Elbow 5">
+              <a:extLst>
+                <a:ext uri="{FF2B5EF4-FFF2-40B4-BE49-F238E27FC236}">
+                  <a16:creationId xmlns:a16="http://schemas.microsoft.com/office/drawing/2014/main" id="{C61EC2FF-F906-AA69-3929-920E39A626C1}"/>
+                </a:ext>
+              </a:extLst>
+            </p:cNvPr>
+            <p:cNvCxnSpPr>
+              <a:cxnSpLocks/>
+            </p:cNvCxnSpPr>
+            <p:nvPr/>
+          </p:nvCxnSpPr>
+          <p:spPr>
+            <a:xfrm>
+              <a:off x="7501192" y="4476301"/>
+              <a:ext cx="0" cy="109794"/>
+            </a:xfrm>
+            <a:prstGeom prst="straightConnector1">
+              <a:avLst/>
+            </a:prstGeom>
+            <a:ln>
+              <a:tailEnd type="triangle"/>
+            </a:ln>
+          </p:spPr>
+          <p:style>
+            <a:lnRef idx="1">
+              <a:schemeClr val="accent1"/>
+            </a:lnRef>
+            <a:fillRef idx="0">
+              <a:schemeClr val="accent1"/>
+            </a:fillRef>
+            <a:effectRef idx="0">
+              <a:schemeClr val="accent1"/>
+            </a:effectRef>
+            <a:fontRef idx="minor">
+              <a:schemeClr val="tx1"/>
+            </a:fontRef>
+          </p:style>
+        </p:cxnSp>
+        <p:sp>
+          <p:nvSpPr>
+            <p:cNvPr id="47" name="TextBox 46">
+              <a:extLst>
+                <a:ext uri="{FF2B5EF4-FFF2-40B4-BE49-F238E27FC236}">
+                  <a16:creationId xmlns:a16="http://schemas.microsoft.com/office/drawing/2014/main" id="{14DEAB82-E983-8F7E-C803-1A96342C92FE}"/>
+                </a:ext>
+              </a:extLst>
+            </p:cNvPr>
+            <p:cNvSpPr txBox="1"/>
+            <p:nvPr/>
+          </p:nvSpPr>
+          <p:spPr>
+            <a:xfrm>
+              <a:off x="6108683" y="4514619"/>
+              <a:ext cx="741133" cy="215444"/>
+            </a:xfrm>
+            <a:prstGeom prst="rect">
+              <a:avLst/>
+            </a:prstGeom>
+            <a:noFill/>
+          </p:spPr>
+          <p:txBody>
+            <a:bodyPr wrap="square" rtlCol="0">
+              <a:spAutoFit/>
+            </a:bodyPr>
+            <a:lstStyle/>
+            <a:p>
+              <a:pPr algn="ctr"/>
+              <a:r>
+                <a:rPr lang="en-US" sz="800" dirty="0">
+                  <a:solidFill>
+                    <a:schemeClr val="tx1">
+                      <a:lumMod val="50000"/>
+                      <a:lumOff val="50000"/>
+                    </a:schemeClr>
+                  </a:solidFill>
+                </a:rPr>
+                <a:t>poco</a:t>
+              </a:r>
+            </a:p>
+          </p:txBody>
+        </p:sp>
+        <p:cxnSp>
+          <p:nvCxnSpPr>
+            <p:cNvPr id="48" name="Connector: Elbow 5">
+              <a:extLst>
+                <a:ext uri="{FF2B5EF4-FFF2-40B4-BE49-F238E27FC236}">
+                  <a16:creationId xmlns:a16="http://schemas.microsoft.com/office/drawing/2014/main" id="{C95127CF-FC8C-DF6B-944F-A281A226FB25}"/>
+                </a:ext>
+              </a:extLst>
+            </p:cNvPr>
+            <p:cNvCxnSpPr>
+              <a:cxnSpLocks/>
+            </p:cNvCxnSpPr>
+            <p:nvPr/>
+          </p:nvCxnSpPr>
+          <p:spPr>
+            <a:xfrm flipV="1">
+              <a:off x="6452005" y="4469922"/>
+              <a:ext cx="0" cy="109794"/>
+            </a:xfrm>
+            <a:prstGeom prst="straightConnector1">
+              <a:avLst/>
+            </a:prstGeom>
+            <a:ln>
+              <a:tailEnd type="triangle"/>
+            </a:ln>
+          </p:spPr>
+          <p:style>
+            <a:lnRef idx="1">
+              <a:schemeClr val="accent1"/>
+            </a:lnRef>
+            <a:fillRef idx="0">
+              <a:schemeClr val="accent1"/>
+            </a:fillRef>
+            <a:effectRef idx="0">
+              <a:schemeClr val="accent1"/>
+            </a:effectRef>
+            <a:fontRef idx="minor">
+              <a:schemeClr val="tx1"/>
+            </a:fontRef>
+          </p:style>
+        </p:cxnSp>
+        <p:sp>
+          <p:nvSpPr>
+            <p:cNvPr id="49" name="TextBox 48">
+              <a:extLst>
+                <a:ext uri="{FF2B5EF4-FFF2-40B4-BE49-F238E27FC236}">
+                  <a16:creationId xmlns:a16="http://schemas.microsoft.com/office/drawing/2014/main" id="{D9FAC93E-A31E-1196-2B07-B5D548D4DB63}"/>
+                </a:ext>
+              </a:extLst>
+            </p:cNvPr>
+            <p:cNvSpPr txBox="1"/>
+            <p:nvPr/>
+          </p:nvSpPr>
+          <p:spPr>
+            <a:xfrm>
+              <a:off x="5722209" y="4520671"/>
+              <a:ext cx="741133" cy="215444"/>
+            </a:xfrm>
+            <a:prstGeom prst="rect">
+              <a:avLst/>
+            </a:prstGeom>
+            <a:noFill/>
+          </p:spPr>
+          <p:txBody>
+            <a:bodyPr wrap="square" rtlCol="0">
+              <a:spAutoFit/>
+            </a:bodyPr>
+            <a:lstStyle/>
+            <a:p>
+              <a:pPr algn="ctr"/>
+              <a:r>
+                <a:rPr lang="en-US" sz="800" dirty="0">
+                  <a:solidFill>
+                    <a:schemeClr val="tx1">
+                      <a:lumMod val="50000"/>
+                      <a:lumOff val="50000"/>
+                    </a:schemeClr>
+                  </a:solidFill>
+                </a:rPr>
+                <a:t>poco</a:t>
+              </a:r>
+            </a:p>
+          </p:txBody>
+        </p:sp>
+        <p:cxnSp>
+          <p:nvCxnSpPr>
+            <p:cNvPr id="50" name="Connector: Elbow 5">
+              <a:extLst>
+                <a:ext uri="{FF2B5EF4-FFF2-40B4-BE49-F238E27FC236}">
+                  <a16:creationId xmlns:a16="http://schemas.microsoft.com/office/drawing/2014/main" id="{935867A3-0AC2-2A11-9003-F207BE9C6246}"/>
+                </a:ext>
+              </a:extLst>
+            </p:cNvPr>
+            <p:cNvCxnSpPr>
+              <a:cxnSpLocks/>
+            </p:cNvCxnSpPr>
+            <p:nvPr/>
+          </p:nvCxnSpPr>
+          <p:spPr>
+            <a:xfrm>
+              <a:off x="6027435" y="4475974"/>
+              <a:ext cx="0" cy="109794"/>
+            </a:xfrm>
+            <a:prstGeom prst="straightConnector1">
+              <a:avLst/>
+            </a:prstGeom>
+            <a:ln>
+              <a:tailEnd type="triangle"/>
+            </a:ln>
+          </p:spPr>
+          <p:style>
+            <a:lnRef idx="1">
+              <a:schemeClr val="accent1"/>
+            </a:lnRef>
+            <a:fillRef idx="0">
+              <a:schemeClr val="accent1"/>
+            </a:fillRef>
+            <a:effectRef idx="0">
+              <a:schemeClr val="accent1"/>
+            </a:effectRef>
+            <a:fontRef idx="minor">
+              <a:schemeClr val="tx1"/>
+            </a:fontRef>
+          </p:style>
+        </p:cxnSp>
+      </p:grpSp>
     </p:spTree>
     <p:extLst>
       <p:ext uri="{BB962C8B-B14F-4D97-AF65-F5344CB8AC3E}">
@@ -12932,7 +12806,7 @@
           <p:spPr>
             <a:xfrm>
               <a:off x="8108153" y="2802574"/>
-              <a:ext cx="741133" cy="215444"/>
+              <a:ext cx="771974" cy="215444"/>
             </a:xfrm>
             <a:prstGeom prst="rect">
               <a:avLst/>
@@ -12955,7 +12829,7 @@
                     </a:schemeClr>
                   </a:solidFill>
                 </a:rPr>
-                <a:t>yaml</a:t>
+                <a:t>json</a:t>
               </a:r>
               <a:endParaRPr lang="en-US" sz="800" dirty="0">
                 <a:solidFill>
@@ -13542,7 +13416,7 @@
                   <a:ea typeface="+mn-ea"/>
                   <a:cs typeface="+mn-cs"/>
                 </a:rPr>
-                <a:t>[Rapid YAML]</a:t>
+                <a:t>[Rapid JSON]</a:t>
               </a:r>
             </a:p>
             <a:p>
@@ -15543,10 +15417,10 @@
           </p:nvGrpSpPr>
           <p:grpSpPr>
             <a:xfrm>
-              <a:off x="6164340" y="3525049"/>
-              <a:ext cx="924644" cy="215444"/>
-              <a:chOff x="1025766" y="1118525"/>
-              <a:chExt cx="924644" cy="215444"/>
+              <a:off x="6225647" y="3480308"/>
+              <a:ext cx="947881" cy="338554"/>
+              <a:chOff x="1087073" y="1073784"/>
+              <a:chExt cx="947881" cy="338554"/>
             </a:xfrm>
           </p:grpSpPr>
           <p:cxnSp>
@@ -15564,9 +15438,9 @@
               <p:nvPr/>
             </p:nvCxnSpPr>
             <p:spPr>
-              <a:xfrm flipH="1" flipV="1">
-                <a:off x="1025766" y="1233156"/>
-                <a:ext cx="279002" cy="650"/>
+              <a:xfrm flipH="1">
+                <a:off x="1087073" y="1236431"/>
+                <a:ext cx="181216" cy="0"/>
               </a:xfrm>
               <a:prstGeom prst="straightConnector1">
                 <a:avLst/>
@@ -15604,8 +15478,8 @@
             </p:nvSpPr>
             <p:spPr>
               <a:xfrm>
-                <a:off x="1264724" y="1118525"/>
-                <a:ext cx="455258" cy="215444"/>
+                <a:off x="1249976" y="1073784"/>
+                <a:ext cx="652052" cy="338554"/>
               </a:xfrm>
               <a:prstGeom prst="rect">
                 <a:avLst/>
@@ -15620,6 +15494,17 @@
               <a:p>
                 <a:pPr algn="ctr"/>
                 <a:r>
+                  <a:rPr lang="en-US" sz="800" dirty="0" err="1">
+                    <a:solidFill>
+                      <a:schemeClr val="tx1">
+                        <a:lumMod val="50000"/>
+                        <a:lumOff val="50000"/>
+                      </a:schemeClr>
+                    </a:solidFill>
+                  </a:rPr>
+                  <a:t>json</a:t>
+                </a:r>
+                <a:r>
                   <a:rPr lang="en-US" sz="800" dirty="0">
                     <a:solidFill>
                       <a:schemeClr val="tx1">
@@ -15628,7 +15513,43 @@
                       </a:schemeClr>
                     </a:solidFill>
                   </a:rPr>
-                  <a:t>poco</a:t>
+                  <a:t>, </a:t>
+                </a:r>
+                <a:r>
+                  <a:rPr lang="en-US" sz="800" dirty="0" err="1">
+                    <a:solidFill>
+                      <a:schemeClr val="tx1">
+                        <a:lumMod val="50000"/>
+                        <a:lumOff val="50000"/>
+                      </a:schemeClr>
+                    </a:solidFill>
+                  </a:rPr>
+                  <a:t>yaml</a:t>
+                </a:r>
+                <a:r>
+                  <a:rPr lang="en-US" sz="800" dirty="0">
+                    <a:solidFill>
+                      <a:schemeClr val="tx1">
+                        <a:lumMod val="50000"/>
+                        <a:lumOff val="50000"/>
+                      </a:schemeClr>
+                    </a:solidFill>
+                  </a:rPr>
+                  <a:t>,</a:t>
+                </a:r>
+              </a:p>
+              <a:p>
+                <a:pPr algn="ctr"/>
+                <a:r>
+                  <a:rPr lang="en-US" sz="800" dirty="0">
+                    <a:solidFill>
+                      <a:schemeClr val="tx1">
+                        <a:lumMod val="50000"/>
+                        <a:lumOff val="50000"/>
+                      </a:schemeClr>
+                    </a:solidFill>
+                  </a:rPr>
+                  <a:t>or poco</a:t>
                 </a:r>
               </a:p>
             </p:txBody>
@@ -15648,9 +15569,9 @@
               <p:nvPr/>
             </p:nvCxnSpPr>
             <p:spPr>
-              <a:xfrm flipV="1">
-                <a:off x="1671408" y="1229125"/>
-                <a:ext cx="279002" cy="650"/>
+              <a:xfrm>
+                <a:off x="1842526" y="1225062"/>
+                <a:ext cx="192428" cy="4484"/>
               </a:xfrm>
               <a:prstGeom prst="straightConnector1">
                 <a:avLst/>
@@ -15765,434 +15686,6 @@
             </a:p>
           </p:txBody>
         </p:sp>
-        <p:grpSp>
-          <p:nvGrpSpPr>
-            <p:cNvPr id="86" name="Group 85">
-              <a:extLst>
-                <a:ext uri="{FF2B5EF4-FFF2-40B4-BE49-F238E27FC236}">
-                  <a16:creationId xmlns:a16="http://schemas.microsoft.com/office/drawing/2014/main" id="{3065FDA6-A7A5-E808-DAF3-3F47AB530A04}"/>
-                </a:ext>
-              </a:extLst>
-            </p:cNvPr>
-            <p:cNvGrpSpPr/>
-            <p:nvPr/>
-          </p:nvGrpSpPr>
-          <p:grpSpPr>
-            <a:xfrm>
-              <a:off x="8948442" y="4392421"/>
-              <a:ext cx="741133" cy="260141"/>
-              <a:chOff x="7686586" y="4456943"/>
-              <a:chExt cx="741133" cy="260141"/>
-            </a:xfrm>
-          </p:grpSpPr>
-          <p:sp>
-            <p:nvSpPr>
-              <p:cNvPr id="109" name="TextBox 108">
-                <a:extLst>
-                  <a:ext uri="{FF2B5EF4-FFF2-40B4-BE49-F238E27FC236}">
-                    <a16:creationId xmlns:a16="http://schemas.microsoft.com/office/drawing/2014/main" id="{5DD5408D-3340-8BBE-F611-63E1B80CAFB7}"/>
-                  </a:ext>
-                </a:extLst>
-              </p:cNvPr>
-              <p:cNvSpPr txBox="1"/>
-              <p:nvPr/>
-            </p:nvSpPr>
-            <p:spPr>
-              <a:xfrm>
-                <a:off x="7686586" y="4501640"/>
-                <a:ext cx="741133" cy="215444"/>
-              </a:xfrm>
-              <a:prstGeom prst="rect">
-                <a:avLst/>
-              </a:prstGeom>
-              <a:noFill/>
-            </p:spPr>
-            <p:txBody>
-              <a:bodyPr wrap="square" rtlCol="0">
-                <a:spAutoFit/>
-              </a:bodyPr>
-              <a:lstStyle/>
-              <a:p>
-                <a:pPr algn="ctr"/>
-                <a:r>
-                  <a:rPr lang="en-US" sz="800" dirty="0" err="1">
-                    <a:solidFill>
-                      <a:schemeClr val="tx1">
-                        <a:lumMod val="50000"/>
-                        <a:lumOff val="50000"/>
-                      </a:schemeClr>
-                    </a:solidFill>
-                  </a:rPr>
-                  <a:t>yaml</a:t>
-                </a:r>
-                <a:endParaRPr lang="en-US" sz="800" dirty="0">
-                  <a:solidFill>
-                    <a:schemeClr val="tx1">
-                      <a:lumMod val="50000"/>
-                      <a:lumOff val="50000"/>
-                    </a:schemeClr>
-                  </a:solidFill>
-                </a:endParaRPr>
-              </a:p>
-            </p:txBody>
-          </p:sp>
-          <p:cxnSp>
-            <p:nvCxnSpPr>
-              <p:cNvPr id="110" name="Connector: Elbow 5">
-                <a:extLst>
-                  <a:ext uri="{FF2B5EF4-FFF2-40B4-BE49-F238E27FC236}">
-                    <a16:creationId xmlns:a16="http://schemas.microsoft.com/office/drawing/2014/main" id="{0FC03F3D-C128-208A-C957-6F8A7C7539E1}"/>
-                  </a:ext>
-                </a:extLst>
-              </p:cNvPr>
-              <p:cNvCxnSpPr>
-                <a:cxnSpLocks/>
-              </p:cNvCxnSpPr>
-              <p:nvPr/>
-            </p:nvCxnSpPr>
-            <p:spPr>
-              <a:xfrm flipV="1">
-                <a:off x="8032289" y="4456943"/>
-                <a:ext cx="0" cy="109794"/>
-              </a:xfrm>
-              <a:prstGeom prst="straightConnector1">
-                <a:avLst/>
-              </a:prstGeom>
-              <a:ln>
-                <a:tailEnd type="triangle"/>
-              </a:ln>
-            </p:spPr>
-            <p:style>
-              <a:lnRef idx="1">
-                <a:schemeClr val="accent1"/>
-              </a:lnRef>
-              <a:fillRef idx="0">
-                <a:schemeClr val="accent1"/>
-              </a:fillRef>
-              <a:effectRef idx="0">
-                <a:schemeClr val="accent1"/>
-              </a:effectRef>
-              <a:fontRef idx="minor">
-                <a:schemeClr val="tx1"/>
-              </a:fontRef>
-            </p:style>
-          </p:cxnSp>
-        </p:grpSp>
-        <p:grpSp>
-          <p:nvGrpSpPr>
-            <p:cNvPr id="87" name="Group 86">
-              <a:extLst>
-                <a:ext uri="{FF2B5EF4-FFF2-40B4-BE49-F238E27FC236}">
-                  <a16:creationId xmlns:a16="http://schemas.microsoft.com/office/drawing/2014/main" id="{EFAD2C50-98AC-7351-44CA-D93D17A9552E}"/>
-                </a:ext>
-              </a:extLst>
-            </p:cNvPr>
-            <p:cNvGrpSpPr/>
-            <p:nvPr/>
-          </p:nvGrpSpPr>
-          <p:grpSpPr>
-            <a:xfrm>
-              <a:off x="8284524" y="4392421"/>
-              <a:ext cx="741133" cy="260141"/>
-              <a:chOff x="7686586" y="4456943"/>
-              <a:chExt cx="741133" cy="260141"/>
-            </a:xfrm>
-          </p:grpSpPr>
-          <p:sp>
-            <p:nvSpPr>
-              <p:cNvPr id="107" name="TextBox 106">
-                <a:extLst>
-                  <a:ext uri="{FF2B5EF4-FFF2-40B4-BE49-F238E27FC236}">
-                    <a16:creationId xmlns:a16="http://schemas.microsoft.com/office/drawing/2014/main" id="{7E906A09-1C38-4FDF-232F-DBFED7EA5D8A}"/>
-                  </a:ext>
-                </a:extLst>
-              </p:cNvPr>
-              <p:cNvSpPr txBox="1"/>
-              <p:nvPr/>
-            </p:nvSpPr>
-            <p:spPr>
-              <a:xfrm>
-                <a:off x="7686586" y="4501640"/>
-                <a:ext cx="741133" cy="215444"/>
-              </a:xfrm>
-              <a:prstGeom prst="rect">
-                <a:avLst/>
-              </a:prstGeom>
-              <a:noFill/>
-            </p:spPr>
-            <p:txBody>
-              <a:bodyPr wrap="square" rtlCol="0">
-                <a:spAutoFit/>
-              </a:bodyPr>
-              <a:lstStyle/>
-              <a:p>
-                <a:pPr algn="ctr"/>
-                <a:r>
-                  <a:rPr lang="en-US" sz="800" dirty="0">
-                    <a:solidFill>
-                      <a:schemeClr val="tx1">
-                        <a:lumMod val="50000"/>
-                        <a:lumOff val="50000"/>
-                      </a:schemeClr>
-                    </a:solidFill>
-                  </a:rPr>
-                  <a:t>string</a:t>
-                </a:r>
-              </a:p>
-            </p:txBody>
-          </p:sp>
-          <p:cxnSp>
-            <p:nvCxnSpPr>
-              <p:cNvPr id="108" name="Connector: Elbow 5">
-                <a:extLst>
-                  <a:ext uri="{FF2B5EF4-FFF2-40B4-BE49-F238E27FC236}">
-                    <a16:creationId xmlns:a16="http://schemas.microsoft.com/office/drawing/2014/main" id="{FCFB0ADB-267C-85D2-F148-D680A6E358A8}"/>
-                  </a:ext>
-                </a:extLst>
-              </p:cNvPr>
-              <p:cNvCxnSpPr>
-                <a:cxnSpLocks/>
-              </p:cNvCxnSpPr>
-              <p:nvPr/>
-            </p:nvCxnSpPr>
-            <p:spPr>
-              <a:xfrm>
-                <a:off x="8032289" y="4456943"/>
-                <a:ext cx="0" cy="109794"/>
-              </a:xfrm>
-              <a:prstGeom prst="straightConnector1">
-                <a:avLst/>
-              </a:prstGeom>
-              <a:ln>
-                <a:tailEnd type="triangle"/>
-              </a:ln>
-            </p:spPr>
-            <p:style>
-              <a:lnRef idx="1">
-                <a:schemeClr val="accent1"/>
-              </a:lnRef>
-              <a:fillRef idx="0">
-                <a:schemeClr val="accent1"/>
-              </a:fillRef>
-              <a:effectRef idx="0">
-                <a:schemeClr val="accent1"/>
-              </a:effectRef>
-              <a:fontRef idx="minor">
-                <a:schemeClr val="tx1"/>
-              </a:fontRef>
-            </p:style>
-          </p:cxnSp>
-        </p:grpSp>
-        <p:grpSp>
-          <p:nvGrpSpPr>
-            <p:cNvPr id="88" name="Group 87">
-              <a:extLst>
-                <a:ext uri="{FF2B5EF4-FFF2-40B4-BE49-F238E27FC236}">
-                  <a16:creationId xmlns:a16="http://schemas.microsoft.com/office/drawing/2014/main" id="{A1B9CE32-75E9-606A-0CB4-48073499ECDD}"/>
-                </a:ext>
-              </a:extLst>
-            </p:cNvPr>
-            <p:cNvGrpSpPr/>
-            <p:nvPr/>
-          </p:nvGrpSpPr>
-          <p:grpSpPr>
-            <a:xfrm>
-              <a:off x="7090075" y="4386369"/>
-              <a:ext cx="741133" cy="260141"/>
-              <a:chOff x="7686586" y="4456943"/>
-              <a:chExt cx="741133" cy="260141"/>
-            </a:xfrm>
-          </p:grpSpPr>
-          <p:sp>
-            <p:nvSpPr>
-              <p:cNvPr id="99" name="TextBox 98">
-                <a:extLst>
-                  <a:ext uri="{FF2B5EF4-FFF2-40B4-BE49-F238E27FC236}">
-                    <a16:creationId xmlns:a16="http://schemas.microsoft.com/office/drawing/2014/main" id="{B96DD22F-7948-43FC-E96C-90107DE85717}"/>
-                  </a:ext>
-                </a:extLst>
-              </p:cNvPr>
-              <p:cNvSpPr txBox="1"/>
-              <p:nvPr/>
-            </p:nvSpPr>
-            <p:spPr>
-              <a:xfrm>
-                <a:off x="7686586" y="4501640"/>
-                <a:ext cx="741133" cy="215444"/>
-              </a:xfrm>
-              <a:prstGeom prst="rect">
-                <a:avLst/>
-              </a:prstGeom>
-              <a:noFill/>
-            </p:spPr>
-            <p:txBody>
-              <a:bodyPr wrap="square" rtlCol="0">
-                <a:spAutoFit/>
-              </a:bodyPr>
-              <a:lstStyle/>
-              <a:p>
-                <a:pPr algn="ctr"/>
-                <a:r>
-                  <a:rPr lang="en-US" sz="800" dirty="0">
-                    <a:solidFill>
-                      <a:schemeClr val="tx1">
-                        <a:lumMod val="50000"/>
-                        <a:lumOff val="50000"/>
-                      </a:schemeClr>
-                    </a:solidFill>
-                  </a:rPr>
-                  <a:t>poco</a:t>
-                </a:r>
-              </a:p>
-            </p:txBody>
-          </p:sp>
-          <p:cxnSp>
-            <p:nvCxnSpPr>
-              <p:cNvPr id="106" name="Connector: Elbow 5">
-                <a:extLst>
-                  <a:ext uri="{FF2B5EF4-FFF2-40B4-BE49-F238E27FC236}">
-                    <a16:creationId xmlns:a16="http://schemas.microsoft.com/office/drawing/2014/main" id="{24D67472-561A-45BB-7ACD-A7FA9C2BE68B}"/>
-                  </a:ext>
-                </a:extLst>
-              </p:cNvPr>
-              <p:cNvCxnSpPr>
-                <a:cxnSpLocks/>
-              </p:cNvCxnSpPr>
-              <p:nvPr/>
-            </p:nvCxnSpPr>
-            <p:spPr>
-              <a:xfrm flipV="1">
-                <a:off x="8032289" y="4456943"/>
-                <a:ext cx="0" cy="109794"/>
-              </a:xfrm>
-              <a:prstGeom prst="straightConnector1">
-                <a:avLst/>
-              </a:prstGeom>
-              <a:ln>
-                <a:tailEnd type="triangle"/>
-              </a:ln>
-            </p:spPr>
-            <p:style>
-              <a:lnRef idx="1">
-                <a:schemeClr val="accent1"/>
-              </a:lnRef>
-              <a:fillRef idx="0">
-                <a:schemeClr val="accent1"/>
-              </a:fillRef>
-              <a:effectRef idx="0">
-                <a:schemeClr val="accent1"/>
-              </a:effectRef>
-              <a:fontRef idx="minor">
-                <a:schemeClr val="tx1"/>
-              </a:fontRef>
-            </p:style>
-          </p:cxnSp>
-        </p:grpSp>
-        <p:grpSp>
-          <p:nvGrpSpPr>
-            <p:cNvPr id="89" name="Group 88">
-              <a:extLst>
-                <a:ext uri="{FF2B5EF4-FFF2-40B4-BE49-F238E27FC236}">
-                  <a16:creationId xmlns:a16="http://schemas.microsoft.com/office/drawing/2014/main" id="{8D579217-2976-BFC9-DC04-A3029CD4FD68}"/>
-                </a:ext>
-              </a:extLst>
-            </p:cNvPr>
-            <p:cNvGrpSpPr/>
-            <p:nvPr/>
-          </p:nvGrpSpPr>
-          <p:grpSpPr>
-            <a:xfrm>
-              <a:off x="6426157" y="4386369"/>
-              <a:ext cx="741133" cy="260141"/>
-              <a:chOff x="7686586" y="4456943"/>
-              <a:chExt cx="741133" cy="260141"/>
-            </a:xfrm>
-          </p:grpSpPr>
-          <p:sp>
-            <p:nvSpPr>
-              <p:cNvPr id="96" name="TextBox 95">
-                <a:extLst>
-                  <a:ext uri="{FF2B5EF4-FFF2-40B4-BE49-F238E27FC236}">
-                    <a16:creationId xmlns:a16="http://schemas.microsoft.com/office/drawing/2014/main" id="{861AF7DE-2957-9F07-0634-6079BD2DDFC7}"/>
-                  </a:ext>
-                </a:extLst>
-              </p:cNvPr>
-              <p:cNvSpPr txBox="1"/>
-              <p:nvPr/>
-            </p:nvSpPr>
-            <p:spPr>
-              <a:xfrm>
-                <a:off x="7686586" y="4501640"/>
-                <a:ext cx="741133" cy="215444"/>
-              </a:xfrm>
-              <a:prstGeom prst="rect">
-                <a:avLst/>
-              </a:prstGeom>
-              <a:noFill/>
-            </p:spPr>
-            <p:txBody>
-              <a:bodyPr wrap="square" rtlCol="0">
-                <a:spAutoFit/>
-              </a:bodyPr>
-              <a:lstStyle/>
-              <a:p>
-                <a:pPr algn="ctr"/>
-                <a:r>
-                  <a:rPr lang="en-US" sz="800" dirty="0">
-                    <a:solidFill>
-                      <a:schemeClr val="tx1">
-                        <a:lumMod val="50000"/>
-                        <a:lumOff val="50000"/>
-                      </a:schemeClr>
-                    </a:solidFill>
-                  </a:rPr>
-                  <a:t>poco</a:t>
-                </a:r>
-              </a:p>
-            </p:txBody>
-          </p:sp>
-          <p:cxnSp>
-            <p:nvCxnSpPr>
-              <p:cNvPr id="97" name="Connector: Elbow 5">
-                <a:extLst>
-                  <a:ext uri="{FF2B5EF4-FFF2-40B4-BE49-F238E27FC236}">
-                    <a16:creationId xmlns:a16="http://schemas.microsoft.com/office/drawing/2014/main" id="{13A59AD8-2FC9-BBB1-C14E-10652666F824}"/>
-                  </a:ext>
-                </a:extLst>
-              </p:cNvPr>
-              <p:cNvCxnSpPr>
-                <a:cxnSpLocks/>
-              </p:cNvCxnSpPr>
-              <p:nvPr/>
-            </p:nvCxnSpPr>
-            <p:spPr>
-              <a:xfrm>
-                <a:off x="8032289" y="4456943"/>
-                <a:ext cx="0" cy="109794"/>
-              </a:xfrm>
-              <a:prstGeom prst="straightConnector1">
-                <a:avLst/>
-              </a:prstGeom>
-              <a:ln>
-                <a:tailEnd type="triangle"/>
-              </a:ln>
-            </p:spPr>
-            <p:style>
-              <a:lnRef idx="1">
-                <a:schemeClr val="accent1"/>
-              </a:lnRef>
-              <a:fillRef idx="0">
-                <a:schemeClr val="accent1"/>
-              </a:fillRef>
-              <a:effectRef idx="0">
-                <a:schemeClr val="accent1"/>
-              </a:effectRef>
-              <a:fontRef idx="minor">
-                <a:schemeClr val="tx1"/>
-              </a:fontRef>
-            </p:style>
-          </p:cxnSp>
-        </p:grpSp>
         <p:grpSp>
           <p:nvGrpSpPr>
             <p:cNvPr id="90" name="Group 89">
@@ -16441,7 +15934,7 @@
             <a:pPr algn="ctr"/>
             <a:r>
               <a:rPr lang="en-US" dirty="0"/>
-              <a:t>AVX Roadmap – 3B27 – CY2024</a:t>
+              <a:t>AVX Roadmap – 3C02 – CY2024</a:t>
             </a:r>
           </a:p>
         </p:txBody>
@@ -18381,6 +17874,371 @@
           </a:p>
         </p:txBody>
       </p:sp>
+      <p:grpSp>
+        <p:nvGrpSpPr>
+          <p:cNvPr id="16" name="Group 15">
+            <a:extLst>
+              <a:ext uri="{FF2B5EF4-FFF2-40B4-BE49-F238E27FC236}">
+                <a16:creationId xmlns:a16="http://schemas.microsoft.com/office/drawing/2014/main" id="{B52646EA-6374-5EF0-8825-1CE0AA0CBC1C}"/>
+              </a:ext>
+            </a:extLst>
+          </p:cNvPr>
+          <p:cNvGrpSpPr/>
+          <p:nvPr/>
+        </p:nvGrpSpPr>
+        <p:grpSpPr>
+          <a:xfrm>
+            <a:off x="6994947" y="4394712"/>
+            <a:ext cx="2174413" cy="266520"/>
+            <a:chOff x="5722209" y="4469922"/>
+            <a:chExt cx="2174413" cy="266520"/>
+          </a:xfrm>
+        </p:grpSpPr>
+        <p:sp>
+          <p:nvSpPr>
+            <p:cNvPr id="3" name="TextBox 2">
+              <a:extLst>
+                <a:ext uri="{FF2B5EF4-FFF2-40B4-BE49-F238E27FC236}">
+                  <a16:creationId xmlns:a16="http://schemas.microsoft.com/office/drawing/2014/main" id="{F89DC1A6-5248-FAF0-C5BF-EF8A0F8BD229}"/>
+                </a:ext>
+              </a:extLst>
+            </p:cNvPr>
+            <p:cNvSpPr txBox="1"/>
+            <p:nvPr/>
+          </p:nvSpPr>
+          <p:spPr>
+            <a:xfrm>
+              <a:off x="6705586" y="4514619"/>
+              <a:ext cx="741133" cy="215444"/>
+            </a:xfrm>
+            <a:prstGeom prst="rect">
+              <a:avLst/>
+            </a:prstGeom>
+            <a:noFill/>
+          </p:spPr>
+          <p:txBody>
+            <a:bodyPr wrap="square" rtlCol="0">
+              <a:spAutoFit/>
+            </a:bodyPr>
+            <a:lstStyle/>
+            <a:p>
+              <a:pPr algn="ctr"/>
+              <a:r>
+                <a:rPr lang="en-US" sz="800" dirty="0" err="1">
+                  <a:solidFill>
+                    <a:schemeClr val="tx1">
+                      <a:lumMod val="50000"/>
+                      <a:lumOff val="50000"/>
+                    </a:schemeClr>
+                  </a:solidFill>
+                </a:rPr>
+                <a:t>json</a:t>
+              </a:r>
+              <a:endParaRPr lang="en-US" sz="800" dirty="0">
+                <a:solidFill>
+                  <a:schemeClr val="tx1">
+                    <a:lumMod val="50000"/>
+                    <a:lumOff val="50000"/>
+                  </a:schemeClr>
+                </a:solidFill>
+              </a:endParaRPr>
+            </a:p>
+          </p:txBody>
+        </p:sp>
+        <p:cxnSp>
+          <p:nvCxnSpPr>
+            <p:cNvPr id="4" name="Connector: Elbow 5">
+              <a:extLst>
+                <a:ext uri="{FF2B5EF4-FFF2-40B4-BE49-F238E27FC236}">
+                  <a16:creationId xmlns:a16="http://schemas.microsoft.com/office/drawing/2014/main" id="{8D77940B-3A3A-A2AC-4DBF-80BD4A3E4B32}"/>
+                </a:ext>
+              </a:extLst>
+            </p:cNvPr>
+            <p:cNvCxnSpPr>
+              <a:cxnSpLocks/>
+            </p:cNvCxnSpPr>
+            <p:nvPr/>
+          </p:nvCxnSpPr>
+          <p:spPr>
+            <a:xfrm flipV="1">
+              <a:off x="7051289" y="4469922"/>
+              <a:ext cx="0" cy="109794"/>
+            </a:xfrm>
+            <a:prstGeom prst="straightConnector1">
+              <a:avLst/>
+            </a:prstGeom>
+            <a:ln>
+              <a:tailEnd type="triangle"/>
+            </a:ln>
+          </p:spPr>
+          <p:style>
+            <a:lnRef idx="1">
+              <a:schemeClr val="accent1"/>
+            </a:lnRef>
+            <a:fillRef idx="0">
+              <a:schemeClr val="accent1"/>
+            </a:fillRef>
+            <a:effectRef idx="0">
+              <a:schemeClr val="accent1"/>
+            </a:effectRef>
+            <a:fontRef idx="minor">
+              <a:schemeClr val="tx1"/>
+            </a:fontRef>
+          </p:style>
+        </p:cxnSp>
+        <p:sp>
+          <p:nvSpPr>
+            <p:cNvPr id="5" name="TextBox 4">
+              <a:extLst>
+                <a:ext uri="{FF2B5EF4-FFF2-40B4-BE49-F238E27FC236}">
+                  <a16:creationId xmlns:a16="http://schemas.microsoft.com/office/drawing/2014/main" id="{7E356B21-2E87-118E-8EBE-FA81AF9D923F}"/>
+                </a:ext>
+              </a:extLst>
+            </p:cNvPr>
+            <p:cNvSpPr txBox="1"/>
+            <p:nvPr/>
+          </p:nvSpPr>
+          <p:spPr>
+            <a:xfrm>
+              <a:off x="7155489" y="4520998"/>
+              <a:ext cx="741133" cy="215444"/>
+            </a:xfrm>
+            <a:prstGeom prst="rect">
+              <a:avLst/>
+            </a:prstGeom>
+            <a:noFill/>
+          </p:spPr>
+          <p:txBody>
+            <a:bodyPr wrap="square" rtlCol="0">
+              <a:spAutoFit/>
+            </a:bodyPr>
+            <a:lstStyle/>
+            <a:p>
+              <a:pPr algn="ctr"/>
+              <a:r>
+                <a:rPr lang="en-US" sz="800" dirty="0">
+                  <a:solidFill>
+                    <a:schemeClr val="tx1">
+                      <a:lumMod val="50000"/>
+                      <a:lumOff val="50000"/>
+                    </a:schemeClr>
+                  </a:solidFill>
+                </a:rPr>
+                <a:t>string</a:t>
+              </a:r>
+            </a:p>
+          </p:txBody>
+        </p:sp>
+        <p:cxnSp>
+          <p:nvCxnSpPr>
+            <p:cNvPr id="6" name="Connector: Elbow 5">
+              <a:extLst>
+                <a:ext uri="{FF2B5EF4-FFF2-40B4-BE49-F238E27FC236}">
+                  <a16:creationId xmlns:a16="http://schemas.microsoft.com/office/drawing/2014/main" id="{59C5B77D-C3DD-B5B3-160D-040096FF78D0}"/>
+                </a:ext>
+              </a:extLst>
+            </p:cNvPr>
+            <p:cNvCxnSpPr>
+              <a:cxnSpLocks/>
+            </p:cNvCxnSpPr>
+            <p:nvPr/>
+          </p:nvCxnSpPr>
+          <p:spPr>
+            <a:xfrm>
+              <a:off x="7501192" y="4476301"/>
+              <a:ext cx="0" cy="109794"/>
+            </a:xfrm>
+            <a:prstGeom prst="straightConnector1">
+              <a:avLst/>
+            </a:prstGeom>
+            <a:ln>
+              <a:tailEnd type="triangle"/>
+            </a:ln>
+          </p:spPr>
+          <p:style>
+            <a:lnRef idx="1">
+              <a:schemeClr val="accent1"/>
+            </a:lnRef>
+            <a:fillRef idx="0">
+              <a:schemeClr val="accent1"/>
+            </a:fillRef>
+            <a:effectRef idx="0">
+              <a:schemeClr val="accent1"/>
+            </a:effectRef>
+            <a:fontRef idx="minor">
+              <a:schemeClr val="tx1"/>
+            </a:fontRef>
+          </p:style>
+        </p:cxnSp>
+        <p:sp>
+          <p:nvSpPr>
+            <p:cNvPr id="7" name="TextBox 6">
+              <a:extLst>
+                <a:ext uri="{FF2B5EF4-FFF2-40B4-BE49-F238E27FC236}">
+                  <a16:creationId xmlns:a16="http://schemas.microsoft.com/office/drawing/2014/main" id="{9BE2B8D1-9617-66E6-21AE-862093692A86}"/>
+                </a:ext>
+              </a:extLst>
+            </p:cNvPr>
+            <p:cNvSpPr txBox="1"/>
+            <p:nvPr/>
+          </p:nvSpPr>
+          <p:spPr>
+            <a:xfrm>
+              <a:off x="6108683" y="4514619"/>
+              <a:ext cx="741133" cy="215444"/>
+            </a:xfrm>
+            <a:prstGeom prst="rect">
+              <a:avLst/>
+            </a:prstGeom>
+            <a:noFill/>
+          </p:spPr>
+          <p:txBody>
+            <a:bodyPr wrap="square" rtlCol="0">
+              <a:spAutoFit/>
+            </a:bodyPr>
+            <a:lstStyle/>
+            <a:p>
+              <a:pPr algn="ctr"/>
+              <a:r>
+                <a:rPr lang="en-US" sz="800" dirty="0">
+                  <a:solidFill>
+                    <a:schemeClr val="tx1">
+                      <a:lumMod val="50000"/>
+                      <a:lumOff val="50000"/>
+                    </a:schemeClr>
+                  </a:solidFill>
+                </a:rPr>
+                <a:t>poco</a:t>
+              </a:r>
+            </a:p>
+          </p:txBody>
+        </p:sp>
+        <p:cxnSp>
+          <p:nvCxnSpPr>
+            <p:cNvPr id="8" name="Connector: Elbow 5">
+              <a:extLst>
+                <a:ext uri="{FF2B5EF4-FFF2-40B4-BE49-F238E27FC236}">
+                  <a16:creationId xmlns:a16="http://schemas.microsoft.com/office/drawing/2014/main" id="{0E3EA0C6-3A76-4BDC-E0F8-92849DC9EF1B}"/>
+                </a:ext>
+              </a:extLst>
+            </p:cNvPr>
+            <p:cNvCxnSpPr>
+              <a:cxnSpLocks/>
+            </p:cNvCxnSpPr>
+            <p:nvPr/>
+          </p:nvCxnSpPr>
+          <p:spPr>
+            <a:xfrm flipV="1">
+              <a:off x="6452005" y="4469922"/>
+              <a:ext cx="0" cy="109794"/>
+            </a:xfrm>
+            <a:prstGeom prst="straightConnector1">
+              <a:avLst/>
+            </a:prstGeom>
+            <a:ln>
+              <a:tailEnd type="triangle"/>
+            </a:ln>
+          </p:spPr>
+          <p:style>
+            <a:lnRef idx="1">
+              <a:schemeClr val="accent1"/>
+            </a:lnRef>
+            <a:fillRef idx="0">
+              <a:schemeClr val="accent1"/>
+            </a:fillRef>
+            <a:effectRef idx="0">
+              <a:schemeClr val="accent1"/>
+            </a:effectRef>
+            <a:fontRef idx="minor">
+              <a:schemeClr val="tx1"/>
+            </a:fontRef>
+          </p:style>
+        </p:cxnSp>
+        <p:sp>
+          <p:nvSpPr>
+            <p:cNvPr id="9" name="TextBox 8">
+              <a:extLst>
+                <a:ext uri="{FF2B5EF4-FFF2-40B4-BE49-F238E27FC236}">
+                  <a16:creationId xmlns:a16="http://schemas.microsoft.com/office/drawing/2014/main" id="{34B3F8AF-3BA8-9BB4-16CF-476FA1EA29EB}"/>
+                </a:ext>
+              </a:extLst>
+            </p:cNvPr>
+            <p:cNvSpPr txBox="1"/>
+            <p:nvPr/>
+          </p:nvSpPr>
+          <p:spPr>
+            <a:xfrm>
+              <a:off x="5722209" y="4520671"/>
+              <a:ext cx="741133" cy="215444"/>
+            </a:xfrm>
+            <a:prstGeom prst="rect">
+              <a:avLst/>
+            </a:prstGeom>
+            <a:noFill/>
+          </p:spPr>
+          <p:txBody>
+            <a:bodyPr wrap="square" rtlCol="0">
+              <a:spAutoFit/>
+            </a:bodyPr>
+            <a:lstStyle/>
+            <a:p>
+              <a:pPr algn="ctr"/>
+              <a:r>
+                <a:rPr lang="en-US" sz="800" dirty="0">
+                  <a:solidFill>
+                    <a:schemeClr val="tx1">
+                      <a:lumMod val="50000"/>
+                      <a:lumOff val="50000"/>
+                    </a:schemeClr>
+                  </a:solidFill>
+                </a:rPr>
+                <a:t>poco</a:t>
+              </a:r>
+            </a:p>
+          </p:txBody>
+        </p:sp>
+        <p:cxnSp>
+          <p:nvCxnSpPr>
+            <p:cNvPr id="15" name="Connector: Elbow 5">
+              <a:extLst>
+                <a:ext uri="{FF2B5EF4-FFF2-40B4-BE49-F238E27FC236}">
+                  <a16:creationId xmlns:a16="http://schemas.microsoft.com/office/drawing/2014/main" id="{842748DB-99E3-AE5E-3AAE-5F939015968C}"/>
+                </a:ext>
+              </a:extLst>
+            </p:cNvPr>
+            <p:cNvCxnSpPr>
+              <a:cxnSpLocks/>
+            </p:cNvCxnSpPr>
+            <p:nvPr/>
+          </p:nvCxnSpPr>
+          <p:spPr>
+            <a:xfrm>
+              <a:off x="6027435" y="4475974"/>
+              <a:ext cx="0" cy="109794"/>
+            </a:xfrm>
+            <a:prstGeom prst="straightConnector1">
+              <a:avLst/>
+            </a:prstGeom>
+            <a:ln>
+              <a:tailEnd type="triangle"/>
+            </a:ln>
+          </p:spPr>
+          <p:style>
+            <a:lnRef idx="1">
+              <a:schemeClr val="accent1"/>
+            </a:lnRef>
+            <a:fillRef idx="0">
+              <a:schemeClr val="accent1"/>
+            </a:fillRef>
+            <a:effectRef idx="0">
+              <a:schemeClr val="accent1"/>
+            </a:effectRef>
+            <a:fontRef idx="minor">
+              <a:schemeClr val="tx1"/>
+            </a:fontRef>
+          </p:style>
+        </p:cxnSp>
+      </p:grpSp>
     </p:spTree>
     <p:extLst>
       <p:ext uri="{BB962C8B-B14F-4D97-AF65-F5344CB8AC3E}">
@@ -19462,7 +19320,7 @@
             <a:pPr algn="ctr"/>
             <a:r>
               <a:rPr lang="en-US" dirty="0"/>
-              <a:t>AVX Roadmap – 3B27 – CY2025</a:t>
+              <a:t>AVX Roadmap – 3C02 – CY2025</a:t>
             </a:r>
           </a:p>
         </p:txBody>

</xml_diff>